<commit_message>
changed WBS to have better structure
</commit_message>
<xml_diff>
--- a/Präsentation/Präsentation_Entwurf.pptx
+++ b/Präsentation/Präsentation_Entwurf.pptx
@@ -109,6 +109,11 @@
       </a:defRPr>
     </a:lvl9pPr>
   </p:defaultTextStyle>
+  <p:extLst>
+    <p:ext uri="{EFAFB233-063F-42B5-8137-9DF3F51BA10A}">
+      <p15:sldGuideLst xmlns:p15="http://schemas.microsoft.com/office/powerpoint/2012/main"/>
+    </p:ext>
+  </p:extLst>
 </p:presentation>
 </file>
 
@@ -259,7 +264,7 @@
           <a:p>
             <a:fld id="{D5E4B74C-DC10-4D74-8535-8C5AB711050D}" type="datetimeFigureOut">
               <a:rPr lang="de-DE" smtClean="0"/>
-              <a:t>28.10.2019</a:t>
+              <a:t>29.10.2019</a:t>
             </a:fld>
             <a:endParaRPr lang="de-DE"/>
           </a:p>
@@ -457,7 +462,7 @@
           <a:p>
             <a:fld id="{D5E4B74C-DC10-4D74-8535-8C5AB711050D}" type="datetimeFigureOut">
               <a:rPr lang="de-DE" smtClean="0"/>
-              <a:t>28.10.2019</a:t>
+              <a:t>29.10.2019</a:t>
             </a:fld>
             <a:endParaRPr lang="de-DE"/>
           </a:p>
@@ -665,7 +670,7 @@
           <a:p>
             <a:fld id="{D5E4B74C-DC10-4D74-8535-8C5AB711050D}" type="datetimeFigureOut">
               <a:rPr lang="de-DE" smtClean="0"/>
-              <a:t>28.10.2019</a:t>
+              <a:t>29.10.2019</a:t>
             </a:fld>
             <a:endParaRPr lang="de-DE"/>
           </a:p>
@@ -863,7 +868,7 @@
           <a:p>
             <a:fld id="{D5E4B74C-DC10-4D74-8535-8C5AB711050D}" type="datetimeFigureOut">
               <a:rPr lang="de-DE" smtClean="0"/>
-              <a:t>28.10.2019</a:t>
+              <a:t>29.10.2019</a:t>
             </a:fld>
             <a:endParaRPr lang="de-DE"/>
           </a:p>
@@ -1138,7 +1143,7 @@
           <a:p>
             <a:fld id="{D5E4B74C-DC10-4D74-8535-8C5AB711050D}" type="datetimeFigureOut">
               <a:rPr lang="de-DE" smtClean="0"/>
-              <a:t>28.10.2019</a:t>
+              <a:t>29.10.2019</a:t>
             </a:fld>
             <a:endParaRPr lang="de-DE"/>
           </a:p>
@@ -1403,7 +1408,7 @@
           <a:p>
             <a:fld id="{D5E4B74C-DC10-4D74-8535-8C5AB711050D}" type="datetimeFigureOut">
               <a:rPr lang="de-DE" smtClean="0"/>
-              <a:t>28.10.2019</a:t>
+              <a:t>29.10.2019</a:t>
             </a:fld>
             <a:endParaRPr lang="de-DE"/>
           </a:p>
@@ -1815,7 +1820,7 @@
           <a:p>
             <a:fld id="{D5E4B74C-DC10-4D74-8535-8C5AB711050D}" type="datetimeFigureOut">
               <a:rPr lang="de-DE" smtClean="0"/>
-              <a:t>28.10.2019</a:t>
+              <a:t>29.10.2019</a:t>
             </a:fld>
             <a:endParaRPr lang="de-DE"/>
           </a:p>
@@ -1956,7 +1961,7 @@
           <a:p>
             <a:fld id="{D5E4B74C-DC10-4D74-8535-8C5AB711050D}" type="datetimeFigureOut">
               <a:rPr lang="de-DE" smtClean="0"/>
-              <a:t>28.10.2019</a:t>
+              <a:t>29.10.2019</a:t>
             </a:fld>
             <a:endParaRPr lang="de-DE"/>
           </a:p>
@@ -2069,7 +2074,7 @@
           <a:p>
             <a:fld id="{D5E4B74C-DC10-4D74-8535-8C5AB711050D}" type="datetimeFigureOut">
               <a:rPr lang="de-DE" smtClean="0"/>
-              <a:t>28.10.2019</a:t>
+              <a:t>29.10.2019</a:t>
             </a:fld>
             <a:endParaRPr lang="de-DE"/>
           </a:p>
@@ -2380,7 +2385,7 @@
           <a:p>
             <a:fld id="{D5E4B74C-DC10-4D74-8535-8C5AB711050D}" type="datetimeFigureOut">
               <a:rPr lang="de-DE" smtClean="0"/>
-              <a:t>28.10.2019</a:t>
+              <a:t>29.10.2019</a:t>
             </a:fld>
             <a:endParaRPr lang="de-DE"/>
           </a:p>
@@ -2668,7 +2673,7 @@
           <a:p>
             <a:fld id="{D5E4B74C-DC10-4D74-8535-8C5AB711050D}" type="datetimeFigureOut">
               <a:rPr lang="de-DE" smtClean="0"/>
-              <a:t>28.10.2019</a:t>
+              <a:t>29.10.2019</a:t>
             </a:fld>
             <a:endParaRPr lang="de-DE"/>
           </a:p>
@@ -2909,7 +2914,7 @@
           <a:p>
             <a:fld id="{D5E4B74C-DC10-4D74-8535-8C5AB711050D}" type="datetimeFigureOut">
               <a:rPr lang="de-DE" smtClean="0"/>
-              <a:t>28.10.2019</a:t>
+              <a:t>29.10.2019</a:t>
             </a:fld>
             <a:endParaRPr lang="de-DE"/>
           </a:p>
@@ -3546,6 +3551,7 @@
           </a:bodyPr>
           <a:lstStyle/>
           <a:p>
+            <a:pPr algn="ctr"/>
             <a:r>
               <a:rPr lang="de-DE" dirty="0"/>
               <a:t>Work Breakdown Structure</a:t>
@@ -3555,10 +3561,10 @@
       </p:sp>
       <p:sp>
         <p:nvSpPr>
-          <p:cNvPr id="4" name="Rechteck 3">
-            <a:extLst>
-              <a:ext uri="{FF2B5EF4-FFF2-40B4-BE49-F238E27FC236}">
-                <a16:creationId xmlns:a16="http://schemas.microsoft.com/office/drawing/2014/main" id="{84A25221-F4BC-4ECC-80AF-403EBD2415BF}"/>
+          <p:cNvPr id="5" name="Rechteck 4">
+            <a:extLst>
+              <a:ext uri="{FF2B5EF4-FFF2-40B4-BE49-F238E27FC236}">
+                <a16:creationId xmlns:a16="http://schemas.microsoft.com/office/drawing/2014/main" id="{D05F816A-C7C1-49BE-ADE5-3D33CBD35610}"/>
               </a:ext>
             </a:extLst>
           </p:cNvPr>
@@ -3567,8 +3573,8 @@
         </p:nvSpPr>
         <p:spPr>
           <a:xfrm>
-            <a:off x="4312938" y="1293586"/>
-            <a:ext cx="2480603" cy="773723"/>
+            <a:off x="7374824" y="1690688"/>
+            <a:ext cx="1275475" cy="570381"/>
           </a:xfrm>
           <a:prstGeom prst="rect">
             <a:avLst/>
@@ -3604,22 +3610,27 @@
           <a:p>
             <a:pPr algn="ctr"/>
             <a:r>
-              <a:rPr lang="de-DE" sz="1400" dirty="0">
+              <a:rPr lang="de-DE" sz="1400" dirty="0" err="1">
                 <a:solidFill>
                   <a:schemeClr val="tx1"/>
                 </a:solidFill>
               </a:rPr>
-              <a:t>System</a:t>
-            </a:r>
-          </a:p>
-        </p:txBody>
-      </p:sp>
-      <p:sp>
-        <p:nvSpPr>
-          <p:cNvPr id="5" name="Rechteck 4">
-            <a:extLst>
-              <a:ext uri="{FF2B5EF4-FFF2-40B4-BE49-F238E27FC236}">
-                <a16:creationId xmlns:a16="http://schemas.microsoft.com/office/drawing/2014/main" id="{D05F816A-C7C1-49BE-ADE5-3D33CBD35610}"/>
+              <a:t>Testing</a:t>
+            </a:r>
+            <a:endParaRPr lang="de-DE" sz="1400" dirty="0">
+              <a:solidFill>
+                <a:schemeClr val="tx1"/>
+              </a:solidFill>
+            </a:endParaRPr>
+          </a:p>
+        </p:txBody>
+      </p:sp>
+      <p:sp>
+        <p:nvSpPr>
+          <p:cNvPr id="6" name="Rechteck 5">
+            <a:extLst>
+              <a:ext uri="{FF2B5EF4-FFF2-40B4-BE49-F238E27FC236}">
+                <a16:creationId xmlns:a16="http://schemas.microsoft.com/office/drawing/2014/main" id="{2748357F-DA3C-4365-B39A-A2797DCE49EB}"/>
               </a:ext>
             </a:extLst>
           </p:cNvPr>
@@ -3628,8 +3639,8 @@
         </p:nvSpPr>
         <p:spPr>
           <a:xfrm>
-            <a:off x="7437505" y="2557947"/>
-            <a:ext cx="1275475" cy="773723"/>
+            <a:off x="1318263" y="1690687"/>
+            <a:ext cx="1275474" cy="570382"/>
           </a:xfrm>
           <a:prstGeom prst="rect">
             <a:avLst/>
@@ -3670,7 +3681,7 @@
                   <a:schemeClr val="tx1"/>
                 </a:solidFill>
               </a:rPr>
-              <a:t>Testing</a:t>
+              <a:t>Developement</a:t>
             </a:r>
             <a:endParaRPr lang="de-DE" sz="1400" dirty="0">
               <a:solidFill>
@@ -3682,10 +3693,10 @@
       </p:sp>
       <p:sp>
         <p:nvSpPr>
-          <p:cNvPr id="6" name="Rechteck 5">
-            <a:extLst>
-              <a:ext uri="{FF2B5EF4-FFF2-40B4-BE49-F238E27FC236}">
-                <a16:creationId xmlns:a16="http://schemas.microsoft.com/office/drawing/2014/main" id="{2748357F-DA3C-4365-B39A-A2797DCE49EB}"/>
+          <p:cNvPr id="8" name="Rechteck 7">
+            <a:extLst>
+              <a:ext uri="{FF2B5EF4-FFF2-40B4-BE49-F238E27FC236}">
+                <a16:creationId xmlns:a16="http://schemas.microsoft.com/office/drawing/2014/main" id="{25C6A291-E902-4178-AD51-613DEEC5CEC3}"/>
               </a:ext>
             </a:extLst>
           </p:cNvPr>
@@ -3694,8 +3705,8 @@
         </p:nvSpPr>
         <p:spPr>
           <a:xfrm>
-            <a:off x="1173815" y="1782455"/>
-            <a:ext cx="1298050" cy="518714"/>
+            <a:off x="10138114" y="1690687"/>
+            <a:ext cx="1155895" cy="570381"/>
           </a:xfrm>
           <a:prstGeom prst="rect">
             <a:avLst/>
@@ -3731,27 +3742,238 @@
           <a:p>
             <a:pPr algn="ctr"/>
             <a:r>
+              <a:rPr lang="de-DE" sz="1400" dirty="0">
+                <a:solidFill>
+                  <a:schemeClr val="tx1"/>
+                </a:solidFill>
+              </a:rPr>
+              <a:t>Support</a:t>
+            </a:r>
+          </a:p>
+        </p:txBody>
+      </p:sp>
+      <p:sp>
+        <p:nvSpPr>
+          <p:cNvPr id="9" name="Rechteck 8">
+            <a:extLst>
+              <a:ext uri="{FF2B5EF4-FFF2-40B4-BE49-F238E27FC236}">
+                <a16:creationId xmlns:a16="http://schemas.microsoft.com/office/drawing/2014/main" id="{6E6E176E-2C0C-4FEF-AFBC-F5E07926AEFE}"/>
+              </a:ext>
+            </a:extLst>
+          </p:cNvPr>
+          <p:cNvSpPr/>
+          <p:nvPr/>
+        </p:nvSpPr>
+        <p:spPr>
+          <a:xfrm>
+            <a:off x="410437" y="2464409"/>
+            <a:ext cx="3091126" cy="4197677"/>
+          </a:xfrm>
+          <a:prstGeom prst="rect">
+            <a:avLst/>
+          </a:prstGeom>
+          <a:noFill/>
+          <a:ln>
+            <a:noFill/>
+          </a:ln>
+        </p:spPr>
+        <p:style>
+          <a:lnRef idx="2">
+            <a:schemeClr val="accent1">
+              <a:shade val="50000"/>
+            </a:schemeClr>
+          </a:lnRef>
+          <a:fillRef idx="1">
+            <a:schemeClr val="accent1"/>
+          </a:fillRef>
+          <a:effectRef idx="0">
+            <a:schemeClr val="accent1"/>
+          </a:effectRef>
+          <a:fontRef idx="minor">
+            <a:schemeClr val="lt1"/>
+          </a:fontRef>
+        </p:style>
+        <p:txBody>
+          <a:bodyPr rtlCol="0" anchor="t"/>
+          <a:lstStyle/>
+          <a:p>
+            <a:pPr marL="285750" indent="-285750">
+              <a:buFont typeface="Arial" panose="020B0604020202020204" pitchFamily="34" charset="0"/>
+              <a:buChar char="•"/>
+            </a:pPr>
+            <a:r>
+              <a:rPr lang="de-DE" sz="1400" dirty="0">
+                <a:solidFill>
+                  <a:schemeClr val="tx1"/>
+                </a:solidFill>
+              </a:rPr>
+              <a:t>MQTT Server programmieren</a:t>
+            </a:r>
+          </a:p>
+          <a:p>
+            <a:pPr marL="285750" indent="-285750">
+              <a:buFont typeface="Arial" panose="020B0604020202020204" pitchFamily="34" charset="0"/>
+              <a:buChar char="•"/>
+            </a:pPr>
+            <a:r>
+              <a:rPr lang="de-DE" sz="1400" dirty="0">
+                <a:solidFill>
+                  <a:schemeClr val="tx1"/>
+                </a:solidFill>
+              </a:rPr>
+              <a:t>Rezepte in SAP einpflegen </a:t>
+            </a:r>
+          </a:p>
+          <a:p>
+            <a:pPr marL="285750" indent="-285750">
+              <a:buFont typeface="Arial" panose="020B0604020202020204" pitchFamily="34" charset="0"/>
+              <a:buChar char="•"/>
+            </a:pPr>
+            <a:r>
+              <a:rPr lang="de-DE" sz="1400" dirty="0">
+                <a:solidFill>
+                  <a:schemeClr val="tx1"/>
+                </a:solidFill>
+              </a:rPr>
+              <a:t>Schnittstelle für Pflanzenanbau schaffen</a:t>
+            </a:r>
+          </a:p>
+          <a:p>
+            <a:pPr marL="285750" indent="-285750">
+              <a:buFont typeface="Arial" panose="020B0604020202020204" pitchFamily="34" charset="0"/>
+              <a:buChar char="•"/>
+            </a:pPr>
+            <a:r>
+              <a:rPr lang="de-DE" sz="1400" dirty="0">
+                <a:solidFill>
+                  <a:schemeClr val="tx1"/>
+                </a:solidFill>
+              </a:rPr>
+              <a:t>Schnittstelle für </a:t>
+            </a:r>
+            <a:r>
               <a:rPr lang="de-DE" sz="1400" dirty="0" err="1">
                 <a:solidFill>
                   <a:schemeClr val="tx1"/>
                 </a:solidFill>
               </a:rPr>
-              <a:t>Developement</a:t>
-            </a:r>
-            <a:endParaRPr lang="de-DE" sz="1400" dirty="0">
-              <a:solidFill>
-                <a:schemeClr val="tx1"/>
-              </a:solidFill>
-            </a:endParaRPr>
-          </a:p>
-        </p:txBody>
-      </p:sp>
-      <p:sp>
-        <p:nvSpPr>
-          <p:cNvPr id="8" name="Rechteck 7">
-            <a:extLst>
-              <a:ext uri="{FF2B5EF4-FFF2-40B4-BE49-F238E27FC236}">
-                <a16:creationId xmlns:a16="http://schemas.microsoft.com/office/drawing/2014/main" id="{25C6A291-E902-4178-AD51-613DEEC5CEC3}"/>
+              <a:t>Conditioning</a:t>
+            </a:r>
+            <a:r>
+              <a:rPr lang="de-DE" sz="1400" dirty="0">
+                <a:solidFill>
+                  <a:schemeClr val="tx1"/>
+                </a:solidFill>
+              </a:rPr>
+              <a:t> Monitoring</a:t>
+            </a:r>
+          </a:p>
+          <a:p>
+            <a:pPr marL="285750" indent="-285750">
+              <a:buFont typeface="Arial" panose="020B0604020202020204" pitchFamily="34" charset="0"/>
+              <a:buChar char="•"/>
+            </a:pPr>
+            <a:r>
+              <a:rPr lang="de-DE" sz="1400" dirty="0">
+                <a:solidFill>
+                  <a:schemeClr val="tx1"/>
+                </a:solidFill>
+              </a:rPr>
+              <a:t>SAP programmieren</a:t>
+            </a:r>
+          </a:p>
+          <a:p>
+            <a:pPr marL="285750" indent="-285750">
+              <a:buFont typeface="Arial" panose="020B0604020202020204" pitchFamily="34" charset="0"/>
+              <a:buChar char="•"/>
+            </a:pPr>
+            <a:r>
+              <a:rPr lang="de-DE" sz="1400" dirty="0">
+                <a:solidFill>
+                  <a:schemeClr val="tx1"/>
+                </a:solidFill>
+              </a:rPr>
+              <a:t>SAP Schnittstelle für die Sensoren </a:t>
+            </a:r>
+          </a:p>
+          <a:p>
+            <a:pPr marL="285750" indent="-285750">
+              <a:buFont typeface="Arial" panose="020B0604020202020204" pitchFamily="34" charset="0"/>
+              <a:buChar char="•"/>
+            </a:pPr>
+            <a:r>
+              <a:rPr lang="de-DE" sz="1400" dirty="0">
+                <a:solidFill>
+                  <a:schemeClr val="tx1"/>
+                </a:solidFill>
+              </a:rPr>
+              <a:t>RFID Kennzeichnung (pro Auftrag) erzeugen</a:t>
+            </a:r>
+          </a:p>
+          <a:p>
+            <a:pPr marL="285750" indent="-285750">
+              <a:buFont typeface="Arial" panose="020B0604020202020204" pitchFamily="34" charset="0"/>
+              <a:buChar char="•"/>
+            </a:pPr>
+            <a:r>
+              <a:rPr lang="de-DE" sz="1400" dirty="0">
+                <a:solidFill>
+                  <a:schemeClr val="tx1"/>
+                </a:solidFill>
+              </a:rPr>
+              <a:t>Sensoren anbinden und konfigurieren</a:t>
+            </a:r>
+          </a:p>
+          <a:p>
+            <a:pPr marL="285750" indent="-285750">
+              <a:buFont typeface="Arial" panose="020B0604020202020204" pitchFamily="34" charset="0"/>
+              <a:buChar char="•"/>
+            </a:pPr>
+            <a:r>
+              <a:rPr lang="de-DE" sz="1400" dirty="0">
+                <a:solidFill>
+                  <a:schemeClr val="tx1"/>
+                </a:solidFill>
+              </a:rPr>
+              <a:t>Aktoren anbinden und konfigurieren</a:t>
+            </a:r>
+          </a:p>
+          <a:p>
+            <a:pPr marL="285750" indent="-285750">
+              <a:buFont typeface="Arial" panose="020B0604020202020204" pitchFamily="34" charset="0"/>
+              <a:buChar char="•"/>
+            </a:pPr>
+            <a:r>
+              <a:rPr lang="de-DE" sz="1400" dirty="0">
+                <a:solidFill>
+                  <a:schemeClr val="tx1"/>
+                </a:solidFill>
+              </a:rPr>
+              <a:t>SPS programmieren und anbinden</a:t>
+            </a:r>
+          </a:p>
+          <a:p>
+            <a:pPr marL="285750" indent="-285750">
+              <a:buFont typeface="Arial" panose="020B0604020202020204" pitchFamily="34" charset="0"/>
+              <a:buChar char="•"/>
+            </a:pPr>
+            <a:r>
+              <a:rPr lang="de-DE" sz="1400" dirty="0">
+                <a:solidFill>
+                  <a:schemeClr val="tx1"/>
+                </a:solidFill>
+              </a:rPr>
+              <a:t>Gateway aufsetzen </a:t>
+            </a:r>
+          </a:p>
+        </p:txBody>
+      </p:sp>
+      <p:sp>
+        <p:nvSpPr>
+          <p:cNvPr id="31" name="Rechteck 30">
+            <a:extLst>
+              <a:ext uri="{FF2B5EF4-FFF2-40B4-BE49-F238E27FC236}">
+                <a16:creationId xmlns:a16="http://schemas.microsoft.com/office/drawing/2014/main" id="{0C03E21E-2FD8-44A6-AE66-1AFAE12DD2D5}"/>
               </a:ext>
             </a:extLst>
           </p:cNvPr>
@@ -3760,8 +3982,8 @@
         </p:nvSpPr>
         <p:spPr>
           <a:xfrm>
-            <a:off x="9487424" y="2584761"/>
-            <a:ext cx="1275475" cy="773723"/>
+            <a:off x="4717704" y="1690687"/>
+            <a:ext cx="1275475" cy="570382"/>
           </a:xfrm>
           <a:prstGeom prst="rect">
             <a:avLst/>
@@ -3802,17 +4024,33 @@
                   <a:schemeClr val="tx1"/>
                 </a:solidFill>
               </a:rPr>
-              <a:t>Support</a:t>
-            </a:r>
-          </a:p>
-        </p:txBody>
-      </p:sp>
-      <p:sp>
-        <p:nvSpPr>
-          <p:cNvPr id="9" name="Rechteck 8">
-            <a:extLst>
-              <a:ext uri="{FF2B5EF4-FFF2-40B4-BE49-F238E27FC236}">
-                <a16:creationId xmlns:a16="http://schemas.microsoft.com/office/drawing/2014/main" id="{6E6E176E-2C0C-4FEF-AFBC-F5E07926AEFE}"/>
+              <a:t>Projekt-</a:t>
+            </a:r>
+          </a:p>
+          <a:p>
+            <a:pPr algn="ctr"/>
+            <a:r>
+              <a:rPr lang="de-DE" sz="1400" dirty="0" err="1">
+                <a:solidFill>
+                  <a:schemeClr val="tx1"/>
+                </a:solidFill>
+              </a:rPr>
+              <a:t>management</a:t>
+            </a:r>
+            <a:endParaRPr lang="de-DE" sz="1400" dirty="0">
+              <a:solidFill>
+                <a:schemeClr val="tx1"/>
+              </a:solidFill>
+            </a:endParaRPr>
+          </a:p>
+        </p:txBody>
+      </p:sp>
+      <p:sp>
+        <p:nvSpPr>
+          <p:cNvPr id="26" name="Rechteck 25">
+            <a:extLst>
+              <a:ext uri="{FF2B5EF4-FFF2-40B4-BE49-F238E27FC236}">
+                <a16:creationId xmlns:a16="http://schemas.microsoft.com/office/drawing/2014/main" id="{CA1B537E-5B48-4DFB-9BEA-6D3128E34427}"/>
               </a:ext>
             </a:extLst>
           </p:cNvPr>
@@ -3821,19 +4059,15 @@
         </p:nvSpPr>
         <p:spPr>
           <a:xfrm>
-            <a:off x="69812" y="3245407"/>
-            <a:ext cx="657217" cy="610648"/>
+            <a:off x="3813074" y="2464409"/>
+            <a:ext cx="3091126" cy="4197677"/>
           </a:xfrm>
           <a:prstGeom prst="rect">
             <a:avLst/>
           </a:prstGeom>
-          <a:solidFill>
-            <a:schemeClr val="bg1"/>
-          </a:solidFill>
+          <a:noFill/>
           <a:ln>
-            <a:solidFill>
-              <a:schemeClr val="tx1"/>
-            </a:solidFill>
+            <a:noFill/>
           </a:ln>
         </p:spPr>
         <p:style>
@@ -3853,27 +4087,72 @@
           </a:fontRef>
         </p:style>
         <p:txBody>
-          <a:bodyPr rtlCol="0" anchor="ctr"/>
-          <a:lstStyle/>
-          <a:p>
-            <a:pPr algn="ctr"/>
+          <a:bodyPr rtlCol="0" anchor="t"/>
+          <a:lstStyle/>
+          <a:p>
+            <a:pPr marL="285750" indent="-285750">
+              <a:buFont typeface="Arial" panose="020B0604020202020204" pitchFamily="34" charset="0"/>
+              <a:buChar char="•"/>
+            </a:pPr>
             <a:r>
               <a:rPr lang="de-DE" sz="1400" dirty="0">
                 <a:solidFill>
                   <a:schemeClr val="tx1"/>
                 </a:solidFill>
               </a:rPr>
-              <a:t>MQTT Server</a:t>
-            </a:r>
-          </a:p>
-        </p:txBody>
-      </p:sp>
-      <p:sp>
-        <p:nvSpPr>
-          <p:cNvPr id="10" name="Rechteck 9">
-            <a:extLst>
-              <a:ext uri="{FF2B5EF4-FFF2-40B4-BE49-F238E27FC236}">
-                <a16:creationId xmlns:a16="http://schemas.microsoft.com/office/drawing/2014/main" id="{D54208B6-F53A-4F06-A5B6-F0D24738887C}"/>
+              <a:t>Kommunikationsplan des Systems erstellen</a:t>
+            </a:r>
+          </a:p>
+          <a:p>
+            <a:pPr marL="285750" indent="-285750">
+              <a:buFont typeface="Arial" panose="020B0604020202020204" pitchFamily="34" charset="0"/>
+              <a:buChar char="•"/>
+            </a:pPr>
+            <a:r>
+              <a:rPr lang="de-DE" sz="1400" dirty="0">
+                <a:solidFill>
+                  <a:schemeClr val="tx1"/>
+                </a:solidFill>
+              </a:rPr>
+              <a:t>Aktivitätsplan und Verteilung </a:t>
+            </a:r>
+          </a:p>
+          <a:p>
+            <a:pPr marL="285750" indent="-285750">
+              <a:buFont typeface="Arial" panose="020B0604020202020204" pitchFamily="34" charset="0"/>
+              <a:buChar char="•"/>
+            </a:pPr>
+            <a:r>
+              <a:rPr lang="de-DE" sz="1400" dirty="0">
+                <a:solidFill>
+                  <a:schemeClr val="tx1"/>
+                </a:solidFill>
+              </a:rPr>
+              <a:t>Kommunikation mit anderen Gruppen</a:t>
+            </a:r>
+          </a:p>
+          <a:p>
+            <a:pPr marL="285750" indent="-285750">
+              <a:buFont typeface="Arial" panose="020B0604020202020204" pitchFamily="34" charset="0"/>
+              <a:buChar char="•"/>
+            </a:pPr>
+            <a:r>
+              <a:rPr lang="de-DE" sz="1400" dirty="0">
+                <a:solidFill>
+                  <a:schemeClr val="tx1"/>
+                </a:solidFill>
+              </a:rPr>
+              <a:t>Überprüfung der Ziele und mögliche Anpassung des Projektplans</a:t>
+            </a:r>
+          </a:p>
+        </p:txBody>
+      </p:sp>
+      <p:sp>
+        <p:nvSpPr>
+          <p:cNvPr id="30" name="Rechteck 29">
+            <a:extLst>
+              <a:ext uri="{FF2B5EF4-FFF2-40B4-BE49-F238E27FC236}">
+                <a16:creationId xmlns:a16="http://schemas.microsoft.com/office/drawing/2014/main" id="{C80BE056-2216-419E-A5EA-0CCEEE7AC3B1}"/>
               </a:ext>
             </a:extLst>
           </p:cNvPr>
@@ -3882,19 +4161,15 @@
         </p:nvSpPr>
         <p:spPr>
           <a:xfrm>
-            <a:off x="2738920" y="3242740"/>
-            <a:ext cx="1092590" cy="773723"/>
+            <a:off x="6686590" y="2464410"/>
+            <a:ext cx="3091126" cy="4197677"/>
           </a:xfrm>
           <a:prstGeom prst="rect">
             <a:avLst/>
           </a:prstGeom>
-          <a:solidFill>
-            <a:schemeClr val="bg1"/>
-          </a:solidFill>
+          <a:noFill/>
           <a:ln>
-            <a:solidFill>
-              <a:schemeClr val="tx1"/>
-            </a:solidFill>
+            <a:noFill/>
           </a:ln>
         </p:spPr>
         <p:style>
@@ -3914,27 +4189,44 @@
           </a:fontRef>
         </p:style>
         <p:txBody>
-          <a:bodyPr rtlCol="0" anchor="ctr"/>
-          <a:lstStyle/>
-          <a:p>
-            <a:pPr algn="ctr"/>
+          <a:bodyPr rtlCol="0" anchor="t"/>
+          <a:lstStyle/>
+          <a:p>
+            <a:pPr marL="285750" indent="-285750">
+              <a:buFont typeface="Arial" panose="020B0604020202020204" pitchFamily="34" charset="0"/>
+              <a:buChar char="•"/>
+            </a:pPr>
             <a:r>
               <a:rPr lang="de-DE" sz="1400" dirty="0">
                 <a:solidFill>
                   <a:schemeClr val="tx1"/>
                 </a:solidFill>
               </a:rPr>
-              <a:t>Sensoren anbinden</a:t>
-            </a:r>
-          </a:p>
-        </p:txBody>
-      </p:sp>
-      <p:sp>
-        <p:nvSpPr>
-          <p:cNvPr id="11" name="Rechteck 10">
-            <a:extLst>
-              <a:ext uri="{FF2B5EF4-FFF2-40B4-BE49-F238E27FC236}">
-                <a16:creationId xmlns:a16="http://schemas.microsoft.com/office/drawing/2014/main" id="{A1BAA2AD-8D3C-4A0F-8928-1BEE36818AB5}"/>
+              <a:t>Stresstest/Integrationstest</a:t>
+            </a:r>
+          </a:p>
+          <a:p>
+            <a:pPr marL="285750" indent="-285750">
+              <a:buFont typeface="Arial" panose="020B0604020202020204" pitchFamily="34" charset="0"/>
+              <a:buChar char="•"/>
+            </a:pPr>
+            <a:r>
+              <a:rPr lang="de-DE" sz="1400" dirty="0">
+                <a:solidFill>
+                  <a:schemeClr val="tx1"/>
+                </a:solidFill>
+              </a:rPr>
+              <a:t>Produktionstest/Abnahme</a:t>
+            </a:r>
+          </a:p>
+        </p:txBody>
+      </p:sp>
+      <p:sp>
+        <p:nvSpPr>
+          <p:cNvPr id="35" name="Rechteck 34">
+            <a:extLst>
+              <a:ext uri="{FF2B5EF4-FFF2-40B4-BE49-F238E27FC236}">
+                <a16:creationId xmlns:a16="http://schemas.microsoft.com/office/drawing/2014/main" id="{B3E8A12B-59CA-41CA-8416-C45E34EE49E2}"/>
               </a:ext>
             </a:extLst>
           </p:cNvPr>
@@ -3943,19 +4235,15 @@
         </p:nvSpPr>
         <p:spPr>
           <a:xfrm>
-            <a:off x="2733032" y="4212510"/>
-            <a:ext cx="1155895" cy="773723"/>
+            <a:off x="9170498" y="2464408"/>
+            <a:ext cx="3091126" cy="4197677"/>
           </a:xfrm>
           <a:prstGeom prst="rect">
             <a:avLst/>
           </a:prstGeom>
-          <a:solidFill>
-            <a:schemeClr val="bg1"/>
-          </a:solidFill>
+          <a:noFill/>
           <a:ln>
-            <a:solidFill>
-              <a:schemeClr val="tx1"/>
-            </a:solidFill>
+            <a:noFill/>
           </a:ln>
         </p:spPr>
         <p:style>
@@ -3975,1092 +4263,34 @@
           </a:fontRef>
         </p:style>
         <p:txBody>
-          <a:bodyPr rtlCol="0" anchor="ctr"/>
-          <a:lstStyle/>
-          <a:p>
-            <a:pPr algn="ctr"/>
+          <a:bodyPr rtlCol="0" anchor="t"/>
+          <a:lstStyle/>
+          <a:p>
+            <a:pPr marL="285750" indent="-285750">
+              <a:buFont typeface="Arial" panose="020B0604020202020204" pitchFamily="34" charset="0"/>
+              <a:buChar char="•"/>
+            </a:pPr>
             <a:r>
               <a:rPr lang="de-DE" sz="1400" dirty="0">
                 <a:solidFill>
                   <a:schemeClr val="tx1"/>
                 </a:solidFill>
               </a:rPr>
-              <a:t>Aktoren anbinden</a:t>
-            </a:r>
-          </a:p>
-        </p:txBody>
-      </p:sp>
-      <p:sp>
-        <p:nvSpPr>
-          <p:cNvPr id="12" name="Rechteck 11">
-            <a:extLst>
-              <a:ext uri="{FF2B5EF4-FFF2-40B4-BE49-F238E27FC236}">
-                <a16:creationId xmlns:a16="http://schemas.microsoft.com/office/drawing/2014/main" id="{116AFCAB-5D7F-40A2-9320-734EF2401289}"/>
-              </a:ext>
-            </a:extLst>
-          </p:cNvPr>
-          <p:cNvSpPr/>
-          <p:nvPr/>
-        </p:nvSpPr>
-        <p:spPr>
-          <a:xfrm>
-            <a:off x="2717882" y="5080796"/>
-            <a:ext cx="1155895" cy="773723"/>
-          </a:xfrm>
-          <a:prstGeom prst="rect">
-            <a:avLst/>
-          </a:prstGeom>
-          <a:solidFill>
-            <a:schemeClr val="bg1"/>
-          </a:solidFill>
-          <a:ln>
-            <a:solidFill>
-              <a:schemeClr val="tx1"/>
-            </a:solidFill>
-          </a:ln>
-        </p:spPr>
-        <p:style>
-          <a:lnRef idx="2">
-            <a:schemeClr val="accent1">
-              <a:shade val="50000"/>
-            </a:schemeClr>
-          </a:lnRef>
-          <a:fillRef idx="1">
-            <a:schemeClr val="accent1"/>
-          </a:fillRef>
-          <a:effectRef idx="0">
-            <a:schemeClr val="accent1"/>
-          </a:effectRef>
-          <a:fontRef idx="minor">
-            <a:schemeClr val="lt1"/>
-          </a:fontRef>
-        </p:style>
-        <p:txBody>
-          <a:bodyPr rtlCol="0" anchor="ctr"/>
-          <a:lstStyle/>
-          <a:p>
-            <a:pPr algn="ctr"/>
+              <a:t>Mitarbeiter Schulung </a:t>
+            </a:r>
+          </a:p>
+          <a:p>
+            <a:pPr marL="285750" indent="-285750">
+              <a:buFont typeface="Arial" panose="020B0604020202020204" pitchFamily="34" charset="0"/>
+              <a:buChar char="•"/>
+            </a:pPr>
             <a:r>
               <a:rPr lang="de-DE" sz="1400" dirty="0">
                 <a:solidFill>
                   <a:schemeClr val="tx1"/>
                 </a:solidFill>
               </a:rPr>
-              <a:t>SPS programmieren</a:t>
-            </a:r>
-          </a:p>
-        </p:txBody>
-      </p:sp>
-      <p:sp>
-        <p:nvSpPr>
-          <p:cNvPr id="13" name="Rechteck 12">
-            <a:extLst>
-              <a:ext uri="{FF2B5EF4-FFF2-40B4-BE49-F238E27FC236}">
-                <a16:creationId xmlns:a16="http://schemas.microsoft.com/office/drawing/2014/main" id="{0E6803AD-81D4-4D77-A08F-86B80795DE4A}"/>
-              </a:ext>
-            </a:extLst>
-          </p:cNvPr>
-          <p:cNvSpPr/>
-          <p:nvPr/>
-        </p:nvSpPr>
-        <p:spPr>
-          <a:xfrm>
-            <a:off x="36541" y="5549293"/>
-            <a:ext cx="927320" cy="610648"/>
-          </a:xfrm>
-          <a:prstGeom prst="rect">
-            <a:avLst/>
-          </a:prstGeom>
-          <a:solidFill>
-            <a:schemeClr val="bg1"/>
-          </a:solidFill>
-          <a:ln>
-            <a:solidFill>
-              <a:schemeClr val="tx1"/>
-            </a:solidFill>
-          </a:ln>
-        </p:spPr>
-        <p:style>
-          <a:lnRef idx="2">
-            <a:schemeClr val="accent1">
-              <a:shade val="50000"/>
-            </a:schemeClr>
-          </a:lnRef>
-          <a:fillRef idx="1">
-            <a:schemeClr val="accent1"/>
-          </a:fillRef>
-          <a:effectRef idx="0">
-            <a:schemeClr val="accent1"/>
-          </a:effectRef>
-          <a:fontRef idx="minor">
-            <a:schemeClr val="lt1"/>
-          </a:fontRef>
-        </p:style>
-        <p:txBody>
-          <a:bodyPr rtlCol="0" anchor="ctr"/>
-          <a:lstStyle/>
-          <a:p>
-            <a:pPr algn="ctr"/>
-            <a:r>
-              <a:rPr lang="de-DE" sz="1400" dirty="0">
-                <a:solidFill>
-                  <a:schemeClr val="tx1"/>
-                </a:solidFill>
-              </a:rPr>
-              <a:t>SAP aufsetzen</a:t>
-            </a:r>
-          </a:p>
-        </p:txBody>
-      </p:sp>
-      <p:sp>
-        <p:nvSpPr>
-          <p:cNvPr id="15" name="Rechteck 14">
-            <a:extLst>
-              <a:ext uri="{FF2B5EF4-FFF2-40B4-BE49-F238E27FC236}">
-                <a16:creationId xmlns:a16="http://schemas.microsoft.com/office/drawing/2014/main" id="{4F71A897-02BA-4EF5-9EAE-62E5FABAE0F9}"/>
-              </a:ext>
-            </a:extLst>
-          </p:cNvPr>
-          <p:cNvSpPr/>
-          <p:nvPr/>
-        </p:nvSpPr>
-        <p:spPr>
-          <a:xfrm>
-            <a:off x="7396332" y="3576458"/>
-            <a:ext cx="1413799" cy="773723"/>
-          </a:xfrm>
-          <a:prstGeom prst="rect">
-            <a:avLst/>
-          </a:prstGeom>
-          <a:solidFill>
-            <a:schemeClr val="bg1"/>
-          </a:solidFill>
-          <a:ln>
-            <a:solidFill>
-              <a:schemeClr val="tx1"/>
-            </a:solidFill>
-          </a:ln>
-        </p:spPr>
-        <p:style>
-          <a:lnRef idx="2">
-            <a:schemeClr val="accent1">
-              <a:shade val="50000"/>
-            </a:schemeClr>
-          </a:lnRef>
-          <a:fillRef idx="1">
-            <a:schemeClr val="accent1"/>
-          </a:fillRef>
-          <a:effectRef idx="0">
-            <a:schemeClr val="accent1"/>
-          </a:effectRef>
-          <a:fontRef idx="minor">
-            <a:schemeClr val="lt1"/>
-          </a:fontRef>
-        </p:style>
-        <p:txBody>
-          <a:bodyPr rtlCol="0" anchor="ctr"/>
-          <a:lstStyle/>
-          <a:p>
-            <a:pPr algn="ctr"/>
-            <a:r>
-              <a:rPr lang="de-DE" sz="1400" dirty="0">
-                <a:solidFill>
-                  <a:schemeClr val="tx1"/>
-                </a:solidFill>
-              </a:rPr>
-              <a:t>Integrationstest</a:t>
-            </a:r>
-          </a:p>
-          <a:p>
-            <a:pPr algn="ctr"/>
-            <a:r>
-              <a:rPr lang="de-DE" sz="1400" dirty="0">
-                <a:solidFill>
-                  <a:schemeClr val="tx1"/>
-                </a:solidFill>
-              </a:rPr>
-              <a:t>Stresstest</a:t>
-            </a:r>
-          </a:p>
-        </p:txBody>
-      </p:sp>
-      <p:sp>
-        <p:nvSpPr>
-          <p:cNvPr id="20" name="Rechteck 19">
-            <a:extLst>
-              <a:ext uri="{FF2B5EF4-FFF2-40B4-BE49-F238E27FC236}">
-                <a16:creationId xmlns:a16="http://schemas.microsoft.com/office/drawing/2014/main" id="{D674EFF7-0D84-4321-9C08-C6B08CA60BEC}"/>
-              </a:ext>
-            </a:extLst>
-          </p:cNvPr>
-          <p:cNvSpPr/>
-          <p:nvPr/>
-        </p:nvSpPr>
-        <p:spPr>
-          <a:xfrm>
-            <a:off x="11012656" y="3882705"/>
-            <a:ext cx="1155895" cy="773723"/>
-          </a:xfrm>
-          <a:prstGeom prst="rect">
-            <a:avLst/>
-          </a:prstGeom>
-          <a:solidFill>
-            <a:schemeClr val="bg1"/>
-          </a:solidFill>
-          <a:ln>
-            <a:solidFill>
-              <a:schemeClr val="tx1"/>
-            </a:solidFill>
-          </a:ln>
-        </p:spPr>
-        <p:style>
-          <a:lnRef idx="2">
-            <a:schemeClr val="accent1">
-              <a:shade val="50000"/>
-            </a:schemeClr>
-          </a:lnRef>
-          <a:fillRef idx="1">
-            <a:schemeClr val="accent1"/>
-          </a:fillRef>
-          <a:effectRef idx="0">
-            <a:schemeClr val="accent1"/>
-          </a:effectRef>
-          <a:fontRef idx="minor">
-            <a:schemeClr val="lt1"/>
-          </a:fontRef>
-        </p:style>
-        <p:txBody>
-          <a:bodyPr rtlCol="0" anchor="ctr"/>
-          <a:lstStyle/>
-          <a:p>
-            <a:pPr algn="ctr"/>
-            <a:r>
-              <a:rPr lang="de-DE" sz="1400" dirty="0">
-                <a:solidFill>
-                  <a:schemeClr val="tx1"/>
-                </a:solidFill>
-              </a:rPr>
-              <a:t>MA Schulung</a:t>
-            </a:r>
-          </a:p>
-        </p:txBody>
-      </p:sp>
-      <p:sp>
-        <p:nvSpPr>
-          <p:cNvPr id="21" name="Rechteck 20">
-            <a:extLst>
-              <a:ext uri="{FF2B5EF4-FFF2-40B4-BE49-F238E27FC236}">
-                <a16:creationId xmlns:a16="http://schemas.microsoft.com/office/drawing/2014/main" id="{68C4B01A-10DD-4A31-BA11-948DD239210A}"/>
-              </a:ext>
-            </a:extLst>
-          </p:cNvPr>
-          <p:cNvSpPr/>
-          <p:nvPr/>
-        </p:nvSpPr>
-        <p:spPr>
-          <a:xfrm>
-            <a:off x="77946" y="2633518"/>
-            <a:ext cx="927320" cy="518715"/>
-          </a:xfrm>
-          <a:prstGeom prst="rect">
-            <a:avLst/>
-          </a:prstGeom>
-          <a:solidFill>
-            <a:schemeClr val="bg1"/>
-          </a:solidFill>
-          <a:ln>
-            <a:solidFill>
-              <a:schemeClr val="tx1"/>
-            </a:solidFill>
-          </a:ln>
-        </p:spPr>
-        <p:style>
-          <a:lnRef idx="2">
-            <a:schemeClr val="accent1">
-              <a:shade val="50000"/>
-            </a:schemeClr>
-          </a:lnRef>
-          <a:fillRef idx="1">
-            <a:schemeClr val="accent1"/>
-          </a:fillRef>
-          <a:effectRef idx="0">
-            <a:schemeClr val="accent1"/>
-          </a:effectRef>
-          <a:fontRef idx="minor">
-            <a:schemeClr val="lt1"/>
-          </a:fontRef>
-        </p:style>
-        <p:txBody>
-          <a:bodyPr rtlCol="0" anchor="ctr"/>
-          <a:lstStyle/>
-          <a:p>
-            <a:pPr algn="ctr"/>
-            <a:r>
-              <a:rPr lang="de-DE" sz="1400" dirty="0">
-                <a:solidFill>
-                  <a:schemeClr val="tx1"/>
-                </a:solidFill>
-              </a:rPr>
-              <a:t>Software</a:t>
-            </a:r>
-          </a:p>
-        </p:txBody>
-      </p:sp>
-      <p:sp>
-        <p:nvSpPr>
-          <p:cNvPr id="22" name="Rechteck 21">
-            <a:extLst>
-              <a:ext uri="{FF2B5EF4-FFF2-40B4-BE49-F238E27FC236}">
-                <a16:creationId xmlns:a16="http://schemas.microsoft.com/office/drawing/2014/main" id="{3BF449BA-AB13-466A-BD21-6269F42259A1}"/>
-              </a:ext>
-            </a:extLst>
-          </p:cNvPr>
-          <p:cNvSpPr/>
-          <p:nvPr/>
-        </p:nvSpPr>
-        <p:spPr>
-          <a:xfrm>
-            <a:off x="2704576" y="2421255"/>
-            <a:ext cx="927320" cy="658446"/>
-          </a:xfrm>
-          <a:prstGeom prst="rect">
-            <a:avLst/>
-          </a:prstGeom>
-          <a:solidFill>
-            <a:schemeClr val="bg1"/>
-          </a:solidFill>
-          <a:ln>
-            <a:solidFill>
-              <a:schemeClr val="tx1"/>
-            </a:solidFill>
-          </a:ln>
-        </p:spPr>
-        <p:style>
-          <a:lnRef idx="2">
-            <a:schemeClr val="accent1">
-              <a:shade val="50000"/>
-            </a:schemeClr>
-          </a:lnRef>
-          <a:fillRef idx="1">
-            <a:schemeClr val="accent1"/>
-          </a:fillRef>
-          <a:effectRef idx="0">
-            <a:schemeClr val="accent1"/>
-          </a:effectRef>
-          <a:fontRef idx="minor">
-            <a:schemeClr val="lt1"/>
-          </a:fontRef>
-        </p:style>
-        <p:txBody>
-          <a:bodyPr rtlCol="0" anchor="ctr"/>
-          <a:lstStyle/>
-          <a:p>
-            <a:pPr algn="ctr"/>
-            <a:r>
-              <a:rPr lang="de-DE" sz="1400" dirty="0">
-                <a:solidFill>
-                  <a:schemeClr val="tx1"/>
-                </a:solidFill>
-              </a:rPr>
-              <a:t>Hardware</a:t>
-            </a:r>
-          </a:p>
-        </p:txBody>
-      </p:sp>
-      <p:sp>
-        <p:nvSpPr>
-          <p:cNvPr id="23" name="Rechteck 22">
-            <a:extLst>
-              <a:ext uri="{FF2B5EF4-FFF2-40B4-BE49-F238E27FC236}">
-                <a16:creationId xmlns:a16="http://schemas.microsoft.com/office/drawing/2014/main" id="{24D94F05-E5CF-460B-953E-49177F07D9D8}"/>
-              </a:ext>
-            </a:extLst>
-          </p:cNvPr>
-          <p:cNvSpPr/>
-          <p:nvPr/>
-        </p:nvSpPr>
-        <p:spPr>
-          <a:xfrm>
-            <a:off x="2733032" y="5949579"/>
-            <a:ext cx="928848" cy="638356"/>
-          </a:xfrm>
-          <a:prstGeom prst="rect">
-            <a:avLst/>
-          </a:prstGeom>
-          <a:solidFill>
-            <a:schemeClr val="bg1"/>
-          </a:solidFill>
-          <a:ln>
-            <a:solidFill>
-              <a:schemeClr val="tx1"/>
-            </a:solidFill>
-          </a:ln>
-        </p:spPr>
-        <p:style>
-          <a:lnRef idx="2">
-            <a:schemeClr val="accent1">
-              <a:shade val="50000"/>
-            </a:schemeClr>
-          </a:lnRef>
-          <a:fillRef idx="1">
-            <a:schemeClr val="accent1"/>
-          </a:fillRef>
-          <a:effectRef idx="0">
-            <a:schemeClr val="accent1"/>
-          </a:effectRef>
-          <a:fontRef idx="minor">
-            <a:schemeClr val="lt1"/>
-          </a:fontRef>
-        </p:style>
-        <p:txBody>
-          <a:bodyPr rtlCol="0" anchor="ctr"/>
-          <a:lstStyle/>
-          <a:p>
-            <a:pPr algn="ctr"/>
-            <a:r>
-              <a:rPr lang="de-DE" sz="1400" dirty="0">
-                <a:solidFill>
-                  <a:schemeClr val="tx1"/>
-                </a:solidFill>
-              </a:rPr>
-              <a:t>Gateway aufsetzen</a:t>
-            </a:r>
-          </a:p>
-        </p:txBody>
-      </p:sp>
-      <p:sp>
-        <p:nvSpPr>
-          <p:cNvPr id="24" name="Rechteck 23">
-            <a:extLst>
-              <a:ext uri="{FF2B5EF4-FFF2-40B4-BE49-F238E27FC236}">
-                <a16:creationId xmlns:a16="http://schemas.microsoft.com/office/drawing/2014/main" id="{FCDCF1D2-5A4B-4F0F-ABFC-DD3967A165B3}"/>
-              </a:ext>
-            </a:extLst>
-          </p:cNvPr>
-          <p:cNvSpPr/>
-          <p:nvPr/>
-        </p:nvSpPr>
-        <p:spPr>
-          <a:xfrm>
-            <a:off x="17919" y="4773642"/>
-            <a:ext cx="1155896" cy="737579"/>
-          </a:xfrm>
-          <a:prstGeom prst="rect">
-            <a:avLst/>
-          </a:prstGeom>
-          <a:solidFill>
-            <a:schemeClr val="bg1"/>
-          </a:solidFill>
-          <a:ln>
-            <a:solidFill>
-              <a:schemeClr val="tx1"/>
-            </a:solidFill>
-          </a:ln>
-        </p:spPr>
-        <p:style>
-          <a:lnRef idx="2">
-            <a:schemeClr val="accent1">
-              <a:shade val="50000"/>
-            </a:schemeClr>
-          </a:lnRef>
-          <a:fillRef idx="1">
-            <a:schemeClr val="accent1"/>
-          </a:fillRef>
-          <a:effectRef idx="0">
-            <a:schemeClr val="accent1"/>
-          </a:effectRef>
-          <a:fontRef idx="minor">
-            <a:schemeClr val="lt1"/>
-          </a:fontRef>
-        </p:style>
-        <p:txBody>
-          <a:bodyPr rtlCol="0" anchor="ctr"/>
-          <a:lstStyle/>
-          <a:p>
-            <a:pPr algn="ctr"/>
-            <a:r>
-              <a:rPr lang="de-DE" sz="1400" dirty="0" err="1">
-                <a:solidFill>
-                  <a:schemeClr val="tx1"/>
-                </a:solidFill>
-              </a:rPr>
-              <a:t>Conditioning</a:t>
-            </a:r>
-            <a:r>
-              <a:rPr lang="de-DE" sz="1400" dirty="0">
-                <a:solidFill>
-                  <a:schemeClr val="tx1"/>
-                </a:solidFill>
-              </a:rPr>
-              <a:t> Monitoring anbinden</a:t>
-            </a:r>
-          </a:p>
-        </p:txBody>
-      </p:sp>
-      <p:sp>
-        <p:nvSpPr>
-          <p:cNvPr id="27" name="Rechteck 26">
-            <a:extLst>
-              <a:ext uri="{FF2B5EF4-FFF2-40B4-BE49-F238E27FC236}">
-                <a16:creationId xmlns:a16="http://schemas.microsoft.com/office/drawing/2014/main" id="{6385308D-9EF9-4F93-ADEF-7FD57317D1E3}"/>
-              </a:ext>
-            </a:extLst>
-          </p:cNvPr>
-          <p:cNvSpPr/>
-          <p:nvPr/>
-        </p:nvSpPr>
-        <p:spPr>
-          <a:xfrm>
-            <a:off x="7382651" y="4482410"/>
-            <a:ext cx="1528690" cy="773723"/>
-          </a:xfrm>
-          <a:prstGeom prst="rect">
-            <a:avLst/>
-          </a:prstGeom>
-          <a:solidFill>
-            <a:schemeClr val="bg1"/>
-          </a:solidFill>
-          <a:ln>
-            <a:solidFill>
-              <a:schemeClr val="tx1"/>
-            </a:solidFill>
-          </a:ln>
-        </p:spPr>
-        <p:style>
-          <a:lnRef idx="2">
-            <a:schemeClr val="accent1">
-              <a:shade val="50000"/>
-            </a:schemeClr>
-          </a:lnRef>
-          <a:fillRef idx="1">
-            <a:schemeClr val="accent1"/>
-          </a:fillRef>
-          <a:effectRef idx="0">
-            <a:schemeClr val="accent1"/>
-          </a:effectRef>
-          <a:fontRef idx="minor">
-            <a:schemeClr val="lt1"/>
-          </a:fontRef>
-        </p:style>
-        <p:txBody>
-          <a:bodyPr rtlCol="0" anchor="ctr"/>
-          <a:lstStyle/>
-          <a:p>
-            <a:pPr algn="ctr"/>
-            <a:r>
-              <a:rPr lang="de-DE" sz="1400" dirty="0">
-                <a:solidFill>
-                  <a:schemeClr val="tx1"/>
-                </a:solidFill>
-              </a:rPr>
-              <a:t>Produktionstest</a:t>
-            </a:r>
-          </a:p>
-          <a:p>
-            <a:pPr algn="ctr"/>
-            <a:r>
-              <a:rPr lang="de-DE" sz="1400" dirty="0">
-                <a:solidFill>
-                  <a:schemeClr val="tx1"/>
-                </a:solidFill>
-              </a:rPr>
-              <a:t>Abnahme</a:t>
-            </a:r>
-          </a:p>
-        </p:txBody>
-      </p:sp>
-      <p:sp>
-        <p:nvSpPr>
-          <p:cNvPr id="28" name="Rechteck 27">
-            <a:extLst>
-              <a:ext uri="{FF2B5EF4-FFF2-40B4-BE49-F238E27FC236}">
-                <a16:creationId xmlns:a16="http://schemas.microsoft.com/office/drawing/2014/main" id="{DCE394A4-13C5-4C69-A24B-0EBD5E9DB43A}"/>
-              </a:ext>
-            </a:extLst>
-          </p:cNvPr>
-          <p:cNvSpPr/>
-          <p:nvPr/>
-        </p:nvSpPr>
-        <p:spPr>
-          <a:xfrm>
-            <a:off x="1221245" y="4079122"/>
-            <a:ext cx="1351671" cy="773723"/>
-          </a:xfrm>
-          <a:prstGeom prst="rect">
-            <a:avLst/>
-          </a:prstGeom>
-          <a:solidFill>
-            <a:schemeClr val="bg1"/>
-          </a:solidFill>
-          <a:ln>
-            <a:solidFill>
-              <a:schemeClr val="tx1"/>
-            </a:solidFill>
-          </a:ln>
-        </p:spPr>
-        <p:style>
-          <a:lnRef idx="2">
-            <a:schemeClr val="accent1">
-              <a:shade val="50000"/>
-            </a:schemeClr>
-          </a:lnRef>
-          <a:fillRef idx="1">
-            <a:schemeClr val="accent1"/>
-          </a:fillRef>
-          <a:effectRef idx="0">
-            <a:schemeClr val="accent1"/>
-          </a:effectRef>
-          <a:fontRef idx="minor">
-            <a:schemeClr val="lt1"/>
-          </a:fontRef>
-        </p:style>
-        <p:txBody>
-          <a:bodyPr rtlCol="0" anchor="ctr"/>
-          <a:lstStyle/>
-          <a:p>
-            <a:pPr algn="ctr"/>
-            <a:r>
-              <a:rPr lang="de-DE" sz="1400" dirty="0">
-                <a:solidFill>
-                  <a:schemeClr val="tx1"/>
-                </a:solidFill>
-              </a:rPr>
-              <a:t>SAP Schnittstelle zu Sensoren</a:t>
-            </a:r>
-          </a:p>
-        </p:txBody>
-      </p:sp>
-      <p:sp>
-        <p:nvSpPr>
-          <p:cNvPr id="31" name="Rechteck 30">
-            <a:extLst>
-              <a:ext uri="{FF2B5EF4-FFF2-40B4-BE49-F238E27FC236}">
-                <a16:creationId xmlns:a16="http://schemas.microsoft.com/office/drawing/2014/main" id="{0C03E21E-2FD8-44A6-AE66-1AFAE12DD2D5}"/>
-              </a:ext>
-            </a:extLst>
-          </p:cNvPr>
-          <p:cNvSpPr/>
-          <p:nvPr/>
-        </p:nvSpPr>
-        <p:spPr>
-          <a:xfrm>
-            <a:off x="4975291" y="2534341"/>
-            <a:ext cx="1155895" cy="773723"/>
-          </a:xfrm>
-          <a:prstGeom prst="rect">
-            <a:avLst/>
-          </a:prstGeom>
-          <a:solidFill>
-            <a:schemeClr val="bg1"/>
-          </a:solidFill>
-          <a:ln>
-            <a:solidFill>
-              <a:schemeClr val="tx1"/>
-            </a:solidFill>
-          </a:ln>
-        </p:spPr>
-        <p:style>
-          <a:lnRef idx="2">
-            <a:schemeClr val="accent1">
-              <a:shade val="50000"/>
-            </a:schemeClr>
-          </a:lnRef>
-          <a:fillRef idx="1">
-            <a:schemeClr val="accent1"/>
-          </a:fillRef>
-          <a:effectRef idx="0">
-            <a:schemeClr val="accent1"/>
-          </a:effectRef>
-          <a:fontRef idx="minor">
-            <a:schemeClr val="lt1"/>
-          </a:fontRef>
-        </p:style>
-        <p:txBody>
-          <a:bodyPr rtlCol="0" anchor="ctr"/>
-          <a:lstStyle/>
-          <a:p>
-            <a:pPr algn="ctr"/>
-            <a:r>
-              <a:rPr lang="de-DE" sz="1400" dirty="0">
-                <a:solidFill>
-                  <a:schemeClr val="tx1"/>
-                </a:solidFill>
-              </a:rPr>
-              <a:t>Projekt-</a:t>
-            </a:r>
-          </a:p>
-          <a:p>
-            <a:pPr algn="ctr"/>
-            <a:r>
-              <a:rPr lang="de-DE" sz="1400" dirty="0" err="1">
-                <a:solidFill>
-                  <a:schemeClr val="tx1"/>
-                </a:solidFill>
-              </a:rPr>
-              <a:t>management</a:t>
-            </a:r>
-            <a:endParaRPr lang="de-DE" sz="1400" dirty="0">
-              <a:solidFill>
-                <a:schemeClr val="tx1"/>
-              </a:solidFill>
-            </a:endParaRPr>
-          </a:p>
-        </p:txBody>
-      </p:sp>
-      <p:sp>
-        <p:nvSpPr>
-          <p:cNvPr id="32" name="Rechteck 31">
-            <a:extLst>
-              <a:ext uri="{FF2B5EF4-FFF2-40B4-BE49-F238E27FC236}">
-                <a16:creationId xmlns:a16="http://schemas.microsoft.com/office/drawing/2014/main" id="{804237F2-8707-48EA-9450-BC1BFD44DA9C}"/>
-              </a:ext>
-            </a:extLst>
-          </p:cNvPr>
-          <p:cNvSpPr/>
-          <p:nvPr/>
-        </p:nvSpPr>
-        <p:spPr>
-          <a:xfrm>
-            <a:off x="1135181" y="3185676"/>
-            <a:ext cx="1298050" cy="712866"/>
-          </a:xfrm>
-          <a:prstGeom prst="rect">
-            <a:avLst/>
-          </a:prstGeom>
-          <a:solidFill>
-            <a:schemeClr val="bg1"/>
-          </a:solidFill>
-          <a:ln>
-            <a:solidFill>
-              <a:schemeClr val="tx1"/>
-            </a:solidFill>
-          </a:ln>
-        </p:spPr>
-        <p:style>
-          <a:lnRef idx="2">
-            <a:schemeClr val="accent1">
-              <a:shade val="50000"/>
-            </a:schemeClr>
-          </a:lnRef>
-          <a:fillRef idx="1">
-            <a:schemeClr val="accent1"/>
-          </a:fillRef>
-          <a:effectRef idx="0">
-            <a:schemeClr val="accent1"/>
-          </a:effectRef>
-          <a:fontRef idx="minor">
-            <a:schemeClr val="lt1"/>
-          </a:fontRef>
-        </p:style>
-        <p:txBody>
-          <a:bodyPr rtlCol="0" anchor="ctr"/>
-          <a:lstStyle/>
-          <a:p>
-            <a:pPr algn="ctr"/>
-            <a:r>
-              <a:rPr lang="de-DE" sz="1400" dirty="0">
-                <a:solidFill>
-                  <a:schemeClr val="tx1"/>
-                </a:solidFill>
-              </a:rPr>
-              <a:t>Rezept in SAP einpflegen</a:t>
-            </a:r>
-          </a:p>
-        </p:txBody>
-      </p:sp>
-      <p:sp>
-        <p:nvSpPr>
-          <p:cNvPr id="33" name="Rechteck 32">
-            <a:extLst>
-              <a:ext uri="{FF2B5EF4-FFF2-40B4-BE49-F238E27FC236}">
-                <a16:creationId xmlns:a16="http://schemas.microsoft.com/office/drawing/2014/main" id="{1E2B988C-07FE-410C-816F-230AE7313F7C}"/>
-              </a:ext>
-            </a:extLst>
-          </p:cNvPr>
-          <p:cNvSpPr/>
-          <p:nvPr/>
-        </p:nvSpPr>
-        <p:spPr>
-          <a:xfrm>
-            <a:off x="4940591" y="3511680"/>
-            <a:ext cx="1528689" cy="773723"/>
-          </a:xfrm>
-          <a:prstGeom prst="rect">
-            <a:avLst/>
-          </a:prstGeom>
-          <a:solidFill>
-            <a:schemeClr val="bg1"/>
-          </a:solidFill>
-          <a:ln>
-            <a:solidFill>
-              <a:schemeClr val="tx1"/>
-            </a:solidFill>
-          </a:ln>
-        </p:spPr>
-        <p:style>
-          <a:lnRef idx="2">
-            <a:schemeClr val="accent1">
-              <a:shade val="50000"/>
-            </a:schemeClr>
-          </a:lnRef>
-          <a:fillRef idx="1">
-            <a:schemeClr val="accent1"/>
-          </a:fillRef>
-          <a:effectRef idx="0">
-            <a:schemeClr val="accent1"/>
-          </a:effectRef>
-          <a:fontRef idx="minor">
-            <a:schemeClr val="lt1"/>
-          </a:fontRef>
-        </p:style>
-        <p:txBody>
-          <a:bodyPr rtlCol="0" anchor="ctr"/>
-          <a:lstStyle/>
-          <a:p>
-            <a:pPr algn="ctr"/>
-            <a:r>
-              <a:rPr lang="de-DE" sz="1400" dirty="0" err="1">
-                <a:solidFill>
-                  <a:schemeClr val="tx1"/>
-                </a:solidFill>
-              </a:rPr>
-              <a:t>Kommuni</a:t>
-            </a:r>
-            <a:r>
-              <a:rPr lang="de-DE" sz="1400" dirty="0">
-                <a:solidFill>
-                  <a:schemeClr val="tx1"/>
-                </a:solidFill>
-              </a:rPr>
-              <a:t>-</a:t>
-            </a:r>
-            <a:br>
-              <a:rPr lang="de-DE" sz="1400" dirty="0">
-                <a:solidFill>
-                  <a:schemeClr val="tx1"/>
-                </a:solidFill>
-              </a:rPr>
-            </a:br>
-            <a:r>
-              <a:rPr lang="de-DE" sz="1400" dirty="0" err="1">
-                <a:solidFill>
-                  <a:schemeClr val="tx1"/>
-                </a:solidFill>
-              </a:rPr>
-              <a:t>kationplan</a:t>
-            </a:r>
-            <a:r>
-              <a:rPr lang="de-DE" sz="1400" dirty="0">
-                <a:solidFill>
-                  <a:schemeClr val="tx1"/>
-                </a:solidFill>
-              </a:rPr>
-              <a:t> des Systems</a:t>
-            </a:r>
-          </a:p>
-        </p:txBody>
-      </p:sp>
-      <p:sp>
-        <p:nvSpPr>
-          <p:cNvPr id="34" name="Rechteck 33">
-            <a:extLst>
-              <a:ext uri="{FF2B5EF4-FFF2-40B4-BE49-F238E27FC236}">
-                <a16:creationId xmlns:a16="http://schemas.microsoft.com/office/drawing/2014/main" id="{688ACC91-A55A-4806-B07C-B55EFE88D988}"/>
-              </a:ext>
-            </a:extLst>
-          </p:cNvPr>
-          <p:cNvSpPr/>
-          <p:nvPr/>
-        </p:nvSpPr>
-        <p:spPr>
-          <a:xfrm>
-            <a:off x="17920" y="3949230"/>
-            <a:ext cx="1155895" cy="773723"/>
-          </a:xfrm>
-          <a:prstGeom prst="rect">
-            <a:avLst/>
-          </a:prstGeom>
-          <a:solidFill>
-            <a:schemeClr val="bg1"/>
-          </a:solidFill>
-          <a:ln>
-            <a:solidFill>
-              <a:schemeClr val="tx1"/>
-            </a:solidFill>
-          </a:ln>
-        </p:spPr>
-        <p:style>
-          <a:lnRef idx="2">
-            <a:schemeClr val="accent1">
-              <a:shade val="50000"/>
-            </a:schemeClr>
-          </a:lnRef>
-          <a:fillRef idx="1">
-            <a:schemeClr val="accent1"/>
-          </a:fillRef>
-          <a:effectRef idx="0">
-            <a:schemeClr val="accent1"/>
-          </a:effectRef>
-          <a:fontRef idx="minor">
-            <a:schemeClr val="lt1"/>
-          </a:fontRef>
-        </p:style>
-        <p:txBody>
-          <a:bodyPr rtlCol="0" anchor="ctr"/>
-          <a:lstStyle/>
-          <a:p>
-            <a:pPr algn="ctr"/>
-            <a:r>
-              <a:rPr lang="de-DE" sz="1400" dirty="0">
-                <a:solidFill>
-                  <a:schemeClr val="tx1"/>
-                </a:solidFill>
-              </a:rPr>
-              <a:t>Schnittstelle für Pflanzen-</a:t>
-            </a:r>
-          </a:p>
-          <a:p>
-            <a:pPr algn="ctr"/>
-            <a:r>
-              <a:rPr lang="de-DE" sz="1400" dirty="0">
-                <a:solidFill>
-                  <a:schemeClr val="tx1"/>
-                </a:solidFill>
-              </a:rPr>
-              <a:t>gruppe</a:t>
-            </a:r>
-          </a:p>
-        </p:txBody>
-      </p:sp>
-      <p:sp>
-        <p:nvSpPr>
-          <p:cNvPr id="70" name="Rechteck 69">
-            <a:extLst>
-              <a:ext uri="{FF2B5EF4-FFF2-40B4-BE49-F238E27FC236}">
-                <a16:creationId xmlns:a16="http://schemas.microsoft.com/office/drawing/2014/main" id="{45D85A1B-B47A-40A8-A4A8-CF8ED9780D93}"/>
-              </a:ext>
-            </a:extLst>
-          </p:cNvPr>
-          <p:cNvSpPr/>
-          <p:nvPr/>
-        </p:nvSpPr>
-        <p:spPr>
-          <a:xfrm>
-            <a:off x="4952846" y="4452052"/>
-            <a:ext cx="1528689" cy="773723"/>
-          </a:xfrm>
-          <a:prstGeom prst="rect">
-            <a:avLst/>
-          </a:prstGeom>
-          <a:solidFill>
-            <a:schemeClr val="bg1"/>
-          </a:solidFill>
-          <a:ln>
-            <a:solidFill>
-              <a:schemeClr val="tx1"/>
-            </a:solidFill>
-          </a:ln>
-        </p:spPr>
-        <p:style>
-          <a:lnRef idx="2">
-            <a:schemeClr val="accent1">
-              <a:shade val="50000"/>
-            </a:schemeClr>
-          </a:lnRef>
-          <a:fillRef idx="1">
-            <a:schemeClr val="accent1"/>
-          </a:fillRef>
-          <a:effectRef idx="0">
-            <a:schemeClr val="accent1"/>
-          </a:effectRef>
-          <a:fontRef idx="minor">
-            <a:schemeClr val="lt1"/>
-          </a:fontRef>
-        </p:style>
-        <p:txBody>
-          <a:bodyPr rtlCol="0" anchor="ctr"/>
-          <a:lstStyle/>
-          <a:p>
-            <a:pPr algn="ctr"/>
-            <a:r>
-              <a:rPr lang="de-DE" sz="1400" dirty="0">
-                <a:solidFill>
-                  <a:schemeClr val="tx1"/>
-                </a:solidFill>
-              </a:rPr>
-              <a:t>Aktivitäten verteilen</a:t>
-            </a:r>
-          </a:p>
-        </p:txBody>
-      </p:sp>
-      <p:sp>
-        <p:nvSpPr>
-          <p:cNvPr id="71" name="Rechteck 70">
-            <a:extLst>
-              <a:ext uri="{FF2B5EF4-FFF2-40B4-BE49-F238E27FC236}">
-                <a16:creationId xmlns:a16="http://schemas.microsoft.com/office/drawing/2014/main" id="{31FBD003-419A-4CA4-A340-A7879C8A3B05}"/>
-              </a:ext>
-            </a:extLst>
-          </p:cNvPr>
-          <p:cNvSpPr/>
-          <p:nvPr/>
-        </p:nvSpPr>
-        <p:spPr>
-          <a:xfrm>
-            <a:off x="1248055" y="4966418"/>
-            <a:ext cx="1298050" cy="737578"/>
-          </a:xfrm>
-          <a:prstGeom prst="rect">
-            <a:avLst/>
-          </a:prstGeom>
-          <a:solidFill>
-            <a:schemeClr val="bg1"/>
-          </a:solidFill>
-          <a:ln>
-            <a:solidFill>
-              <a:schemeClr val="tx1"/>
-            </a:solidFill>
-          </a:ln>
-        </p:spPr>
-        <p:style>
-          <a:lnRef idx="2">
-            <a:schemeClr val="accent1">
-              <a:shade val="50000"/>
-            </a:schemeClr>
-          </a:lnRef>
-          <a:fillRef idx="1">
-            <a:schemeClr val="accent1"/>
-          </a:fillRef>
-          <a:effectRef idx="0">
-            <a:schemeClr val="accent1"/>
-          </a:effectRef>
-          <a:fontRef idx="minor">
-            <a:schemeClr val="lt1"/>
-          </a:fontRef>
-        </p:style>
-        <p:txBody>
-          <a:bodyPr rtlCol="0" anchor="ctr"/>
-          <a:lstStyle/>
-          <a:p>
-            <a:pPr algn="ctr"/>
-            <a:r>
-              <a:rPr lang="de-DE" sz="1400" dirty="0">
-                <a:solidFill>
-                  <a:schemeClr val="tx1"/>
-                </a:solidFill>
-              </a:rPr>
-              <a:t>RFID Kennzeichnung</a:t>
-            </a:r>
-          </a:p>
-          <a:p>
-            <a:pPr algn="ctr"/>
-            <a:r>
-              <a:rPr lang="de-DE" sz="1400" dirty="0">
-                <a:solidFill>
-                  <a:schemeClr val="tx1"/>
-                </a:solidFill>
-              </a:rPr>
-              <a:t>pro Auftrag</a:t>
+              <a:t>Kommunikation mit Kunde</a:t>
             </a:r>
           </a:p>
         </p:txBody>

</xml_diff>

<commit_message>
first try at architecture for presentation
</commit_message>
<xml_diff>
--- a/Präsentation/Präsentation_Entwurf.pptx
+++ b/Präsentation/Präsentation_Entwurf.pptx
@@ -264,7 +264,7 @@
           <a:p>
             <a:fld id="{D5E4B74C-DC10-4D74-8535-8C5AB711050D}" type="datetimeFigureOut">
               <a:rPr lang="de-DE" smtClean="0"/>
-              <a:t>29.10.2019</a:t>
+              <a:t>30.10.2019</a:t>
             </a:fld>
             <a:endParaRPr lang="de-DE"/>
           </a:p>
@@ -462,7 +462,7 @@
           <a:p>
             <a:fld id="{D5E4B74C-DC10-4D74-8535-8C5AB711050D}" type="datetimeFigureOut">
               <a:rPr lang="de-DE" smtClean="0"/>
-              <a:t>29.10.2019</a:t>
+              <a:t>30.10.2019</a:t>
             </a:fld>
             <a:endParaRPr lang="de-DE"/>
           </a:p>
@@ -670,7 +670,7 @@
           <a:p>
             <a:fld id="{D5E4B74C-DC10-4D74-8535-8C5AB711050D}" type="datetimeFigureOut">
               <a:rPr lang="de-DE" smtClean="0"/>
-              <a:t>29.10.2019</a:t>
+              <a:t>30.10.2019</a:t>
             </a:fld>
             <a:endParaRPr lang="de-DE"/>
           </a:p>
@@ -868,7 +868,7 @@
           <a:p>
             <a:fld id="{D5E4B74C-DC10-4D74-8535-8C5AB711050D}" type="datetimeFigureOut">
               <a:rPr lang="de-DE" smtClean="0"/>
-              <a:t>29.10.2019</a:t>
+              <a:t>30.10.2019</a:t>
             </a:fld>
             <a:endParaRPr lang="de-DE"/>
           </a:p>
@@ -1143,7 +1143,7 @@
           <a:p>
             <a:fld id="{D5E4B74C-DC10-4D74-8535-8C5AB711050D}" type="datetimeFigureOut">
               <a:rPr lang="de-DE" smtClean="0"/>
-              <a:t>29.10.2019</a:t>
+              <a:t>30.10.2019</a:t>
             </a:fld>
             <a:endParaRPr lang="de-DE"/>
           </a:p>
@@ -1408,7 +1408,7 @@
           <a:p>
             <a:fld id="{D5E4B74C-DC10-4D74-8535-8C5AB711050D}" type="datetimeFigureOut">
               <a:rPr lang="de-DE" smtClean="0"/>
-              <a:t>29.10.2019</a:t>
+              <a:t>30.10.2019</a:t>
             </a:fld>
             <a:endParaRPr lang="de-DE"/>
           </a:p>
@@ -1820,7 +1820,7 @@
           <a:p>
             <a:fld id="{D5E4B74C-DC10-4D74-8535-8C5AB711050D}" type="datetimeFigureOut">
               <a:rPr lang="de-DE" smtClean="0"/>
-              <a:t>29.10.2019</a:t>
+              <a:t>30.10.2019</a:t>
             </a:fld>
             <a:endParaRPr lang="de-DE"/>
           </a:p>
@@ -1961,7 +1961,7 @@
           <a:p>
             <a:fld id="{D5E4B74C-DC10-4D74-8535-8C5AB711050D}" type="datetimeFigureOut">
               <a:rPr lang="de-DE" smtClean="0"/>
-              <a:t>29.10.2019</a:t>
+              <a:t>30.10.2019</a:t>
             </a:fld>
             <a:endParaRPr lang="de-DE"/>
           </a:p>
@@ -2074,7 +2074,7 @@
           <a:p>
             <a:fld id="{D5E4B74C-DC10-4D74-8535-8C5AB711050D}" type="datetimeFigureOut">
               <a:rPr lang="de-DE" smtClean="0"/>
-              <a:t>29.10.2019</a:t>
+              <a:t>30.10.2019</a:t>
             </a:fld>
             <a:endParaRPr lang="de-DE"/>
           </a:p>
@@ -2385,7 +2385,7 @@
           <a:p>
             <a:fld id="{D5E4B74C-DC10-4D74-8535-8C5AB711050D}" type="datetimeFigureOut">
               <a:rPr lang="de-DE" smtClean="0"/>
-              <a:t>29.10.2019</a:t>
+              <a:t>30.10.2019</a:t>
             </a:fld>
             <a:endParaRPr lang="de-DE"/>
           </a:p>
@@ -2673,7 +2673,7 @@
           <a:p>
             <a:fld id="{D5E4B74C-DC10-4D74-8535-8C5AB711050D}" type="datetimeFigureOut">
               <a:rPr lang="de-DE" smtClean="0"/>
-              <a:t>29.10.2019</a:t>
+              <a:t>30.10.2019</a:t>
             </a:fld>
             <a:endParaRPr lang="de-DE"/>
           </a:p>
@@ -2914,7 +2914,7 @@
           <a:p>
             <a:fld id="{D5E4B74C-DC10-4D74-8535-8C5AB711050D}" type="datetimeFigureOut">
               <a:rPr lang="de-DE" smtClean="0"/>
-              <a:t>29.10.2019</a:t>
+              <a:t>30.10.2019</a:t>
             </a:fld>
             <a:endParaRPr lang="de-DE"/>
           </a:p>
@@ -4327,6 +4327,72 @@
       </p:grpSpPr>
       <p:sp>
         <p:nvSpPr>
+          <p:cNvPr id="14" name="Textfeld 13">
+            <a:extLst>
+              <a:ext uri="{FF2B5EF4-FFF2-40B4-BE49-F238E27FC236}">
+                <a16:creationId xmlns:a16="http://schemas.microsoft.com/office/drawing/2014/main" id="{9C026AD5-F207-4579-B326-8DC42B2A421A}"/>
+              </a:ext>
+            </a:extLst>
+          </p:cNvPr>
+          <p:cNvSpPr txBox="1"/>
+          <p:nvPr/>
+        </p:nvSpPr>
+        <p:spPr>
+          <a:xfrm>
+            <a:off x="3773714" y="1447965"/>
+            <a:ext cx="3018971" cy="2031325"/>
+          </a:xfrm>
+          <a:prstGeom prst="rect">
+            <a:avLst/>
+          </a:prstGeom>
+        </p:spPr>
+        <p:style>
+          <a:lnRef idx="2">
+            <a:schemeClr val="dk1"/>
+          </a:lnRef>
+          <a:fillRef idx="1">
+            <a:schemeClr val="lt1"/>
+          </a:fillRef>
+          <a:effectRef idx="0">
+            <a:schemeClr val="dk1"/>
+          </a:effectRef>
+          <a:fontRef idx="minor">
+            <a:schemeClr val="dk1"/>
+          </a:fontRef>
+        </p:style>
+        <p:txBody>
+          <a:bodyPr wrap="square" rtlCol="0">
+            <a:spAutoFit/>
+          </a:bodyPr>
+          <a:lstStyle/>
+          <a:p>
+            <a:r>
+              <a:rPr lang="de-DE" dirty="0"/>
+              <a:t>Gateway</a:t>
+            </a:r>
+          </a:p>
+          <a:p>
+            <a:endParaRPr lang="de-DE" dirty="0"/>
+          </a:p>
+          <a:p>
+            <a:endParaRPr lang="de-DE" dirty="0"/>
+          </a:p>
+          <a:p>
+            <a:endParaRPr lang="de-DE" dirty="0"/>
+          </a:p>
+          <a:p>
+            <a:endParaRPr lang="de-DE" dirty="0"/>
+          </a:p>
+          <a:p>
+            <a:endParaRPr lang="de-DE" dirty="0"/>
+          </a:p>
+          <a:p>
+            <a:endParaRPr lang="de-DE" dirty="0"/>
+          </a:p>
+        </p:txBody>
+      </p:sp>
+      <p:sp>
+        <p:nvSpPr>
           <p:cNvPr id="2" name="Titel 1">
             <a:extLst>
               <a:ext uri="{FF2B5EF4-FFF2-40B4-BE49-F238E27FC236}">
@@ -4341,40 +4407,646 @@
             <p:ph type="title"/>
           </p:nvPr>
         </p:nvSpPr>
-        <p:spPr/>
+        <p:spPr>
+          <a:xfrm>
+            <a:off x="518886" y="307068"/>
+            <a:ext cx="10515600" cy="1325563"/>
+          </a:xfrm>
+        </p:spPr>
         <p:txBody>
           <a:bodyPr/>
           <a:lstStyle/>
           <a:p>
+            <a:r>
+              <a:rPr lang="de-DE" dirty="0"/>
+              <a:t>Architektur</a:t>
+            </a:r>
+          </a:p>
+        </p:txBody>
+      </p:sp>
+      <p:sp>
+        <p:nvSpPr>
+          <p:cNvPr id="12" name="Textfeld 11">
+            <a:extLst>
+              <a:ext uri="{FF2B5EF4-FFF2-40B4-BE49-F238E27FC236}">
+                <a16:creationId xmlns:a16="http://schemas.microsoft.com/office/drawing/2014/main" id="{64CED825-16D8-4DBD-9B16-765EE85A0757}"/>
+              </a:ext>
+            </a:extLst>
+          </p:cNvPr>
+          <p:cNvSpPr txBox="1"/>
+          <p:nvPr/>
+        </p:nvSpPr>
+        <p:spPr>
+          <a:xfrm>
+            <a:off x="4013201" y="1978361"/>
+            <a:ext cx="2307772" cy="369332"/>
+          </a:xfrm>
+          <a:prstGeom prst="rect">
+            <a:avLst/>
+          </a:prstGeom>
+        </p:spPr>
+        <p:style>
+          <a:lnRef idx="2">
+            <a:schemeClr val="dk1"/>
+          </a:lnRef>
+          <a:fillRef idx="1">
+            <a:schemeClr val="lt1"/>
+          </a:fillRef>
+          <a:effectRef idx="0">
+            <a:schemeClr val="dk1"/>
+          </a:effectRef>
+          <a:fontRef idx="minor">
+            <a:schemeClr val="dk1"/>
+          </a:fontRef>
+        </p:style>
+        <p:txBody>
+          <a:bodyPr wrap="square" rtlCol="0">
+            <a:spAutoFit/>
+          </a:bodyPr>
+          <a:lstStyle/>
+          <a:p>
+            <a:r>
+              <a:rPr lang="de-DE" dirty="0"/>
+              <a:t>NodeRed</a:t>
+            </a:r>
+          </a:p>
+        </p:txBody>
+      </p:sp>
+      <p:sp>
+        <p:nvSpPr>
+          <p:cNvPr id="13" name="Textfeld 12">
+            <a:extLst>
+              <a:ext uri="{FF2B5EF4-FFF2-40B4-BE49-F238E27FC236}">
+                <a16:creationId xmlns:a16="http://schemas.microsoft.com/office/drawing/2014/main" id="{BA1AD9AC-17D1-4FE6-BE4A-BE51A93153CA}"/>
+              </a:ext>
+            </a:extLst>
+          </p:cNvPr>
+          <p:cNvSpPr txBox="1"/>
+          <p:nvPr/>
+        </p:nvSpPr>
+        <p:spPr>
+          <a:xfrm>
+            <a:off x="185056" y="2001962"/>
+            <a:ext cx="2529115" cy="923330"/>
+          </a:xfrm>
+          <a:prstGeom prst="rect">
+            <a:avLst/>
+          </a:prstGeom>
+        </p:spPr>
+        <p:style>
+          <a:lnRef idx="2">
+            <a:schemeClr val="dk1"/>
+          </a:lnRef>
+          <a:fillRef idx="1">
+            <a:schemeClr val="lt1"/>
+          </a:fillRef>
+          <a:effectRef idx="0">
+            <a:schemeClr val="dk1"/>
+          </a:effectRef>
+          <a:fontRef idx="minor">
+            <a:schemeClr val="dk1"/>
+          </a:fontRef>
+        </p:style>
+        <p:txBody>
+          <a:bodyPr wrap="square" rtlCol="0">
+            <a:spAutoFit/>
+          </a:bodyPr>
+          <a:lstStyle/>
+          <a:p>
+            <a:r>
+              <a:rPr lang="de-DE" dirty="0"/>
+              <a:t>Client</a:t>
+            </a:r>
+          </a:p>
+          <a:p>
             <a:endParaRPr lang="de-DE" dirty="0"/>
           </a:p>
-        </p:txBody>
-      </p:sp>
-      <p:sp>
-        <p:nvSpPr>
-          <p:cNvPr id="3" name="Inhaltsplatzhalter 2">
-            <a:extLst>
-              <a:ext uri="{FF2B5EF4-FFF2-40B4-BE49-F238E27FC236}">
-                <a16:creationId xmlns:a16="http://schemas.microsoft.com/office/drawing/2014/main" id="{D236642F-FE33-40A0-9E7B-02E415246599}"/>
-              </a:ext>
-            </a:extLst>
-          </p:cNvPr>
-          <p:cNvSpPr>
-            <a:spLocks noGrp="1"/>
-          </p:cNvSpPr>
-          <p:nvPr>
-            <p:ph idx="1"/>
-          </p:nvPr>
-        </p:nvSpPr>
-        <p:spPr/>
-        <p:txBody>
-          <a:bodyPr/>
-          <a:lstStyle/>
-          <a:p>
-            <a:endParaRPr lang="de-DE"/>
-          </a:p>
-        </p:txBody>
-      </p:sp>
+          <a:p>
+            <a:endParaRPr lang="de-DE" dirty="0"/>
+          </a:p>
+        </p:txBody>
+      </p:sp>
+      <p:sp>
+        <p:nvSpPr>
+          <p:cNvPr id="15" name="Textfeld 14">
+            <a:extLst>
+              <a:ext uri="{FF2B5EF4-FFF2-40B4-BE49-F238E27FC236}">
+                <a16:creationId xmlns:a16="http://schemas.microsoft.com/office/drawing/2014/main" id="{5BEF3B51-3299-47BB-AD83-68B1B3FE91B2}"/>
+              </a:ext>
+            </a:extLst>
+          </p:cNvPr>
+          <p:cNvSpPr txBox="1"/>
+          <p:nvPr/>
+        </p:nvSpPr>
+        <p:spPr>
+          <a:xfrm>
+            <a:off x="7852228" y="1863462"/>
+            <a:ext cx="2783113" cy="1200329"/>
+          </a:xfrm>
+          <a:prstGeom prst="rect">
+            <a:avLst/>
+          </a:prstGeom>
+        </p:spPr>
+        <p:style>
+          <a:lnRef idx="2">
+            <a:schemeClr val="dk1"/>
+          </a:lnRef>
+          <a:fillRef idx="1">
+            <a:schemeClr val="lt1"/>
+          </a:fillRef>
+          <a:effectRef idx="0">
+            <a:schemeClr val="dk1"/>
+          </a:effectRef>
+          <a:fontRef idx="minor">
+            <a:schemeClr val="dk1"/>
+          </a:fontRef>
+        </p:style>
+        <p:txBody>
+          <a:bodyPr wrap="square" rtlCol="0">
+            <a:spAutoFit/>
+          </a:bodyPr>
+          <a:lstStyle/>
+          <a:p>
+            <a:r>
+              <a:rPr lang="de-DE" dirty="0"/>
+              <a:t>SPS</a:t>
+            </a:r>
+          </a:p>
+          <a:p>
+            <a:endParaRPr lang="de-DE" dirty="0"/>
+          </a:p>
+          <a:p>
+            <a:endParaRPr lang="de-DE" dirty="0"/>
+          </a:p>
+          <a:p>
+            <a:endParaRPr lang="de-DE" dirty="0"/>
+          </a:p>
+        </p:txBody>
+      </p:sp>
+      <p:sp>
+        <p:nvSpPr>
+          <p:cNvPr id="16" name="Textfeld 15">
+            <a:extLst>
+              <a:ext uri="{FF2B5EF4-FFF2-40B4-BE49-F238E27FC236}">
+                <a16:creationId xmlns:a16="http://schemas.microsoft.com/office/drawing/2014/main" id="{230BDB12-8F38-4745-A837-68C22BBA9111}"/>
+              </a:ext>
+            </a:extLst>
+          </p:cNvPr>
+          <p:cNvSpPr txBox="1"/>
+          <p:nvPr/>
+        </p:nvSpPr>
+        <p:spPr>
+          <a:xfrm>
+            <a:off x="7977415" y="2255360"/>
+            <a:ext cx="2307772" cy="369332"/>
+          </a:xfrm>
+          <a:prstGeom prst="rect">
+            <a:avLst/>
+          </a:prstGeom>
+        </p:spPr>
+        <p:style>
+          <a:lnRef idx="2">
+            <a:schemeClr val="dk1"/>
+          </a:lnRef>
+          <a:fillRef idx="1">
+            <a:schemeClr val="lt1"/>
+          </a:fillRef>
+          <a:effectRef idx="0">
+            <a:schemeClr val="dk1"/>
+          </a:effectRef>
+          <a:fontRef idx="minor">
+            <a:schemeClr val="dk1"/>
+          </a:fontRef>
+        </p:style>
+        <p:txBody>
+          <a:bodyPr wrap="square" rtlCol="0">
+            <a:spAutoFit/>
+          </a:bodyPr>
+          <a:lstStyle/>
+          <a:p>
+            <a:r>
+              <a:rPr lang="de-DE" dirty="0"/>
+              <a:t>OPC-UA Client</a:t>
+            </a:r>
+          </a:p>
+        </p:txBody>
+      </p:sp>
+      <p:sp>
+        <p:nvSpPr>
+          <p:cNvPr id="17" name="Textfeld 16">
+            <a:extLst>
+              <a:ext uri="{FF2B5EF4-FFF2-40B4-BE49-F238E27FC236}">
+                <a16:creationId xmlns:a16="http://schemas.microsoft.com/office/drawing/2014/main" id="{CE4DBFA2-748C-4805-8DEE-14A82B857834}"/>
+              </a:ext>
+            </a:extLst>
+          </p:cNvPr>
+          <p:cNvSpPr txBox="1"/>
+          <p:nvPr/>
+        </p:nvSpPr>
+        <p:spPr>
+          <a:xfrm>
+            <a:off x="4013201" y="2940467"/>
+            <a:ext cx="2307772" cy="369332"/>
+          </a:xfrm>
+          <a:prstGeom prst="rect">
+            <a:avLst/>
+          </a:prstGeom>
+        </p:spPr>
+        <p:style>
+          <a:lnRef idx="2">
+            <a:schemeClr val="dk1"/>
+          </a:lnRef>
+          <a:fillRef idx="1">
+            <a:schemeClr val="lt1"/>
+          </a:fillRef>
+          <a:effectRef idx="0">
+            <a:schemeClr val="dk1"/>
+          </a:effectRef>
+          <a:fontRef idx="minor">
+            <a:schemeClr val="dk1"/>
+          </a:fontRef>
+        </p:style>
+        <p:txBody>
+          <a:bodyPr wrap="square" rtlCol="0">
+            <a:spAutoFit/>
+          </a:bodyPr>
+          <a:lstStyle/>
+          <a:p>
+            <a:r>
+              <a:rPr lang="de-DE" dirty="0"/>
+              <a:t>OPC-UA Server</a:t>
+            </a:r>
+          </a:p>
+        </p:txBody>
+      </p:sp>
+      <p:sp>
+        <p:nvSpPr>
+          <p:cNvPr id="18" name="Textfeld 17">
+            <a:extLst>
+              <a:ext uri="{FF2B5EF4-FFF2-40B4-BE49-F238E27FC236}">
+                <a16:creationId xmlns:a16="http://schemas.microsoft.com/office/drawing/2014/main" id="{33783CC9-E5B2-45ED-B18C-825249FEDAC5}"/>
+              </a:ext>
+            </a:extLst>
+          </p:cNvPr>
+          <p:cNvSpPr txBox="1"/>
+          <p:nvPr/>
+        </p:nvSpPr>
+        <p:spPr>
+          <a:xfrm>
+            <a:off x="306614" y="2411396"/>
+            <a:ext cx="2291443" cy="369332"/>
+          </a:xfrm>
+          <a:prstGeom prst="rect">
+            <a:avLst/>
+          </a:prstGeom>
+        </p:spPr>
+        <p:style>
+          <a:lnRef idx="2">
+            <a:schemeClr val="dk1"/>
+          </a:lnRef>
+          <a:fillRef idx="1">
+            <a:schemeClr val="lt1"/>
+          </a:fillRef>
+          <a:effectRef idx="0">
+            <a:schemeClr val="dk1"/>
+          </a:effectRef>
+          <a:fontRef idx="minor">
+            <a:schemeClr val="dk1"/>
+          </a:fontRef>
+        </p:style>
+        <p:txBody>
+          <a:bodyPr wrap="square" rtlCol="0">
+            <a:spAutoFit/>
+          </a:bodyPr>
+          <a:lstStyle/>
+          <a:p>
+            <a:r>
+              <a:rPr lang="de-DE" dirty="0"/>
+              <a:t>MQTT Client</a:t>
+            </a:r>
+          </a:p>
+        </p:txBody>
+      </p:sp>
+      <p:sp>
+        <p:nvSpPr>
+          <p:cNvPr id="19" name="Textfeld 18">
+            <a:extLst>
+              <a:ext uri="{FF2B5EF4-FFF2-40B4-BE49-F238E27FC236}">
+                <a16:creationId xmlns:a16="http://schemas.microsoft.com/office/drawing/2014/main" id="{97A3B0F0-BE70-4EA5-90E9-BB9321456F94}"/>
+              </a:ext>
+            </a:extLst>
+          </p:cNvPr>
+          <p:cNvSpPr txBox="1"/>
+          <p:nvPr/>
+        </p:nvSpPr>
+        <p:spPr>
+          <a:xfrm>
+            <a:off x="4013201" y="2451616"/>
+            <a:ext cx="2307772" cy="369332"/>
+          </a:xfrm>
+          <a:prstGeom prst="rect">
+            <a:avLst/>
+          </a:prstGeom>
+        </p:spPr>
+        <p:style>
+          <a:lnRef idx="2">
+            <a:schemeClr val="dk1"/>
+          </a:lnRef>
+          <a:fillRef idx="1">
+            <a:schemeClr val="lt1"/>
+          </a:fillRef>
+          <a:effectRef idx="0">
+            <a:schemeClr val="dk1"/>
+          </a:effectRef>
+          <a:fontRef idx="minor">
+            <a:schemeClr val="dk1"/>
+          </a:fontRef>
+        </p:style>
+        <p:txBody>
+          <a:bodyPr wrap="square" rtlCol="0">
+            <a:spAutoFit/>
+          </a:bodyPr>
+          <a:lstStyle/>
+          <a:p>
+            <a:r>
+              <a:rPr lang="de-DE" dirty="0"/>
+              <a:t>MQTT Server</a:t>
+            </a:r>
+          </a:p>
+        </p:txBody>
+      </p:sp>
+      <p:sp>
+        <p:nvSpPr>
+          <p:cNvPr id="20" name="Textfeld 19">
+            <a:extLst>
+              <a:ext uri="{FF2B5EF4-FFF2-40B4-BE49-F238E27FC236}">
+                <a16:creationId xmlns:a16="http://schemas.microsoft.com/office/drawing/2014/main" id="{29BFE980-C78D-4826-B695-0A7C9D2DE6BC}"/>
+              </a:ext>
+            </a:extLst>
+          </p:cNvPr>
+          <p:cNvSpPr txBox="1"/>
+          <p:nvPr/>
+        </p:nvSpPr>
+        <p:spPr>
+          <a:xfrm>
+            <a:off x="9397999" y="4680404"/>
+            <a:ext cx="2307772" cy="369332"/>
+          </a:xfrm>
+          <a:prstGeom prst="rect">
+            <a:avLst/>
+          </a:prstGeom>
+        </p:spPr>
+        <p:style>
+          <a:lnRef idx="2">
+            <a:schemeClr val="dk1"/>
+          </a:lnRef>
+          <a:fillRef idx="1">
+            <a:schemeClr val="lt1"/>
+          </a:fillRef>
+          <a:effectRef idx="0">
+            <a:schemeClr val="dk1"/>
+          </a:effectRef>
+          <a:fontRef idx="minor">
+            <a:schemeClr val="dk1"/>
+          </a:fontRef>
+        </p:style>
+        <p:txBody>
+          <a:bodyPr wrap="square" rtlCol="0">
+            <a:spAutoFit/>
+          </a:bodyPr>
+          <a:lstStyle/>
+          <a:p>
+            <a:r>
+              <a:rPr lang="de-DE" dirty="0"/>
+              <a:t>Sensoren</a:t>
+            </a:r>
+          </a:p>
+        </p:txBody>
+      </p:sp>
+      <p:sp>
+        <p:nvSpPr>
+          <p:cNvPr id="21" name="Textfeld 20">
+            <a:extLst>
+              <a:ext uri="{FF2B5EF4-FFF2-40B4-BE49-F238E27FC236}">
+                <a16:creationId xmlns:a16="http://schemas.microsoft.com/office/drawing/2014/main" id="{1E9CC7FE-8834-4051-B8FE-7736658BC19A}"/>
+              </a:ext>
+            </a:extLst>
+          </p:cNvPr>
+          <p:cNvSpPr txBox="1"/>
+          <p:nvPr/>
+        </p:nvSpPr>
+        <p:spPr>
+          <a:xfrm>
+            <a:off x="6614886" y="4680404"/>
+            <a:ext cx="2307772" cy="369332"/>
+          </a:xfrm>
+          <a:prstGeom prst="rect">
+            <a:avLst/>
+          </a:prstGeom>
+        </p:spPr>
+        <p:style>
+          <a:lnRef idx="2">
+            <a:schemeClr val="dk1"/>
+          </a:lnRef>
+          <a:fillRef idx="1">
+            <a:schemeClr val="lt1"/>
+          </a:fillRef>
+          <a:effectRef idx="0">
+            <a:schemeClr val="dk1"/>
+          </a:effectRef>
+          <a:fontRef idx="minor">
+            <a:schemeClr val="dk1"/>
+          </a:fontRef>
+        </p:style>
+        <p:txBody>
+          <a:bodyPr wrap="square" rtlCol="0">
+            <a:spAutoFit/>
+          </a:bodyPr>
+          <a:lstStyle/>
+          <a:p>
+            <a:r>
+              <a:rPr lang="de-DE" dirty="0"/>
+              <a:t>Aktoren</a:t>
+            </a:r>
+          </a:p>
+        </p:txBody>
+      </p:sp>
+      <p:cxnSp>
+        <p:nvCxnSpPr>
+          <p:cNvPr id="35" name="Gerade Verbindung mit Pfeil 34">
+            <a:extLst>
+              <a:ext uri="{FF2B5EF4-FFF2-40B4-BE49-F238E27FC236}">
+                <a16:creationId xmlns:a16="http://schemas.microsoft.com/office/drawing/2014/main" id="{D2E24F2D-910E-4A3C-A572-69E57A6AE802}"/>
+              </a:ext>
+            </a:extLst>
+          </p:cNvPr>
+          <p:cNvCxnSpPr>
+            <a:cxnSpLocks/>
+            <a:stCxn id="14" idx="3"/>
+            <a:endCxn id="15" idx="1"/>
+          </p:cNvCxnSpPr>
+          <p:nvPr/>
+        </p:nvCxnSpPr>
+        <p:spPr>
+          <a:xfrm flipV="1">
+            <a:off x="6792685" y="2463627"/>
+            <a:ext cx="1059543" cy="1"/>
+          </a:xfrm>
+          <a:prstGeom prst="straightConnector1">
+            <a:avLst/>
+          </a:prstGeom>
+          <a:ln>
+            <a:headEnd type="triangle"/>
+            <a:tailEnd type="triangle"/>
+          </a:ln>
+        </p:spPr>
+        <p:style>
+          <a:lnRef idx="1">
+            <a:schemeClr val="dk1"/>
+          </a:lnRef>
+          <a:fillRef idx="0">
+            <a:schemeClr val="dk1"/>
+          </a:fillRef>
+          <a:effectRef idx="0">
+            <a:schemeClr val="dk1"/>
+          </a:effectRef>
+          <a:fontRef idx="minor">
+            <a:schemeClr val="tx1"/>
+          </a:fontRef>
+        </p:style>
+      </p:cxnSp>
+      <p:cxnSp>
+        <p:nvCxnSpPr>
+          <p:cNvPr id="38" name="Gerade Verbindung mit Pfeil 37">
+            <a:extLst>
+              <a:ext uri="{FF2B5EF4-FFF2-40B4-BE49-F238E27FC236}">
+                <a16:creationId xmlns:a16="http://schemas.microsoft.com/office/drawing/2014/main" id="{39506AE5-FE58-41F7-AC77-67F82D370C6D}"/>
+              </a:ext>
+            </a:extLst>
+          </p:cNvPr>
+          <p:cNvCxnSpPr>
+            <a:cxnSpLocks/>
+            <a:stCxn id="13" idx="3"/>
+            <a:endCxn id="14" idx="1"/>
+          </p:cNvCxnSpPr>
+          <p:nvPr/>
+        </p:nvCxnSpPr>
+        <p:spPr>
+          <a:xfrm>
+            <a:off x="2714171" y="2463627"/>
+            <a:ext cx="1059543" cy="1"/>
+          </a:xfrm>
+          <a:prstGeom prst="straightConnector1">
+            <a:avLst/>
+          </a:prstGeom>
+          <a:ln>
+            <a:headEnd type="triangle"/>
+            <a:tailEnd type="triangle"/>
+          </a:ln>
+        </p:spPr>
+        <p:style>
+          <a:lnRef idx="1">
+            <a:schemeClr val="dk1"/>
+          </a:lnRef>
+          <a:fillRef idx="0">
+            <a:schemeClr val="dk1"/>
+          </a:fillRef>
+          <a:effectRef idx="0">
+            <a:schemeClr val="dk1"/>
+          </a:effectRef>
+          <a:fontRef idx="minor">
+            <a:schemeClr val="tx1"/>
+          </a:fontRef>
+        </p:style>
+      </p:cxnSp>
+      <p:cxnSp>
+        <p:nvCxnSpPr>
+          <p:cNvPr id="41" name="Gerade Verbindung mit Pfeil 40">
+            <a:extLst>
+              <a:ext uri="{FF2B5EF4-FFF2-40B4-BE49-F238E27FC236}">
+                <a16:creationId xmlns:a16="http://schemas.microsoft.com/office/drawing/2014/main" id="{D870AD2A-88D3-485D-B694-19F923FDD366}"/>
+              </a:ext>
+            </a:extLst>
+          </p:cNvPr>
+          <p:cNvCxnSpPr>
+            <a:cxnSpLocks/>
+            <a:stCxn id="21" idx="0"/>
+            <a:endCxn id="15" idx="2"/>
+          </p:cNvCxnSpPr>
+          <p:nvPr/>
+        </p:nvCxnSpPr>
+        <p:spPr>
+          <a:xfrm flipV="1">
+            <a:off x="7768772" y="3063791"/>
+            <a:ext cx="1475013" cy="1616613"/>
+          </a:xfrm>
+          <a:prstGeom prst="straightConnector1">
+            <a:avLst/>
+          </a:prstGeom>
+          <a:ln>
+            <a:headEnd type="triangle"/>
+            <a:tailEnd type="triangle"/>
+          </a:ln>
+        </p:spPr>
+        <p:style>
+          <a:lnRef idx="1">
+            <a:schemeClr val="dk1"/>
+          </a:lnRef>
+          <a:fillRef idx="0">
+            <a:schemeClr val="dk1"/>
+          </a:fillRef>
+          <a:effectRef idx="0">
+            <a:schemeClr val="dk1"/>
+          </a:effectRef>
+          <a:fontRef idx="minor">
+            <a:schemeClr val="tx1"/>
+          </a:fontRef>
+        </p:style>
+      </p:cxnSp>
+      <p:cxnSp>
+        <p:nvCxnSpPr>
+          <p:cNvPr id="44" name="Gerade Verbindung mit Pfeil 43">
+            <a:extLst>
+              <a:ext uri="{FF2B5EF4-FFF2-40B4-BE49-F238E27FC236}">
+                <a16:creationId xmlns:a16="http://schemas.microsoft.com/office/drawing/2014/main" id="{3C193CE8-F8D2-420F-B8B6-9CD164B9A8AB}"/>
+              </a:ext>
+            </a:extLst>
+          </p:cNvPr>
+          <p:cNvCxnSpPr>
+            <a:cxnSpLocks/>
+            <a:stCxn id="20" idx="0"/>
+            <a:endCxn id="15" idx="2"/>
+          </p:cNvCxnSpPr>
+          <p:nvPr/>
+        </p:nvCxnSpPr>
+        <p:spPr>
+          <a:xfrm flipH="1" flipV="1">
+            <a:off x="9243785" y="3063791"/>
+            <a:ext cx="1308100" cy="1616613"/>
+          </a:xfrm>
+          <a:prstGeom prst="straightConnector1">
+            <a:avLst/>
+          </a:prstGeom>
+          <a:ln>
+            <a:headEnd type="triangle"/>
+            <a:tailEnd type="triangle"/>
+          </a:ln>
+        </p:spPr>
+        <p:style>
+          <a:lnRef idx="1">
+            <a:schemeClr val="dk1"/>
+          </a:lnRef>
+          <a:fillRef idx="0">
+            <a:schemeClr val="dk1"/>
+          </a:fillRef>
+          <a:effectRef idx="0">
+            <a:schemeClr val="dk1"/>
+          </a:effectRef>
+          <a:fontRef idx="minor">
+            <a:schemeClr val="tx1"/>
+          </a:fontRef>
+        </p:style>
+      </p:cxnSp>
     </p:spTree>
     <p:extLst>
       <p:ext uri="{BB962C8B-B14F-4D97-AF65-F5344CB8AC3E}">

</xml_diff>

<commit_message>
removed unnecessary file and added bpmn diagram into presentation
</commit_message>
<xml_diff>
--- a/Präsentation/Präsentation_Entwurf.pptx
+++ b/Präsentation/Präsentation_Entwurf.pptx
@@ -6,11 +6,18 @@
   </p:sldMasterIdLst>
   <p:sldIdLst>
     <p:sldId id="257" r:id="rId2"/>
-    <p:sldId id="256" r:id="rId3"/>
-    <p:sldId id="258" r:id="rId4"/>
-    <p:sldId id="259" r:id="rId5"/>
-    <p:sldId id="260" r:id="rId6"/>
+    <p:sldId id="262" r:id="rId3"/>
+    <p:sldId id="260" r:id="rId4"/>
+    <p:sldId id="256" r:id="rId5"/>
+    <p:sldId id="259" r:id="rId6"/>
     <p:sldId id="261" r:id="rId7"/>
+    <p:sldId id="268" r:id="rId8"/>
+    <p:sldId id="258" r:id="rId9"/>
+    <p:sldId id="267" r:id="rId10"/>
+    <p:sldId id="263" r:id="rId11"/>
+    <p:sldId id="266" r:id="rId12"/>
+    <p:sldId id="264" r:id="rId13"/>
+    <p:sldId id="265" r:id="rId14"/>
   </p:sldIdLst>
   <p:sldSz cx="12192000" cy="6858000"/>
   <p:notesSz cx="6858000" cy="9144000"/>
@@ -3405,6 +3412,427 @@
 </p:sld>
 </file>
 
+<file path=ppt/slides/slide10.xml><?xml version="1.0" encoding="utf-8"?>
+<p:sld xmlns:a="http://schemas.openxmlformats.org/drawingml/2006/main" xmlns:r="http://schemas.openxmlformats.org/officeDocument/2006/relationships" xmlns:p="http://schemas.openxmlformats.org/presentationml/2006/main">
+  <p:cSld>
+    <p:spTree>
+      <p:nvGrpSpPr>
+        <p:cNvPr id="1" name=""/>
+        <p:cNvGrpSpPr/>
+        <p:nvPr/>
+      </p:nvGrpSpPr>
+      <p:grpSpPr>
+        <a:xfrm>
+          <a:off x="0" y="0"/>
+          <a:ext cx="0" cy="0"/>
+          <a:chOff x="0" y="0"/>
+          <a:chExt cx="0" cy="0"/>
+        </a:xfrm>
+      </p:grpSpPr>
+      <p:sp>
+        <p:nvSpPr>
+          <p:cNvPr id="2" name="Titel 1">
+            <a:extLst>
+              <a:ext uri="{FF2B5EF4-FFF2-40B4-BE49-F238E27FC236}">
+                <a16:creationId xmlns:a16="http://schemas.microsoft.com/office/drawing/2014/main" id="{ECB575D1-760B-43F1-9715-77F1EA9C08A1}"/>
+              </a:ext>
+            </a:extLst>
+          </p:cNvPr>
+          <p:cNvSpPr>
+            <a:spLocks noGrp="1"/>
+          </p:cNvSpPr>
+          <p:nvPr>
+            <p:ph type="title"/>
+          </p:nvPr>
+        </p:nvSpPr>
+        <p:spPr/>
+        <p:txBody>
+          <a:bodyPr/>
+          <a:lstStyle/>
+          <a:p>
+            <a:r>
+              <a:rPr lang="de-DE" dirty="0"/>
+              <a:t>Zeitplan</a:t>
+            </a:r>
+          </a:p>
+        </p:txBody>
+      </p:sp>
+      <p:sp>
+        <p:nvSpPr>
+          <p:cNvPr id="3" name="Inhaltsplatzhalter 2">
+            <a:extLst>
+              <a:ext uri="{FF2B5EF4-FFF2-40B4-BE49-F238E27FC236}">
+                <a16:creationId xmlns:a16="http://schemas.microsoft.com/office/drawing/2014/main" id="{6BA601DC-E4DC-487D-AD7E-860BEE5E22D8}"/>
+              </a:ext>
+            </a:extLst>
+          </p:cNvPr>
+          <p:cNvSpPr>
+            <a:spLocks noGrp="1"/>
+          </p:cNvSpPr>
+          <p:nvPr>
+            <p:ph idx="1"/>
+          </p:nvPr>
+        </p:nvSpPr>
+        <p:spPr/>
+        <p:txBody>
+          <a:bodyPr/>
+          <a:lstStyle/>
+          <a:p>
+            <a:r>
+              <a:rPr lang="de-DE" dirty="0"/>
+              <a:t>Annahme zur Dauer von Milestones/wichtigen Aktivitäten</a:t>
+            </a:r>
+          </a:p>
+          <a:p>
+            <a:r>
+              <a:rPr lang="de-DE" dirty="0"/>
+              <a:t>Annahme zum Zugang der Produktionsstätte</a:t>
+            </a:r>
+          </a:p>
+          <a:p>
+            <a:r>
+              <a:rPr lang="de-DE" dirty="0"/>
+              <a:t>Annahme zur Produktionsdauer</a:t>
+            </a:r>
+          </a:p>
+        </p:txBody>
+      </p:sp>
+    </p:spTree>
+    <p:extLst>
+      <p:ext uri="{BB962C8B-B14F-4D97-AF65-F5344CB8AC3E}">
+        <p14:creationId xmlns:p14="http://schemas.microsoft.com/office/powerpoint/2010/main" val="758388306"/>
+      </p:ext>
+    </p:extLst>
+  </p:cSld>
+  <p:clrMapOvr>
+    <a:masterClrMapping/>
+  </p:clrMapOvr>
+</p:sld>
+</file>
+
+<file path=ppt/slides/slide11.xml><?xml version="1.0" encoding="utf-8"?>
+<p:sld xmlns:a="http://schemas.openxmlformats.org/drawingml/2006/main" xmlns:r="http://schemas.openxmlformats.org/officeDocument/2006/relationships" xmlns:p="http://schemas.openxmlformats.org/presentationml/2006/main">
+  <p:cSld>
+    <p:spTree>
+      <p:nvGrpSpPr>
+        <p:cNvPr id="1" name=""/>
+        <p:cNvGrpSpPr/>
+        <p:nvPr/>
+      </p:nvGrpSpPr>
+      <p:grpSpPr>
+        <a:xfrm>
+          <a:off x="0" y="0"/>
+          <a:ext cx="0" cy="0"/>
+          <a:chOff x="0" y="0"/>
+          <a:chExt cx="0" cy="0"/>
+        </a:xfrm>
+      </p:grpSpPr>
+      <p:sp>
+        <p:nvSpPr>
+          <p:cNvPr id="2" name="Titel 1">
+            <a:extLst>
+              <a:ext uri="{FF2B5EF4-FFF2-40B4-BE49-F238E27FC236}">
+                <a16:creationId xmlns:a16="http://schemas.microsoft.com/office/drawing/2014/main" id="{CCCD46FC-9A01-47D6-BAC8-2D2E932072CF}"/>
+              </a:ext>
+            </a:extLst>
+          </p:cNvPr>
+          <p:cNvSpPr>
+            <a:spLocks noGrp="1"/>
+          </p:cNvSpPr>
+          <p:nvPr>
+            <p:ph type="title"/>
+          </p:nvPr>
+        </p:nvSpPr>
+        <p:spPr/>
+        <p:txBody>
+          <a:bodyPr/>
+          <a:lstStyle/>
+          <a:p>
+            <a:r>
+              <a:rPr lang="de-DE" dirty="0"/>
+              <a:t>Gantt-Chart</a:t>
+            </a:r>
+          </a:p>
+        </p:txBody>
+      </p:sp>
+      <p:sp>
+        <p:nvSpPr>
+          <p:cNvPr id="3" name="Inhaltsplatzhalter 2">
+            <a:extLst>
+              <a:ext uri="{FF2B5EF4-FFF2-40B4-BE49-F238E27FC236}">
+                <a16:creationId xmlns:a16="http://schemas.microsoft.com/office/drawing/2014/main" id="{0C113CFB-F00A-4CC7-BB2B-C835C0DE3A9E}"/>
+              </a:ext>
+            </a:extLst>
+          </p:cNvPr>
+          <p:cNvSpPr>
+            <a:spLocks noGrp="1"/>
+          </p:cNvSpPr>
+          <p:nvPr>
+            <p:ph idx="1"/>
+          </p:nvPr>
+        </p:nvSpPr>
+        <p:spPr/>
+        <p:txBody>
+          <a:bodyPr/>
+          <a:lstStyle/>
+          <a:p>
+            <a:endParaRPr lang="de-DE" dirty="0"/>
+          </a:p>
+        </p:txBody>
+      </p:sp>
+    </p:spTree>
+    <p:extLst>
+      <p:ext uri="{BB962C8B-B14F-4D97-AF65-F5344CB8AC3E}">
+        <p14:creationId xmlns:p14="http://schemas.microsoft.com/office/powerpoint/2010/main" val="4020376945"/>
+      </p:ext>
+    </p:extLst>
+  </p:cSld>
+  <p:clrMapOvr>
+    <a:masterClrMapping/>
+  </p:clrMapOvr>
+</p:sld>
+</file>
+
+<file path=ppt/slides/slide12.xml><?xml version="1.0" encoding="utf-8"?>
+<p:sld xmlns:a="http://schemas.openxmlformats.org/drawingml/2006/main" xmlns:r="http://schemas.openxmlformats.org/officeDocument/2006/relationships" xmlns:p="http://schemas.openxmlformats.org/presentationml/2006/main">
+  <p:cSld>
+    <p:spTree>
+      <p:nvGrpSpPr>
+        <p:cNvPr id="1" name=""/>
+        <p:cNvGrpSpPr/>
+        <p:nvPr/>
+      </p:nvGrpSpPr>
+      <p:grpSpPr>
+        <a:xfrm>
+          <a:off x="0" y="0"/>
+          <a:ext cx="0" cy="0"/>
+          <a:chOff x="0" y="0"/>
+          <a:chExt cx="0" cy="0"/>
+        </a:xfrm>
+      </p:grpSpPr>
+      <p:sp>
+        <p:nvSpPr>
+          <p:cNvPr id="2" name="Titel 1">
+            <a:extLst>
+              <a:ext uri="{FF2B5EF4-FFF2-40B4-BE49-F238E27FC236}">
+                <a16:creationId xmlns:a16="http://schemas.microsoft.com/office/drawing/2014/main" id="{64782AED-C01C-4FDA-89D6-BB6C01ED6A2E}"/>
+              </a:ext>
+            </a:extLst>
+          </p:cNvPr>
+          <p:cNvSpPr>
+            <a:spLocks noGrp="1"/>
+          </p:cNvSpPr>
+          <p:nvPr>
+            <p:ph type="title"/>
+          </p:nvPr>
+        </p:nvSpPr>
+        <p:spPr/>
+        <p:txBody>
+          <a:bodyPr/>
+          <a:lstStyle/>
+          <a:p>
+            <a:r>
+              <a:rPr lang="de-DE" dirty="0"/>
+              <a:t>Kostenplan</a:t>
+            </a:r>
+          </a:p>
+        </p:txBody>
+      </p:sp>
+      <p:sp>
+        <p:nvSpPr>
+          <p:cNvPr id="3" name="Inhaltsplatzhalter 2">
+            <a:extLst>
+              <a:ext uri="{FF2B5EF4-FFF2-40B4-BE49-F238E27FC236}">
+                <a16:creationId xmlns:a16="http://schemas.microsoft.com/office/drawing/2014/main" id="{122F56C8-E26B-4550-A9DD-280B050A9347}"/>
+              </a:ext>
+            </a:extLst>
+          </p:cNvPr>
+          <p:cNvSpPr>
+            <a:spLocks noGrp="1"/>
+          </p:cNvSpPr>
+          <p:nvPr>
+            <p:ph idx="1"/>
+          </p:nvPr>
+        </p:nvSpPr>
+        <p:spPr/>
+        <p:txBody>
+          <a:bodyPr/>
+          <a:lstStyle/>
+          <a:p>
+            <a:r>
+              <a:rPr lang="de-DE" dirty="0"/>
+              <a:t>Annahme zum Gehalt und Arbeitsstunden unserer MAs</a:t>
+            </a:r>
+          </a:p>
+          <a:p>
+            <a:r>
+              <a:rPr lang="de-DE" dirty="0"/>
+              <a:t>Annahme zur Beschaffungskosten von Hardware (SPS, Gateway, mögl. RFID Sender/Empfänger, mögl. Geräte zum Anzeigen des Dashboards)</a:t>
+            </a:r>
+          </a:p>
+          <a:p>
+            <a:r>
+              <a:rPr lang="de-DE" dirty="0"/>
+              <a:t>Annahme zu Lizenzkosten</a:t>
+            </a:r>
+          </a:p>
+          <a:p>
+            <a:r>
+              <a:rPr lang="de-DE" dirty="0"/>
+              <a:t>Annahme zu unserer Gewinnmarge (z.B. 14% ohne Lizenz)</a:t>
+            </a:r>
+          </a:p>
+          <a:p>
+            <a:endParaRPr lang="de-DE" dirty="0"/>
+          </a:p>
+          <a:p>
+            <a:endParaRPr lang="de-DE" dirty="0"/>
+          </a:p>
+        </p:txBody>
+      </p:sp>
+    </p:spTree>
+    <p:extLst>
+      <p:ext uri="{BB962C8B-B14F-4D97-AF65-F5344CB8AC3E}">
+        <p14:creationId xmlns:p14="http://schemas.microsoft.com/office/powerpoint/2010/main" val="1586088365"/>
+      </p:ext>
+    </p:extLst>
+  </p:cSld>
+  <p:clrMapOvr>
+    <a:masterClrMapping/>
+  </p:clrMapOvr>
+</p:sld>
+</file>
+
+<file path=ppt/slides/slide13.xml><?xml version="1.0" encoding="utf-8"?>
+<p:sld xmlns:a="http://schemas.openxmlformats.org/drawingml/2006/main" xmlns:r="http://schemas.openxmlformats.org/officeDocument/2006/relationships" xmlns:p="http://schemas.openxmlformats.org/presentationml/2006/main">
+  <p:cSld>
+    <p:spTree>
+      <p:nvGrpSpPr>
+        <p:cNvPr id="1" name=""/>
+        <p:cNvGrpSpPr/>
+        <p:nvPr/>
+      </p:nvGrpSpPr>
+      <p:grpSpPr>
+        <a:xfrm>
+          <a:off x="0" y="0"/>
+          <a:ext cx="0" cy="0"/>
+          <a:chOff x="0" y="0"/>
+          <a:chExt cx="0" cy="0"/>
+        </a:xfrm>
+      </p:grpSpPr>
+      <p:sp>
+        <p:nvSpPr>
+          <p:cNvPr id="2" name="Titel 1">
+            <a:extLst>
+              <a:ext uri="{FF2B5EF4-FFF2-40B4-BE49-F238E27FC236}">
+                <a16:creationId xmlns:a16="http://schemas.microsoft.com/office/drawing/2014/main" id="{2721C069-BABD-4827-BD58-66B56371F492}"/>
+              </a:ext>
+            </a:extLst>
+          </p:cNvPr>
+          <p:cNvSpPr>
+            <a:spLocks noGrp="1"/>
+          </p:cNvSpPr>
+          <p:nvPr>
+            <p:ph type="title"/>
+          </p:nvPr>
+        </p:nvSpPr>
+        <p:spPr/>
+        <p:txBody>
+          <a:bodyPr/>
+          <a:lstStyle/>
+          <a:p>
+            <a:r>
+              <a:rPr lang="de-DE" dirty="0"/>
+              <a:t>Kosteneinsparungen/Gewinnsteigerung</a:t>
+            </a:r>
+          </a:p>
+        </p:txBody>
+      </p:sp>
+      <p:sp>
+        <p:nvSpPr>
+          <p:cNvPr id="3" name="Inhaltsplatzhalter 2">
+            <a:extLst>
+              <a:ext uri="{FF2B5EF4-FFF2-40B4-BE49-F238E27FC236}">
+                <a16:creationId xmlns:a16="http://schemas.microsoft.com/office/drawing/2014/main" id="{39500A13-64F0-48E2-920D-0DE07D2B3862}"/>
+              </a:ext>
+            </a:extLst>
+          </p:cNvPr>
+          <p:cNvSpPr>
+            <a:spLocks noGrp="1"/>
+          </p:cNvSpPr>
+          <p:nvPr>
+            <p:ph idx="1"/>
+          </p:nvPr>
+        </p:nvSpPr>
+        <p:spPr/>
+        <p:txBody>
+          <a:bodyPr/>
+          <a:lstStyle/>
+          <a:p>
+            <a:r>
+              <a:rPr lang="de-DE" dirty="0"/>
+              <a:t>Annahme zur Fehlproduktion pro Bestellung davor und danach</a:t>
+            </a:r>
+          </a:p>
+          <a:p>
+            <a:r>
+              <a:rPr lang="de-DE" dirty="0"/>
+              <a:t>Annahme zu Erhöhung des Marktanteils aufgrund höherer Qualität </a:t>
+            </a:r>
+            <a:br>
+              <a:rPr lang="de-DE" dirty="0"/>
+            </a:br>
+            <a:r>
+              <a:rPr lang="de-DE" dirty="0"/>
+              <a:t>-&gt; sehr umkämpfter Markt </a:t>
+            </a:r>
+          </a:p>
+          <a:p>
+            <a:r>
+              <a:rPr lang="de-DE" dirty="0"/>
+              <a:t>Risiko bei Ausfall des Braumeisters Annahme machen</a:t>
+            </a:r>
+          </a:p>
+          <a:p>
+            <a:r>
+              <a:rPr lang="de-DE" dirty="0"/>
+              <a:t>Investitionen in weitere gewinnsteigende Maßnahmen ermöglicht (Prozessoptimierung, </a:t>
+            </a:r>
+            <a:r>
+              <a:rPr lang="de-DE" dirty="0" err="1"/>
+              <a:t>Conditioning</a:t>
+            </a:r>
+            <a:r>
+              <a:rPr lang="de-DE" dirty="0"/>
+              <a:t> Monitoring, </a:t>
+            </a:r>
+            <a:r>
+              <a:rPr lang="de-DE" dirty="0" err="1"/>
+              <a:t>Predictive</a:t>
+            </a:r>
+            <a:r>
+              <a:rPr lang="de-DE" dirty="0"/>
+              <a:t> Maintenance, weitere Automatisierungsschritte)</a:t>
+            </a:r>
+          </a:p>
+          <a:p>
+            <a:endParaRPr lang="de-DE" dirty="0"/>
+          </a:p>
+        </p:txBody>
+      </p:sp>
+    </p:spTree>
+    <p:extLst>
+      <p:ext uri="{BB962C8B-B14F-4D97-AF65-F5344CB8AC3E}">
+        <p14:creationId xmlns:p14="http://schemas.microsoft.com/office/powerpoint/2010/main" val="1886582988"/>
+      </p:ext>
+    </p:extLst>
+  </p:cSld>
+  <p:clrMapOvr>
+    <a:masterClrMapping/>
+  </p:clrMapOvr>
+</p:sld>
+</file>
+
 <file path=ppt/slides/slide2.xml><?xml version="1.0" encoding="utf-8"?>
 <p:sld xmlns:a="http://schemas.openxmlformats.org/drawingml/2006/main" xmlns:r="http://schemas.openxmlformats.org/officeDocument/2006/relationships" xmlns:p="http://schemas.openxmlformats.org/presentationml/2006/main">
   <p:cSld>
@@ -3422,73 +3850,88 @@
           <a:chExt cx="0" cy="0"/>
         </a:xfrm>
       </p:grpSpPr>
-      <p:pic>
-        <p:nvPicPr>
-          <p:cNvPr id="5" name="Grafik 4">
-            <a:extLst>
-              <a:ext uri="{FF2B5EF4-FFF2-40B4-BE49-F238E27FC236}">
-                <a16:creationId xmlns:a16="http://schemas.microsoft.com/office/drawing/2014/main" id="{845A4F59-6293-40D8-92AE-9CDD7D9BE489}"/>
-              </a:ext>
-            </a:extLst>
-          </p:cNvPr>
-          <p:cNvPicPr>
-            <a:picLocks noChangeAspect="1"/>
-          </p:cNvPicPr>
-          <p:nvPr/>
-        </p:nvPicPr>
-        <p:blipFill>
-          <a:blip r:embed="rId2">
-            <a:extLst>
-              <a:ext uri="{28A0092B-C50C-407E-A947-70E740481C1C}">
-                <a14:useLocalDpi xmlns:a14="http://schemas.microsoft.com/office/drawing/2010/main" val="0"/>
-              </a:ext>
-            </a:extLst>
-          </a:blip>
-          <a:stretch>
-            <a:fillRect/>
-          </a:stretch>
-        </p:blipFill>
-        <p:spPr>
-          <a:xfrm>
-            <a:off x="2290407" y="530086"/>
-            <a:ext cx="8125801" cy="6189833"/>
-          </a:xfrm>
-          <a:prstGeom prst="rect">
-            <a:avLst/>
-          </a:prstGeom>
-        </p:spPr>
-      </p:pic>
-      <p:sp>
-        <p:nvSpPr>
-          <p:cNvPr id="6" name="Textfeld 5">
-            <a:extLst>
-              <a:ext uri="{FF2B5EF4-FFF2-40B4-BE49-F238E27FC236}">
-                <a16:creationId xmlns:a16="http://schemas.microsoft.com/office/drawing/2014/main" id="{57554A9D-0590-41A4-92EF-9D70E66B3BB2}"/>
-              </a:ext>
-            </a:extLst>
-          </p:cNvPr>
-          <p:cNvSpPr txBox="1"/>
-          <p:nvPr/>
-        </p:nvSpPr>
-        <p:spPr>
-          <a:xfrm>
-            <a:off x="4866208" y="138081"/>
-            <a:ext cx="2499530" cy="369332"/>
-          </a:xfrm>
-          <a:prstGeom prst="rect">
-            <a:avLst/>
-          </a:prstGeom>
-          <a:noFill/>
-        </p:spPr>
-        <p:txBody>
-          <a:bodyPr wrap="none" rtlCol="0">
-            <a:spAutoFit/>
-          </a:bodyPr>
-          <a:lstStyle/>
-          <a:p>
-            <a:r>
-              <a:rPr lang="de-DE" b="1" u="sng" dirty="0"/>
-              <a:t>Business Process Canvas</a:t>
+      <p:sp>
+        <p:nvSpPr>
+          <p:cNvPr id="2" name="Titel 1">
+            <a:extLst>
+              <a:ext uri="{FF2B5EF4-FFF2-40B4-BE49-F238E27FC236}">
+                <a16:creationId xmlns:a16="http://schemas.microsoft.com/office/drawing/2014/main" id="{8F0AF5FB-8DEB-4B5F-A0D5-3962E5C1D615}"/>
+              </a:ext>
+            </a:extLst>
+          </p:cNvPr>
+          <p:cNvSpPr>
+            <a:spLocks noGrp="1"/>
+          </p:cNvSpPr>
+          <p:nvPr>
+            <p:ph type="title"/>
+          </p:nvPr>
+        </p:nvSpPr>
+        <p:spPr/>
+        <p:txBody>
+          <a:bodyPr/>
+          <a:lstStyle/>
+          <a:p>
+            <a:r>
+              <a:rPr lang="de-DE" dirty="0"/>
+              <a:t>Projektinhalt</a:t>
+            </a:r>
+          </a:p>
+        </p:txBody>
+      </p:sp>
+      <p:sp>
+        <p:nvSpPr>
+          <p:cNvPr id="3" name="Inhaltsplatzhalter 2">
+            <a:extLst>
+              <a:ext uri="{FF2B5EF4-FFF2-40B4-BE49-F238E27FC236}">
+                <a16:creationId xmlns:a16="http://schemas.microsoft.com/office/drawing/2014/main" id="{758A1A43-BF55-43E0-B551-64CEFB9FF834}"/>
+              </a:ext>
+            </a:extLst>
+          </p:cNvPr>
+          <p:cNvSpPr>
+            <a:spLocks noGrp="1"/>
+          </p:cNvSpPr>
+          <p:nvPr>
+            <p:ph idx="1"/>
+          </p:nvPr>
+        </p:nvSpPr>
+        <p:spPr/>
+        <p:txBody>
+          <a:bodyPr/>
+          <a:lstStyle/>
+          <a:p>
+            <a:r>
+              <a:rPr lang="de-DE" dirty="0"/>
+              <a:t>Formalisierung des Brauprozesses</a:t>
+            </a:r>
+          </a:p>
+          <a:p>
+            <a:r>
+              <a:rPr lang="de-DE" dirty="0"/>
+              <a:t>Erstellung eines SAP Konzeptes und dessen Umsetzung unter Absprache mit Kunde</a:t>
+            </a:r>
+          </a:p>
+          <a:p>
+            <a:r>
+              <a:rPr lang="de-DE" dirty="0"/>
+              <a:t>Installation und Konfiguration der Sensoren und Aktoren</a:t>
+            </a:r>
+          </a:p>
+          <a:p>
+            <a:r>
+              <a:rPr lang="de-DE" dirty="0"/>
+              <a:t>Erstellung eines Dashboards zur Prozessnachverfolgung</a:t>
+            </a:r>
+          </a:p>
+          <a:p>
+            <a:r>
+              <a:rPr lang="de-DE" dirty="0"/>
+              <a:t>Ausgiebiges Testen der Funktionalität</a:t>
+            </a:r>
+          </a:p>
+          <a:p>
+            <a:r>
+              <a:rPr lang="de-DE" dirty="0"/>
+              <a:t>Optional: Nachverfolgung der Flaschen über RFID</a:t>
             </a:r>
           </a:p>
         </p:txBody>
@@ -3496,7 +3939,7 @@
     </p:spTree>
     <p:extLst>
       <p:ext uri="{BB962C8B-B14F-4D97-AF65-F5344CB8AC3E}">
-        <p14:creationId xmlns:p14="http://schemas.microsoft.com/office/powerpoint/2010/main" val="1074104814"/>
+        <p14:creationId xmlns:p14="http://schemas.microsoft.com/office/powerpoint/2010/main" val="1120313986"/>
       </p:ext>
     </p:extLst>
   </p:cSld>
@@ -3528,7 +3971,7 @@
           <p:cNvPr id="2" name="Titel 1">
             <a:extLst>
               <a:ext uri="{FF2B5EF4-FFF2-40B4-BE49-F238E27FC236}">
-                <a16:creationId xmlns:a16="http://schemas.microsoft.com/office/drawing/2014/main" id="{EBA85F54-63E7-42CF-B18F-7EE29DE838DE}"/>
+                <a16:creationId xmlns:a16="http://schemas.microsoft.com/office/drawing/2014/main" id="{9549A355-C696-438B-9CDE-61A085AB99EC}"/>
               </a:ext>
             </a:extLst>
           </p:cNvPr>
@@ -3539,766 +3982,108 @@
             <p:ph type="title"/>
           </p:nvPr>
         </p:nvSpPr>
-        <p:spPr>
-          <a:xfrm>
-            <a:off x="838200" y="365125"/>
-            <a:ext cx="10515600" cy="1325563"/>
-          </a:xfrm>
-        </p:spPr>
-        <p:txBody>
-          <a:bodyPr>
-            <a:normAutofit/>
-          </a:bodyPr>
-          <a:lstStyle/>
-          <a:p>
-            <a:pPr algn="ctr"/>
+        <p:spPr/>
+        <p:txBody>
+          <a:bodyPr/>
+          <a:lstStyle/>
+          <a:p>
             <a:r>
               <a:rPr lang="de-DE" dirty="0"/>
-              <a:t>Work Breakdown Structure</a:t>
-            </a:r>
-          </a:p>
-        </p:txBody>
-      </p:sp>
-      <p:sp>
-        <p:nvSpPr>
-          <p:cNvPr id="5" name="Rechteck 4">
-            <a:extLst>
-              <a:ext uri="{FF2B5EF4-FFF2-40B4-BE49-F238E27FC236}">
-                <a16:creationId xmlns:a16="http://schemas.microsoft.com/office/drawing/2014/main" id="{D05F816A-C7C1-49BE-ADE5-3D33CBD35610}"/>
-              </a:ext>
-            </a:extLst>
-          </p:cNvPr>
-          <p:cNvSpPr/>
-          <p:nvPr/>
-        </p:nvSpPr>
-        <p:spPr>
-          <a:xfrm>
-            <a:off x="7374824" y="1690688"/>
-            <a:ext cx="1275475" cy="570381"/>
-          </a:xfrm>
-          <a:prstGeom prst="rect">
-            <a:avLst/>
-          </a:prstGeom>
-          <a:solidFill>
-            <a:schemeClr val="bg1"/>
-          </a:solidFill>
-          <a:ln>
-            <a:solidFill>
-              <a:schemeClr val="tx1"/>
-            </a:solidFill>
-          </a:ln>
-        </p:spPr>
-        <p:style>
-          <a:lnRef idx="2">
-            <a:schemeClr val="accent1">
-              <a:shade val="50000"/>
-            </a:schemeClr>
-          </a:lnRef>
-          <a:fillRef idx="1">
-            <a:schemeClr val="accent1"/>
-          </a:fillRef>
-          <a:effectRef idx="0">
-            <a:schemeClr val="accent1"/>
-          </a:effectRef>
-          <a:fontRef idx="minor">
-            <a:schemeClr val="lt1"/>
-          </a:fontRef>
-        </p:style>
-        <p:txBody>
-          <a:bodyPr rtlCol="0" anchor="ctr"/>
-          <a:lstStyle/>
-          <a:p>
-            <a:pPr algn="ctr"/>
-            <a:r>
-              <a:rPr lang="de-DE" sz="1400" dirty="0" err="1">
-                <a:solidFill>
-                  <a:schemeClr val="tx1"/>
-                </a:solidFill>
-              </a:rPr>
-              <a:t>Testing</a:t>
-            </a:r>
-            <a:endParaRPr lang="de-DE" sz="1400" dirty="0">
-              <a:solidFill>
-                <a:schemeClr val="tx1"/>
-              </a:solidFill>
-            </a:endParaRPr>
-          </a:p>
-        </p:txBody>
-      </p:sp>
-      <p:sp>
-        <p:nvSpPr>
-          <p:cNvPr id="6" name="Rechteck 5">
-            <a:extLst>
-              <a:ext uri="{FF2B5EF4-FFF2-40B4-BE49-F238E27FC236}">
-                <a16:creationId xmlns:a16="http://schemas.microsoft.com/office/drawing/2014/main" id="{2748357F-DA3C-4365-B39A-A2797DCE49EB}"/>
-              </a:ext>
-            </a:extLst>
-          </p:cNvPr>
-          <p:cNvSpPr/>
-          <p:nvPr/>
-        </p:nvSpPr>
-        <p:spPr>
-          <a:xfrm>
-            <a:off x="1318263" y="1690687"/>
-            <a:ext cx="1275474" cy="570382"/>
-          </a:xfrm>
-          <a:prstGeom prst="rect">
-            <a:avLst/>
-          </a:prstGeom>
-          <a:solidFill>
-            <a:schemeClr val="bg1"/>
-          </a:solidFill>
-          <a:ln>
-            <a:solidFill>
-              <a:schemeClr val="tx1"/>
-            </a:solidFill>
-          </a:ln>
-        </p:spPr>
-        <p:style>
-          <a:lnRef idx="2">
-            <a:schemeClr val="accent1">
-              <a:shade val="50000"/>
-            </a:schemeClr>
-          </a:lnRef>
-          <a:fillRef idx="1">
-            <a:schemeClr val="accent1"/>
-          </a:fillRef>
-          <a:effectRef idx="0">
-            <a:schemeClr val="accent1"/>
-          </a:effectRef>
-          <a:fontRef idx="minor">
-            <a:schemeClr val="lt1"/>
-          </a:fontRef>
-        </p:style>
-        <p:txBody>
-          <a:bodyPr rtlCol="0" anchor="ctr"/>
-          <a:lstStyle/>
-          <a:p>
-            <a:pPr algn="ctr"/>
-            <a:r>
-              <a:rPr lang="de-DE" sz="1400" dirty="0" err="1">
-                <a:solidFill>
-                  <a:schemeClr val="tx1"/>
-                </a:solidFill>
-              </a:rPr>
-              <a:t>Developement</a:t>
-            </a:r>
-            <a:endParaRPr lang="de-DE" sz="1400" dirty="0">
-              <a:solidFill>
-                <a:schemeClr val="tx1"/>
-              </a:solidFill>
-            </a:endParaRPr>
-          </a:p>
-        </p:txBody>
-      </p:sp>
-      <p:sp>
-        <p:nvSpPr>
-          <p:cNvPr id="8" name="Rechteck 7">
-            <a:extLst>
-              <a:ext uri="{FF2B5EF4-FFF2-40B4-BE49-F238E27FC236}">
-                <a16:creationId xmlns:a16="http://schemas.microsoft.com/office/drawing/2014/main" id="{25C6A291-E902-4178-AD51-613DEEC5CEC3}"/>
-              </a:ext>
-            </a:extLst>
-          </p:cNvPr>
-          <p:cNvSpPr/>
-          <p:nvPr/>
-        </p:nvSpPr>
-        <p:spPr>
-          <a:xfrm>
-            <a:off x="10138114" y="1690687"/>
-            <a:ext cx="1155895" cy="570381"/>
-          </a:xfrm>
-          <a:prstGeom prst="rect">
-            <a:avLst/>
-          </a:prstGeom>
-          <a:solidFill>
-            <a:schemeClr val="bg1"/>
-          </a:solidFill>
-          <a:ln>
-            <a:solidFill>
-              <a:schemeClr val="tx1"/>
-            </a:solidFill>
-          </a:ln>
-        </p:spPr>
-        <p:style>
-          <a:lnRef idx="2">
-            <a:schemeClr val="accent1">
-              <a:shade val="50000"/>
-            </a:schemeClr>
-          </a:lnRef>
-          <a:fillRef idx="1">
-            <a:schemeClr val="accent1"/>
-          </a:fillRef>
-          <a:effectRef idx="0">
-            <a:schemeClr val="accent1"/>
-          </a:effectRef>
-          <a:fontRef idx="minor">
-            <a:schemeClr val="lt1"/>
-          </a:fontRef>
-        </p:style>
-        <p:txBody>
-          <a:bodyPr rtlCol="0" anchor="ctr"/>
-          <a:lstStyle/>
-          <a:p>
-            <a:pPr algn="ctr"/>
-            <a:r>
-              <a:rPr lang="de-DE" sz="1400" dirty="0">
-                <a:solidFill>
-                  <a:schemeClr val="tx1"/>
-                </a:solidFill>
-              </a:rPr>
-              <a:t>Support</a:t>
-            </a:r>
-          </a:p>
-        </p:txBody>
-      </p:sp>
-      <p:sp>
-        <p:nvSpPr>
-          <p:cNvPr id="9" name="Rechteck 8">
-            <a:extLst>
-              <a:ext uri="{FF2B5EF4-FFF2-40B4-BE49-F238E27FC236}">
-                <a16:creationId xmlns:a16="http://schemas.microsoft.com/office/drawing/2014/main" id="{6E6E176E-2C0C-4FEF-AFBC-F5E07926AEFE}"/>
-              </a:ext>
-            </a:extLst>
-          </p:cNvPr>
-          <p:cNvSpPr/>
-          <p:nvPr/>
-        </p:nvSpPr>
-        <p:spPr>
-          <a:xfrm>
-            <a:off x="410437" y="2464409"/>
-            <a:ext cx="3091126" cy="4197677"/>
-          </a:xfrm>
-          <a:prstGeom prst="rect">
-            <a:avLst/>
-          </a:prstGeom>
-          <a:noFill/>
-          <a:ln>
-            <a:noFill/>
-          </a:ln>
-        </p:spPr>
-        <p:style>
-          <a:lnRef idx="2">
-            <a:schemeClr val="accent1">
-              <a:shade val="50000"/>
-            </a:schemeClr>
-          </a:lnRef>
-          <a:fillRef idx="1">
-            <a:schemeClr val="accent1"/>
-          </a:fillRef>
-          <a:effectRef idx="0">
-            <a:schemeClr val="accent1"/>
-          </a:effectRef>
-          <a:fontRef idx="minor">
-            <a:schemeClr val="lt1"/>
-          </a:fontRef>
-        </p:style>
-        <p:txBody>
-          <a:bodyPr rtlCol="0" anchor="t"/>
-          <a:lstStyle/>
-          <a:p>
-            <a:pPr marL="285750" indent="-285750">
-              <a:buFont typeface="Arial" panose="020B0604020202020204" pitchFamily="34" charset="0"/>
-              <a:buChar char="•"/>
-            </a:pPr>
-            <a:r>
-              <a:rPr lang="de-DE" sz="1400" dirty="0">
-                <a:solidFill>
-                  <a:schemeClr val="tx1"/>
-                </a:solidFill>
-              </a:rPr>
-              <a:t>MQTT Server programmieren</a:t>
-            </a:r>
-          </a:p>
-          <a:p>
-            <a:pPr marL="285750" indent="-285750">
-              <a:buFont typeface="Arial" panose="020B0604020202020204" pitchFamily="34" charset="0"/>
-              <a:buChar char="•"/>
-            </a:pPr>
-            <a:r>
-              <a:rPr lang="de-DE" sz="1400" dirty="0">
-                <a:solidFill>
-                  <a:schemeClr val="tx1"/>
-                </a:solidFill>
-              </a:rPr>
-              <a:t>Rezepte in SAP einpflegen </a:t>
-            </a:r>
-          </a:p>
-          <a:p>
-            <a:pPr marL="285750" indent="-285750">
-              <a:buFont typeface="Arial" panose="020B0604020202020204" pitchFamily="34" charset="0"/>
-              <a:buChar char="•"/>
-            </a:pPr>
-            <a:r>
-              <a:rPr lang="de-DE" sz="1400" dirty="0">
-                <a:solidFill>
-                  <a:schemeClr val="tx1"/>
-                </a:solidFill>
-              </a:rPr>
-              <a:t>Schnittstelle für Pflanzenanbau schaffen</a:t>
-            </a:r>
-          </a:p>
-          <a:p>
-            <a:pPr marL="285750" indent="-285750">
-              <a:buFont typeface="Arial" panose="020B0604020202020204" pitchFamily="34" charset="0"/>
-              <a:buChar char="•"/>
-            </a:pPr>
-            <a:r>
-              <a:rPr lang="de-DE" sz="1400" dirty="0">
-                <a:solidFill>
-                  <a:schemeClr val="tx1"/>
-                </a:solidFill>
-              </a:rPr>
-              <a:t>Schnittstelle für </a:t>
-            </a:r>
-            <a:r>
-              <a:rPr lang="de-DE" sz="1400" dirty="0" err="1">
-                <a:solidFill>
-                  <a:schemeClr val="tx1"/>
-                </a:solidFill>
-              </a:rPr>
+              <a:t>Vorteile</a:t>
+            </a:r>
+          </a:p>
+        </p:txBody>
+      </p:sp>
+      <p:sp>
+        <p:nvSpPr>
+          <p:cNvPr id="3" name="Inhaltsplatzhalter 2">
+            <a:extLst>
+              <a:ext uri="{FF2B5EF4-FFF2-40B4-BE49-F238E27FC236}">
+                <a16:creationId xmlns:a16="http://schemas.microsoft.com/office/drawing/2014/main" id="{45EACD51-1684-442A-9955-C5DE6B957EC1}"/>
+              </a:ext>
+            </a:extLst>
+          </p:cNvPr>
+          <p:cNvSpPr>
+            <a:spLocks noGrp="1"/>
+          </p:cNvSpPr>
+          <p:nvPr>
+            <p:ph idx="1"/>
+          </p:nvPr>
+        </p:nvSpPr>
+        <p:spPr/>
+        <p:txBody>
+          <a:bodyPr/>
+          <a:lstStyle/>
+          <a:p>
+            <a:r>
+              <a:rPr lang="de-DE" dirty="0"/>
+              <a:t>Weniger Fehlproduktionen durch formalisierten Ablauf</a:t>
+            </a:r>
+          </a:p>
+          <a:p>
+            <a:r>
+              <a:rPr lang="de-DE" dirty="0"/>
+              <a:t>Bessere Nachverfolgbarkeit von Tätigkeiten</a:t>
+            </a:r>
+          </a:p>
+          <a:p>
+            <a:r>
+              <a:rPr lang="de-DE" dirty="0"/>
+              <a:t>Ermöglicht Prozessoptimierung durch Daten aus der Produktion</a:t>
+            </a:r>
+          </a:p>
+          <a:p>
+            <a:r>
+              <a:rPr lang="de-DE" dirty="0"/>
+              <a:t>Sicherung bzw. sogar Verbesserung der Qualität durch klare Instruktionen</a:t>
+            </a:r>
+          </a:p>
+          <a:p>
+            <a:r>
+              <a:rPr lang="de-DE" dirty="0"/>
+              <a:t>Erhöhte Ausfallsicherung durch Abschaffen eines Single Point </a:t>
+            </a:r>
+            <a:r>
+              <a:rPr lang="de-DE" dirty="0" err="1"/>
+              <a:t>of</a:t>
+            </a:r>
+            <a:r>
+              <a:rPr lang="de-DE" dirty="0"/>
+              <a:t> Failure (Braumeister)</a:t>
+            </a:r>
+          </a:p>
+          <a:p>
+            <a:r>
+              <a:rPr lang="de-DE" dirty="0"/>
+              <a:t>Ermöglicht Einsatz neuer Technologien wie </a:t>
+            </a:r>
+            <a:r>
+              <a:rPr lang="de-DE" dirty="0" err="1"/>
               <a:t>Conditioning</a:t>
             </a:r>
             <a:r>
-              <a:rPr lang="de-DE" sz="1400" dirty="0">
-                <a:solidFill>
-                  <a:schemeClr val="tx1"/>
-                </a:solidFill>
-              </a:rPr>
+              <a:rPr lang="de-DE" dirty="0"/>
               <a:t> Monitoring</a:t>
             </a:r>
           </a:p>
           <a:p>
-            <a:pPr marL="285750" indent="-285750">
-              <a:buFont typeface="Arial" panose="020B0604020202020204" pitchFamily="34" charset="0"/>
-              <a:buChar char="•"/>
-            </a:pPr>
-            <a:r>
-              <a:rPr lang="de-DE" sz="1400" dirty="0">
-                <a:solidFill>
-                  <a:schemeClr val="tx1"/>
-                </a:solidFill>
-              </a:rPr>
-              <a:t>SAP programmieren</a:t>
-            </a:r>
-          </a:p>
-          <a:p>
-            <a:pPr marL="285750" indent="-285750">
-              <a:buFont typeface="Arial" panose="020B0604020202020204" pitchFamily="34" charset="0"/>
-              <a:buChar char="•"/>
-            </a:pPr>
-            <a:r>
-              <a:rPr lang="de-DE" sz="1400" dirty="0">
-                <a:solidFill>
-                  <a:schemeClr val="tx1"/>
-                </a:solidFill>
-              </a:rPr>
-              <a:t>SAP Schnittstelle für die Sensoren </a:t>
-            </a:r>
-          </a:p>
-          <a:p>
-            <a:pPr marL="285750" indent="-285750">
-              <a:buFont typeface="Arial" panose="020B0604020202020204" pitchFamily="34" charset="0"/>
-              <a:buChar char="•"/>
-            </a:pPr>
-            <a:r>
-              <a:rPr lang="de-DE" sz="1400" dirty="0">
-                <a:solidFill>
-                  <a:schemeClr val="tx1"/>
-                </a:solidFill>
-              </a:rPr>
-              <a:t>RFID Kennzeichnung (pro Auftrag) erzeugen</a:t>
-            </a:r>
-          </a:p>
-          <a:p>
-            <a:pPr marL="285750" indent="-285750">
-              <a:buFont typeface="Arial" panose="020B0604020202020204" pitchFamily="34" charset="0"/>
-              <a:buChar char="•"/>
-            </a:pPr>
-            <a:r>
-              <a:rPr lang="de-DE" sz="1400" dirty="0">
-                <a:solidFill>
-                  <a:schemeClr val="tx1"/>
-                </a:solidFill>
-              </a:rPr>
-              <a:t>Sensoren anbinden und konfigurieren</a:t>
-            </a:r>
-          </a:p>
-          <a:p>
-            <a:pPr marL="285750" indent="-285750">
-              <a:buFont typeface="Arial" panose="020B0604020202020204" pitchFamily="34" charset="0"/>
-              <a:buChar char="•"/>
-            </a:pPr>
-            <a:r>
-              <a:rPr lang="de-DE" sz="1400" dirty="0">
-                <a:solidFill>
-                  <a:schemeClr val="tx1"/>
-                </a:solidFill>
-              </a:rPr>
-              <a:t>Aktoren anbinden und konfigurieren</a:t>
-            </a:r>
-          </a:p>
-          <a:p>
-            <a:pPr marL="285750" indent="-285750">
-              <a:buFont typeface="Arial" panose="020B0604020202020204" pitchFamily="34" charset="0"/>
-              <a:buChar char="•"/>
-            </a:pPr>
-            <a:r>
-              <a:rPr lang="de-DE" sz="1400" dirty="0">
-                <a:solidFill>
-                  <a:schemeClr val="tx1"/>
-                </a:solidFill>
-              </a:rPr>
-              <a:t>SPS programmieren und anbinden</a:t>
-            </a:r>
-          </a:p>
-          <a:p>
-            <a:pPr marL="285750" indent="-285750">
-              <a:buFont typeface="Arial" panose="020B0604020202020204" pitchFamily="34" charset="0"/>
-              <a:buChar char="•"/>
-            </a:pPr>
-            <a:r>
-              <a:rPr lang="de-DE" sz="1400" dirty="0">
-                <a:solidFill>
-                  <a:schemeClr val="tx1"/>
-                </a:solidFill>
-              </a:rPr>
-              <a:t>Gateway aufsetzen </a:t>
-            </a:r>
-          </a:p>
-        </p:txBody>
-      </p:sp>
-      <p:sp>
-        <p:nvSpPr>
-          <p:cNvPr id="31" name="Rechteck 30">
-            <a:extLst>
-              <a:ext uri="{FF2B5EF4-FFF2-40B4-BE49-F238E27FC236}">
-                <a16:creationId xmlns:a16="http://schemas.microsoft.com/office/drawing/2014/main" id="{0C03E21E-2FD8-44A6-AE66-1AFAE12DD2D5}"/>
-              </a:ext>
-            </a:extLst>
-          </p:cNvPr>
-          <p:cNvSpPr/>
-          <p:nvPr/>
-        </p:nvSpPr>
-        <p:spPr>
-          <a:xfrm>
-            <a:off x="4717704" y="1690687"/>
-            <a:ext cx="1275475" cy="570382"/>
-          </a:xfrm>
-          <a:prstGeom prst="rect">
-            <a:avLst/>
-          </a:prstGeom>
-          <a:solidFill>
-            <a:schemeClr val="bg1"/>
-          </a:solidFill>
-          <a:ln>
-            <a:solidFill>
-              <a:schemeClr val="tx1"/>
-            </a:solidFill>
-          </a:ln>
-        </p:spPr>
-        <p:style>
-          <a:lnRef idx="2">
-            <a:schemeClr val="accent1">
-              <a:shade val="50000"/>
-            </a:schemeClr>
-          </a:lnRef>
-          <a:fillRef idx="1">
-            <a:schemeClr val="accent1"/>
-          </a:fillRef>
-          <a:effectRef idx="0">
-            <a:schemeClr val="accent1"/>
-          </a:effectRef>
-          <a:fontRef idx="minor">
-            <a:schemeClr val="lt1"/>
-          </a:fontRef>
-        </p:style>
-        <p:txBody>
-          <a:bodyPr rtlCol="0" anchor="ctr"/>
-          <a:lstStyle/>
-          <a:p>
-            <a:pPr algn="ctr"/>
-            <a:r>
-              <a:rPr lang="de-DE" sz="1400" dirty="0">
-                <a:solidFill>
-                  <a:schemeClr val="tx1"/>
-                </a:solidFill>
-              </a:rPr>
-              <a:t>Projekt-</a:t>
-            </a:r>
-          </a:p>
-          <a:p>
-            <a:pPr algn="ctr"/>
-            <a:r>
-              <a:rPr lang="de-DE" sz="1400" dirty="0" err="1">
-                <a:solidFill>
-                  <a:schemeClr val="tx1"/>
-                </a:solidFill>
-              </a:rPr>
-              <a:t>management</a:t>
-            </a:r>
-            <a:endParaRPr lang="de-DE" sz="1400" dirty="0">
-              <a:solidFill>
-                <a:schemeClr val="tx1"/>
-              </a:solidFill>
-            </a:endParaRPr>
-          </a:p>
-        </p:txBody>
-      </p:sp>
-      <p:sp>
-        <p:nvSpPr>
-          <p:cNvPr id="26" name="Rechteck 25">
-            <a:extLst>
-              <a:ext uri="{FF2B5EF4-FFF2-40B4-BE49-F238E27FC236}">
-                <a16:creationId xmlns:a16="http://schemas.microsoft.com/office/drawing/2014/main" id="{CA1B537E-5B48-4DFB-9BEA-6D3128E34427}"/>
-              </a:ext>
-            </a:extLst>
-          </p:cNvPr>
-          <p:cNvSpPr/>
-          <p:nvPr/>
-        </p:nvSpPr>
-        <p:spPr>
-          <a:xfrm>
-            <a:off x="3813074" y="2464409"/>
-            <a:ext cx="3091126" cy="4197677"/>
-          </a:xfrm>
-          <a:prstGeom prst="rect">
-            <a:avLst/>
-          </a:prstGeom>
-          <a:noFill/>
-          <a:ln>
-            <a:noFill/>
-          </a:ln>
-        </p:spPr>
-        <p:style>
-          <a:lnRef idx="2">
-            <a:schemeClr val="accent1">
-              <a:shade val="50000"/>
-            </a:schemeClr>
-          </a:lnRef>
-          <a:fillRef idx="1">
-            <a:schemeClr val="accent1"/>
-          </a:fillRef>
-          <a:effectRef idx="0">
-            <a:schemeClr val="accent1"/>
-          </a:effectRef>
-          <a:fontRef idx="minor">
-            <a:schemeClr val="lt1"/>
-          </a:fontRef>
-        </p:style>
-        <p:txBody>
-          <a:bodyPr rtlCol="0" anchor="t"/>
-          <a:lstStyle/>
-          <a:p>
-            <a:pPr marL="285750" indent="-285750">
-              <a:buFont typeface="Arial" panose="020B0604020202020204" pitchFamily="34" charset="0"/>
-              <a:buChar char="•"/>
-            </a:pPr>
-            <a:r>
-              <a:rPr lang="de-DE" sz="1400" dirty="0">
-                <a:solidFill>
-                  <a:schemeClr val="tx1"/>
-                </a:solidFill>
-              </a:rPr>
-              <a:t>Kommunikationsplan des Systems erstellen</a:t>
-            </a:r>
-          </a:p>
-          <a:p>
-            <a:pPr marL="285750" indent="-285750">
-              <a:buFont typeface="Arial" panose="020B0604020202020204" pitchFamily="34" charset="0"/>
-              <a:buChar char="•"/>
-            </a:pPr>
-            <a:r>
-              <a:rPr lang="de-DE" sz="1400" dirty="0">
-                <a:solidFill>
-                  <a:schemeClr val="tx1"/>
-                </a:solidFill>
-              </a:rPr>
-              <a:t>Aktivitätsplan und Verteilung </a:t>
-            </a:r>
-          </a:p>
-          <a:p>
-            <a:pPr marL="285750" indent="-285750">
-              <a:buFont typeface="Arial" panose="020B0604020202020204" pitchFamily="34" charset="0"/>
-              <a:buChar char="•"/>
-            </a:pPr>
-            <a:r>
-              <a:rPr lang="de-DE" sz="1400" dirty="0">
-                <a:solidFill>
-                  <a:schemeClr val="tx1"/>
-                </a:solidFill>
-              </a:rPr>
-              <a:t>Kommunikation mit anderen Gruppen</a:t>
-            </a:r>
-          </a:p>
-          <a:p>
-            <a:pPr marL="285750" indent="-285750">
-              <a:buFont typeface="Arial" panose="020B0604020202020204" pitchFamily="34" charset="0"/>
-              <a:buChar char="•"/>
-            </a:pPr>
-            <a:r>
-              <a:rPr lang="de-DE" sz="1400" dirty="0">
-                <a:solidFill>
-                  <a:schemeClr val="tx1"/>
-                </a:solidFill>
-              </a:rPr>
-              <a:t>Überprüfung der Ziele und mögliche Anpassung des Projektplans</a:t>
-            </a:r>
-          </a:p>
-        </p:txBody>
-      </p:sp>
-      <p:sp>
-        <p:nvSpPr>
-          <p:cNvPr id="30" name="Rechteck 29">
-            <a:extLst>
-              <a:ext uri="{FF2B5EF4-FFF2-40B4-BE49-F238E27FC236}">
-                <a16:creationId xmlns:a16="http://schemas.microsoft.com/office/drawing/2014/main" id="{C80BE056-2216-419E-A5EA-0CCEEE7AC3B1}"/>
-              </a:ext>
-            </a:extLst>
-          </p:cNvPr>
-          <p:cNvSpPr/>
-          <p:nvPr/>
-        </p:nvSpPr>
-        <p:spPr>
-          <a:xfrm>
-            <a:off x="6686590" y="2464410"/>
-            <a:ext cx="3091126" cy="4197677"/>
-          </a:xfrm>
-          <a:prstGeom prst="rect">
-            <a:avLst/>
-          </a:prstGeom>
-          <a:noFill/>
-          <a:ln>
-            <a:noFill/>
-          </a:ln>
-        </p:spPr>
-        <p:style>
-          <a:lnRef idx="2">
-            <a:schemeClr val="accent1">
-              <a:shade val="50000"/>
-            </a:schemeClr>
-          </a:lnRef>
-          <a:fillRef idx="1">
-            <a:schemeClr val="accent1"/>
-          </a:fillRef>
-          <a:effectRef idx="0">
-            <a:schemeClr val="accent1"/>
-          </a:effectRef>
-          <a:fontRef idx="minor">
-            <a:schemeClr val="lt1"/>
-          </a:fontRef>
-        </p:style>
-        <p:txBody>
-          <a:bodyPr rtlCol="0" anchor="t"/>
-          <a:lstStyle/>
-          <a:p>
-            <a:pPr marL="285750" indent="-285750">
-              <a:buFont typeface="Arial" panose="020B0604020202020204" pitchFamily="34" charset="0"/>
-              <a:buChar char="•"/>
-            </a:pPr>
-            <a:r>
-              <a:rPr lang="de-DE" sz="1400" dirty="0">
-                <a:solidFill>
-                  <a:schemeClr val="tx1"/>
-                </a:solidFill>
-              </a:rPr>
-              <a:t>Stresstest/Integrationstest</a:t>
-            </a:r>
-          </a:p>
-          <a:p>
-            <a:pPr marL="285750" indent="-285750">
-              <a:buFont typeface="Arial" panose="020B0604020202020204" pitchFamily="34" charset="0"/>
-              <a:buChar char="•"/>
-            </a:pPr>
-            <a:r>
-              <a:rPr lang="de-DE" sz="1400" dirty="0">
-                <a:solidFill>
-                  <a:schemeClr val="tx1"/>
-                </a:solidFill>
-              </a:rPr>
-              <a:t>Produktionstest/Abnahme</a:t>
-            </a:r>
-          </a:p>
-        </p:txBody>
-      </p:sp>
-      <p:sp>
-        <p:nvSpPr>
-          <p:cNvPr id="35" name="Rechteck 34">
-            <a:extLst>
-              <a:ext uri="{FF2B5EF4-FFF2-40B4-BE49-F238E27FC236}">
-                <a16:creationId xmlns:a16="http://schemas.microsoft.com/office/drawing/2014/main" id="{B3E8A12B-59CA-41CA-8416-C45E34EE49E2}"/>
-              </a:ext>
-            </a:extLst>
-          </p:cNvPr>
-          <p:cNvSpPr/>
-          <p:nvPr/>
-        </p:nvSpPr>
-        <p:spPr>
-          <a:xfrm>
-            <a:off x="9170498" y="2464408"/>
-            <a:ext cx="3091126" cy="4197677"/>
-          </a:xfrm>
-          <a:prstGeom prst="rect">
-            <a:avLst/>
-          </a:prstGeom>
-          <a:noFill/>
-          <a:ln>
-            <a:noFill/>
-          </a:ln>
-        </p:spPr>
-        <p:style>
-          <a:lnRef idx="2">
-            <a:schemeClr val="accent1">
-              <a:shade val="50000"/>
-            </a:schemeClr>
-          </a:lnRef>
-          <a:fillRef idx="1">
-            <a:schemeClr val="accent1"/>
-          </a:fillRef>
-          <a:effectRef idx="0">
-            <a:schemeClr val="accent1"/>
-          </a:effectRef>
-          <a:fontRef idx="minor">
-            <a:schemeClr val="lt1"/>
-          </a:fontRef>
-        </p:style>
-        <p:txBody>
-          <a:bodyPr rtlCol="0" anchor="t"/>
-          <a:lstStyle/>
-          <a:p>
-            <a:pPr marL="285750" indent="-285750">
-              <a:buFont typeface="Arial" panose="020B0604020202020204" pitchFamily="34" charset="0"/>
-              <a:buChar char="•"/>
-            </a:pPr>
-            <a:r>
-              <a:rPr lang="de-DE" sz="1400" dirty="0">
-                <a:solidFill>
-                  <a:schemeClr val="tx1"/>
-                </a:solidFill>
-              </a:rPr>
-              <a:t>Mitarbeiter Schulung </a:t>
-            </a:r>
-          </a:p>
-          <a:p>
-            <a:pPr marL="285750" indent="-285750">
-              <a:buFont typeface="Arial" panose="020B0604020202020204" pitchFamily="34" charset="0"/>
-              <a:buChar char="•"/>
-            </a:pPr>
-            <a:r>
-              <a:rPr lang="de-DE" sz="1400" dirty="0">
-                <a:solidFill>
-                  <a:schemeClr val="tx1"/>
-                </a:solidFill>
-              </a:rPr>
-              <a:t>Kommunikation mit Kunde</a:t>
-            </a:r>
+            <a:r>
+              <a:rPr lang="de-DE" dirty="0"/>
+              <a:t>Erhöhte Skalierbarkeit </a:t>
+            </a:r>
+          </a:p>
+          <a:p>
+            <a:endParaRPr lang="de-DE" dirty="0"/>
+          </a:p>
+          <a:p>
+            <a:endParaRPr lang="de-DE" dirty="0"/>
           </a:p>
         </p:txBody>
       </p:sp>
     </p:spTree>
     <p:extLst>
       <p:ext uri="{BB962C8B-B14F-4D97-AF65-F5344CB8AC3E}">
-        <p14:creationId xmlns:p14="http://schemas.microsoft.com/office/powerpoint/2010/main" val="128592377"/>
+        <p14:creationId xmlns:p14="http://schemas.microsoft.com/office/powerpoint/2010/main" val="2755506117"/>
       </p:ext>
     </p:extLst>
   </p:cSld>
@@ -4309,6 +4094,107 @@
 </file>
 
 <file path=ppt/slides/slide4.xml><?xml version="1.0" encoding="utf-8"?>
+<p:sld xmlns:a="http://schemas.openxmlformats.org/drawingml/2006/main" xmlns:r="http://schemas.openxmlformats.org/officeDocument/2006/relationships" xmlns:p="http://schemas.openxmlformats.org/presentationml/2006/main">
+  <p:cSld>
+    <p:spTree>
+      <p:nvGrpSpPr>
+        <p:cNvPr id="1" name=""/>
+        <p:cNvGrpSpPr/>
+        <p:nvPr/>
+      </p:nvGrpSpPr>
+      <p:grpSpPr>
+        <a:xfrm>
+          <a:off x="0" y="0"/>
+          <a:ext cx="0" cy="0"/>
+          <a:chOff x="0" y="0"/>
+          <a:chExt cx="0" cy="0"/>
+        </a:xfrm>
+      </p:grpSpPr>
+      <p:pic>
+        <p:nvPicPr>
+          <p:cNvPr id="5" name="Grafik 4">
+            <a:extLst>
+              <a:ext uri="{FF2B5EF4-FFF2-40B4-BE49-F238E27FC236}">
+                <a16:creationId xmlns:a16="http://schemas.microsoft.com/office/drawing/2014/main" id="{845A4F59-6293-40D8-92AE-9CDD7D9BE489}"/>
+              </a:ext>
+            </a:extLst>
+          </p:cNvPr>
+          <p:cNvPicPr>
+            <a:picLocks noChangeAspect="1"/>
+          </p:cNvPicPr>
+          <p:nvPr/>
+        </p:nvPicPr>
+        <p:blipFill>
+          <a:blip r:embed="rId2">
+            <a:extLst>
+              <a:ext uri="{28A0092B-C50C-407E-A947-70E740481C1C}">
+                <a14:useLocalDpi xmlns:a14="http://schemas.microsoft.com/office/drawing/2010/main" val="0"/>
+              </a:ext>
+            </a:extLst>
+          </a:blip>
+          <a:stretch>
+            <a:fillRect/>
+          </a:stretch>
+        </p:blipFill>
+        <p:spPr>
+          <a:xfrm>
+            <a:off x="2290407" y="530086"/>
+            <a:ext cx="8125801" cy="6189833"/>
+          </a:xfrm>
+          <a:prstGeom prst="rect">
+            <a:avLst/>
+          </a:prstGeom>
+        </p:spPr>
+      </p:pic>
+      <p:sp>
+        <p:nvSpPr>
+          <p:cNvPr id="6" name="Textfeld 5">
+            <a:extLst>
+              <a:ext uri="{FF2B5EF4-FFF2-40B4-BE49-F238E27FC236}">
+                <a16:creationId xmlns:a16="http://schemas.microsoft.com/office/drawing/2014/main" id="{57554A9D-0590-41A4-92EF-9D70E66B3BB2}"/>
+              </a:ext>
+            </a:extLst>
+          </p:cNvPr>
+          <p:cNvSpPr txBox="1"/>
+          <p:nvPr/>
+        </p:nvSpPr>
+        <p:spPr>
+          <a:xfrm>
+            <a:off x="4866208" y="138081"/>
+            <a:ext cx="2499530" cy="369332"/>
+          </a:xfrm>
+          <a:prstGeom prst="rect">
+            <a:avLst/>
+          </a:prstGeom>
+          <a:noFill/>
+        </p:spPr>
+        <p:txBody>
+          <a:bodyPr wrap="none" rtlCol="0">
+            <a:spAutoFit/>
+          </a:bodyPr>
+          <a:lstStyle/>
+          <a:p>
+            <a:r>
+              <a:rPr lang="de-DE" b="1" u="sng" dirty="0"/>
+              <a:t>Business Process Canvas</a:t>
+            </a:r>
+          </a:p>
+        </p:txBody>
+      </p:sp>
+    </p:spTree>
+    <p:extLst>
+      <p:ext uri="{BB962C8B-B14F-4D97-AF65-F5344CB8AC3E}">
+        <p14:creationId xmlns:p14="http://schemas.microsoft.com/office/powerpoint/2010/main" val="1074104814"/>
+      </p:ext>
+    </p:extLst>
+  </p:cSld>
+  <p:clrMapOvr>
+    <a:masterClrMapping/>
+  </p:clrMapOvr>
+</p:sld>
+</file>
+
+<file path=ppt/slides/slide5.xml><?xml version="1.0" encoding="utf-8"?>
 <p:sld xmlns:a="http://schemas.openxmlformats.org/drawingml/2006/main" xmlns:r="http://schemas.openxmlformats.org/officeDocument/2006/relationships" xmlns:p="http://schemas.openxmlformats.org/presentationml/2006/main">
   <p:cSld>
     <p:spTree>
@@ -5060,86 +4946,6 @@
 </p:sld>
 </file>
 
-<file path=ppt/slides/slide5.xml><?xml version="1.0" encoding="utf-8"?>
-<p:sld xmlns:a="http://schemas.openxmlformats.org/drawingml/2006/main" xmlns:r="http://schemas.openxmlformats.org/officeDocument/2006/relationships" xmlns:p="http://schemas.openxmlformats.org/presentationml/2006/main">
-  <p:cSld>
-    <p:spTree>
-      <p:nvGrpSpPr>
-        <p:cNvPr id="1" name=""/>
-        <p:cNvGrpSpPr/>
-        <p:nvPr/>
-      </p:nvGrpSpPr>
-      <p:grpSpPr>
-        <a:xfrm>
-          <a:off x="0" y="0"/>
-          <a:ext cx="0" cy="0"/>
-          <a:chOff x="0" y="0"/>
-          <a:chExt cx="0" cy="0"/>
-        </a:xfrm>
-      </p:grpSpPr>
-      <p:sp>
-        <p:nvSpPr>
-          <p:cNvPr id="2" name="Titel 1">
-            <a:extLst>
-              <a:ext uri="{FF2B5EF4-FFF2-40B4-BE49-F238E27FC236}">
-                <a16:creationId xmlns:a16="http://schemas.microsoft.com/office/drawing/2014/main" id="{9549A355-C696-438B-9CDE-61A085AB99EC}"/>
-              </a:ext>
-            </a:extLst>
-          </p:cNvPr>
-          <p:cNvSpPr>
-            <a:spLocks noGrp="1"/>
-          </p:cNvSpPr>
-          <p:nvPr>
-            <p:ph type="title"/>
-          </p:nvPr>
-        </p:nvSpPr>
-        <p:spPr/>
-        <p:txBody>
-          <a:bodyPr/>
-          <a:lstStyle/>
-          <a:p>
-            <a:endParaRPr lang="de-DE"/>
-          </a:p>
-        </p:txBody>
-      </p:sp>
-      <p:sp>
-        <p:nvSpPr>
-          <p:cNvPr id="3" name="Inhaltsplatzhalter 2">
-            <a:extLst>
-              <a:ext uri="{FF2B5EF4-FFF2-40B4-BE49-F238E27FC236}">
-                <a16:creationId xmlns:a16="http://schemas.microsoft.com/office/drawing/2014/main" id="{45EACD51-1684-442A-9955-C5DE6B957EC1}"/>
-              </a:ext>
-            </a:extLst>
-          </p:cNvPr>
-          <p:cNvSpPr>
-            <a:spLocks noGrp="1"/>
-          </p:cNvSpPr>
-          <p:nvPr>
-            <p:ph idx="1"/>
-          </p:nvPr>
-        </p:nvSpPr>
-        <p:spPr/>
-        <p:txBody>
-          <a:bodyPr/>
-          <a:lstStyle/>
-          <a:p>
-            <a:endParaRPr lang="de-DE"/>
-          </a:p>
-        </p:txBody>
-      </p:sp>
-    </p:spTree>
-    <p:extLst>
-      <p:ext uri="{BB962C8B-B14F-4D97-AF65-F5344CB8AC3E}">
-        <p14:creationId xmlns:p14="http://schemas.microsoft.com/office/powerpoint/2010/main" val="2755506117"/>
-      </p:ext>
-    </p:extLst>
-  </p:cSld>
-  <p:clrMapOvr>
-    <a:masterClrMapping/>
-  </p:clrMapOvr>
-</p:sld>
-</file>
-
 <file path=ppt/slides/slide6.xml><?xml version="1.0" encoding="utf-8"?>
 <p:sld xmlns:a="http://schemas.openxmlformats.org/drawingml/2006/main" xmlns:r="http://schemas.openxmlformats.org/officeDocument/2006/relationships" xmlns:p="http://schemas.openxmlformats.org/presentationml/2006/main">
   <p:cSld>
@@ -5157,6 +4963,42 @@
           <a:chExt cx="0" cy="0"/>
         </a:xfrm>
       </p:grpSpPr>
+      <p:pic>
+        <p:nvPicPr>
+          <p:cNvPr id="6" name="Grafik 5">
+            <a:extLst>
+              <a:ext uri="{FF2B5EF4-FFF2-40B4-BE49-F238E27FC236}">
+                <a16:creationId xmlns:a16="http://schemas.microsoft.com/office/drawing/2014/main" id="{C673B625-4496-41D1-A36B-18EBE7E90F15}"/>
+              </a:ext>
+            </a:extLst>
+          </p:cNvPr>
+          <p:cNvPicPr>
+            <a:picLocks noChangeAspect="1"/>
+          </p:cNvPicPr>
+          <p:nvPr/>
+        </p:nvPicPr>
+        <p:blipFill>
+          <a:blip r:embed="rId2">
+            <a:extLst>
+              <a:ext uri="{28A0092B-C50C-407E-A947-70E740481C1C}">
+                <a14:useLocalDpi xmlns:a14="http://schemas.microsoft.com/office/drawing/2010/main" val="0"/>
+              </a:ext>
+            </a:extLst>
+          </a:blip>
+          <a:stretch>
+            <a:fillRect/>
+          </a:stretch>
+        </p:blipFill>
+        <p:spPr>
+          <a:xfrm>
+            <a:off x="117833" y="1271519"/>
+            <a:ext cx="11674832" cy="5221356"/>
+          </a:xfrm>
+          <a:prstGeom prst="rect">
+            <a:avLst/>
+          </a:prstGeom>
+        </p:spPr>
+      </p:pic>
       <p:sp>
         <p:nvSpPr>
           <p:cNvPr id="2" name="Titel 1">
@@ -5178,32 +5020,10 @@
           <a:bodyPr/>
           <a:lstStyle/>
           <a:p>
-            <a:endParaRPr lang="de-DE"/>
-          </a:p>
-        </p:txBody>
-      </p:sp>
-      <p:sp>
-        <p:nvSpPr>
-          <p:cNvPr id="3" name="Inhaltsplatzhalter 2">
-            <a:extLst>
-              <a:ext uri="{FF2B5EF4-FFF2-40B4-BE49-F238E27FC236}">
-                <a16:creationId xmlns:a16="http://schemas.microsoft.com/office/drawing/2014/main" id="{AA731751-3265-4AC6-971B-E6E9FC4A11CC}"/>
-              </a:ext>
-            </a:extLst>
-          </p:cNvPr>
-          <p:cNvSpPr>
-            <a:spLocks noGrp="1"/>
-          </p:cNvSpPr>
-          <p:nvPr>
-            <p:ph idx="1"/>
-          </p:nvPr>
-        </p:nvSpPr>
-        <p:spPr/>
-        <p:txBody>
-          <a:bodyPr/>
-          <a:lstStyle/>
-          <a:p>
-            <a:endParaRPr lang="de-DE"/>
+            <a:r>
+              <a:rPr lang="de-DE" dirty="0"/>
+              <a:t>BPMN Diagramm</a:t>
+            </a:r>
           </a:p>
         </p:txBody>
       </p:sp>
@@ -5211,6 +5031,1017 @@
     <p:extLst>
       <p:ext uri="{BB962C8B-B14F-4D97-AF65-F5344CB8AC3E}">
         <p14:creationId xmlns:p14="http://schemas.microsoft.com/office/powerpoint/2010/main" val="3256324248"/>
+      </p:ext>
+    </p:extLst>
+  </p:cSld>
+  <p:clrMapOvr>
+    <a:masterClrMapping/>
+  </p:clrMapOvr>
+</p:sld>
+</file>
+
+<file path=ppt/slides/slide7.xml><?xml version="1.0" encoding="utf-8"?>
+<p:sld xmlns:a="http://schemas.openxmlformats.org/drawingml/2006/main" xmlns:r="http://schemas.openxmlformats.org/officeDocument/2006/relationships" xmlns:p="http://schemas.openxmlformats.org/presentationml/2006/main">
+  <p:cSld>
+    <p:spTree>
+      <p:nvGrpSpPr>
+        <p:cNvPr id="1" name=""/>
+        <p:cNvGrpSpPr/>
+        <p:nvPr/>
+      </p:nvGrpSpPr>
+      <p:grpSpPr>
+        <a:xfrm>
+          <a:off x="0" y="0"/>
+          <a:ext cx="0" cy="0"/>
+          <a:chOff x="0" y="0"/>
+          <a:chExt cx="0" cy="0"/>
+        </a:xfrm>
+      </p:grpSpPr>
+      <p:pic>
+        <p:nvPicPr>
+          <p:cNvPr id="5" name="Grafik 4">
+            <a:extLst>
+              <a:ext uri="{FF2B5EF4-FFF2-40B4-BE49-F238E27FC236}">
+                <a16:creationId xmlns:a16="http://schemas.microsoft.com/office/drawing/2014/main" id="{101BC3BC-A272-42FD-83C7-24339DAC4235}"/>
+              </a:ext>
+            </a:extLst>
+          </p:cNvPr>
+          <p:cNvPicPr>
+            <a:picLocks noChangeAspect="1"/>
+          </p:cNvPicPr>
+          <p:nvPr/>
+        </p:nvPicPr>
+        <p:blipFill>
+          <a:blip r:embed="rId2">
+            <a:extLst>
+              <a:ext uri="{28A0092B-C50C-407E-A947-70E740481C1C}">
+                <a14:useLocalDpi xmlns:a14="http://schemas.microsoft.com/office/drawing/2010/main" val="0"/>
+              </a:ext>
+            </a:extLst>
+          </a:blip>
+          <a:stretch>
+            <a:fillRect/>
+          </a:stretch>
+        </p:blipFill>
+        <p:spPr>
+          <a:xfrm>
+            <a:off x="367932" y="1219200"/>
+            <a:ext cx="11625285" cy="5363910"/>
+          </a:xfrm>
+          <a:prstGeom prst="rect">
+            <a:avLst/>
+          </a:prstGeom>
+        </p:spPr>
+      </p:pic>
+      <p:sp>
+        <p:nvSpPr>
+          <p:cNvPr id="2" name="Titel 1">
+            <a:extLst>
+              <a:ext uri="{FF2B5EF4-FFF2-40B4-BE49-F238E27FC236}">
+                <a16:creationId xmlns:a16="http://schemas.microsoft.com/office/drawing/2014/main" id="{3BBD4F87-3109-4130-948F-1DC0A88A6EB9}"/>
+              </a:ext>
+            </a:extLst>
+          </p:cNvPr>
+          <p:cNvSpPr>
+            <a:spLocks noGrp="1"/>
+          </p:cNvSpPr>
+          <p:nvPr>
+            <p:ph type="title"/>
+          </p:nvPr>
+        </p:nvSpPr>
+        <p:spPr/>
+        <p:txBody>
+          <a:bodyPr/>
+          <a:lstStyle/>
+          <a:p>
+            <a:r>
+              <a:rPr lang="de-DE" dirty="0"/>
+              <a:t>BPMN Diagramm</a:t>
+            </a:r>
+          </a:p>
+        </p:txBody>
+      </p:sp>
+    </p:spTree>
+    <p:extLst>
+      <p:ext uri="{BB962C8B-B14F-4D97-AF65-F5344CB8AC3E}">
+        <p14:creationId xmlns:p14="http://schemas.microsoft.com/office/powerpoint/2010/main" val="3656584313"/>
+      </p:ext>
+    </p:extLst>
+  </p:cSld>
+  <p:clrMapOvr>
+    <a:masterClrMapping/>
+  </p:clrMapOvr>
+</p:sld>
+</file>
+
+<file path=ppt/slides/slide8.xml><?xml version="1.0" encoding="utf-8"?>
+<p:sld xmlns:a="http://schemas.openxmlformats.org/drawingml/2006/main" xmlns:r="http://schemas.openxmlformats.org/officeDocument/2006/relationships" xmlns:p="http://schemas.openxmlformats.org/presentationml/2006/main">
+  <p:cSld>
+    <p:spTree>
+      <p:nvGrpSpPr>
+        <p:cNvPr id="1" name=""/>
+        <p:cNvGrpSpPr/>
+        <p:nvPr/>
+      </p:nvGrpSpPr>
+      <p:grpSpPr>
+        <a:xfrm>
+          <a:off x="0" y="0"/>
+          <a:ext cx="0" cy="0"/>
+          <a:chOff x="0" y="0"/>
+          <a:chExt cx="0" cy="0"/>
+        </a:xfrm>
+      </p:grpSpPr>
+      <p:sp>
+        <p:nvSpPr>
+          <p:cNvPr id="2" name="Titel 1">
+            <a:extLst>
+              <a:ext uri="{FF2B5EF4-FFF2-40B4-BE49-F238E27FC236}">
+                <a16:creationId xmlns:a16="http://schemas.microsoft.com/office/drawing/2014/main" id="{EBA85F54-63E7-42CF-B18F-7EE29DE838DE}"/>
+              </a:ext>
+            </a:extLst>
+          </p:cNvPr>
+          <p:cNvSpPr>
+            <a:spLocks noGrp="1"/>
+          </p:cNvSpPr>
+          <p:nvPr>
+            <p:ph type="title"/>
+          </p:nvPr>
+        </p:nvSpPr>
+        <p:spPr>
+          <a:xfrm>
+            <a:off x="838200" y="365125"/>
+            <a:ext cx="10515600" cy="1325563"/>
+          </a:xfrm>
+        </p:spPr>
+        <p:txBody>
+          <a:bodyPr>
+            <a:normAutofit/>
+          </a:bodyPr>
+          <a:lstStyle/>
+          <a:p>
+            <a:pPr algn="ctr"/>
+            <a:r>
+              <a:rPr lang="de-DE" dirty="0"/>
+              <a:t>Work Breakdown Structure</a:t>
+            </a:r>
+          </a:p>
+        </p:txBody>
+      </p:sp>
+      <p:sp>
+        <p:nvSpPr>
+          <p:cNvPr id="5" name="Rechteck 4">
+            <a:extLst>
+              <a:ext uri="{FF2B5EF4-FFF2-40B4-BE49-F238E27FC236}">
+                <a16:creationId xmlns:a16="http://schemas.microsoft.com/office/drawing/2014/main" id="{D05F816A-C7C1-49BE-ADE5-3D33CBD35610}"/>
+              </a:ext>
+            </a:extLst>
+          </p:cNvPr>
+          <p:cNvSpPr/>
+          <p:nvPr/>
+        </p:nvSpPr>
+        <p:spPr>
+          <a:xfrm>
+            <a:off x="7374824" y="1690688"/>
+            <a:ext cx="1275475" cy="570381"/>
+          </a:xfrm>
+          <a:prstGeom prst="rect">
+            <a:avLst/>
+          </a:prstGeom>
+          <a:solidFill>
+            <a:schemeClr val="bg1"/>
+          </a:solidFill>
+          <a:ln>
+            <a:solidFill>
+              <a:schemeClr val="tx1"/>
+            </a:solidFill>
+          </a:ln>
+        </p:spPr>
+        <p:style>
+          <a:lnRef idx="2">
+            <a:schemeClr val="accent1">
+              <a:shade val="50000"/>
+            </a:schemeClr>
+          </a:lnRef>
+          <a:fillRef idx="1">
+            <a:schemeClr val="accent1"/>
+          </a:fillRef>
+          <a:effectRef idx="0">
+            <a:schemeClr val="accent1"/>
+          </a:effectRef>
+          <a:fontRef idx="minor">
+            <a:schemeClr val="lt1"/>
+          </a:fontRef>
+        </p:style>
+        <p:txBody>
+          <a:bodyPr rtlCol="0" anchor="ctr"/>
+          <a:lstStyle/>
+          <a:p>
+            <a:pPr algn="ctr"/>
+            <a:r>
+              <a:rPr lang="de-DE" sz="1400" dirty="0" err="1">
+                <a:solidFill>
+                  <a:schemeClr val="tx1"/>
+                </a:solidFill>
+              </a:rPr>
+              <a:t>Testing</a:t>
+            </a:r>
+            <a:endParaRPr lang="de-DE" sz="1400" dirty="0">
+              <a:solidFill>
+                <a:schemeClr val="tx1"/>
+              </a:solidFill>
+            </a:endParaRPr>
+          </a:p>
+        </p:txBody>
+      </p:sp>
+      <p:sp>
+        <p:nvSpPr>
+          <p:cNvPr id="6" name="Rechteck 5">
+            <a:extLst>
+              <a:ext uri="{FF2B5EF4-FFF2-40B4-BE49-F238E27FC236}">
+                <a16:creationId xmlns:a16="http://schemas.microsoft.com/office/drawing/2014/main" id="{2748357F-DA3C-4365-B39A-A2797DCE49EB}"/>
+              </a:ext>
+            </a:extLst>
+          </p:cNvPr>
+          <p:cNvSpPr/>
+          <p:nvPr/>
+        </p:nvSpPr>
+        <p:spPr>
+          <a:xfrm>
+            <a:off x="1318263" y="1690687"/>
+            <a:ext cx="1275474" cy="570382"/>
+          </a:xfrm>
+          <a:prstGeom prst="rect">
+            <a:avLst/>
+          </a:prstGeom>
+          <a:solidFill>
+            <a:schemeClr val="bg1"/>
+          </a:solidFill>
+          <a:ln>
+            <a:solidFill>
+              <a:schemeClr val="tx1"/>
+            </a:solidFill>
+          </a:ln>
+        </p:spPr>
+        <p:style>
+          <a:lnRef idx="2">
+            <a:schemeClr val="accent1">
+              <a:shade val="50000"/>
+            </a:schemeClr>
+          </a:lnRef>
+          <a:fillRef idx="1">
+            <a:schemeClr val="accent1"/>
+          </a:fillRef>
+          <a:effectRef idx="0">
+            <a:schemeClr val="accent1"/>
+          </a:effectRef>
+          <a:fontRef idx="minor">
+            <a:schemeClr val="lt1"/>
+          </a:fontRef>
+        </p:style>
+        <p:txBody>
+          <a:bodyPr rtlCol="0" anchor="ctr"/>
+          <a:lstStyle/>
+          <a:p>
+            <a:pPr algn="ctr"/>
+            <a:r>
+              <a:rPr lang="de-DE" sz="1400" dirty="0" err="1">
+                <a:solidFill>
+                  <a:schemeClr val="tx1"/>
+                </a:solidFill>
+              </a:rPr>
+              <a:t>Developement</a:t>
+            </a:r>
+            <a:endParaRPr lang="de-DE" sz="1400" dirty="0">
+              <a:solidFill>
+                <a:schemeClr val="tx1"/>
+              </a:solidFill>
+            </a:endParaRPr>
+          </a:p>
+        </p:txBody>
+      </p:sp>
+      <p:sp>
+        <p:nvSpPr>
+          <p:cNvPr id="8" name="Rechteck 7">
+            <a:extLst>
+              <a:ext uri="{FF2B5EF4-FFF2-40B4-BE49-F238E27FC236}">
+                <a16:creationId xmlns:a16="http://schemas.microsoft.com/office/drawing/2014/main" id="{25C6A291-E902-4178-AD51-613DEEC5CEC3}"/>
+              </a:ext>
+            </a:extLst>
+          </p:cNvPr>
+          <p:cNvSpPr/>
+          <p:nvPr/>
+        </p:nvSpPr>
+        <p:spPr>
+          <a:xfrm>
+            <a:off x="10138114" y="1690687"/>
+            <a:ext cx="1155895" cy="570381"/>
+          </a:xfrm>
+          <a:prstGeom prst="rect">
+            <a:avLst/>
+          </a:prstGeom>
+          <a:solidFill>
+            <a:schemeClr val="bg1"/>
+          </a:solidFill>
+          <a:ln>
+            <a:solidFill>
+              <a:schemeClr val="tx1"/>
+            </a:solidFill>
+          </a:ln>
+        </p:spPr>
+        <p:style>
+          <a:lnRef idx="2">
+            <a:schemeClr val="accent1">
+              <a:shade val="50000"/>
+            </a:schemeClr>
+          </a:lnRef>
+          <a:fillRef idx="1">
+            <a:schemeClr val="accent1"/>
+          </a:fillRef>
+          <a:effectRef idx="0">
+            <a:schemeClr val="accent1"/>
+          </a:effectRef>
+          <a:fontRef idx="minor">
+            <a:schemeClr val="lt1"/>
+          </a:fontRef>
+        </p:style>
+        <p:txBody>
+          <a:bodyPr rtlCol="0" anchor="ctr"/>
+          <a:lstStyle/>
+          <a:p>
+            <a:pPr algn="ctr"/>
+            <a:r>
+              <a:rPr lang="de-DE" sz="1400" dirty="0">
+                <a:solidFill>
+                  <a:schemeClr val="tx1"/>
+                </a:solidFill>
+              </a:rPr>
+              <a:t>Support</a:t>
+            </a:r>
+          </a:p>
+        </p:txBody>
+      </p:sp>
+      <p:sp>
+        <p:nvSpPr>
+          <p:cNvPr id="9" name="Rechteck 8">
+            <a:extLst>
+              <a:ext uri="{FF2B5EF4-FFF2-40B4-BE49-F238E27FC236}">
+                <a16:creationId xmlns:a16="http://schemas.microsoft.com/office/drawing/2014/main" id="{6E6E176E-2C0C-4FEF-AFBC-F5E07926AEFE}"/>
+              </a:ext>
+            </a:extLst>
+          </p:cNvPr>
+          <p:cNvSpPr/>
+          <p:nvPr/>
+        </p:nvSpPr>
+        <p:spPr>
+          <a:xfrm>
+            <a:off x="410437" y="2464409"/>
+            <a:ext cx="3091126" cy="4197677"/>
+          </a:xfrm>
+          <a:prstGeom prst="rect">
+            <a:avLst/>
+          </a:prstGeom>
+          <a:noFill/>
+          <a:ln>
+            <a:noFill/>
+          </a:ln>
+        </p:spPr>
+        <p:style>
+          <a:lnRef idx="2">
+            <a:schemeClr val="accent1">
+              <a:shade val="50000"/>
+            </a:schemeClr>
+          </a:lnRef>
+          <a:fillRef idx="1">
+            <a:schemeClr val="accent1"/>
+          </a:fillRef>
+          <a:effectRef idx="0">
+            <a:schemeClr val="accent1"/>
+          </a:effectRef>
+          <a:fontRef idx="minor">
+            <a:schemeClr val="lt1"/>
+          </a:fontRef>
+        </p:style>
+        <p:txBody>
+          <a:bodyPr rtlCol="0" anchor="t"/>
+          <a:lstStyle/>
+          <a:p>
+            <a:pPr marL="285750" indent="-285750">
+              <a:buFont typeface="Arial" panose="020B0604020202020204" pitchFamily="34" charset="0"/>
+              <a:buChar char="•"/>
+            </a:pPr>
+            <a:r>
+              <a:rPr lang="de-DE" sz="1400" dirty="0">
+                <a:solidFill>
+                  <a:schemeClr val="tx1"/>
+                </a:solidFill>
+              </a:rPr>
+              <a:t>MQTT Server programmieren</a:t>
+            </a:r>
+          </a:p>
+          <a:p>
+            <a:pPr marL="285750" indent="-285750">
+              <a:buFont typeface="Arial" panose="020B0604020202020204" pitchFamily="34" charset="0"/>
+              <a:buChar char="•"/>
+            </a:pPr>
+            <a:r>
+              <a:rPr lang="de-DE" sz="1400" dirty="0">
+                <a:solidFill>
+                  <a:schemeClr val="tx1"/>
+                </a:solidFill>
+              </a:rPr>
+              <a:t>Rezepte in SAP einpflegen </a:t>
+            </a:r>
+          </a:p>
+          <a:p>
+            <a:pPr marL="285750" indent="-285750">
+              <a:buFont typeface="Arial" panose="020B0604020202020204" pitchFamily="34" charset="0"/>
+              <a:buChar char="•"/>
+            </a:pPr>
+            <a:r>
+              <a:rPr lang="de-DE" sz="1400" dirty="0">
+                <a:solidFill>
+                  <a:schemeClr val="tx1"/>
+                </a:solidFill>
+              </a:rPr>
+              <a:t>Schnittstelle für Pflanzenanbau schaffen</a:t>
+            </a:r>
+          </a:p>
+          <a:p>
+            <a:pPr marL="285750" indent="-285750">
+              <a:buFont typeface="Arial" panose="020B0604020202020204" pitchFamily="34" charset="0"/>
+              <a:buChar char="•"/>
+            </a:pPr>
+            <a:r>
+              <a:rPr lang="de-DE" sz="1400" dirty="0">
+                <a:solidFill>
+                  <a:schemeClr val="tx1"/>
+                </a:solidFill>
+              </a:rPr>
+              <a:t>Schnittstelle für </a:t>
+            </a:r>
+            <a:r>
+              <a:rPr lang="de-DE" sz="1400" dirty="0" err="1">
+                <a:solidFill>
+                  <a:schemeClr val="tx1"/>
+                </a:solidFill>
+              </a:rPr>
+              <a:t>Conditioning</a:t>
+            </a:r>
+            <a:r>
+              <a:rPr lang="de-DE" sz="1400" dirty="0">
+                <a:solidFill>
+                  <a:schemeClr val="tx1"/>
+                </a:solidFill>
+              </a:rPr>
+              <a:t> Monitoring</a:t>
+            </a:r>
+          </a:p>
+          <a:p>
+            <a:pPr marL="285750" indent="-285750">
+              <a:buFont typeface="Arial" panose="020B0604020202020204" pitchFamily="34" charset="0"/>
+              <a:buChar char="•"/>
+            </a:pPr>
+            <a:r>
+              <a:rPr lang="de-DE" sz="1400" dirty="0">
+                <a:solidFill>
+                  <a:schemeClr val="tx1"/>
+                </a:solidFill>
+              </a:rPr>
+              <a:t>SAP programmieren</a:t>
+            </a:r>
+          </a:p>
+          <a:p>
+            <a:pPr marL="285750" indent="-285750">
+              <a:buFont typeface="Arial" panose="020B0604020202020204" pitchFamily="34" charset="0"/>
+              <a:buChar char="•"/>
+            </a:pPr>
+            <a:r>
+              <a:rPr lang="de-DE" sz="1400" dirty="0">
+                <a:solidFill>
+                  <a:schemeClr val="tx1"/>
+                </a:solidFill>
+              </a:rPr>
+              <a:t>SAP Schnittstelle für die Sensoren </a:t>
+            </a:r>
+          </a:p>
+          <a:p>
+            <a:pPr marL="285750" indent="-285750">
+              <a:buFont typeface="Arial" panose="020B0604020202020204" pitchFamily="34" charset="0"/>
+              <a:buChar char="•"/>
+            </a:pPr>
+            <a:r>
+              <a:rPr lang="de-DE" sz="1400" dirty="0">
+                <a:solidFill>
+                  <a:schemeClr val="tx1"/>
+                </a:solidFill>
+              </a:rPr>
+              <a:t>RFID Kennzeichnung (pro Auftrag) erzeugen</a:t>
+            </a:r>
+          </a:p>
+          <a:p>
+            <a:pPr marL="285750" indent="-285750">
+              <a:buFont typeface="Arial" panose="020B0604020202020204" pitchFamily="34" charset="0"/>
+              <a:buChar char="•"/>
+            </a:pPr>
+            <a:r>
+              <a:rPr lang="de-DE" sz="1400" dirty="0">
+                <a:solidFill>
+                  <a:schemeClr val="tx1"/>
+                </a:solidFill>
+              </a:rPr>
+              <a:t>Sensoren anbinden und konfigurieren</a:t>
+            </a:r>
+          </a:p>
+          <a:p>
+            <a:pPr marL="285750" indent="-285750">
+              <a:buFont typeface="Arial" panose="020B0604020202020204" pitchFamily="34" charset="0"/>
+              <a:buChar char="•"/>
+            </a:pPr>
+            <a:r>
+              <a:rPr lang="de-DE" sz="1400" dirty="0">
+                <a:solidFill>
+                  <a:schemeClr val="tx1"/>
+                </a:solidFill>
+              </a:rPr>
+              <a:t>Aktoren anbinden und konfigurieren</a:t>
+            </a:r>
+          </a:p>
+          <a:p>
+            <a:pPr marL="285750" indent="-285750">
+              <a:buFont typeface="Arial" panose="020B0604020202020204" pitchFamily="34" charset="0"/>
+              <a:buChar char="•"/>
+            </a:pPr>
+            <a:r>
+              <a:rPr lang="de-DE" sz="1400" dirty="0">
+                <a:solidFill>
+                  <a:schemeClr val="tx1"/>
+                </a:solidFill>
+              </a:rPr>
+              <a:t>SPS programmieren und anbinden</a:t>
+            </a:r>
+          </a:p>
+          <a:p>
+            <a:pPr marL="285750" indent="-285750">
+              <a:buFont typeface="Arial" panose="020B0604020202020204" pitchFamily="34" charset="0"/>
+              <a:buChar char="•"/>
+            </a:pPr>
+            <a:r>
+              <a:rPr lang="de-DE" sz="1400" dirty="0">
+                <a:solidFill>
+                  <a:schemeClr val="tx1"/>
+                </a:solidFill>
+              </a:rPr>
+              <a:t>Gateway aufsetzen </a:t>
+            </a:r>
+          </a:p>
+        </p:txBody>
+      </p:sp>
+      <p:sp>
+        <p:nvSpPr>
+          <p:cNvPr id="31" name="Rechteck 30">
+            <a:extLst>
+              <a:ext uri="{FF2B5EF4-FFF2-40B4-BE49-F238E27FC236}">
+                <a16:creationId xmlns:a16="http://schemas.microsoft.com/office/drawing/2014/main" id="{0C03E21E-2FD8-44A6-AE66-1AFAE12DD2D5}"/>
+              </a:ext>
+            </a:extLst>
+          </p:cNvPr>
+          <p:cNvSpPr/>
+          <p:nvPr/>
+        </p:nvSpPr>
+        <p:spPr>
+          <a:xfrm>
+            <a:off x="4717704" y="1690687"/>
+            <a:ext cx="1275475" cy="570382"/>
+          </a:xfrm>
+          <a:prstGeom prst="rect">
+            <a:avLst/>
+          </a:prstGeom>
+          <a:solidFill>
+            <a:schemeClr val="bg1"/>
+          </a:solidFill>
+          <a:ln>
+            <a:solidFill>
+              <a:schemeClr val="tx1"/>
+            </a:solidFill>
+          </a:ln>
+        </p:spPr>
+        <p:style>
+          <a:lnRef idx="2">
+            <a:schemeClr val="accent1">
+              <a:shade val="50000"/>
+            </a:schemeClr>
+          </a:lnRef>
+          <a:fillRef idx="1">
+            <a:schemeClr val="accent1"/>
+          </a:fillRef>
+          <a:effectRef idx="0">
+            <a:schemeClr val="accent1"/>
+          </a:effectRef>
+          <a:fontRef idx="minor">
+            <a:schemeClr val="lt1"/>
+          </a:fontRef>
+        </p:style>
+        <p:txBody>
+          <a:bodyPr rtlCol="0" anchor="ctr"/>
+          <a:lstStyle/>
+          <a:p>
+            <a:pPr algn="ctr"/>
+            <a:r>
+              <a:rPr lang="de-DE" sz="1400" dirty="0">
+                <a:solidFill>
+                  <a:schemeClr val="tx1"/>
+                </a:solidFill>
+              </a:rPr>
+              <a:t>Projekt-</a:t>
+            </a:r>
+          </a:p>
+          <a:p>
+            <a:pPr algn="ctr"/>
+            <a:r>
+              <a:rPr lang="de-DE" sz="1400" dirty="0" err="1">
+                <a:solidFill>
+                  <a:schemeClr val="tx1"/>
+                </a:solidFill>
+              </a:rPr>
+              <a:t>management</a:t>
+            </a:r>
+            <a:endParaRPr lang="de-DE" sz="1400" dirty="0">
+              <a:solidFill>
+                <a:schemeClr val="tx1"/>
+              </a:solidFill>
+            </a:endParaRPr>
+          </a:p>
+        </p:txBody>
+      </p:sp>
+      <p:sp>
+        <p:nvSpPr>
+          <p:cNvPr id="26" name="Rechteck 25">
+            <a:extLst>
+              <a:ext uri="{FF2B5EF4-FFF2-40B4-BE49-F238E27FC236}">
+                <a16:creationId xmlns:a16="http://schemas.microsoft.com/office/drawing/2014/main" id="{CA1B537E-5B48-4DFB-9BEA-6D3128E34427}"/>
+              </a:ext>
+            </a:extLst>
+          </p:cNvPr>
+          <p:cNvSpPr/>
+          <p:nvPr/>
+        </p:nvSpPr>
+        <p:spPr>
+          <a:xfrm>
+            <a:off x="3813074" y="2464409"/>
+            <a:ext cx="3091126" cy="4197677"/>
+          </a:xfrm>
+          <a:prstGeom prst="rect">
+            <a:avLst/>
+          </a:prstGeom>
+          <a:noFill/>
+          <a:ln>
+            <a:noFill/>
+          </a:ln>
+        </p:spPr>
+        <p:style>
+          <a:lnRef idx="2">
+            <a:schemeClr val="accent1">
+              <a:shade val="50000"/>
+            </a:schemeClr>
+          </a:lnRef>
+          <a:fillRef idx="1">
+            <a:schemeClr val="accent1"/>
+          </a:fillRef>
+          <a:effectRef idx="0">
+            <a:schemeClr val="accent1"/>
+          </a:effectRef>
+          <a:fontRef idx="minor">
+            <a:schemeClr val="lt1"/>
+          </a:fontRef>
+        </p:style>
+        <p:txBody>
+          <a:bodyPr rtlCol="0" anchor="t"/>
+          <a:lstStyle/>
+          <a:p>
+            <a:pPr marL="285750" indent="-285750">
+              <a:buFont typeface="Arial" panose="020B0604020202020204" pitchFamily="34" charset="0"/>
+              <a:buChar char="•"/>
+            </a:pPr>
+            <a:r>
+              <a:rPr lang="de-DE" sz="1400" dirty="0">
+                <a:solidFill>
+                  <a:schemeClr val="tx1"/>
+                </a:solidFill>
+              </a:rPr>
+              <a:t>Kommunikationsplan des </a:t>
+            </a:r>
+            <a:br>
+              <a:rPr lang="de-DE" sz="1400" dirty="0">
+                <a:solidFill>
+                  <a:schemeClr val="tx1"/>
+                </a:solidFill>
+              </a:rPr>
+            </a:br>
+            <a:r>
+              <a:rPr lang="de-DE" sz="1400" dirty="0">
+                <a:solidFill>
+                  <a:schemeClr val="tx1"/>
+                </a:solidFill>
+              </a:rPr>
+              <a:t>Systems erstellen</a:t>
+            </a:r>
+          </a:p>
+          <a:p>
+            <a:pPr marL="285750" indent="-285750">
+              <a:buFont typeface="Arial" panose="020B0604020202020204" pitchFamily="34" charset="0"/>
+              <a:buChar char="•"/>
+            </a:pPr>
+            <a:r>
+              <a:rPr lang="de-DE" sz="1400" dirty="0">
+                <a:solidFill>
+                  <a:schemeClr val="tx1"/>
+                </a:solidFill>
+              </a:rPr>
+              <a:t>Aktivitätsplan und Verteilung </a:t>
+            </a:r>
+          </a:p>
+          <a:p>
+            <a:pPr marL="285750" indent="-285750">
+              <a:buFont typeface="Arial" panose="020B0604020202020204" pitchFamily="34" charset="0"/>
+              <a:buChar char="•"/>
+            </a:pPr>
+            <a:r>
+              <a:rPr lang="de-DE" sz="1400" dirty="0">
+                <a:solidFill>
+                  <a:schemeClr val="tx1"/>
+                </a:solidFill>
+              </a:rPr>
+              <a:t>Kommunikation mit Braumeister</a:t>
+            </a:r>
+          </a:p>
+          <a:p>
+            <a:pPr marL="285750" indent="-285750">
+              <a:buFont typeface="Arial" panose="020B0604020202020204" pitchFamily="34" charset="0"/>
+              <a:buChar char="•"/>
+            </a:pPr>
+            <a:r>
+              <a:rPr lang="de-DE" sz="1400" dirty="0">
+                <a:solidFill>
+                  <a:schemeClr val="tx1"/>
+                </a:solidFill>
+              </a:rPr>
+              <a:t>Kommunikation mit anderen Gruppen</a:t>
+            </a:r>
+          </a:p>
+          <a:p>
+            <a:pPr marL="285750" indent="-285750">
+              <a:buFont typeface="Arial" panose="020B0604020202020204" pitchFamily="34" charset="0"/>
+              <a:buChar char="•"/>
+            </a:pPr>
+            <a:r>
+              <a:rPr lang="de-DE" sz="1400" dirty="0">
+                <a:solidFill>
+                  <a:schemeClr val="tx1"/>
+                </a:solidFill>
+              </a:rPr>
+              <a:t>Überprüfung der Ziele und mögliche Anpassung des Projektplans</a:t>
+            </a:r>
+          </a:p>
+        </p:txBody>
+      </p:sp>
+      <p:sp>
+        <p:nvSpPr>
+          <p:cNvPr id="30" name="Rechteck 29">
+            <a:extLst>
+              <a:ext uri="{FF2B5EF4-FFF2-40B4-BE49-F238E27FC236}">
+                <a16:creationId xmlns:a16="http://schemas.microsoft.com/office/drawing/2014/main" id="{C80BE056-2216-419E-A5EA-0CCEEE7AC3B1}"/>
+              </a:ext>
+            </a:extLst>
+          </p:cNvPr>
+          <p:cNvSpPr/>
+          <p:nvPr/>
+        </p:nvSpPr>
+        <p:spPr>
+          <a:xfrm>
+            <a:off x="6686590" y="2464410"/>
+            <a:ext cx="3091126" cy="4197677"/>
+          </a:xfrm>
+          <a:prstGeom prst="rect">
+            <a:avLst/>
+          </a:prstGeom>
+          <a:noFill/>
+          <a:ln>
+            <a:noFill/>
+          </a:ln>
+        </p:spPr>
+        <p:style>
+          <a:lnRef idx="2">
+            <a:schemeClr val="accent1">
+              <a:shade val="50000"/>
+            </a:schemeClr>
+          </a:lnRef>
+          <a:fillRef idx="1">
+            <a:schemeClr val="accent1"/>
+          </a:fillRef>
+          <a:effectRef idx="0">
+            <a:schemeClr val="accent1"/>
+          </a:effectRef>
+          <a:fontRef idx="minor">
+            <a:schemeClr val="lt1"/>
+          </a:fontRef>
+        </p:style>
+        <p:txBody>
+          <a:bodyPr rtlCol="0" anchor="t"/>
+          <a:lstStyle/>
+          <a:p>
+            <a:pPr marL="285750" indent="-285750">
+              <a:buFont typeface="Arial" panose="020B0604020202020204" pitchFamily="34" charset="0"/>
+              <a:buChar char="•"/>
+            </a:pPr>
+            <a:r>
+              <a:rPr lang="de-DE" sz="1400" dirty="0">
+                <a:solidFill>
+                  <a:schemeClr val="tx1"/>
+                </a:solidFill>
+              </a:rPr>
+              <a:t>Stresstest/Integrationstest</a:t>
+            </a:r>
+          </a:p>
+          <a:p>
+            <a:pPr marL="285750" indent="-285750">
+              <a:buFont typeface="Arial" panose="020B0604020202020204" pitchFamily="34" charset="0"/>
+              <a:buChar char="•"/>
+            </a:pPr>
+            <a:r>
+              <a:rPr lang="de-DE" sz="1400" dirty="0">
+                <a:solidFill>
+                  <a:schemeClr val="tx1"/>
+                </a:solidFill>
+              </a:rPr>
+              <a:t>Produktionstest/Abnahme</a:t>
+            </a:r>
+          </a:p>
+        </p:txBody>
+      </p:sp>
+      <p:sp>
+        <p:nvSpPr>
+          <p:cNvPr id="35" name="Rechteck 34">
+            <a:extLst>
+              <a:ext uri="{FF2B5EF4-FFF2-40B4-BE49-F238E27FC236}">
+                <a16:creationId xmlns:a16="http://schemas.microsoft.com/office/drawing/2014/main" id="{B3E8A12B-59CA-41CA-8416-C45E34EE49E2}"/>
+              </a:ext>
+            </a:extLst>
+          </p:cNvPr>
+          <p:cNvSpPr/>
+          <p:nvPr/>
+        </p:nvSpPr>
+        <p:spPr>
+          <a:xfrm>
+            <a:off x="9170498" y="2464408"/>
+            <a:ext cx="3091126" cy="4197677"/>
+          </a:xfrm>
+          <a:prstGeom prst="rect">
+            <a:avLst/>
+          </a:prstGeom>
+          <a:noFill/>
+          <a:ln>
+            <a:noFill/>
+          </a:ln>
+        </p:spPr>
+        <p:style>
+          <a:lnRef idx="2">
+            <a:schemeClr val="accent1">
+              <a:shade val="50000"/>
+            </a:schemeClr>
+          </a:lnRef>
+          <a:fillRef idx="1">
+            <a:schemeClr val="accent1"/>
+          </a:fillRef>
+          <a:effectRef idx="0">
+            <a:schemeClr val="accent1"/>
+          </a:effectRef>
+          <a:fontRef idx="minor">
+            <a:schemeClr val="lt1"/>
+          </a:fontRef>
+        </p:style>
+        <p:txBody>
+          <a:bodyPr rtlCol="0" anchor="t"/>
+          <a:lstStyle/>
+          <a:p>
+            <a:pPr marL="285750" indent="-285750">
+              <a:buFont typeface="Arial" panose="020B0604020202020204" pitchFamily="34" charset="0"/>
+              <a:buChar char="•"/>
+            </a:pPr>
+            <a:r>
+              <a:rPr lang="de-DE" sz="1400" dirty="0">
+                <a:solidFill>
+                  <a:schemeClr val="tx1"/>
+                </a:solidFill>
+              </a:rPr>
+              <a:t>Mitarbeiter Schulung </a:t>
+            </a:r>
+          </a:p>
+          <a:p>
+            <a:pPr marL="285750" indent="-285750">
+              <a:buFont typeface="Arial" panose="020B0604020202020204" pitchFamily="34" charset="0"/>
+              <a:buChar char="•"/>
+            </a:pPr>
+            <a:r>
+              <a:rPr lang="de-DE" sz="1400" dirty="0">
+                <a:solidFill>
+                  <a:schemeClr val="tx1"/>
+                </a:solidFill>
+              </a:rPr>
+              <a:t>Kommunikation mit Kunde</a:t>
+            </a:r>
+          </a:p>
+        </p:txBody>
+      </p:sp>
+    </p:spTree>
+    <p:extLst>
+      <p:ext uri="{BB962C8B-B14F-4D97-AF65-F5344CB8AC3E}">
+        <p14:creationId xmlns:p14="http://schemas.microsoft.com/office/powerpoint/2010/main" val="128592377"/>
+      </p:ext>
+    </p:extLst>
+  </p:cSld>
+  <p:clrMapOvr>
+    <a:masterClrMapping/>
+  </p:clrMapOvr>
+</p:sld>
+</file>
+
+<file path=ppt/slides/slide9.xml><?xml version="1.0" encoding="utf-8"?>
+<p:sld xmlns:a="http://schemas.openxmlformats.org/drawingml/2006/main" xmlns:r="http://schemas.openxmlformats.org/officeDocument/2006/relationships" xmlns:p="http://schemas.openxmlformats.org/presentationml/2006/main">
+  <p:cSld>
+    <p:spTree>
+      <p:nvGrpSpPr>
+        <p:cNvPr id="1" name=""/>
+        <p:cNvGrpSpPr/>
+        <p:nvPr/>
+      </p:nvGrpSpPr>
+      <p:grpSpPr>
+        <a:xfrm>
+          <a:off x="0" y="0"/>
+          <a:ext cx="0" cy="0"/>
+          <a:chOff x="0" y="0"/>
+          <a:chExt cx="0" cy="0"/>
+        </a:xfrm>
+      </p:grpSpPr>
+      <p:sp>
+        <p:nvSpPr>
+          <p:cNvPr id="2" name="Titel 1">
+            <a:extLst>
+              <a:ext uri="{FF2B5EF4-FFF2-40B4-BE49-F238E27FC236}">
+                <a16:creationId xmlns:a16="http://schemas.microsoft.com/office/drawing/2014/main" id="{501EBE92-3DFF-4B1E-B806-A7C566334140}"/>
+              </a:ext>
+            </a:extLst>
+          </p:cNvPr>
+          <p:cNvSpPr>
+            <a:spLocks noGrp="1"/>
+          </p:cNvSpPr>
+          <p:nvPr>
+            <p:ph type="title"/>
+          </p:nvPr>
+        </p:nvSpPr>
+        <p:spPr/>
+        <p:txBody>
+          <a:bodyPr/>
+          <a:lstStyle/>
+          <a:p>
+            <a:r>
+              <a:rPr lang="de-DE" dirty="0"/>
+              <a:t>Rangfolgediagramm</a:t>
+            </a:r>
+          </a:p>
+        </p:txBody>
+      </p:sp>
+      <p:sp>
+        <p:nvSpPr>
+          <p:cNvPr id="3" name="Inhaltsplatzhalter 2">
+            <a:extLst>
+              <a:ext uri="{FF2B5EF4-FFF2-40B4-BE49-F238E27FC236}">
+                <a16:creationId xmlns:a16="http://schemas.microsoft.com/office/drawing/2014/main" id="{8B0038F3-B0C2-4D4D-A5BD-ABD1F0B35332}"/>
+              </a:ext>
+            </a:extLst>
+          </p:cNvPr>
+          <p:cNvSpPr>
+            <a:spLocks noGrp="1"/>
+          </p:cNvSpPr>
+          <p:nvPr>
+            <p:ph idx="1"/>
+          </p:nvPr>
+        </p:nvSpPr>
+        <p:spPr/>
+        <p:txBody>
+          <a:bodyPr/>
+          <a:lstStyle/>
+          <a:p>
+            <a:r>
+              <a:rPr lang="de-DE" dirty="0"/>
+              <a:t>Annahme zur Reihenfolge bzw. Reihenfolge festlegen</a:t>
+            </a:r>
+          </a:p>
+        </p:txBody>
+      </p:sp>
+    </p:spTree>
+    <p:extLst>
+      <p:ext uri="{BB962C8B-B14F-4D97-AF65-F5344CB8AC3E}">
+        <p14:creationId xmlns:p14="http://schemas.microsoft.com/office/powerpoint/2010/main" val="3604795767"/>
       </p:ext>
     </p:extLst>
   </p:cSld>

</xml_diff>

<commit_message>
added file with questions, updated presentation with what to do
</commit_message>
<xml_diff>
--- a/Präsentation/Präsentation_Entwurf.pptx
+++ b/Präsentation/Präsentation_Entwurf.pptx
@@ -3673,13 +3673,13 @@
           <a:p>
             <a:r>
               <a:rPr lang="de-DE" dirty="0"/>
-              <a:t>Annahme zu Lizenzkosten</a:t>
+              <a:t>Annahme zu Lizenzkosten (1 professional, 10 limited)</a:t>
             </a:r>
           </a:p>
           <a:p>
             <a:r>
               <a:rPr lang="de-DE" dirty="0"/>
-              <a:t>Annahme zu unserer Gewinnmarge (z.B. 14% ohne Lizenz)</a:t>
+              <a:t>Annahme zu unserer Gewinnmarge (z.B. 18% ohne Lizenz)</a:t>
             </a:r>
           </a:p>
           <a:p>

</xml_diff>

<commit_message>
updated presentation, added data for gantt-chart, added some sources for assumptions
</commit_message>
<xml_diff>
--- a/Präsentation/Präsentation_Entwurf.pptx
+++ b/Präsentation/Präsentation_Entwurf.pptx
@@ -13,11 +13,11 @@
     <p:sldId id="261" r:id="rId7"/>
     <p:sldId id="268" r:id="rId8"/>
     <p:sldId id="258" r:id="rId9"/>
-    <p:sldId id="267" r:id="rId10"/>
-    <p:sldId id="263" r:id="rId11"/>
-    <p:sldId id="266" r:id="rId12"/>
-    <p:sldId id="264" r:id="rId13"/>
-    <p:sldId id="265" r:id="rId14"/>
+    <p:sldId id="263" r:id="rId10"/>
+    <p:sldId id="266" r:id="rId11"/>
+    <p:sldId id="264" r:id="rId12"/>
+    <p:sldId id="265" r:id="rId13"/>
+    <p:sldId id="269" r:id="rId14"/>
   </p:sldIdLst>
   <p:sldSz cx="12192000" cy="6858000"/>
   <p:notesSz cx="6858000" cy="9144000"/>
@@ -271,7 +271,7 @@
           <a:p>
             <a:fld id="{D5E4B74C-DC10-4D74-8535-8C5AB711050D}" type="datetimeFigureOut">
               <a:rPr lang="de-DE" smtClean="0"/>
-              <a:t>30.10.2019</a:t>
+              <a:t>01.11.2019</a:t>
             </a:fld>
             <a:endParaRPr lang="de-DE"/>
           </a:p>
@@ -469,7 +469,7 @@
           <a:p>
             <a:fld id="{D5E4B74C-DC10-4D74-8535-8C5AB711050D}" type="datetimeFigureOut">
               <a:rPr lang="de-DE" smtClean="0"/>
-              <a:t>30.10.2019</a:t>
+              <a:t>01.11.2019</a:t>
             </a:fld>
             <a:endParaRPr lang="de-DE"/>
           </a:p>
@@ -677,7 +677,7 @@
           <a:p>
             <a:fld id="{D5E4B74C-DC10-4D74-8535-8C5AB711050D}" type="datetimeFigureOut">
               <a:rPr lang="de-DE" smtClean="0"/>
-              <a:t>30.10.2019</a:t>
+              <a:t>01.11.2019</a:t>
             </a:fld>
             <a:endParaRPr lang="de-DE"/>
           </a:p>
@@ -875,7 +875,7 @@
           <a:p>
             <a:fld id="{D5E4B74C-DC10-4D74-8535-8C5AB711050D}" type="datetimeFigureOut">
               <a:rPr lang="de-DE" smtClean="0"/>
-              <a:t>30.10.2019</a:t>
+              <a:t>01.11.2019</a:t>
             </a:fld>
             <a:endParaRPr lang="de-DE"/>
           </a:p>
@@ -1150,7 +1150,7 @@
           <a:p>
             <a:fld id="{D5E4B74C-DC10-4D74-8535-8C5AB711050D}" type="datetimeFigureOut">
               <a:rPr lang="de-DE" smtClean="0"/>
-              <a:t>30.10.2019</a:t>
+              <a:t>01.11.2019</a:t>
             </a:fld>
             <a:endParaRPr lang="de-DE"/>
           </a:p>
@@ -1415,7 +1415,7 @@
           <a:p>
             <a:fld id="{D5E4B74C-DC10-4D74-8535-8C5AB711050D}" type="datetimeFigureOut">
               <a:rPr lang="de-DE" smtClean="0"/>
-              <a:t>30.10.2019</a:t>
+              <a:t>01.11.2019</a:t>
             </a:fld>
             <a:endParaRPr lang="de-DE"/>
           </a:p>
@@ -1827,7 +1827,7 @@
           <a:p>
             <a:fld id="{D5E4B74C-DC10-4D74-8535-8C5AB711050D}" type="datetimeFigureOut">
               <a:rPr lang="de-DE" smtClean="0"/>
-              <a:t>30.10.2019</a:t>
+              <a:t>01.11.2019</a:t>
             </a:fld>
             <a:endParaRPr lang="de-DE"/>
           </a:p>
@@ -1968,7 +1968,7 @@
           <a:p>
             <a:fld id="{D5E4B74C-DC10-4D74-8535-8C5AB711050D}" type="datetimeFigureOut">
               <a:rPr lang="de-DE" smtClean="0"/>
-              <a:t>30.10.2019</a:t>
+              <a:t>01.11.2019</a:t>
             </a:fld>
             <a:endParaRPr lang="de-DE"/>
           </a:p>
@@ -2081,7 +2081,7 @@
           <a:p>
             <a:fld id="{D5E4B74C-DC10-4D74-8535-8C5AB711050D}" type="datetimeFigureOut">
               <a:rPr lang="de-DE" smtClean="0"/>
-              <a:t>30.10.2019</a:t>
+              <a:t>01.11.2019</a:t>
             </a:fld>
             <a:endParaRPr lang="de-DE"/>
           </a:p>
@@ -2392,7 +2392,7 @@
           <a:p>
             <a:fld id="{D5E4B74C-DC10-4D74-8535-8C5AB711050D}" type="datetimeFigureOut">
               <a:rPr lang="de-DE" smtClean="0"/>
-              <a:t>30.10.2019</a:t>
+              <a:t>01.11.2019</a:t>
             </a:fld>
             <a:endParaRPr lang="de-DE"/>
           </a:p>
@@ -2680,7 +2680,7 @@
           <a:p>
             <a:fld id="{D5E4B74C-DC10-4D74-8535-8C5AB711050D}" type="datetimeFigureOut">
               <a:rPr lang="de-DE" smtClean="0"/>
-              <a:t>30.10.2019</a:t>
+              <a:t>01.11.2019</a:t>
             </a:fld>
             <a:endParaRPr lang="de-DE"/>
           </a:p>
@@ -2921,7 +2921,7 @@
           <a:p>
             <a:fld id="{D5E4B74C-DC10-4D74-8535-8C5AB711050D}" type="datetimeFigureOut">
               <a:rPr lang="de-DE" smtClean="0"/>
-              <a:t>30.10.2019</a:t>
+              <a:t>01.11.2019</a:t>
             </a:fld>
             <a:endParaRPr lang="de-DE"/>
           </a:p>
@@ -3434,7 +3434,7 @@
           <p:cNvPr id="2" name="Titel 1">
             <a:extLst>
               <a:ext uri="{FF2B5EF4-FFF2-40B4-BE49-F238E27FC236}">
-                <a16:creationId xmlns:a16="http://schemas.microsoft.com/office/drawing/2014/main" id="{ECB575D1-760B-43F1-9715-77F1EA9C08A1}"/>
+                <a16:creationId xmlns:a16="http://schemas.microsoft.com/office/drawing/2014/main" id="{CCCD46FC-9A01-47D6-BAC8-2D2E932072CF}"/>
               </a:ext>
             </a:extLst>
           </p:cNvPr>
@@ -3452,55 +3452,2775 @@
           <a:p>
             <a:r>
               <a:rPr lang="de-DE" dirty="0"/>
-              <a:t>Zeitplan</a:t>
+              <a:t>Gantt-Chart</a:t>
             </a:r>
           </a:p>
         </p:txBody>
       </p:sp>
-      <p:sp>
-        <p:nvSpPr>
-          <p:cNvPr id="3" name="Inhaltsplatzhalter 2">
-            <a:extLst>
-              <a:ext uri="{FF2B5EF4-FFF2-40B4-BE49-F238E27FC236}">
-                <a16:creationId xmlns:a16="http://schemas.microsoft.com/office/drawing/2014/main" id="{6BA601DC-E4DC-487D-AD7E-860BEE5E22D8}"/>
-              </a:ext>
-            </a:extLst>
-          </p:cNvPr>
-          <p:cNvSpPr>
-            <a:spLocks noGrp="1"/>
-          </p:cNvSpPr>
+      <p:graphicFrame>
+        <p:nvGraphicFramePr>
+          <p:cNvPr id="4" name="Inhaltsplatzhalter 3">
+            <a:extLst>
+              <a:ext uri="{FF2B5EF4-FFF2-40B4-BE49-F238E27FC236}">
+                <a16:creationId xmlns:a16="http://schemas.microsoft.com/office/drawing/2014/main" id="{BB46A61D-5D04-4EA5-8568-D6D1B3CC2E10}"/>
+              </a:ext>
+            </a:extLst>
+          </p:cNvPr>
+          <p:cNvGraphicFramePr>
+            <a:graphicFrameLocks noGrp="1"/>
+          </p:cNvGraphicFramePr>
           <p:nvPr>
             <p:ph idx="1"/>
+            <p:extLst>
+              <p:ext uri="{D42A27DB-BD31-4B8C-83A1-F6EECF244321}">
+                <p14:modId xmlns:p14="http://schemas.microsoft.com/office/powerpoint/2010/main" val="2142215454"/>
+              </p:ext>
+            </p:extLst>
           </p:nvPr>
-        </p:nvSpPr>
-        <p:spPr/>
-        <p:txBody>
-          <a:bodyPr/>
-          <a:lstStyle/>
-          <a:p>
-            <a:r>
-              <a:rPr lang="de-DE" dirty="0"/>
-              <a:t>Annahme zur Dauer von Milestones/wichtigen Aktivitäten</a:t>
-            </a:r>
-          </a:p>
-          <a:p>
-            <a:r>
-              <a:rPr lang="de-DE" dirty="0"/>
-              <a:t>Annahme zum Zugang der Produktionsstätte</a:t>
-            </a:r>
-          </a:p>
-          <a:p>
-            <a:r>
-              <a:rPr lang="de-DE" dirty="0"/>
-              <a:t>Annahme zur Produktionsdauer</a:t>
-            </a:r>
-          </a:p>
-        </p:txBody>
-      </p:sp>
+        </p:nvGraphicFramePr>
+        <p:xfrm>
+          <a:off x="838200" y="1690688"/>
+          <a:ext cx="10515601" cy="4538666"/>
+        </p:xfrm>
+        <a:graphic>
+          <a:graphicData uri="http://schemas.openxmlformats.org/drawingml/2006/table">
+            <a:tbl>
+              <a:tblPr>
+                <a:tableStyleId>{5C22544A-7EE6-4342-B048-85BDC9FD1C3A}</a:tableStyleId>
+              </a:tblPr>
+              <a:tblGrid>
+                <a:gridCol w="1073933">
+                  <a:extLst>
+                    <a:ext uri="{9D8B030D-6E8A-4147-A177-3AD203B41FA5}">
+                      <a16:colId xmlns:a16="http://schemas.microsoft.com/office/drawing/2014/main" val="2694448182"/>
+                    </a:ext>
+                  </a:extLst>
+                </a:gridCol>
+                <a:gridCol w="1073933">
+                  <a:extLst>
+                    <a:ext uri="{9D8B030D-6E8A-4147-A177-3AD203B41FA5}">
+                      <a16:colId xmlns:a16="http://schemas.microsoft.com/office/drawing/2014/main" val="3759476627"/>
+                    </a:ext>
+                  </a:extLst>
+                </a:gridCol>
+                <a:gridCol w="1073933">
+                  <a:extLst>
+                    <a:ext uri="{9D8B030D-6E8A-4147-A177-3AD203B41FA5}">
+                      <a16:colId xmlns:a16="http://schemas.microsoft.com/office/drawing/2014/main" val="389344022"/>
+                    </a:ext>
+                  </a:extLst>
+                </a:gridCol>
+                <a:gridCol w="1275297">
+                  <a:extLst>
+                    <a:ext uri="{9D8B030D-6E8A-4147-A177-3AD203B41FA5}">
+                      <a16:colId xmlns:a16="http://schemas.microsoft.com/office/drawing/2014/main" val="4089230005"/>
+                    </a:ext>
+                  </a:extLst>
+                </a:gridCol>
+                <a:gridCol w="1217125">
+                  <a:extLst>
+                    <a:ext uri="{9D8B030D-6E8A-4147-A177-3AD203B41FA5}">
+                      <a16:colId xmlns:a16="http://schemas.microsoft.com/office/drawing/2014/main" val="3316606397"/>
+                    </a:ext>
+                  </a:extLst>
+                </a:gridCol>
+                <a:gridCol w="1270823">
+                  <a:extLst>
+                    <a:ext uri="{9D8B030D-6E8A-4147-A177-3AD203B41FA5}">
+                      <a16:colId xmlns:a16="http://schemas.microsoft.com/office/drawing/2014/main" val="2096272206"/>
+                    </a:ext>
+                  </a:extLst>
+                </a:gridCol>
+                <a:gridCol w="2456624">
+                  <a:extLst>
+                    <a:ext uri="{9D8B030D-6E8A-4147-A177-3AD203B41FA5}">
+                      <a16:colId xmlns:a16="http://schemas.microsoft.com/office/drawing/2014/main" val="317751891"/>
+                    </a:ext>
+                  </a:extLst>
+                </a:gridCol>
+                <a:gridCol w="1073933">
+                  <a:extLst>
+                    <a:ext uri="{9D8B030D-6E8A-4147-A177-3AD203B41FA5}">
+                      <a16:colId xmlns:a16="http://schemas.microsoft.com/office/drawing/2014/main" val="3923423310"/>
+                    </a:ext>
+                  </a:extLst>
+                </a:gridCol>
+              </a:tblGrid>
+              <a:tr h="257586">
+                <a:tc gridSpan="2">
+                  <a:txBody>
+                    <a:bodyPr/>
+                    <a:lstStyle/>
+                    <a:p>
+                      <a:pPr algn="l" fontAlgn="b"/>
+                      <a:r>
+                        <a:rPr lang="de-DE" sz="1100" u="none" strike="noStrike">
+                          <a:effectLst/>
+                        </a:rPr>
+                        <a:t>Meilensteine</a:t>
+                      </a:r>
+                      <a:endParaRPr lang="de-DE" sz="1100" b="0" i="0" u="none" strike="noStrike">
+                        <a:solidFill>
+                          <a:srgbClr val="000000"/>
+                        </a:solidFill>
+                        <a:effectLst/>
+                        <a:latin typeface="Calibri" panose="020F0502020204030204" pitchFamily="34" charset="0"/>
+                      </a:endParaRPr>
+                    </a:p>
+                  </a:txBody>
+                  <a:tcPr marL="9525" marR="9525" marT="9525" marB="0" anchor="b"/>
+                </a:tc>
+                <a:tc hMerge="1">
+                  <a:txBody>
+                    <a:bodyPr/>
+                    <a:lstStyle/>
+                    <a:p>
+                      <a:endParaRPr lang="de-DE"/>
+                    </a:p>
+                  </a:txBody>
+                  <a:tcPr/>
+                </a:tc>
+                <a:tc>
+                  <a:txBody>
+                    <a:bodyPr/>
+                    <a:lstStyle/>
+                    <a:p>
+                      <a:pPr algn="l" fontAlgn="b"/>
+                      <a:endParaRPr lang="de-DE" sz="1100" b="0" i="0" u="none" strike="noStrike">
+                        <a:solidFill>
+                          <a:srgbClr val="000000"/>
+                        </a:solidFill>
+                        <a:effectLst/>
+                        <a:latin typeface="Calibri" panose="020F0502020204030204" pitchFamily="34" charset="0"/>
+                      </a:endParaRPr>
+                    </a:p>
+                  </a:txBody>
+                  <a:tcPr marL="9525" marR="9525" marT="9525" marB="0" anchor="b"/>
+                </a:tc>
+                <a:tc>
+                  <a:txBody>
+                    <a:bodyPr/>
+                    <a:lstStyle/>
+                    <a:p>
+                      <a:pPr algn="l" fontAlgn="b"/>
+                      <a:endParaRPr lang="de-DE" sz="1100" b="0" i="0" u="none" strike="noStrike">
+                        <a:solidFill>
+                          <a:srgbClr val="000000"/>
+                        </a:solidFill>
+                        <a:effectLst/>
+                        <a:latin typeface="Calibri" panose="020F0502020204030204" pitchFamily="34" charset="0"/>
+                      </a:endParaRPr>
+                    </a:p>
+                  </a:txBody>
+                  <a:tcPr marL="9525" marR="9525" marT="9525" marB="0" anchor="b"/>
+                </a:tc>
+                <a:tc>
+                  <a:txBody>
+                    <a:bodyPr/>
+                    <a:lstStyle/>
+                    <a:p>
+                      <a:pPr algn="l" fontAlgn="b"/>
+                      <a:r>
+                        <a:rPr lang="de-DE" sz="1100" u="none" strike="noStrike">
+                          <a:effectLst/>
+                        </a:rPr>
+                        <a:t>Tätigkeiten</a:t>
+                      </a:r>
+                      <a:endParaRPr lang="de-DE" sz="1100" b="0" i="0" u="none" strike="noStrike">
+                        <a:solidFill>
+                          <a:srgbClr val="000000"/>
+                        </a:solidFill>
+                        <a:effectLst/>
+                        <a:latin typeface="Calibri" panose="020F0502020204030204" pitchFamily="34" charset="0"/>
+                      </a:endParaRPr>
+                    </a:p>
+                  </a:txBody>
+                  <a:tcPr marL="9525" marR="9525" marT="9525" marB="0" anchor="b"/>
+                </a:tc>
+                <a:tc>
+                  <a:txBody>
+                    <a:bodyPr/>
+                    <a:lstStyle/>
+                    <a:p>
+                      <a:pPr algn="l" fontAlgn="b"/>
+                      <a:endParaRPr lang="de-DE" sz="1100" b="0" i="0" u="none" strike="noStrike">
+                        <a:solidFill>
+                          <a:srgbClr val="000000"/>
+                        </a:solidFill>
+                        <a:effectLst/>
+                        <a:latin typeface="Calibri" panose="020F0502020204030204" pitchFamily="34" charset="0"/>
+                      </a:endParaRPr>
+                    </a:p>
+                  </a:txBody>
+                  <a:tcPr marL="9525" marR="9525" marT="9525" marB="0" anchor="b"/>
+                </a:tc>
+                <a:tc>
+                  <a:txBody>
+                    <a:bodyPr/>
+                    <a:lstStyle/>
+                    <a:p>
+                      <a:pPr algn="l" fontAlgn="b"/>
+                      <a:endParaRPr lang="de-DE" sz="1100" b="0" i="0" u="none" strike="noStrike">
+                        <a:solidFill>
+                          <a:srgbClr val="000000"/>
+                        </a:solidFill>
+                        <a:effectLst/>
+                        <a:latin typeface="Calibri" panose="020F0502020204030204" pitchFamily="34" charset="0"/>
+                      </a:endParaRPr>
+                    </a:p>
+                  </a:txBody>
+                  <a:tcPr marL="9525" marR="9525" marT="9525" marB="0" anchor="b"/>
+                </a:tc>
+                <a:tc>
+                  <a:txBody>
+                    <a:bodyPr/>
+                    <a:lstStyle/>
+                    <a:p>
+                      <a:pPr algn="l" fontAlgn="b"/>
+                      <a:endParaRPr lang="de-DE" sz="1100" b="0" i="0" u="none" strike="noStrike">
+                        <a:solidFill>
+                          <a:srgbClr val="000000"/>
+                        </a:solidFill>
+                        <a:effectLst/>
+                        <a:latin typeface="Calibri" panose="020F0502020204030204" pitchFamily="34" charset="0"/>
+                      </a:endParaRPr>
+                    </a:p>
+                  </a:txBody>
+                  <a:tcPr marL="9525" marR="9525" marT="9525" marB="0" anchor="b"/>
+                </a:tc>
+                <a:extLst>
+                  <a:ext uri="{0D108BD9-81ED-4DB2-BD59-A6C34878D82A}">
+                    <a16:rowId xmlns:a16="http://schemas.microsoft.com/office/drawing/2014/main" val="328609750"/>
+                  </a:ext>
+                </a:extLst>
+              </a:tr>
+              <a:tr h="257586">
+                <a:tc>
+                  <a:txBody>
+                    <a:bodyPr/>
+                    <a:lstStyle/>
+                    <a:p>
+                      <a:pPr algn="l" fontAlgn="b"/>
+                      <a:r>
+                        <a:rPr lang="de-DE" sz="1100" u="none" strike="noStrike">
+                          <a:effectLst/>
+                        </a:rPr>
+                        <a:t>Datum</a:t>
+                      </a:r>
+                      <a:endParaRPr lang="de-DE" sz="1100" b="0" i="0" u="none" strike="noStrike">
+                        <a:solidFill>
+                          <a:srgbClr val="000000"/>
+                        </a:solidFill>
+                        <a:effectLst/>
+                        <a:latin typeface="Calibri" panose="020F0502020204030204" pitchFamily="34" charset="0"/>
+                      </a:endParaRPr>
+                    </a:p>
+                  </a:txBody>
+                  <a:tcPr marL="9525" marR="9525" marT="9525" marB="0" anchor="b"/>
+                </a:tc>
+                <a:tc gridSpan="2">
+                  <a:txBody>
+                    <a:bodyPr/>
+                    <a:lstStyle/>
+                    <a:p>
+                      <a:pPr algn="l" fontAlgn="b"/>
+                      <a:r>
+                        <a:rPr lang="de-DE" sz="1100" u="none" strike="noStrike">
+                          <a:effectLst/>
+                        </a:rPr>
+                        <a:t>Beschreibung</a:t>
+                      </a:r>
+                      <a:endParaRPr lang="de-DE" sz="1100" b="0" i="0" u="none" strike="noStrike">
+                        <a:solidFill>
+                          <a:srgbClr val="000000"/>
+                        </a:solidFill>
+                        <a:effectLst/>
+                        <a:latin typeface="Calibri" panose="020F0502020204030204" pitchFamily="34" charset="0"/>
+                      </a:endParaRPr>
+                    </a:p>
+                  </a:txBody>
+                  <a:tcPr marL="9525" marR="9525" marT="9525" marB="0" anchor="b"/>
+                </a:tc>
+                <a:tc hMerge="1">
+                  <a:txBody>
+                    <a:bodyPr/>
+                    <a:lstStyle/>
+                    <a:p>
+                      <a:endParaRPr lang="de-DE"/>
+                    </a:p>
+                  </a:txBody>
+                  <a:tcPr/>
+                </a:tc>
+                <a:tc>
+                  <a:txBody>
+                    <a:bodyPr/>
+                    <a:lstStyle/>
+                    <a:p>
+                      <a:pPr algn="l" fontAlgn="b"/>
+                      <a:endParaRPr lang="de-DE" sz="1100" b="0" i="0" u="none" strike="noStrike">
+                        <a:solidFill>
+                          <a:srgbClr val="000000"/>
+                        </a:solidFill>
+                        <a:effectLst/>
+                        <a:latin typeface="Calibri" panose="020F0502020204030204" pitchFamily="34" charset="0"/>
+                      </a:endParaRPr>
+                    </a:p>
+                  </a:txBody>
+                  <a:tcPr marL="9525" marR="9525" marT="9525" marB="0" anchor="b"/>
+                </a:tc>
+                <a:tc>
+                  <a:txBody>
+                    <a:bodyPr/>
+                    <a:lstStyle/>
+                    <a:p>
+                      <a:pPr algn="l" fontAlgn="b"/>
+                      <a:r>
+                        <a:rPr lang="de-DE" sz="1100" u="none" strike="noStrike">
+                          <a:effectLst/>
+                        </a:rPr>
+                        <a:t>Startdatum</a:t>
+                      </a:r>
+                      <a:endParaRPr lang="de-DE" sz="1100" b="0" i="0" u="none" strike="noStrike">
+                        <a:solidFill>
+                          <a:srgbClr val="000000"/>
+                        </a:solidFill>
+                        <a:effectLst/>
+                        <a:latin typeface="Calibri" panose="020F0502020204030204" pitchFamily="34" charset="0"/>
+                      </a:endParaRPr>
+                    </a:p>
+                  </a:txBody>
+                  <a:tcPr marL="9525" marR="9525" marT="9525" marB="0" anchor="b"/>
+                </a:tc>
+                <a:tc>
+                  <a:txBody>
+                    <a:bodyPr/>
+                    <a:lstStyle/>
+                    <a:p>
+                      <a:pPr algn="l" fontAlgn="b"/>
+                      <a:r>
+                        <a:rPr lang="de-DE" sz="1100" u="none" strike="noStrike">
+                          <a:effectLst/>
+                        </a:rPr>
+                        <a:t>Enddatum</a:t>
+                      </a:r>
+                      <a:endParaRPr lang="de-DE" sz="1100" b="0" i="0" u="none" strike="noStrike">
+                        <a:solidFill>
+                          <a:srgbClr val="000000"/>
+                        </a:solidFill>
+                        <a:effectLst/>
+                        <a:latin typeface="Calibri" panose="020F0502020204030204" pitchFamily="34" charset="0"/>
+                      </a:endParaRPr>
+                    </a:p>
+                  </a:txBody>
+                  <a:tcPr marL="9525" marR="9525" marT="9525" marB="0" anchor="b"/>
+                </a:tc>
+                <a:tc>
+                  <a:txBody>
+                    <a:bodyPr/>
+                    <a:lstStyle/>
+                    <a:p>
+                      <a:pPr algn="l" fontAlgn="b"/>
+                      <a:r>
+                        <a:rPr lang="de-DE" sz="1100" u="none" strike="noStrike">
+                          <a:effectLst/>
+                        </a:rPr>
+                        <a:t>Beschreibung</a:t>
+                      </a:r>
+                      <a:endParaRPr lang="de-DE" sz="1100" b="0" i="0" u="none" strike="noStrike">
+                        <a:solidFill>
+                          <a:srgbClr val="000000"/>
+                        </a:solidFill>
+                        <a:effectLst/>
+                        <a:latin typeface="Calibri" panose="020F0502020204030204" pitchFamily="34" charset="0"/>
+                      </a:endParaRPr>
+                    </a:p>
+                  </a:txBody>
+                  <a:tcPr marL="9525" marR="9525" marT="9525" marB="0" anchor="b"/>
+                </a:tc>
+                <a:tc>
+                  <a:txBody>
+                    <a:bodyPr/>
+                    <a:lstStyle/>
+                    <a:p>
+                      <a:pPr algn="l" fontAlgn="b"/>
+                      <a:r>
+                        <a:rPr lang="de-DE" sz="1100" u="none" strike="noStrike">
+                          <a:effectLst/>
+                        </a:rPr>
+                        <a:t>Abhängigkeit</a:t>
+                      </a:r>
+                      <a:endParaRPr lang="de-DE" sz="1100" b="0" i="0" u="none" strike="noStrike">
+                        <a:solidFill>
+                          <a:srgbClr val="000000"/>
+                        </a:solidFill>
+                        <a:effectLst/>
+                        <a:latin typeface="Calibri" panose="020F0502020204030204" pitchFamily="34" charset="0"/>
+                      </a:endParaRPr>
+                    </a:p>
+                  </a:txBody>
+                  <a:tcPr marL="9525" marR="9525" marT="9525" marB="0" anchor="b"/>
+                </a:tc>
+                <a:extLst>
+                  <a:ext uri="{0D108BD9-81ED-4DB2-BD59-A6C34878D82A}">
+                    <a16:rowId xmlns:a16="http://schemas.microsoft.com/office/drawing/2014/main" val="3044393166"/>
+                  </a:ext>
+                </a:extLst>
+              </a:tr>
+              <a:tr h="257586">
+                <a:tc>
+                  <a:txBody>
+                    <a:bodyPr/>
+                    <a:lstStyle/>
+                    <a:p>
+                      <a:pPr algn="r" fontAlgn="b"/>
+                      <a:r>
+                        <a:rPr lang="de-DE" sz="1100" u="none" strike="noStrike">
+                          <a:effectLst/>
+                        </a:rPr>
+                        <a:t>04.11.2019</a:t>
+                      </a:r>
+                      <a:endParaRPr lang="de-DE" sz="1100" b="0" i="0" u="none" strike="noStrike">
+                        <a:solidFill>
+                          <a:srgbClr val="000000"/>
+                        </a:solidFill>
+                        <a:effectLst/>
+                        <a:latin typeface="Calibri" panose="020F0502020204030204" pitchFamily="34" charset="0"/>
+                      </a:endParaRPr>
+                    </a:p>
+                  </a:txBody>
+                  <a:tcPr marL="9525" marR="9525" marT="9525" marB="0" anchor="b"/>
+                </a:tc>
+                <a:tc>
+                  <a:txBody>
+                    <a:bodyPr/>
+                    <a:lstStyle/>
+                    <a:p>
+                      <a:pPr algn="l" fontAlgn="b"/>
+                      <a:r>
+                        <a:rPr lang="de-DE" sz="1100" u="none" strike="noStrike">
+                          <a:effectLst/>
+                        </a:rPr>
+                        <a:t>Kickoff</a:t>
+                      </a:r>
+                      <a:endParaRPr lang="de-DE" sz="1100" b="0" i="0" u="none" strike="noStrike">
+                        <a:solidFill>
+                          <a:srgbClr val="000000"/>
+                        </a:solidFill>
+                        <a:effectLst/>
+                        <a:latin typeface="Calibri" panose="020F0502020204030204" pitchFamily="34" charset="0"/>
+                      </a:endParaRPr>
+                    </a:p>
+                  </a:txBody>
+                  <a:tcPr marL="9525" marR="9525" marT="9525" marB="0" anchor="b"/>
+                </a:tc>
+                <a:tc>
+                  <a:txBody>
+                    <a:bodyPr/>
+                    <a:lstStyle/>
+                    <a:p>
+                      <a:pPr algn="l" fontAlgn="b"/>
+                      <a:endParaRPr lang="de-DE" sz="1100" b="0" i="0" u="none" strike="noStrike">
+                        <a:solidFill>
+                          <a:srgbClr val="000000"/>
+                        </a:solidFill>
+                        <a:effectLst/>
+                        <a:latin typeface="Calibri" panose="020F0502020204030204" pitchFamily="34" charset="0"/>
+                      </a:endParaRPr>
+                    </a:p>
+                  </a:txBody>
+                  <a:tcPr marL="9525" marR="9525" marT="9525" marB="0" anchor="b"/>
+                </a:tc>
+                <a:tc>
+                  <a:txBody>
+                    <a:bodyPr/>
+                    <a:lstStyle/>
+                    <a:p>
+                      <a:pPr algn="l" fontAlgn="b"/>
+                      <a:endParaRPr lang="de-DE" sz="1100" b="0" i="0" u="none" strike="noStrike">
+                        <a:solidFill>
+                          <a:srgbClr val="000000"/>
+                        </a:solidFill>
+                        <a:effectLst/>
+                        <a:latin typeface="Calibri" panose="020F0502020204030204" pitchFamily="34" charset="0"/>
+                      </a:endParaRPr>
+                    </a:p>
+                  </a:txBody>
+                  <a:tcPr marL="9525" marR="9525" marT="9525" marB="0" anchor="b"/>
+                </a:tc>
+                <a:tc>
+                  <a:txBody>
+                    <a:bodyPr/>
+                    <a:lstStyle/>
+                    <a:p>
+                      <a:pPr algn="r" fontAlgn="b"/>
+                      <a:r>
+                        <a:rPr lang="de-DE" sz="1100" u="none" strike="noStrike">
+                          <a:effectLst/>
+                        </a:rPr>
+                        <a:t>05.11.2019</a:t>
+                      </a:r>
+                      <a:endParaRPr lang="de-DE" sz="1100" b="0" i="0" u="none" strike="noStrike">
+                        <a:solidFill>
+                          <a:srgbClr val="000000"/>
+                        </a:solidFill>
+                        <a:effectLst/>
+                        <a:latin typeface="Calibri" panose="020F0502020204030204" pitchFamily="34" charset="0"/>
+                      </a:endParaRPr>
+                    </a:p>
+                  </a:txBody>
+                  <a:tcPr marL="9525" marR="9525" marT="9525" marB="0" anchor="b"/>
+                </a:tc>
+                <a:tc>
+                  <a:txBody>
+                    <a:bodyPr/>
+                    <a:lstStyle/>
+                    <a:p>
+                      <a:pPr algn="r" fontAlgn="b"/>
+                      <a:r>
+                        <a:rPr lang="de-DE" sz="1100" u="none" strike="noStrike">
+                          <a:effectLst/>
+                        </a:rPr>
+                        <a:t>12.11.2019</a:t>
+                      </a:r>
+                      <a:endParaRPr lang="de-DE" sz="1100" b="0" i="0" u="none" strike="noStrike">
+                        <a:solidFill>
+                          <a:srgbClr val="000000"/>
+                        </a:solidFill>
+                        <a:effectLst/>
+                        <a:latin typeface="Calibri" panose="020F0502020204030204" pitchFamily="34" charset="0"/>
+                      </a:endParaRPr>
+                    </a:p>
+                  </a:txBody>
+                  <a:tcPr marL="9525" marR="9525" marT="9525" marB="0" anchor="b"/>
+                </a:tc>
+                <a:tc>
+                  <a:txBody>
+                    <a:bodyPr/>
+                    <a:lstStyle/>
+                    <a:p>
+                      <a:pPr algn="l" fontAlgn="b"/>
+                      <a:r>
+                        <a:rPr lang="de-DE" sz="1100" u="none" strike="noStrike">
+                          <a:effectLst/>
+                        </a:rPr>
+                        <a:t>Gate</a:t>
+                      </a:r>
+                      <a:endParaRPr lang="de-DE" sz="1100" b="0" i="0" u="none" strike="noStrike">
+                        <a:solidFill>
+                          <a:srgbClr val="000000"/>
+                        </a:solidFill>
+                        <a:effectLst/>
+                        <a:latin typeface="Calibri" panose="020F0502020204030204" pitchFamily="34" charset="0"/>
+                      </a:endParaRPr>
+                    </a:p>
+                  </a:txBody>
+                  <a:tcPr marL="9525" marR="9525" marT="9525" marB="0" anchor="b"/>
+                </a:tc>
+                <a:tc>
+                  <a:txBody>
+                    <a:bodyPr/>
+                    <a:lstStyle/>
+                    <a:p>
+                      <a:pPr algn="l" fontAlgn="b"/>
+                      <a:endParaRPr lang="de-DE" sz="1100" b="0" i="0" u="none" strike="noStrike">
+                        <a:solidFill>
+                          <a:srgbClr val="000000"/>
+                        </a:solidFill>
+                        <a:effectLst/>
+                        <a:latin typeface="Calibri" panose="020F0502020204030204" pitchFamily="34" charset="0"/>
+                      </a:endParaRPr>
+                    </a:p>
+                  </a:txBody>
+                  <a:tcPr marL="9525" marR="9525" marT="9525" marB="0" anchor="b"/>
+                </a:tc>
+                <a:extLst>
+                  <a:ext uri="{0D108BD9-81ED-4DB2-BD59-A6C34878D82A}">
+                    <a16:rowId xmlns:a16="http://schemas.microsoft.com/office/drawing/2014/main" val="1889119746"/>
+                  </a:ext>
+                </a:extLst>
+              </a:tr>
+              <a:tr h="257586">
+                <a:tc>
+                  <a:txBody>
+                    <a:bodyPr/>
+                    <a:lstStyle/>
+                    <a:p>
+                      <a:pPr algn="r" fontAlgn="b"/>
+                      <a:r>
+                        <a:rPr lang="de-DE" sz="1100" u="none" strike="noStrike">
+                          <a:effectLst/>
+                        </a:rPr>
+                        <a:t>26.11.2019</a:t>
+                      </a:r>
+                      <a:endParaRPr lang="de-DE" sz="1100" b="0" i="0" u="none" strike="noStrike">
+                        <a:solidFill>
+                          <a:srgbClr val="000000"/>
+                        </a:solidFill>
+                        <a:effectLst/>
+                        <a:latin typeface="Calibri" panose="020F0502020204030204" pitchFamily="34" charset="0"/>
+                      </a:endParaRPr>
+                    </a:p>
+                  </a:txBody>
+                  <a:tcPr marL="9525" marR="9525" marT="9525" marB="0" anchor="b"/>
+                </a:tc>
+                <a:tc gridSpan="2">
+                  <a:txBody>
+                    <a:bodyPr/>
+                    <a:lstStyle/>
+                    <a:p>
+                      <a:pPr algn="l" fontAlgn="b"/>
+                      <a:r>
+                        <a:rPr lang="de-DE" sz="1100" u="none" strike="noStrike">
+                          <a:effectLst/>
+                        </a:rPr>
+                        <a:t>SAP fertig programmiert</a:t>
+                      </a:r>
+                      <a:endParaRPr lang="de-DE" sz="1100" b="0" i="0" u="none" strike="noStrike">
+                        <a:solidFill>
+                          <a:srgbClr val="000000"/>
+                        </a:solidFill>
+                        <a:effectLst/>
+                        <a:latin typeface="Calibri" panose="020F0502020204030204" pitchFamily="34" charset="0"/>
+                      </a:endParaRPr>
+                    </a:p>
+                  </a:txBody>
+                  <a:tcPr marL="9525" marR="9525" marT="9525" marB="0" anchor="b"/>
+                </a:tc>
+                <a:tc hMerge="1">
+                  <a:txBody>
+                    <a:bodyPr/>
+                    <a:lstStyle/>
+                    <a:p>
+                      <a:endParaRPr lang="de-DE"/>
+                    </a:p>
+                  </a:txBody>
+                  <a:tcPr/>
+                </a:tc>
+                <a:tc>
+                  <a:txBody>
+                    <a:bodyPr/>
+                    <a:lstStyle/>
+                    <a:p>
+                      <a:pPr algn="l" fontAlgn="b"/>
+                      <a:endParaRPr lang="de-DE" sz="1100" b="0" i="0" u="none" strike="noStrike">
+                        <a:solidFill>
+                          <a:srgbClr val="000000"/>
+                        </a:solidFill>
+                        <a:effectLst/>
+                        <a:latin typeface="Calibri" panose="020F0502020204030204" pitchFamily="34" charset="0"/>
+                      </a:endParaRPr>
+                    </a:p>
+                  </a:txBody>
+                  <a:tcPr marL="9525" marR="9525" marT="9525" marB="0" anchor="b"/>
+                </a:tc>
+                <a:tc>
+                  <a:txBody>
+                    <a:bodyPr/>
+                    <a:lstStyle/>
+                    <a:p>
+                      <a:pPr algn="r" fontAlgn="b"/>
+                      <a:r>
+                        <a:rPr lang="de-DE" sz="1100" u="none" strike="noStrike">
+                          <a:effectLst/>
+                        </a:rPr>
+                        <a:t>12.11.2019</a:t>
+                      </a:r>
+                      <a:endParaRPr lang="de-DE" sz="1100" b="0" i="0" u="none" strike="noStrike">
+                        <a:solidFill>
+                          <a:srgbClr val="000000"/>
+                        </a:solidFill>
+                        <a:effectLst/>
+                        <a:latin typeface="Calibri" panose="020F0502020204030204" pitchFamily="34" charset="0"/>
+                      </a:endParaRPr>
+                    </a:p>
+                  </a:txBody>
+                  <a:tcPr marL="9525" marR="9525" marT="9525" marB="0" anchor="b"/>
+                </a:tc>
+                <a:tc>
+                  <a:txBody>
+                    <a:bodyPr/>
+                    <a:lstStyle/>
+                    <a:p>
+                      <a:pPr algn="r" fontAlgn="b"/>
+                      <a:r>
+                        <a:rPr lang="de-DE" sz="1100" u="none" strike="noStrike">
+                          <a:effectLst/>
+                        </a:rPr>
+                        <a:t>26.11.2019</a:t>
+                      </a:r>
+                      <a:endParaRPr lang="de-DE" sz="1100" b="0" i="0" u="none" strike="noStrike">
+                        <a:solidFill>
+                          <a:srgbClr val="000000"/>
+                        </a:solidFill>
+                        <a:effectLst/>
+                        <a:latin typeface="Calibri" panose="020F0502020204030204" pitchFamily="34" charset="0"/>
+                      </a:endParaRPr>
+                    </a:p>
+                  </a:txBody>
+                  <a:tcPr marL="9525" marR="9525" marT="9525" marB="0" anchor="b"/>
+                </a:tc>
+                <a:tc>
+                  <a:txBody>
+                    <a:bodyPr/>
+                    <a:lstStyle/>
+                    <a:p>
+                      <a:pPr algn="l" fontAlgn="b"/>
+                      <a:r>
+                        <a:rPr lang="de-DE" sz="1100" u="none" strike="noStrike">
+                          <a:effectLst/>
+                        </a:rPr>
+                        <a:t>MQTT</a:t>
+                      </a:r>
+                      <a:endParaRPr lang="de-DE" sz="1100" b="0" i="0" u="none" strike="noStrike">
+                        <a:solidFill>
+                          <a:srgbClr val="000000"/>
+                        </a:solidFill>
+                        <a:effectLst/>
+                        <a:latin typeface="Calibri" panose="020F0502020204030204" pitchFamily="34" charset="0"/>
+                      </a:endParaRPr>
+                    </a:p>
+                  </a:txBody>
+                  <a:tcPr marL="9525" marR="9525" marT="9525" marB="0" anchor="b"/>
+                </a:tc>
+                <a:tc>
+                  <a:txBody>
+                    <a:bodyPr/>
+                    <a:lstStyle/>
+                    <a:p>
+                      <a:pPr algn="l" fontAlgn="b"/>
+                      <a:r>
+                        <a:rPr lang="de-DE" sz="1100" u="none" strike="noStrike">
+                          <a:effectLst/>
+                        </a:rPr>
+                        <a:t>Gate</a:t>
+                      </a:r>
+                      <a:endParaRPr lang="de-DE" sz="1100" b="0" i="0" u="none" strike="noStrike">
+                        <a:solidFill>
+                          <a:srgbClr val="000000"/>
+                        </a:solidFill>
+                        <a:effectLst/>
+                        <a:latin typeface="Calibri" panose="020F0502020204030204" pitchFamily="34" charset="0"/>
+                      </a:endParaRPr>
+                    </a:p>
+                  </a:txBody>
+                  <a:tcPr marL="9525" marR="9525" marT="9525" marB="0" anchor="b"/>
+                </a:tc>
+                <a:extLst>
+                  <a:ext uri="{0D108BD9-81ED-4DB2-BD59-A6C34878D82A}">
+                    <a16:rowId xmlns:a16="http://schemas.microsoft.com/office/drawing/2014/main" val="3477544370"/>
+                  </a:ext>
+                </a:extLst>
+              </a:tr>
+              <a:tr h="257586">
+                <a:tc>
+                  <a:txBody>
+                    <a:bodyPr/>
+                    <a:lstStyle/>
+                    <a:p>
+                      <a:pPr algn="r" fontAlgn="b"/>
+                      <a:r>
+                        <a:rPr lang="de-DE" sz="1100" u="none" strike="noStrike">
+                          <a:effectLst/>
+                        </a:rPr>
+                        <a:t>12.11.2019</a:t>
+                      </a:r>
+                      <a:endParaRPr lang="de-DE" sz="1100" b="0" i="0" u="none" strike="noStrike">
+                        <a:solidFill>
+                          <a:srgbClr val="000000"/>
+                        </a:solidFill>
+                        <a:effectLst/>
+                        <a:latin typeface="Calibri" panose="020F0502020204030204" pitchFamily="34" charset="0"/>
+                      </a:endParaRPr>
+                    </a:p>
+                  </a:txBody>
+                  <a:tcPr marL="9525" marR="9525" marT="9525" marB="0" anchor="b"/>
+                </a:tc>
+                <a:tc gridSpan="2">
+                  <a:txBody>
+                    <a:bodyPr/>
+                    <a:lstStyle/>
+                    <a:p>
+                      <a:pPr algn="l" fontAlgn="b"/>
+                      <a:r>
+                        <a:rPr lang="de-DE" sz="1100" u="none" strike="noStrike">
+                          <a:effectLst/>
+                        </a:rPr>
+                        <a:t>Gateway fertig</a:t>
+                      </a:r>
+                      <a:endParaRPr lang="de-DE" sz="1100" b="0" i="0" u="none" strike="noStrike">
+                        <a:solidFill>
+                          <a:srgbClr val="000000"/>
+                        </a:solidFill>
+                        <a:effectLst/>
+                        <a:latin typeface="Calibri" panose="020F0502020204030204" pitchFamily="34" charset="0"/>
+                      </a:endParaRPr>
+                    </a:p>
+                  </a:txBody>
+                  <a:tcPr marL="9525" marR="9525" marT="9525" marB="0" anchor="b"/>
+                </a:tc>
+                <a:tc hMerge="1">
+                  <a:txBody>
+                    <a:bodyPr/>
+                    <a:lstStyle/>
+                    <a:p>
+                      <a:endParaRPr lang="de-DE"/>
+                    </a:p>
+                  </a:txBody>
+                  <a:tcPr/>
+                </a:tc>
+                <a:tc>
+                  <a:txBody>
+                    <a:bodyPr/>
+                    <a:lstStyle/>
+                    <a:p>
+                      <a:pPr algn="l" fontAlgn="b"/>
+                      <a:endParaRPr lang="de-DE" sz="1100" b="0" i="0" u="none" strike="noStrike">
+                        <a:solidFill>
+                          <a:srgbClr val="000000"/>
+                        </a:solidFill>
+                        <a:effectLst/>
+                        <a:latin typeface="Calibri" panose="020F0502020204030204" pitchFamily="34" charset="0"/>
+                      </a:endParaRPr>
+                    </a:p>
+                  </a:txBody>
+                  <a:tcPr marL="9525" marR="9525" marT="9525" marB="0" anchor="b"/>
+                </a:tc>
+                <a:tc>
+                  <a:txBody>
+                    <a:bodyPr/>
+                    <a:lstStyle/>
+                    <a:p>
+                      <a:pPr algn="r" fontAlgn="b"/>
+                      <a:r>
+                        <a:rPr lang="de-DE" sz="1100" u="none" strike="noStrike">
+                          <a:effectLst/>
+                        </a:rPr>
+                        <a:t>05.11.2019</a:t>
+                      </a:r>
+                      <a:endParaRPr lang="de-DE" sz="1100" b="0" i="0" u="none" strike="noStrike">
+                        <a:solidFill>
+                          <a:srgbClr val="000000"/>
+                        </a:solidFill>
+                        <a:effectLst/>
+                        <a:latin typeface="Calibri" panose="020F0502020204030204" pitchFamily="34" charset="0"/>
+                      </a:endParaRPr>
+                    </a:p>
+                  </a:txBody>
+                  <a:tcPr marL="9525" marR="9525" marT="9525" marB="0" anchor="b"/>
+                </a:tc>
+                <a:tc>
+                  <a:txBody>
+                    <a:bodyPr/>
+                    <a:lstStyle/>
+                    <a:p>
+                      <a:pPr algn="r" fontAlgn="b"/>
+                      <a:r>
+                        <a:rPr lang="de-DE" sz="1100" u="none" strike="noStrike">
+                          <a:effectLst/>
+                        </a:rPr>
+                        <a:t>26.11.2019</a:t>
+                      </a:r>
+                      <a:endParaRPr lang="de-DE" sz="1100" b="0" i="0" u="none" strike="noStrike">
+                        <a:solidFill>
+                          <a:srgbClr val="000000"/>
+                        </a:solidFill>
+                        <a:effectLst/>
+                        <a:latin typeface="Calibri" panose="020F0502020204030204" pitchFamily="34" charset="0"/>
+                      </a:endParaRPr>
+                    </a:p>
+                  </a:txBody>
+                  <a:tcPr marL="9525" marR="9525" marT="9525" marB="0" anchor="b"/>
+                </a:tc>
+                <a:tc>
+                  <a:txBody>
+                    <a:bodyPr/>
+                    <a:lstStyle/>
+                    <a:p>
+                      <a:pPr algn="l" fontAlgn="b"/>
+                      <a:r>
+                        <a:rPr lang="de-DE" sz="1100" u="none" strike="noStrike">
+                          <a:effectLst/>
+                        </a:rPr>
+                        <a:t>SAP</a:t>
+                      </a:r>
+                      <a:endParaRPr lang="de-DE" sz="1100" b="0" i="0" u="none" strike="noStrike">
+                        <a:solidFill>
+                          <a:srgbClr val="000000"/>
+                        </a:solidFill>
+                        <a:effectLst/>
+                        <a:latin typeface="Calibri" panose="020F0502020204030204" pitchFamily="34" charset="0"/>
+                      </a:endParaRPr>
+                    </a:p>
+                  </a:txBody>
+                  <a:tcPr marL="9525" marR="9525" marT="9525" marB="0" anchor="b"/>
+                </a:tc>
+                <a:tc>
+                  <a:txBody>
+                    <a:bodyPr/>
+                    <a:lstStyle/>
+                    <a:p>
+                      <a:pPr algn="l" fontAlgn="b"/>
+                      <a:endParaRPr lang="de-DE" sz="1100" b="0" i="0" u="none" strike="noStrike">
+                        <a:solidFill>
+                          <a:srgbClr val="000000"/>
+                        </a:solidFill>
+                        <a:effectLst/>
+                        <a:latin typeface="Calibri" panose="020F0502020204030204" pitchFamily="34" charset="0"/>
+                      </a:endParaRPr>
+                    </a:p>
+                  </a:txBody>
+                  <a:tcPr marL="9525" marR="9525" marT="9525" marB="0" anchor="b"/>
+                </a:tc>
+                <a:extLst>
+                  <a:ext uri="{0D108BD9-81ED-4DB2-BD59-A6C34878D82A}">
+                    <a16:rowId xmlns:a16="http://schemas.microsoft.com/office/drawing/2014/main" val="803526364"/>
+                  </a:ext>
+                </a:extLst>
+              </a:tr>
+              <a:tr h="257586">
+                <a:tc>
+                  <a:txBody>
+                    <a:bodyPr/>
+                    <a:lstStyle/>
+                    <a:p>
+                      <a:pPr algn="r" fontAlgn="b"/>
+                      <a:r>
+                        <a:rPr lang="de-DE" sz="1100" u="none" strike="noStrike">
+                          <a:effectLst/>
+                        </a:rPr>
+                        <a:t>03.12.2019</a:t>
+                      </a:r>
+                      <a:endParaRPr lang="de-DE" sz="1100" b="0" i="0" u="none" strike="noStrike">
+                        <a:solidFill>
+                          <a:srgbClr val="000000"/>
+                        </a:solidFill>
+                        <a:effectLst/>
+                        <a:latin typeface="Calibri" panose="020F0502020204030204" pitchFamily="34" charset="0"/>
+                      </a:endParaRPr>
+                    </a:p>
+                  </a:txBody>
+                  <a:tcPr marL="9525" marR="9525" marT="9525" marB="0" anchor="b"/>
+                </a:tc>
+                <a:tc gridSpan="2">
+                  <a:txBody>
+                    <a:bodyPr/>
+                    <a:lstStyle/>
+                    <a:p>
+                      <a:pPr algn="l" fontAlgn="b"/>
+                      <a:r>
+                        <a:rPr lang="de-DE" sz="1100" u="none" strike="noStrike">
+                          <a:effectLst/>
+                        </a:rPr>
+                        <a:t>SPS fertig programmiert</a:t>
+                      </a:r>
+                      <a:endParaRPr lang="de-DE" sz="1100" b="0" i="0" u="none" strike="noStrike">
+                        <a:solidFill>
+                          <a:srgbClr val="000000"/>
+                        </a:solidFill>
+                        <a:effectLst/>
+                        <a:latin typeface="Calibri" panose="020F0502020204030204" pitchFamily="34" charset="0"/>
+                      </a:endParaRPr>
+                    </a:p>
+                  </a:txBody>
+                  <a:tcPr marL="9525" marR="9525" marT="9525" marB="0" anchor="b"/>
+                </a:tc>
+                <a:tc hMerge="1">
+                  <a:txBody>
+                    <a:bodyPr/>
+                    <a:lstStyle/>
+                    <a:p>
+                      <a:endParaRPr lang="de-DE"/>
+                    </a:p>
+                  </a:txBody>
+                  <a:tcPr/>
+                </a:tc>
+                <a:tc>
+                  <a:txBody>
+                    <a:bodyPr/>
+                    <a:lstStyle/>
+                    <a:p>
+                      <a:pPr algn="l" fontAlgn="b"/>
+                      <a:endParaRPr lang="de-DE" sz="1100" b="0" i="0" u="none" strike="noStrike">
+                        <a:solidFill>
+                          <a:srgbClr val="000000"/>
+                        </a:solidFill>
+                        <a:effectLst/>
+                        <a:latin typeface="Calibri" panose="020F0502020204030204" pitchFamily="34" charset="0"/>
+                      </a:endParaRPr>
+                    </a:p>
+                  </a:txBody>
+                  <a:tcPr marL="9525" marR="9525" marT="9525" marB="0" anchor="b"/>
+                </a:tc>
+                <a:tc>
+                  <a:txBody>
+                    <a:bodyPr/>
+                    <a:lstStyle/>
+                    <a:p>
+                      <a:pPr algn="r" fontAlgn="b"/>
+                      <a:r>
+                        <a:rPr lang="de-DE" sz="1100" u="none" strike="noStrike">
+                          <a:effectLst/>
+                        </a:rPr>
+                        <a:t>26.11.2019</a:t>
+                      </a:r>
+                      <a:endParaRPr lang="de-DE" sz="1100" b="0" i="0" u="none" strike="noStrike">
+                        <a:solidFill>
+                          <a:srgbClr val="000000"/>
+                        </a:solidFill>
+                        <a:effectLst/>
+                        <a:latin typeface="Calibri" panose="020F0502020204030204" pitchFamily="34" charset="0"/>
+                      </a:endParaRPr>
+                    </a:p>
+                  </a:txBody>
+                  <a:tcPr marL="9525" marR="9525" marT="9525" marB="0" anchor="b"/>
+                </a:tc>
+                <a:tc>
+                  <a:txBody>
+                    <a:bodyPr/>
+                    <a:lstStyle/>
+                    <a:p>
+                      <a:pPr algn="r" fontAlgn="b"/>
+                      <a:r>
+                        <a:rPr lang="de-DE" sz="1100" u="none" strike="noStrike">
+                          <a:effectLst/>
+                        </a:rPr>
+                        <a:t>10.12.2019</a:t>
+                      </a:r>
+                      <a:endParaRPr lang="de-DE" sz="1100" b="0" i="0" u="none" strike="noStrike">
+                        <a:solidFill>
+                          <a:srgbClr val="000000"/>
+                        </a:solidFill>
+                        <a:effectLst/>
+                        <a:latin typeface="Calibri" panose="020F0502020204030204" pitchFamily="34" charset="0"/>
+                      </a:endParaRPr>
+                    </a:p>
+                  </a:txBody>
+                  <a:tcPr marL="9525" marR="9525" marT="9525" marB="0" anchor="b"/>
+                </a:tc>
+                <a:tc>
+                  <a:txBody>
+                    <a:bodyPr/>
+                    <a:lstStyle/>
+                    <a:p>
+                      <a:pPr algn="l" fontAlgn="b"/>
+                      <a:r>
+                        <a:rPr lang="de-DE" sz="1100" u="none" strike="noStrike">
+                          <a:effectLst/>
+                        </a:rPr>
+                        <a:t>Dash</a:t>
+                      </a:r>
+                      <a:endParaRPr lang="de-DE" sz="1100" b="0" i="0" u="none" strike="noStrike">
+                        <a:solidFill>
+                          <a:srgbClr val="000000"/>
+                        </a:solidFill>
+                        <a:effectLst/>
+                        <a:latin typeface="Calibri" panose="020F0502020204030204" pitchFamily="34" charset="0"/>
+                      </a:endParaRPr>
+                    </a:p>
+                  </a:txBody>
+                  <a:tcPr marL="9525" marR="9525" marT="9525" marB="0" anchor="b"/>
+                </a:tc>
+                <a:tc>
+                  <a:txBody>
+                    <a:bodyPr/>
+                    <a:lstStyle/>
+                    <a:p>
+                      <a:pPr algn="l" fontAlgn="b"/>
+                      <a:r>
+                        <a:rPr lang="de-DE" sz="1100" u="none" strike="noStrike">
+                          <a:effectLst/>
+                        </a:rPr>
+                        <a:t>SAP</a:t>
+                      </a:r>
+                      <a:endParaRPr lang="de-DE" sz="1100" b="0" i="0" u="none" strike="noStrike">
+                        <a:solidFill>
+                          <a:srgbClr val="000000"/>
+                        </a:solidFill>
+                        <a:effectLst/>
+                        <a:latin typeface="Calibri" panose="020F0502020204030204" pitchFamily="34" charset="0"/>
+                      </a:endParaRPr>
+                    </a:p>
+                  </a:txBody>
+                  <a:tcPr marL="9525" marR="9525" marT="9525" marB="0" anchor="b"/>
+                </a:tc>
+                <a:extLst>
+                  <a:ext uri="{0D108BD9-81ED-4DB2-BD59-A6C34878D82A}">
+                    <a16:rowId xmlns:a16="http://schemas.microsoft.com/office/drawing/2014/main" val="644801906"/>
+                  </a:ext>
+                </a:extLst>
+              </a:tr>
+              <a:tr h="257586">
+                <a:tc>
+                  <a:txBody>
+                    <a:bodyPr/>
+                    <a:lstStyle/>
+                    <a:p>
+                      <a:pPr algn="r" fontAlgn="b"/>
+                      <a:r>
+                        <a:rPr lang="de-DE" sz="1100" u="none" strike="noStrike">
+                          <a:effectLst/>
+                        </a:rPr>
+                        <a:t>26.11.2019</a:t>
+                      </a:r>
+                      <a:endParaRPr lang="de-DE" sz="1100" b="0" i="0" u="none" strike="noStrike">
+                        <a:solidFill>
+                          <a:srgbClr val="000000"/>
+                        </a:solidFill>
+                        <a:effectLst/>
+                        <a:latin typeface="Calibri" panose="020F0502020204030204" pitchFamily="34" charset="0"/>
+                      </a:endParaRPr>
+                    </a:p>
+                  </a:txBody>
+                  <a:tcPr marL="9525" marR="9525" marT="9525" marB="0" anchor="b"/>
+                </a:tc>
+                <a:tc gridSpan="3">
+                  <a:txBody>
+                    <a:bodyPr/>
+                    <a:lstStyle/>
+                    <a:p>
+                      <a:pPr algn="l" fontAlgn="b"/>
+                      <a:r>
+                        <a:rPr lang="de-DE" sz="1100" u="none" strike="noStrike">
+                          <a:effectLst/>
+                        </a:rPr>
+                        <a:t>Kommunikation über MQTT erfolgreich</a:t>
+                      </a:r>
+                      <a:endParaRPr lang="de-DE" sz="1100" b="0" i="0" u="none" strike="noStrike">
+                        <a:solidFill>
+                          <a:srgbClr val="000000"/>
+                        </a:solidFill>
+                        <a:effectLst/>
+                        <a:latin typeface="Calibri" panose="020F0502020204030204" pitchFamily="34" charset="0"/>
+                      </a:endParaRPr>
+                    </a:p>
+                  </a:txBody>
+                  <a:tcPr marL="9525" marR="9525" marT="9525" marB="0" anchor="b"/>
+                </a:tc>
+                <a:tc hMerge="1">
+                  <a:txBody>
+                    <a:bodyPr/>
+                    <a:lstStyle/>
+                    <a:p>
+                      <a:endParaRPr lang="de-DE"/>
+                    </a:p>
+                  </a:txBody>
+                  <a:tcPr/>
+                </a:tc>
+                <a:tc hMerge="1">
+                  <a:txBody>
+                    <a:bodyPr/>
+                    <a:lstStyle/>
+                    <a:p>
+                      <a:endParaRPr lang="de-DE"/>
+                    </a:p>
+                  </a:txBody>
+                  <a:tcPr/>
+                </a:tc>
+                <a:tc>
+                  <a:txBody>
+                    <a:bodyPr/>
+                    <a:lstStyle/>
+                    <a:p>
+                      <a:pPr algn="r" fontAlgn="b"/>
+                      <a:r>
+                        <a:rPr lang="de-DE" sz="1100" u="none" strike="noStrike">
+                          <a:effectLst/>
+                        </a:rPr>
+                        <a:t>12.11.2019</a:t>
+                      </a:r>
+                      <a:endParaRPr lang="de-DE" sz="1100" b="0" i="0" u="none" strike="noStrike">
+                        <a:solidFill>
+                          <a:srgbClr val="000000"/>
+                        </a:solidFill>
+                        <a:effectLst/>
+                        <a:latin typeface="Calibri" panose="020F0502020204030204" pitchFamily="34" charset="0"/>
+                      </a:endParaRPr>
+                    </a:p>
+                  </a:txBody>
+                  <a:tcPr marL="9525" marR="9525" marT="9525" marB="0" anchor="b"/>
+                </a:tc>
+                <a:tc>
+                  <a:txBody>
+                    <a:bodyPr/>
+                    <a:lstStyle/>
+                    <a:p>
+                      <a:pPr algn="r" fontAlgn="b"/>
+                      <a:r>
+                        <a:rPr lang="de-DE" sz="1100" u="none" strike="noStrike">
+                          <a:effectLst/>
+                        </a:rPr>
+                        <a:t>26.11.2019</a:t>
+                      </a:r>
+                      <a:endParaRPr lang="de-DE" sz="1100" b="0" i="0" u="none" strike="noStrike">
+                        <a:solidFill>
+                          <a:srgbClr val="000000"/>
+                        </a:solidFill>
+                        <a:effectLst/>
+                        <a:latin typeface="Calibri" panose="020F0502020204030204" pitchFamily="34" charset="0"/>
+                      </a:endParaRPr>
+                    </a:p>
+                  </a:txBody>
+                  <a:tcPr marL="9525" marR="9525" marT="9525" marB="0" anchor="b"/>
+                </a:tc>
+                <a:tc>
+                  <a:txBody>
+                    <a:bodyPr/>
+                    <a:lstStyle/>
+                    <a:p>
+                      <a:pPr algn="l" fontAlgn="b"/>
+                      <a:r>
+                        <a:rPr lang="de-DE" sz="1100" u="none" strike="noStrike">
+                          <a:effectLst/>
+                        </a:rPr>
+                        <a:t>OPC-UA</a:t>
+                      </a:r>
+                      <a:endParaRPr lang="de-DE" sz="1100" b="0" i="0" u="none" strike="noStrike">
+                        <a:solidFill>
+                          <a:srgbClr val="000000"/>
+                        </a:solidFill>
+                        <a:effectLst/>
+                        <a:latin typeface="Calibri" panose="020F0502020204030204" pitchFamily="34" charset="0"/>
+                      </a:endParaRPr>
+                    </a:p>
+                  </a:txBody>
+                  <a:tcPr marL="9525" marR="9525" marT="9525" marB="0" anchor="b"/>
+                </a:tc>
+                <a:tc>
+                  <a:txBody>
+                    <a:bodyPr/>
+                    <a:lstStyle/>
+                    <a:p>
+                      <a:pPr algn="l" fontAlgn="b"/>
+                      <a:r>
+                        <a:rPr lang="de-DE" sz="1100" u="none" strike="noStrike">
+                          <a:effectLst/>
+                        </a:rPr>
+                        <a:t>Gate</a:t>
+                      </a:r>
+                      <a:endParaRPr lang="de-DE" sz="1100" b="0" i="0" u="none" strike="noStrike">
+                        <a:solidFill>
+                          <a:srgbClr val="000000"/>
+                        </a:solidFill>
+                        <a:effectLst/>
+                        <a:latin typeface="Calibri" panose="020F0502020204030204" pitchFamily="34" charset="0"/>
+                      </a:endParaRPr>
+                    </a:p>
+                  </a:txBody>
+                  <a:tcPr marL="9525" marR="9525" marT="9525" marB="0" anchor="b"/>
+                </a:tc>
+                <a:extLst>
+                  <a:ext uri="{0D108BD9-81ED-4DB2-BD59-A6C34878D82A}">
+                    <a16:rowId xmlns:a16="http://schemas.microsoft.com/office/drawing/2014/main" val="2286181577"/>
+                  </a:ext>
+                </a:extLst>
+              </a:tr>
+              <a:tr h="257586">
+                <a:tc>
+                  <a:txBody>
+                    <a:bodyPr/>
+                    <a:lstStyle/>
+                    <a:p>
+                      <a:pPr algn="r" fontAlgn="b"/>
+                      <a:r>
+                        <a:rPr lang="de-DE" sz="1100" u="none" strike="noStrike">
+                          <a:effectLst/>
+                        </a:rPr>
+                        <a:t>07.01.2020</a:t>
+                      </a:r>
+                      <a:endParaRPr lang="de-DE" sz="1100" b="0" i="0" u="none" strike="noStrike">
+                        <a:solidFill>
+                          <a:srgbClr val="000000"/>
+                        </a:solidFill>
+                        <a:effectLst/>
+                        <a:latin typeface="Calibri" panose="020F0502020204030204" pitchFamily="34" charset="0"/>
+                      </a:endParaRPr>
+                    </a:p>
+                  </a:txBody>
+                  <a:tcPr marL="9525" marR="9525" marT="9525" marB="0" anchor="b"/>
+                </a:tc>
+                <a:tc gridSpan="3">
+                  <a:txBody>
+                    <a:bodyPr/>
+                    <a:lstStyle/>
+                    <a:p>
+                      <a:pPr algn="l" fontAlgn="b"/>
+                      <a:r>
+                        <a:rPr lang="de-DE" sz="1100" u="none" strike="noStrike">
+                          <a:effectLst/>
+                        </a:rPr>
+                        <a:t>Anbindung beider Gruppen erfolgreich</a:t>
+                      </a:r>
+                      <a:endParaRPr lang="de-DE" sz="1100" b="0" i="0" u="none" strike="noStrike">
+                        <a:solidFill>
+                          <a:srgbClr val="000000"/>
+                        </a:solidFill>
+                        <a:effectLst/>
+                        <a:latin typeface="Calibri" panose="020F0502020204030204" pitchFamily="34" charset="0"/>
+                      </a:endParaRPr>
+                    </a:p>
+                  </a:txBody>
+                  <a:tcPr marL="9525" marR="9525" marT="9525" marB="0" anchor="b"/>
+                </a:tc>
+                <a:tc hMerge="1">
+                  <a:txBody>
+                    <a:bodyPr/>
+                    <a:lstStyle/>
+                    <a:p>
+                      <a:endParaRPr lang="de-DE"/>
+                    </a:p>
+                  </a:txBody>
+                  <a:tcPr/>
+                </a:tc>
+                <a:tc hMerge="1">
+                  <a:txBody>
+                    <a:bodyPr/>
+                    <a:lstStyle/>
+                    <a:p>
+                      <a:endParaRPr lang="de-DE"/>
+                    </a:p>
+                  </a:txBody>
+                  <a:tcPr/>
+                </a:tc>
+                <a:tc>
+                  <a:txBody>
+                    <a:bodyPr/>
+                    <a:lstStyle/>
+                    <a:p>
+                      <a:pPr algn="r" fontAlgn="b"/>
+                      <a:r>
+                        <a:rPr lang="de-DE" sz="1100" u="none" strike="noStrike">
+                          <a:effectLst/>
+                        </a:rPr>
+                        <a:t>26.11.2019</a:t>
+                      </a:r>
+                      <a:endParaRPr lang="de-DE" sz="1100" b="0" i="0" u="none" strike="noStrike">
+                        <a:solidFill>
+                          <a:srgbClr val="000000"/>
+                        </a:solidFill>
+                        <a:effectLst/>
+                        <a:latin typeface="Calibri" panose="020F0502020204030204" pitchFamily="34" charset="0"/>
+                      </a:endParaRPr>
+                    </a:p>
+                  </a:txBody>
+                  <a:tcPr marL="9525" marR="9525" marT="9525" marB="0" anchor="b"/>
+                </a:tc>
+                <a:tc>
+                  <a:txBody>
+                    <a:bodyPr/>
+                    <a:lstStyle/>
+                    <a:p>
+                      <a:pPr algn="r" fontAlgn="b"/>
+                      <a:r>
+                        <a:rPr lang="de-DE" sz="1100" u="none" strike="noStrike">
+                          <a:effectLst/>
+                        </a:rPr>
+                        <a:t>03.12.2019</a:t>
+                      </a:r>
+                      <a:endParaRPr lang="de-DE" sz="1100" b="0" i="0" u="none" strike="noStrike">
+                        <a:solidFill>
+                          <a:srgbClr val="000000"/>
+                        </a:solidFill>
+                        <a:effectLst/>
+                        <a:latin typeface="Calibri" panose="020F0502020204030204" pitchFamily="34" charset="0"/>
+                      </a:endParaRPr>
+                    </a:p>
+                  </a:txBody>
+                  <a:tcPr marL="9525" marR="9525" marT="9525" marB="0" anchor="b"/>
+                </a:tc>
+                <a:tc>
+                  <a:txBody>
+                    <a:bodyPr/>
+                    <a:lstStyle/>
+                    <a:p>
+                      <a:pPr algn="l" fontAlgn="b"/>
+                      <a:r>
+                        <a:rPr lang="de-DE" sz="1100" u="none" strike="noStrike">
+                          <a:effectLst/>
+                        </a:rPr>
+                        <a:t>SPS</a:t>
+                      </a:r>
+                      <a:endParaRPr lang="de-DE" sz="1100" b="0" i="0" u="none" strike="noStrike">
+                        <a:solidFill>
+                          <a:srgbClr val="000000"/>
+                        </a:solidFill>
+                        <a:effectLst/>
+                        <a:latin typeface="Calibri" panose="020F0502020204030204" pitchFamily="34" charset="0"/>
+                      </a:endParaRPr>
+                    </a:p>
+                  </a:txBody>
+                  <a:tcPr marL="9525" marR="9525" marT="9525" marB="0" anchor="b"/>
+                </a:tc>
+                <a:tc>
+                  <a:txBody>
+                    <a:bodyPr/>
+                    <a:lstStyle/>
+                    <a:p>
+                      <a:pPr algn="l" fontAlgn="b"/>
+                      <a:r>
+                        <a:rPr lang="de-DE" sz="1100" u="none" strike="noStrike">
+                          <a:effectLst/>
+                        </a:rPr>
+                        <a:t>F</a:t>
+                      </a:r>
+                      <a:endParaRPr lang="de-DE" sz="1100" b="0" i="0" u="none" strike="noStrike">
+                        <a:solidFill>
+                          <a:srgbClr val="000000"/>
+                        </a:solidFill>
+                        <a:effectLst/>
+                        <a:latin typeface="Calibri" panose="020F0502020204030204" pitchFamily="34" charset="0"/>
+                      </a:endParaRPr>
+                    </a:p>
+                  </a:txBody>
+                  <a:tcPr marL="9525" marR="9525" marT="9525" marB="0" anchor="b"/>
+                </a:tc>
+                <a:extLst>
+                  <a:ext uri="{0D108BD9-81ED-4DB2-BD59-A6C34878D82A}">
+                    <a16:rowId xmlns:a16="http://schemas.microsoft.com/office/drawing/2014/main" val="1547604521"/>
+                  </a:ext>
+                </a:extLst>
+              </a:tr>
+              <a:tr h="257586">
+                <a:tc>
+                  <a:txBody>
+                    <a:bodyPr/>
+                    <a:lstStyle/>
+                    <a:p>
+                      <a:pPr algn="r" fontAlgn="b"/>
+                      <a:r>
+                        <a:rPr lang="de-DE" sz="1100" u="none" strike="noStrike">
+                          <a:effectLst/>
+                        </a:rPr>
+                        <a:t>21.01.2020</a:t>
+                      </a:r>
+                      <a:endParaRPr lang="de-DE" sz="1100" b="0" i="0" u="none" strike="noStrike">
+                        <a:solidFill>
+                          <a:srgbClr val="000000"/>
+                        </a:solidFill>
+                        <a:effectLst/>
+                        <a:latin typeface="Calibri" panose="020F0502020204030204" pitchFamily="34" charset="0"/>
+                      </a:endParaRPr>
+                    </a:p>
+                  </a:txBody>
+                  <a:tcPr marL="9525" marR="9525" marT="9525" marB="0" anchor="b"/>
+                </a:tc>
+                <a:tc gridSpan="3">
+                  <a:txBody>
+                    <a:bodyPr/>
+                    <a:lstStyle/>
+                    <a:p>
+                      <a:pPr algn="l" fontAlgn="b"/>
+                      <a:r>
+                        <a:rPr lang="de-DE" sz="1100" u="none" strike="noStrike">
+                          <a:effectLst/>
+                        </a:rPr>
+                        <a:t>Systemtest/Abnahme erfolgreich</a:t>
+                      </a:r>
+                      <a:endParaRPr lang="de-DE" sz="1100" b="0" i="0" u="none" strike="noStrike">
+                        <a:solidFill>
+                          <a:srgbClr val="000000"/>
+                        </a:solidFill>
+                        <a:effectLst/>
+                        <a:latin typeface="Calibri" panose="020F0502020204030204" pitchFamily="34" charset="0"/>
+                      </a:endParaRPr>
+                    </a:p>
+                  </a:txBody>
+                  <a:tcPr marL="9525" marR="9525" marT="9525" marB="0" anchor="b"/>
+                </a:tc>
+                <a:tc hMerge="1">
+                  <a:txBody>
+                    <a:bodyPr/>
+                    <a:lstStyle/>
+                    <a:p>
+                      <a:endParaRPr lang="de-DE"/>
+                    </a:p>
+                  </a:txBody>
+                  <a:tcPr/>
+                </a:tc>
+                <a:tc hMerge="1">
+                  <a:txBody>
+                    <a:bodyPr/>
+                    <a:lstStyle/>
+                    <a:p>
+                      <a:endParaRPr lang="de-DE"/>
+                    </a:p>
+                  </a:txBody>
+                  <a:tcPr/>
+                </a:tc>
+                <a:tc>
+                  <a:txBody>
+                    <a:bodyPr/>
+                    <a:lstStyle/>
+                    <a:p>
+                      <a:pPr algn="r" fontAlgn="b"/>
+                      <a:r>
+                        <a:rPr lang="de-DE" sz="1100" u="none" strike="noStrike">
+                          <a:effectLst/>
+                        </a:rPr>
+                        <a:t>26.11.2019</a:t>
+                      </a:r>
+                      <a:endParaRPr lang="de-DE" sz="1100" b="0" i="0" u="none" strike="noStrike">
+                        <a:solidFill>
+                          <a:srgbClr val="000000"/>
+                        </a:solidFill>
+                        <a:effectLst/>
+                        <a:latin typeface="Calibri" panose="020F0502020204030204" pitchFamily="34" charset="0"/>
+                      </a:endParaRPr>
+                    </a:p>
+                  </a:txBody>
+                  <a:tcPr marL="9525" marR="9525" marT="9525" marB="0" anchor="b"/>
+                </a:tc>
+                <a:tc>
+                  <a:txBody>
+                    <a:bodyPr/>
+                    <a:lstStyle/>
+                    <a:p>
+                      <a:pPr algn="r" fontAlgn="b"/>
+                      <a:r>
+                        <a:rPr lang="de-DE" sz="1100" u="none" strike="noStrike">
+                          <a:effectLst/>
+                        </a:rPr>
+                        <a:t>10.12.2019</a:t>
+                      </a:r>
+                      <a:endParaRPr lang="de-DE" sz="1100" b="0" i="0" u="none" strike="noStrike">
+                        <a:solidFill>
+                          <a:srgbClr val="000000"/>
+                        </a:solidFill>
+                        <a:effectLst/>
+                        <a:latin typeface="Calibri" panose="020F0502020204030204" pitchFamily="34" charset="0"/>
+                      </a:endParaRPr>
+                    </a:p>
+                  </a:txBody>
+                  <a:tcPr marL="9525" marR="9525" marT="9525" marB="0" anchor="b"/>
+                </a:tc>
+                <a:tc>
+                  <a:txBody>
+                    <a:bodyPr/>
+                    <a:lstStyle/>
+                    <a:p>
+                      <a:pPr algn="l" fontAlgn="b"/>
+                      <a:r>
+                        <a:rPr lang="de-DE" sz="1100" u="none" strike="noStrike">
+                          <a:effectLst/>
+                        </a:rPr>
+                        <a:t>Schnitt-Pflanzen</a:t>
+                      </a:r>
+                      <a:endParaRPr lang="de-DE" sz="1100" b="0" i="0" u="none" strike="noStrike">
+                        <a:solidFill>
+                          <a:srgbClr val="000000"/>
+                        </a:solidFill>
+                        <a:effectLst/>
+                        <a:latin typeface="Calibri" panose="020F0502020204030204" pitchFamily="34" charset="0"/>
+                      </a:endParaRPr>
+                    </a:p>
+                  </a:txBody>
+                  <a:tcPr marL="9525" marR="9525" marT="9525" marB="0" anchor="b"/>
+                </a:tc>
+                <a:tc>
+                  <a:txBody>
+                    <a:bodyPr/>
+                    <a:lstStyle/>
+                    <a:p>
+                      <a:pPr algn="l" fontAlgn="b"/>
+                      <a:r>
+                        <a:rPr lang="de-DE" sz="1100" u="none" strike="noStrike">
+                          <a:effectLst/>
+                        </a:rPr>
+                        <a:t>SAP</a:t>
+                      </a:r>
+                      <a:endParaRPr lang="de-DE" sz="1100" b="0" i="0" u="none" strike="noStrike">
+                        <a:solidFill>
+                          <a:srgbClr val="000000"/>
+                        </a:solidFill>
+                        <a:effectLst/>
+                        <a:latin typeface="Calibri" panose="020F0502020204030204" pitchFamily="34" charset="0"/>
+                      </a:endParaRPr>
+                    </a:p>
+                  </a:txBody>
+                  <a:tcPr marL="9525" marR="9525" marT="9525" marB="0" anchor="b"/>
+                </a:tc>
+                <a:extLst>
+                  <a:ext uri="{0D108BD9-81ED-4DB2-BD59-A6C34878D82A}">
+                    <a16:rowId xmlns:a16="http://schemas.microsoft.com/office/drawing/2014/main" val="1410077581"/>
+                  </a:ext>
+                </a:extLst>
+              </a:tr>
+              <a:tr h="257586">
+                <a:tc>
+                  <a:txBody>
+                    <a:bodyPr/>
+                    <a:lstStyle/>
+                    <a:p>
+                      <a:pPr algn="l" fontAlgn="b"/>
+                      <a:endParaRPr lang="de-DE" sz="1100" b="0" i="0" u="none" strike="noStrike">
+                        <a:solidFill>
+                          <a:srgbClr val="000000"/>
+                        </a:solidFill>
+                        <a:effectLst/>
+                        <a:latin typeface="Calibri" panose="020F0502020204030204" pitchFamily="34" charset="0"/>
+                      </a:endParaRPr>
+                    </a:p>
+                  </a:txBody>
+                  <a:tcPr marL="9525" marR="9525" marT="9525" marB="0" anchor="b"/>
+                </a:tc>
+                <a:tc>
+                  <a:txBody>
+                    <a:bodyPr/>
+                    <a:lstStyle/>
+                    <a:p>
+                      <a:pPr algn="l" fontAlgn="b"/>
+                      <a:endParaRPr lang="de-DE" sz="1100" b="0" i="0" u="none" strike="noStrike">
+                        <a:solidFill>
+                          <a:srgbClr val="000000"/>
+                        </a:solidFill>
+                        <a:effectLst/>
+                        <a:latin typeface="Calibri" panose="020F0502020204030204" pitchFamily="34" charset="0"/>
+                      </a:endParaRPr>
+                    </a:p>
+                  </a:txBody>
+                  <a:tcPr marL="9525" marR="9525" marT="9525" marB="0" anchor="b"/>
+                </a:tc>
+                <a:tc>
+                  <a:txBody>
+                    <a:bodyPr/>
+                    <a:lstStyle/>
+                    <a:p>
+                      <a:pPr algn="l" fontAlgn="b"/>
+                      <a:endParaRPr lang="de-DE" sz="1100" b="0" i="0" u="none" strike="noStrike">
+                        <a:solidFill>
+                          <a:srgbClr val="000000"/>
+                        </a:solidFill>
+                        <a:effectLst/>
+                        <a:latin typeface="Calibri" panose="020F0502020204030204" pitchFamily="34" charset="0"/>
+                      </a:endParaRPr>
+                    </a:p>
+                  </a:txBody>
+                  <a:tcPr marL="9525" marR="9525" marT="9525" marB="0" anchor="b"/>
+                </a:tc>
+                <a:tc>
+                  <a:txBody>
+                    <a:bodyPr/>
+                    <a:lstStyle/>
+                    <a:p>
+                      <a:pPr algn="l" fontAlgn="b"/>
+                      <a:endParaRPr lang="de-DE" sz="1100" b="0" i="0" u="none" strike="noStrike">
+                        <a:solidFill>
+                          <a:srgbClr val="000000"/>
+                        </a:solidFill>
+                        <a:effectLst/>
+                        <a:latin typeface="Calibri" panose="020F0502020204030204" pitchFamily="34" charset="0"/>
+                      </a:endParaRPr>
+                    </a:p>
+                  </a:txBody>
+                  <a:tcPr marL="9525" marR="9525" marT="9525" marB="0" anchor="b"/>
+                </a:tc>
+                <a:tc>
+                  <a:txBody>
+                    <a:bodyPr/>
+                    <a:lstStyle/>
+                    <a:p>
+                      <a:pPr algn="r" fontAlgn="b"/>
+                      <a:r>
+                        <a:rPr lang="de-DE" sz="1100" u="none" strike="noStrike">
+                          <a:effectLst/>
+                        </a:rPr>
+                        <a:t>03.12.2019</a:t>
+                      </a:r>
+                      <a:endParaRPr lang="de-DE" sz="1100" b="0" i="0" u="none" strike="noStrike">
+                        <a:solidFill>
+                          <a:srgbClr val="000000"/>
+                        </a:solidFill>
+                        <a:effectLst/>
+                        <a:latin typeface="Calibri" panose="020F0502020204030204" pitchFamily="34" charset="0"/>
+                      </a:endParaRPr>
+                    </a:p>
+                  </a:txBody>
+                  <a:tcPr marL="9525" marR="9525" marT="9525" marB="0" anchor="b"/>
+                </a:tc>
+                <a:tc>
+                  <a:txBody>
+                    <a:bodyPr/>
+                    <a:lstStyle/>
+                    <a:p>
+                      <a:pPr algn="r" fontAlgn="b"/>
+                      <a:r>
+                        <a:rPr lang="de-DE" sz="1100" u="none" strike="noStrike">
+                          <a:effectLst/>
+                        </a:rPr>
+                        <a:t>17.12.2019</a:t>
+                      </a:r>
+                      <a:endParaRPr lang="de-DE" sz="1100" b="0" i="0" u="none" strike="noStrike">
+                        <a:solidFill>
+                          <a:srgbClr val="000000"/>
+                        </a:solidFill>
+                        <a:effectLst/>
+                        <a:latin typeface="Calibri" panose="020F0502020204030204" pitchFamily="34" charset="0"/>
+                      </a:endParaRPr>
+                    </a:p>
+                  </a:txBody>
+                  <a:tcPr marL="9525" marR="9525" marT="9525" marB="0" anchor="b"/>
+                </a:tc>
+                <a:tc>
+                  <a:txBody>
+                    <a:bodyPr/>
+                    <a:lstStyle/>
+                    <a:p>
+                      <a:pPr algn="l" fontAlgn="b"/>
+                      <a:r>
+                        <a:rPr lang="de-DE" sz="1100" u="none" strike="noStrike">
+                          <a:effectLst/>
+                        </a:rPr>
+                        <a:t>Schnitt-Monitoring</a:t>
+                      </a:r>
+                      <a:endParaRPr lang="de-DE" sz="1100" b="0" i="0" u="none" strike="noStrike">
+                        <a:solidFill>
+                          <a:srgbClr val="000000"/>
+                        </a:solidFill>
+                        <a:effectLst/>
+                        <a:latin typeface="Calibri" panose="020F0502020204030204" pitchFamily="34" charset="0"/>
+                      </a:endParaRPr>
+                    </a:p>
+                  </a:txBody>
+                  <a:tcPr marL="9525" marR="9525" marT="9525" marB="0" anchor="b"/>
+                </a:tc>
+                <a:tc>
+                  <a:txBody>
+                    <a:bodyPr/>
+                    <a:lstStyle/>
+                    <a:p>
+                      <a:pPr algn="l" fontAlgn="b"/>
+                      <a:r>
+                        <a:rPr lang="de-DE" sz="1100" u="none" strike="noStrike">
+                          <a:effectLst/>
+                        </a:rPr>
+                        <a:t>SPS</a:t>
+                      </a:r>
+                      <a:endParaRPr lang="de-DE" sz="1100" b="0" i="0" u="none" strike="noStrike">
+                        <a:solidFill>
+                          <a:srgbClr val="000000"/>
+                        </a:solidFill>
+                        <a:effectLst/>
+                        <a:latin typeface="Calibri" panose="020F0502020204030204" pitchFamily="34" charset="0"/>
+                      </a:endParaRPr>
+                    </a:p>
+                  </a:txBody>
+                  <a:tcPr marL="9525" marR="9525" marT="9525" marB="0" anchor="b"/>
+                </a:tc>
+                <a:extLst>
+                  <a:ext uri="{0D108BD9-81ED-4DB2-BD59-A6C34878D82A}">
+                    <a16:rowId xmlns:a16="http://schemas.microsoft.com/office/drawing/2014/main" val="4036120768"/>
+                  </a:ext>
+                </a:extLst>
+              </a:tr>
+              <a:tr h="257586">
+                <a:tc>
+                  <a:txBody>
+                    <a:bodyPr/>
+                    <a:lstStyle/>
+                    <a:p>
+                      <a:pPr algn="l" fontAlgn="b"/>
+                      <a:endParaRPr lang="de-DE" sz="1100" b="0" i="0" u="none" strike="noStrike">
+                        <a:solidFill>
+                          <a:srgbClr val="000000"/>
+                        </a:solidFill>
+                        <a:effectLst/>
+                        <a:latin typeface="Calibri" panose="020F0502020204030204" pitchFamily="34" charset="0"/>
+                      </a:endParaRPr>
+                    </a:p>
+                  </a:txBody>
+                  <a:tcPr marL="9525" marR="9525" marT="9525" marB="0" anchor="b"/>
+                </a:tc>
+                <a:tc>
+                  <a:txBody>
+                    <a:bodyPr/>
+                    <a:lstStyle/>
+                    <a:p>
+                      <a:pPr algn="l" fontAlgn="b"/>
+                      <a:endParaRPr lang="de-DE" sz="1100" b="0" i="0" u="none" strike="noStrike">
+                        <a:solidFill>
+                          <a:srgbClr val="000000"/>
+                        </a:solidFill>
+                        <a:effectLst/>
+                        <a:latin typeface="Calibri" panose="020F0502020204030204" pitchFamily="34" charset="0"/>
+                      </a:endParaRPr>
+                    </a:p>
+                  </a:txBody>
+                  <a:tcPr marL="9525" marR="9525" marT="9525" marB="0" anchor="b"/>
+                </a:tc>
+                <a:tc>
+                  <a:txBody>
+                    <a:bodyPr/>
+                    <a:lstStyle/>
+                    <a:p>
+                      <a:pPr algn="l" fontAlgn="b"/>
+                      <a:endParaRPr lang="de-DE" sz="1100" b="0" i="0" u="none" strike="noStrike">
+                        <a:solidFill>
+                          <a:srgbClr val="000000"/>
+                        </a:solidFill>
+                        <a:effectLst/>
+                        <a:latin typeface="Calibri" panose="020F0502020204030204" pitchFamily="34" charset="0"/>
+                      </a:endParaRPr>
+                    </a:p>
+                  </a:txBody>
+                  <a:tcPr marL="9525" marR="9525" marT="9525" marB="0" anchor="b"/>
+                </a:tc>
+                <a:tc>
+                  <a:txBody>
+                    <a:bodyPr/>
+                    <a:lstStyle/>
+                    <a:p>
+                      <a:pPr algn="l" fontAlgn="b"/>
+                      <a:endParaRPr lang="de-DE" sz="1100" b="0" i="0" u="none" strike="noStrike">
+                        <a:solidFill>
+                          <a:srgbClr val="000000"/>
+                        </a:solidFill>
+                        <a:effectLst/>
+                        <a:latin typeface="Calibri" panose="020F0502020204030204" pitchFamily="34" charset="0"/>
+                      </a:endParaRPr>
+                    </a:p>
+                  </a:txBody>
+                  <a:tcPr marL="9525" marR="9525" marT="9525" marB="0" anchor="b"/>
+                </a:tc>
+                <a:tc>
+                  <a:txBody>
+                    <a:bodyPr/>
+                    <a:lstStyle/>
+                    <a:p>
+                      <a:pPr algn="r" fontAlgn="b"/>
+                      <a:r>
+                        <a:rPr lang="de-DE" sz="1100" u="none" strike="noStrike">
+                          <a:effectLst/>
+                        </a:rPr>
+                        <a:t>03.12.2019</a:t>
+                      </a:r>
+                      <a:endParaRPr lang="de-DE" sz="1100" b="0" i="0" u="none" strike="noStrike">
+                        <a:solidFill>
+                          <a:srgbClr val="000000"/>
+                        </a:solidFill>
+                        <a:effectLst/>
+                        <a:latin typeface="Calibri" panose="020F0502020204030204" pitchFamily="34" charset="0"/>
+                      </a:endParaRPr>
+                    </a:p>
+                  </a:txBody>
+                  <a:tcPr marL="9525" marR="9525" marT="9525" marB="0" anchor="b"/>
+                </a:tc>
+                <a:tc>
+                  <a:txBody>
+                    <a:bodyPr/>
+                    <a:lstStyle/>
+                    <a:p>
+                      <a:pPr algn="r" fontAlgn="b"/>
+                      <a:r>
+                        <a:rPr lang="de-DE" sz="1100" u="none" strike="noStrike">
+                          <a:effectLst/>
+                        </a:rPr>
+                        <a:t>17.12.2019</a:t>
+                      </a:r>
+                      <a:endParaRPr lang="de-DE" sz="1100" b="0" i="0" u="none" strike="noStrike">
+                        <a:solidFill>
+                          <a:srgbClr val="000000"/>
+                        </a:solidFill>
+                        <a:effectLst/>
+                        <a:latin typeface="Calibri" panose="020F0502020204030204" pitchFamily="34" charset="0"/>
+                      </a:endParaRPr>
+                    </a:p>
+                  </a:txBody>
+                  <a:tcPr marL="9525" marR="9525" marT="9525" marB="0" anchor="b"/>
+                </a:tc>
+                <a:tc>
+                  <a:txBody>
+                    <a:bodyPr/>
+                    <a:lstStyle/>
+                    <a:p>
+                      <a:pPr algn="l" fontAlgn="b"/>
+                      <a:r>
+                        <a:rPr lang="de-DE" sz="1100" u="none" strike="noStrike">
+                          <a:effectLst/>
+                        </a:rPr>
+                        <a:t>TeilTest-SPS</a:t>
+                      </a:r>
+                      <a:endParaRPr lang="de-DE" sz="1100" b="0" i="0" u="none" strike="noStrike">
+                        <a:solidFill>
+                          <a:srgbClr val="000000"/>
+                        </a:solidFill>
+                        <a:effectLst/>
+                        <a:latin typeface="Calibri" panose="020F0502020204030204" pitchFamily="34" charset="0"/>
+                      </a:endParaRPr>
+                    </a:p>
+                  </a:txBody>
+                  <a:tcPr marL="9525" marR="9525" marT="9525" marB="0" anchor="b"/>
+                </a:tc>
+                <a:tc>
+                  <a:txBody>
+                    <a:bodyPr/>
+                    <a:lstStyle/>
+                    <a:p>
+                      <a:pPr algn="l" fontAlgn="b"/>
+                      <a:r>
+                        <a:rPr lang="de-DE" sz="1100" u="none" strike="noStrike">
+                          <a:effectLst/>
+                        </a:rPr>
+                        <a:t>SPS</a:t>
+                      </a:r>
+                      <a:endParaRPr lang="de-DE" sz="1100" b="0" i="0" u="none" strike="noStrike">
+                        <a:solidFill>
+                          <a:srgbClr val="000000"/>
+                        </a:solidFill>
+                        <a:effectLst/>
+                        <a:latin typeface="Calibri" panose="020F0502020204030204" pitchFamily="34" charset="0"/>
+                      </a:endParaRPr>
+                    </a:p>
+                  </a:txBody>
+                  <a:tcPr marL="9525" marR="9525" marT="9525" marB="0" anchor="b"/>
+                </a:tc>
+                <a:extLst>
+                  <a:ext uri="{0D108BD9-81ED-4DB2-BD59-A6C34878D82A}">
+                    <a16:rowId xmlns:a16="http://schemas.microsoft.com/office/drawing/2014/main" val="4121040023"/>
+                  </a:ext>
+                </a:extLst>
+              </a:tr>
+              <a:tr h="257586">
+                <a:tc>
+                  <a:txBody>
+                    <a:bodyPr/>
+                    <a:lstStyle/>
+                    <a:p>
+                      <a:pPr algn="l" fontAlgn="b"/>
+                      <a:endParaRPr lang="de-DE" sz="1100" b="0" i="0" u="none" strike="noStrike">
+                        <a:solidFill>
+                          <a:srgbClr val="000000"/>
+                        </a:solidFill>
+                        <a:effectLst/>
+                        <a:latin typeface="Calibri" panose="020F0502020204030204" pitchFamily="34" charset="0"/>
+                      </a:endParaRPr>
+                    </a:p>
+                  </a:txBody>
+                  <a:tcPr marL="9525" marR="9525" marT="9525" marB="0" anchor="b"/>
+                </a:tc>
+                <a:tc>
+                  <a:txBody>
+                    <a:bodyPr/>
+                    <a:lstStyle/>
+                    <a:p>
+                      <a:pPr algn="l" fontAlgn="b"/>
+                      <a:endParaRPr lang="de-DE" sz="1100" b="0" i="0" u="none" strike="noStrike">
+                        <a:solidFill>
+                          <a:srgbClr val="000000"/>
+                        </a:solidFill>
+                        <a:effectLst/>
+                        <a:latin typeface="Calibri" panose="020F0502020204030204" pitchFamily="34" charset="0"/>
+                      </a:endParaRPr>
+                    </a:p>
+                  </a:txBody>
+                  <a:tcPr marL="9525" marR="9525" marT="9525" marB="0" anchor="b"/>
+                </a:tc>
+                <a:tc>
+                  <a:txBody>
+                    <a:bodyPr/>
+                    <a:lstStyle/>
+                    <a:p>
+                      <a:pPr algn="l" fontAlgn="b"/>
+                      <a:endParaRPr lang="de-DE" sz="1100" b="0" i="0" u="none" strike="noStrike">
+                        <a:solidFill>
+                          <a:srgbClr val="000000"/>
+                        </a:solidFill>
+                        <a:effectLst/>
+                        <a:latin typeface="Calibri" panose="020F0502020204030204" pitchFamily="34" charset="0"/>
+                      </a:endParaRPr>
+                    </a:p>
+                  </a:txBody>
+                  <a:tcPr marL="9525" marR="9525" marT="9525" marB="0" anchor="b"/>
+                </a:tc>
+                <a:tc>
+                  <a:txBody>
+                    <a:bodyPr/>
+                    <a:lstStyle/>
+                    <a:p>
+                      <a:pPr algn="l" fontAlgn="b"/>
+                      <a:endParaRPr lang="de-DE" sz="1100" b="0" i="0" u="none" strike="noStrike">
+                        <a:solidFill>
+                          <a:srgbClr val="000000"/>
+                        </a:solidFill>
+                        <a:effectLst/>
+                        <a:latin typeface="Calibri" panose="020F0502020204030204" pitchFamily="34" charset="0"/>
+                      </a:endParaRPr>
+                    </a:p>
+                  </a:txBody>
+                  <a:tcPr marL="9525" marR="9525" marT="9525" marB="0" anchor="b"/>
+                </a:tc>
+                <a:tc>
+                  <a:txBody>
+                    <a:bodyPr/>
+                    <a:lstStyle/>
+                    <a:p>
+                      <a:pPr algn="r" fontAlgn="b"/>
+                      <a:r>
+                        <a:rPr lang="de-DE" sz="1100" u="none" strike="noStrike">
+                          <a:effectLst/>
+                        </a:rPr>
+                        <a:t>10.12.2019</a:t>
+                      </a:r>
+                      <a:endParaRPr lang="de-DE" sz="1100" b="0" i="0" u="none" strike="noStrike">
+                        <a:solidFill>
+                          <a:srgbClr val="000000"/>
+                        </a:solidFill>
+                        <a:effectLst/>
+                        <a:latin typeface="Calibri" panose="020F0502020204030204" pitchFamily="34" charset="0"/>
+                      </a:endParaRPr>
+                    </a:p>
+                  </a:txBody>
+                  <a:tcPr marL="9525" marR="9525" marT="9525" marB="0" anchor="b"/>
+                </a:tc>
+                <a:tc>
+                  <a:txBody>
+                    <a:bodyPr/>
+                    <a:lstStyle/>
+                    <a:p>
+                      <a:pPr algn="r" fontAlgn="b"/>
+                      <a:r>
+                        <a:rPr lang="de-DE" sz="1100" u="none" strike="noStrike">
+                          <a:effectLst/>
+                        </a:rPr>
+                        <a:t>07.01.2020</a:t>
+                      </a:r>
+                      <a:endParaRPr lang="de-DE" sz="1100" b="0" i="0" u="none" strike="noStrike">
+                        <a:solidFill>
+                          <a:srgbClr val="000000"/>
+                        </a:solidFill>
+                        <a:effectLst/>
+                        <a:latin typeface="Calibri" panose="020F0502020204030204" pitchFamily="34" charset="0"/>
+                      </a:endParaRPr>
+                    </a:p>
+                  </a:txBody>
+                  <a:tcPr marL="9525" marR="9525" marT="9525" marB="0" anchor="b"/>
+                </a:tc>
+                <a:tc>
+                  <a:txBody>
+                    <a:bodyPr/>
+                    <a:lstStyle/>
+                    <a:p>
+                      <a:pPr algn="l" fontAlgn="b"/>
+                      <a:r>
+                        <a:rPr lang="de-DE" sz="1100" u="none" strike="noStrike">
+                          <a:effectLst/>
+                        </a:rPr>
+                        <a:t>TeilTest-Dash</a:t>
+                      </a:r>
+                      <a:endParaRPr lang="de-DE" sz="1100" b="0" i="0" u="none" strike="noStrike">
+                        <a:solidFill>
+                          <a:srgbClr val="000000"/>
+                        </a:solidFill>
+                        <a:effectLst/>
+                        <a:latin typeface="Calibri" panose="020F0502020204030204" pitchFamily="34" charset="0"/>
+                      </a:endParaRPr>
+                    </a:p>
+                  </a:txBody>
+                  <a:tcPr marL="9525" marR="9525" marT="9525" marB="0" anchor="b"/>
+                </a:tc>
+                <a:tc>
+                  <a:txBody>
+                    <a:bodyPr/>
+                    <a:lstStyle/>
+                    <a:p>
+                      <a:pPr algn="l" fontAlgn="b"/>
+                      <a:r>
+                        <a:rPr lang="de-DE" sz="1100" u="none" strike="noStrike">
+                          <a:effectLst/>
+                        </a:rPr>
+                        <a:t>Dash</a:t>
+                      </a:r>
+                      <a:endParaRPr lang="de-DE" sz="1100" b="0" i="0" u="none" strike="noStrike">
+                        <a:solidFill>
+                          <a:srgbClr val="000000"/>
+                        </a:solidFill>
+                        <a:effectLst/>
+                        <a:latin typeface="Calibri" panose="020F0502020204030204" pitchFamily="34" charset="0"/>
+                      </a:endParaRPr>
+                    </a:p>
+                  </a:txBody>
+                  <a:tcPr marL="9525" marR="9525" marT="9525" marB="0" anchor="b"/>
+                </a:tc>
+                <a:extLst>
+                  <a:ext uri="{0D108BD9-81ED-4DB2-BD59-A6C34878D82A}">
+                    <a16:rowId xmlns:a16="http://schemas.microsoft.com/office/drawing/2014/main" val="524636073"/>
+                  </a:ext>
+                </a:extLst>
+              </a:tr>
+              <a:tr h="257586">
+                <a:tc>
+                  <a:txBody>
+                    <a:bodyPr/>
+                    <a:lstStyle/>
+                    <a:p>
+                      <a:pPr algn="l" fontAlgn="b"/>
+                      <a:endParaRPr lang="de-DE" sz="1100" b="0" i="0" u="none" strike="noStrike">
+                        <a:solidFill>
+                          <a:srgbClr val="000000"/>
+                        </a:solidFill>
+                        <a:effectLst/>
+                        <a:latin typeface="Calibri" panose="020F0502020204030204" pitchFamily="34" charset="0"/>
+                      </a:endParaRPr>
+                    </a:p>
+                  </a:txBody>
+                  <a:tcPr marL="9525" marR="9525" marT="9525" marB="0" anchor="b"/>
+                </a:tc>
+                <a:tc>
+                  <a:txBody>
+                    <a:bodyPr/>
+                    <a:lstStyle/>
+                    <a:p>
+                      <a:pPr algn="l" fontAlgn="b"/>
+                      <a:endParaRPr lang="de-DE" sz="1100" b="0" i="0" u="none" strike="noStrike">
+                        <a:solidFill>
+                          <a:srgbClr val="000000"/>
+                        </a:solidFill>
+                        <a:effectLst/>
+                        <a:latin typeface="Calibri" panose="020F0502020204030204" pitchFamily="34" charset="0"/>
+                      </a:endParaRPr>
+                    </a:p>
+                  </a:txBody>
+                  <a:tcPr marL="9525" marR="9525" marT="9525" marB="0" anchor="b"/>
+                </a:tc>
+                <a:tc>
+                  <a:txBody>
+                    <a:bodyPr/>
+                    <a:lstStyle/>
+                    <a:p>
+                      <a:pPr algn="l" fontAlgn="b"/>
+                      <a:endParaRPr lang="de-DE" sz="1100" b="0" i="0" u="none" strike="noStrike">
+                        <a:solidFill>
+                          <a:srgbClr val="000000"/>
+                        </a:solidFill>
+                        <a:effectLst/>
+                        <a:latin typeface="Calibri" panose="020F0502020204030204" pitchFamily="34" charset="0"/>
+                      </a:endParaRPr>
+                    </a:p>
+                  </a:txBody>
+                  <a:tcPr marL="9525" marR="9525" marT="9525" marB="0" anchor="b"/>
+                </a:tc>
+                <a:tc>
+                  <a:txBody>
+                    <a:bodyPr/>
+                    <a:lstStyle/>
+                    <a:p>
+                      <a:pPr algn="l" fontAlgn="b"/>
+                      <a:endParaRPr lang="de-DE" sz="1100" b="0" i="0" u="none" strike="noStrike">
+                        <a:solidFill>
+                          <a:srgbClr val="000000"/>
+                        </a:solidFill>
+                        <a:effectLst/>
+                        <a:latin typeface="Calibri" panose="020F0502020204030204" pitchFamily="34" charset="0"/>
+                      </a:endParaRPr>
+                    </a:p>
+                  </a:txBody>
+                  <a:tcPr marL="9525" marR="9525" marT="9525" marB="0" anchor="b"/>
+                </a:tc>
+                <a:tc>
+                  <a:txBody>
+                    <a:bodyPr/>
+                    <a:lstStyle/>
+                    <a:p>
+                      <a:pPr algn="r" fontAlgn="b"/>
+                      <a:r>
+                        <a:rPr lang="de-DE" sz="1100" u="none" strike="noStrike">
+                          <a:effectLst/>
+                        </a:rPr>
+                        <a:t>26.11.2019</a:t>
+                      </a:r>
+                      <a:endParaRPr lang="de-DE" sz="1100" b="0" i="0" u="none" strike="noStrike">
+                        <a:solidFill>
+                          <a:srgbClr val="000000"/>
+                        </a:solidFill>
+                        <a:effectLst/>
+                        <a:latin typeface="Calibri" panose="020F0502020204030204" pitchFamily="34" charset="0"/>
+                      </a:endParaRPr>
+                    </a:p>
+                  </a:txBody>
+                  <a:tcPr marL="9525" marR="9525" marT="9525" marB="0" anchor="b"/>
+                </a:tc>
+                <a:tc>
+                  <a:txBody>
+                    <a:bodyPr/>
+                    <a:lstStyle/>
+                    <a:p>
+                      <a:pPr algn="r" fontAlgn="b"/>
+                      <a:r>
+                        <a:rPr lang="de-DE" sz="1100" u="none" strike="noStrike">
+                          <a:effectLst/>
+                        </a:rPr>
+                        <a:t>10.12.2019</a:t>
+                      </a:r>
+                      <a:endParaRPr lang="de-DE" sz="1100" b="0" i="0" u="none" strike="noStrike">
+                        <a:solidFill>
+                          <a:srgbClr val="000000"/>
+                        </a:solidFill>
+                        <a:effectLst/>
+                        <a:latin typeface="Calibri" panose="020F0502020204030204" pitchFamily="34" charset="0"/>
+                      </a:endParaRPr>
+                    </a:p>
+                  </a:txBody>
+                  <a:tcPr marL="9525" marR="9525" marT="9525" marB="0" anchor="b"/>
+                </a:tc>
+                <a:tc>
+                  <a:txBody>
+                    <a:bodyPr/>
+                    <a:lstStyle/>
+                    <a:p>
+                      <a:pPr algn="l" fontAlgn="b"/>
+                      <a:r>
+                        <a:rPr lang="de-DE" sz="1100" u="none" strike="noStrike">
+                          <a:effectLst/>
+                        </a:rPr>
+                        <a:t>TeilTest-MQTT</a:t>
+                      </a:r>
+                      <a:endParaRPr lang="de-DE" sz="1100" b="0" i="0" u="none" strike="noStrike">
+                        <a:solidFill>
+                          <a:srgbClr val="000000"/>
+                        </a:solidFill>
+                        <a:effectLst/>
+                        <a:latin typeface="Calibri" panose="020F0502020204030204" pitchFamily="34" charset="0"/>
+                      </a:endParaRPr>
+                    </a:p>
+                  </a:txBody>
+                  <a:tcPr marL="9525" marR="9525" marT="9525" marB="0" anchor="b"/>
+                </a:tc>
+                <a:tc>
+                  <a:txBody>
+                    <a:bodyPr/>
+                    <a:lstStyle/>
+                    <a:p>
+                      <a:pPr algn="l" fontAlgn="b"/>
+                      <a:r>
+                        <a:rPr lang="de-DE" sz="1100" u="none" strike="noStrike">
+                          <a:effectLst/>
+                        </a:rPr>
+                        <a:t>MQTT</a:t>
+                      </a:r>
+                      <a:endParaRPr lang="de-DE" sz="1100" b="0" i="0" u="none" strike="noStrike">
+                        <a:solidFill>
+                          <a:srgbClr val="000000"/>
+                        </a:solidFill>
+                        <a:effectLst/>
+                        <a:latin typeface="Calibri" panose="020F0502020204030204" pitchFamily="34" charset="0"/>
+                      </a:endParaRPr>
+                    </a:p>
+                  </a:txBody>
+                  <a:tcPr marL="9525" marR="9525" marT="9525" marB="0" anchor="b"/>
+                </a:tc>
+                <a:extLst>
+                  <a:ext uri="{0D108BD9-81ED-4DB2-BD59-A6C34878D82A}">
+                    <a16:rowId xmlns:a16="http://schemas.microsoft.com/office/drawing/2014/main" val="1435592435"/>
+                  </a:ext>
+                </a:extLst>
+              </a:tr>
+              <a:tr h="466231">
+                <a:tc>
+                  <a:txBody>
+                    <a:bodyPr/>
+                    <a:lstStyle/>
+                    <a:p>
+                      <a:pPr algn="l" fontAlgn="b"/>
+                      <a:endParaRPr lang="de-DE" sz="1100" b="0" i="0" u="none" strike="noStrike">
+                        <a:solidFill>
+                          <a:srgbClr val="000000"/>
+                        </a:solidFill>
+                        <a:effectLst/>
+                        <a:latin typeface="Calibri" panose="020F0502020204030204" pitchFamily="34" charset="0"/>
+                      </a:endParaRPr>
+                    </a:p>
+                  </a:txBody>
+                  <a:tcPr marL="9525" marR="9525" marT="9525" marB="0" anchor="b"/>
+                </a:tc>
+                <a:tc>
+                  <a:txBody>
+                    <a:bodyPr/>
+                    <a:lstStyle/>
+                    <a:p>
+                      <a:pPr algn="l" fontAlgn="b"/>
+                      <a:endParaRPr lang="de-DE" sz="1100" b="0" i="0" u="none" strike="noStrike">
+                        <a:solidFill>
+                          <a:srgbClr val="000000"/>
+                        </a:solidFill>
+                        <a:effectLst/>
+                        <a:latin typeface="Calibri" panose="020F0502020204030204" pitchFamily="34" charset="0"/>
+                      </a:endParaRPr>
+                    </a:p>
+                  </a:txBody>
+                  <a:tcPr marL="9525" marR="9525" marT="9525" marB="0" anchor="b"/>
+                </a:tc>
+                <a:tc>
+                  <a:txBody>
+                    <a:bodyPr/>
+                    <a:lstStyle/>
+                    <a:p>
+                      <a:pPr algn="l" fontAlgn="b"/>
+                      <a:endParaRPr lang="de-DE" sz="1100" b="0" i="0" u="none" strike="noStrike">
+                        <a:solidFill>
+                          <a:srgbClr val="000000"/>
+                        </a:solidFill>
+                        <a:effectLst/>
+                        <a:latin typeface="Calibri" panose="020F0502020204030204" pitchFamily="34" charset="0"/>
+                      </a:endParaRPr>
+                    </a:p>
+                  </a:txBody>
+                  <a:tcPr marL="9525" marR="9525" marT="9525" marB="0" anchor="b"/>
+                </a:tc>
+                <a:tc>
+                  <a:txBody>
+                    <a:bodyPr/>
+                    <a:lstStyle/>
+                    <a:p>
+                      <a:pPr algn="l" fontAlgn="b"/>
+                      <a:endParaRPr lang="de-DE" sz="1100" b="0" i="0" u="none" strike="noStrike">
+                        <a:solidFill>
+                          <a:srgbClr val="000000"/>
+                        </a:solidFill>
+                        <a:effectLst/>
+                        <a:latin typeface="Calibri" panose="020F0502020204030204" pitchFamily="34" charset="0"/>
+                      </a:endParaRPr>
+                    </a:p>
+                  </a:txBody>
+                  <a:tcPr marL="9525" marR="9525" marT="9525" marB="0" anchor="b"/>
+                </a:tc>
+                <a:tc>
+                  <a:txBody>
+                    <a:bodyPr/>
+                    <a:lstStyle/>
+                    <a:p>
+                      <a:pPr algn="r" fontAlgn="b"/>
+                      <a:r>
+                        <a:rPr lang="de-DE" sz="1100" u="none" strike="noStrike">
+                          <a:effectLst/>
+                        </a:rPr>
+                        <a:t>10.12.2019</a:t>
+                      </a:r>
+                      <a:endParaRPr lang="de-DE" sz="1100" b="0" i="0" u="none" strike="noStrike">
+                        <a:solidFill>
+                          <a:srgbClr val="000000"/>
+                        </a:solidFill>
+                        <a:effectLst/>
+                        <a:latin typeface="Calibri" panose="020F0502020204030204" pitchFamily="34" charset="0"/>
+                      </a:endParaRPr>
+                    </a:p>
+                  </a:txBody>
+                  <a:tcPr marL="9525" marR="9525" marT="9525" marB="0" anchor="b"/>
+                </a:tc>
+                <a:tc>
+                  <a:txBody>
+                    <a:bodyPr/>
+                    <a:lstStyle/>
+                    <a:p>
+                      <a:pPr algn="r" fontAlgn="b"/>
+                      <a:r>
+                        <a:rPr lang="de-DE" sz="1100" u="none" strike="noStrike">
+                          <a:effectLst/>
+                        </a:rPr>
+                        <a:t>17.12.2019</a:t>
+                      </a:r>
+                      <a:endParaRPr lang="de-DE" sz="1100" b="0" i="0" u="none" strike="noStrike">
+                        <a:solidFill>
+                          <a:srgbClr val="000000"/>
+                        </a:solidFill>
+                        <a:effectLst/>
+                        <a:latin typeface="Calibri" panose="020F0502020204030204" pitchFamily="34" charset="0"/>
+                      </a:endParaRPr>
+                    </a:p>
+                  </a:txBody>
+                  <a:tcPr marL="9525" marR="9525" marT="9525" marB="0" anchor="b"/>
+                </a:tc>
+                <a:tc>
+                  <a:txBody>
+                    <a:bodyPr/>
+                    <a:lstStyle/>
+                    <a:p>
+                      <a:pPr algn="l" fontAlgn="b"/>
+                      <a:r>
+                        <a:rPr lang="de-DE" sz="1100" u="none" strike="noStrike">
+                          <a:effectLst/>
+                        </a:rPr>
+                        <a:t>TeilTest-Schnitt-Pflanzen</a:t>
+                      </a:r>
+                      <a:endParaRPr lang="de-DE" sz="1100" b="0" i="0" u="none" strike="noStrike">
+                        <a:solidFill>
+                          <a:srgbClr val="000000"/>
+                        </a:solidFill>
+                        <a:effectLst/>
+                        <a:latin typeface="Calibri" panose="020F0502020204030204" pitchFamily="34" charset="0"/>
+                      </a:endParaRPr>
+                    </a:p>
+                  </a:txBody>
+                  <a:tcPr marL="9525" marR="9525" marT="9525" marB="0" anchor="b"/>
+                </a:tc>
+                <a:tc>
+                  <a:txBody>
+                    <a:bodyPr/>
+                    <a:lstStyle/>
+                    <a:p>
+                      <a:pPr algn="l" fontAlgn="b"/>
+                      <a:r>
+                        <a:rPr lang="de-DE" sz="1100" u="none" strike="noStrike">
+                          <a:effectLst/>
+                        </a:rPr>
+                        <a:t>Schnitt-Pflanzen</a:t>
+                      </a:r>
+                      <a:endParaRPr lang="de-DE" sz="1100" b="0" i="0" u="none" strike="noStrike">
+                        <a:solidFill>
+                          <a:srgbClr val="000000"/>
+                        </a:solidFill>
+                        <a:effectLst/>
+                        <a:latin typeface="Calibri" panose="020F0502020204030204" pitchFamily="34" charset="0"/>
+                      </a:endParaRPr>
+                    </a:p>
+                  </a:txBody>
+                  <a:tcPr marL="9525" marR="9525" marT="9525" marB="0" anchor="b"/>
+                </a:tc>
+                <a:extLst>
+                  <a:ext uri="{0D108BD9-81ED-4DB2-BD59-A6C34878D82A}">
+                    <a16:rowId xmlns:a16="http://schemas.microsoft.com/office/drawing/2014/main" val="1362266532"/>
+                  </a:ext>
+                </a:extLst>
+              </a:tr>
+              <a:tr h="466231">
+                <a:tc>
+                  <a:txBody>
+                    <a:bodyPr/>
+                    <a:lstStyle/>
+                    <a:p>
+                      <a:pPr algn="l" fontAlgn="b"/>
+                      <a:endParaRPr lang="de-DE" sz="1100" b="0" i="0" u="none" strike="noStrike">
+                        <a:solidFill>
+                          <a:srgbClr val="000000"/>
+                        </a:solidFill>
+                        <a:effectLst/>
+                        <a:latin typeface="Calibri" panose="020F0502020204030204" pitchFamily="34" charset="0"/>
+                      </a:endParaRPr>
+                    </a:p>
+                  </a:txBody>
+                  <a:tcPr marL="9525" marR="9525" marT="9525" marB="0" anchor="b"/>
+                </a:tc>
+                <a:tc>
+                  <a:txBody>
+                    <a:bodyPr/>
+                    <a:lstStyle/>
+                    <a:p>
+                      <a:pPr algn="l" fontAlgn="b"/>
+                      <a:endParaRPr lang="de-DE" sz="1100" b="0" i="0" u="none" strike="noStrike">
+                        <a:solidFill>
+                          <a:srgbClr val="000000"/>
+                        </a:solidFill>
+                        <a:effectLst/>
+                        <a:latin typeface="Calibri" panose="020F0502020204030204" pitchFamily="34" charset="0"/>
+                      </a:endParaRPr>
+                    </a:p>
+                  </a:txBody>
+                  <a:tcPr marL="9525" marR="9525" marT="9525" marB="0" anchor="b"/>
+                </a:tc>
+                <a:tc>
+                  <a:txBody>
+                    <a:bodyPr/>
+                    <a:lstStyle/>
+                    <a:p>
+                      <a:pPr algn="l" fontAlgn="b"/>
+                      <a:endParaRPr lang="de-DE" sz="1100" b="0" i="0" u="none" strike="noStrike">
+                        <a:solidFill>
+                          <a:srgbClr val="000000"/>
+                        </a:solidFill>
+                        <a:effectLst/>
+                        <a:latin typeface="Calibri" panose="020F0502020204030204" pitchFamily="34" charset="0"/>
+                      </a:endParaRPr>
+                    </a:p>
+                  </a:txBody>
+                  <a:tcPr marL="9525" marR="9525" marT="9525" marB="0" anchor="b"/>
+                </a:tc>
+                <a:tc>
+                  <a:txBody>
+                    <a:bodyPr/>
+                    <a:lstStyle/>
+                    <a:p>
+                      <a:pPr algn="l" fontAlgn="b"/>
+                      <a:endParaRPr lang="de-DE" sz="1100" b="0" i="0" u="none" strike="noStrike">
+                        <a:solidFill>
+                          <a:srgbClr val="000000"/>
+                        </a:solidFill>
+                        <a:effectLst/>
+                        <a:latin typeface="Calibri" panose="020F0502020204030204" pitchFamily="34" charset="0"/>
+                      </a:endParaRPr>
+                    </a:p>
+                  </a:txBody>
+                  <a:tcPr marL="9525" marR="9525" marT="9525" marB="0" anchor="b"/>
+                </a:tc>
+                <a:tc>
+                  <a:txBody>
+                    <a:bodyPr/>
+                    <a:lstStyle/>
+                    <a:p>
+                      <a:pPr algn="r" fontAlgn="b"/>
+                      <a:r>
+                        <a:rPr lang="de-DE" sz="1100" u="none" strike="noStrike">
+                          <a:effectLst/>
+                        </a:rPr>
+                        <a:t>17.12.2019</a:t>
+                      </a:r>
+                      <a:endParaRPr lang="de-DE" sz="1100" b="0" i="0" u="none" strike="noStrike">
+                        <a:solidFill>
+                          <a:srgbClr val="000000"/>
+                        </a:solidFill>
+                        <a:effectLst/>
+                        <a:latin typeface="Calibri" panose="020F0502020204030204" pitchFamily="34" charset="0"/>
+                      </a:endParaRPr>
+                    </a:p>
+                  </a:txBody>
+                  <a:tcPr marL="9525" marR="9525" marT="9525" marB="0" anchor="b"/>
+                </a:tc>
+                <a:tc>
+                  <a:txBody>
+                    <a:bodyPr/>
+                    <a:lstStyle/>
+                    <a:p>
+                      <a:pPr algn="r" fontAlgn="b"/>
+                      <a:r>
+                        <a:rPr lang="de-DE" sz="1100" u="none" strike="noStrike">
+                          <a:effectLst/>
+                        </a:rPr>
+                        <a:t>07.01.2020</a:t>
+                      </a:r>
+                      <a:endParaRPr lang="de-DE" sz="1100" b="0" i="0" u="none" strike="noStrike">
+                        <a:solidFill>
+                          <a:srgbClr val="000000"/>
+                        </a:solidFill>
+                        <a:effectLst/>
+                        <a:latin typeface="Calibri" panose="020F0502020204030204" pitchFamily="34" charset="0"/>
+                      </a:endParaRPr>
+                    </a:p>
+                  </a:txBody>
+                  <a:tcPr marL="9525" marR="9525" marT="9525" marB="0" anchor="b"/>
+                </a:tc>
+                <a:tc>
+                  <a:txBody>
+                    <a:bodyPr/>
+                    <a:lstStyle/>
+                    <a:p>
+                      <a:pPr algn="l" fontAlgn="b"/>
+                      <a:r>
+                        <a:rPr lang="de-DE" sz="1100" u="none" strike="noStrike">
+                          <a:effectLst/>
+                        </a:rPr>
+                        <a:t>TeilTest-Schnitt-Monitoring</a:t>
+                      </a:r>
+                      <a:endParaRPr lang="de-DE" sz="1100" b="0" i="0" u="none" strike="noStrike">
+                        <a:solidFill>
+                          <a:srgbClr val="000000"/>
+                        </a:solidFill>
+                        <a:effectLst/>
+                        <a:latin typeface="Calibri" panose="020F0502020204030204" pitchFamily="34" charset="0"/>
+                      </a:endParaRPr>
+                    </a:p>
+                  </a:txBody>
+                  <a:tcPr marL="9525" marR="9525" marT="9525" marB="0" anchor="b"/>
+                </a:tc>
+                <a:tc>
+                  <a:txBody>
+                    <a:bodyPr/>
+                    <a:lstStyle/>
+                    <a:p>
+                      <a:pPr algn="l" fontAlgn="b"/>
+                      <a:r>
+                        <a:rPr lang="de-DE" sz="1100" u="none" strike="noStrike">
+                          <a:effectLst/>
+                        </a:rPr>
+                        <a:t>Schnitt-Monitoring</a:t>
+                      </a:r>
+                      <a:endParaRPr lang="de-DE" sz="1100" b="0" i="0" u="none" strike="noStrike">
+                        <a:solidFill>
+                          <a:srgbClr val="000000"/>
+                        </a:solidFill>
+                        <a:effectLst/>
+                        <a:latin typeface="Calibri" panose="020F0502020204030204" pitchFamily="34" charset="0"/>
+                      </a:endParaRPr>
+                    </a:p>
+                  </a:txBody>
+                  <a:tcPr marL="9525" marR="9525" marT="9525" marB="0" anchor="b"/>
+                </a:tc>
+                <a:extLst>
+                  <a:ext uri="{0D108BD9-81ED-4DB2-BD59-A6C34878D82A}">
+                    <a16:rowId xmlns:a16="http://schemas.microsoft.com/office/drawing/2014/main" val="1473678436"/>
+                  </a:ext>
+                </a:extLst>
+              </a:tr>
+              <a:tr h="257586">
+                <a:tc>
+                  <a:txBody>
+                    <a:bodyPr/>
+                    <a:lstStyle/>
+                    <a:p>
+                      <a:pPr algn="l" fontAlgn="b"/>
+                      <a:endParaRPr lang="de-DE" sz="1100" b="0" i="0" u="none" strike="noStrike">
+                        <a:solidFill>
+                          <a:srgbClr val="000000"/>
+                        </a:solidFill>
+                        <a:effectLst/>
+                        <a:latin typeface="Calibri" panose="020F0502020204030204" pitchFamily="34" charset="0"/>
+                      </a:endParaRPr>
+                    </a:p>
+                  </a:txBody>
+                  <a:tcPr marL="9525" marR="9525" marT="9525" marB="0" anchor="b"/>
+                </a:tc>
+                <a:tc>
+                  <a:txBody>
+                    <a:bodyPr/>
+                    <a:lstStyle/>
+                    <a:p>
+                      <a:pPr algn="l" fontAlgn="b"/>
+                      <a:endParaRPr lang="de-DE" sz="1100" b="0" i="0" u="none" strike="noStrike">
+                        <a:solidFill>
+                          <a:srgbClr val="000000"/>
+                        </a:solidFill>
+                        <a:effectLst/>
+                        <a:latin typeface="Calibri" panose="020F0502020204030204" pitchFamily="34" charset="0"/>
+                      </a:endParaRPr>
+                    </a:p>
+                  </a:txBody>
+                  <a:tcPr marL="9525" marR="9525" marT="9525" marB="0" anchor="b"/>
+                </a:tc>
+                <a:tc>
+                  <a:txBody>
+                    <a:bodyPr/>
+                    <a:lstStyle/>
+                    <a:p>
+                      <a:pPr algn="l" fontAlgn="b"/>
+                      <a:endParaRPr lang="de-DE" sz="1100" b="0" i="0" u="none" strike="noStrike">
+                        <a:solidFill>
+                          <a:srgbClr val="000000"/>
+                        </a:solidFill>
+                        <a:effectLst/>
+                        <a:latin typeface="Calibri" panose="020F0502020204030204" pitchFamily="34" charset="0"/>
+                      </a:endParaRPr>
+                    </a:p>
+                  </a:txBody>
+                  <a:tcPr marL="9525" marR="9525" marT="9525" marB="0" anchor="b"/>
+                </a:tc>
+                <a:tc>
+                  <a:txBody>
+                    <a:bodyPr/>
+                    <a:lstStyle/>
+                    <a:p>
+                      <a:pPr algn="l" fontAlgn="b"/>
+                      <a:endParaRPr lang="de-DE" sz="1100" b="0" i="0" u="none" strike="noStrike">
+                        <a:solidFill>
+                          <a:srgbClr val="000000"/>
+                        </a:solidFill>
+                        <a:effectLst/>
+                        <a:latin typeface="Calibri" panose="020F0502020204030204" pitchFamily="34" charset="0"/>
+                      </a:endParaRPr>
+                    </a:p>
+                  </a:txBody>
+                  <a:tcPr marL="9525" marR="9525" marT="9525" marB="0" anchor="b"/>
+                </a:tc>
+                <a:tc>
+                  <a:txBody>
+                    <a:bodyPr/>
+                    <a:lstStyle/>
+                    <a:p>
+                      <a:pPr algn="r" fontAlgn="b"/>
+                      <a:r>
+                        <a:rPr lang="de-DE" sz="1100" u="none" strike="noStrike">
+                          <a:effectLst/>
+                        </a:rPr>
+                        <a:t>07.01.2020</a:t>
+                      </a:r>
+                      <a:endParaRPr lang="de-DE" sz="1100" b="0" i="0" u="none" strike="noStrike">
+                        <a:solidFill>
+                          <a:srgbClr val="000000"/>
+                        </a:solidFill>
+                        <a:effectLst/>
+                        <a:latin typeface="Calibri" panose="020F0502020204030204" pitchFamily="34" charset="0"/>
+                      </a:endParaRPr>
+                    </a:p>
+                  </a:txBody>
+                  <a:tcPr marL="9525" marR="9525" marT="9525" marB="0" anchor="b"/>
+                </a:tc>
+                <a:tc>
+                  <a:txBody>
+                    <a:bodyPr/>
+                    <a:lstStyle/>
+                    <a:p>
+                      <a:pPr algn="r" fontAlgn="b"/>
+                      <a:r>
+                        <a:rPr lang="de-DE" sz="1100" u="none" strike="noStrike">
+                          <a:effectLst/>
+                        </a:rPr>
+                        <a:t>21.01.2020</a:t>
+                      </a:r>
+                      <a:endParaRPr lang="de-DE" sz="1100" b="0" i="0" u="none" strike="noStrike">
+                        <a:solidFill>
+                          <a:srgbClr val="000000"/>
+                        </a:solidFill>
+                        <a:effectLst/>
+                        <a:latin typeface="Calibri" panose="020F0502020204030204" pitchFamily="34" charset="0"/>
+                      </a:endParaRPr>
+                    </a:p>
+                  </a:txBody>
+                  <a:tcPr marL="9525" marR="9525" marT="9525" marB="0" anchor="b"/>
+                </a:tc>
+                <a:tc>
+                  <a:txBody>
+                    <a:bodyPr/>
+                    <a:lstStyle/>
+                    <a:p>
+                      <a:pPr algn="l" fontAlgn="b"/>
+                      <a:r>
+                        <a:rPr lang="de-DE" sz="1100" u="none" strike="noStrike">
+                          <a:effectLst/>
+                        </a:rPr>
+                        <a:t>SysTest/Abnahme</a:t>
+                      </a:r>
+                      <a:endParaRPr lang="de-DE" sz="1100" b="0" i="0" u="none" strike="noStrike">
+                        <a:solidFill>
+                          <a:srgbClr val="000000"/>
+                        </a:solidFill>
+                        <a:effectLst/>
+                        <a:latin typeface="Calibri" panose="020F0502020204030204" pitchFamily="34" charset="0"/>
+                      </a:endParaRPr>
+                    </a:p>
+                  </a:txBody>
+                  <a:tcPr marL="9525" marR="9525" marT="9525" marB="0" anchor="b"/>
+                </a:tc>
+                <a:tc>
+                  <a:txBody>
+                    <a:bodyPr/>
+                    <a:lstStyle/>
+                    <a:p>
+                      <a:pPr algn="l" fontAlgn="b"/>
+                      <a:r>
+                        <a:rPr lang="de-DE" sz="1100" u="none" strike="noStrike" dirty="0">
+                          <a:effectLst/>
+                        </a:rPr>
+                        <a:t>von allem</a:t>
+                      </a:r>
+                      <a:endParaRPr lang="de-DE" sz="1100" b="0" i="0" u="none" strike="noStrike" dirty="0">
+                        <a:solidFill>
+                          <a:srgbClr val="000000"/>
+                        </a:solidFill>
+                        <a:effectLst/>
+                        <a:latin typeface="Calibri" panose="020F0502020204030204" pitchFamily="34" charset="0"/>
+                      </a:endParaRPr>
+                    </a:p>
+                  </a:txBody>
+                  <a:tcPr marL="9525" marR="9525" marT="9525" marB="0" anchor="b"/>
+                </a:tc>
+                <a:extLst>
+                  <a:ext uri="{0D108BD9-81ED-4DB2-BD59-A6C34878D82A}">
+                    <a16:rowId xmlns:a16="http://schemas.microsoft.com/office/drawing/2014/main" val="3077230180"/>
+                  </a:ext>
+                </a:extLst>
+              </a:tr>
+            </a:tbl>
+          </a:graphicData>
+        </a:graphic>
+      </p:graphicFrame>
     </p:spTree>
     <p:extLst>
       <p:ext uri="{BB962C8B-B14F-4D97-AF65-F5344CB8AC3E}">
-        <p14:creationId xmlns:p14="http://schemas.microsoft.com/office/powerpoint/2010/main" val="758388306"/>
+        <p14:creationId xmlns:p14="http://schemas.microsoft.com/office/powerpoint/2010/main" val="4020376945"/>
       </p:ext>
     </p:extLst>
   </p:cSld>
@@ -3532,7 +6252,7 @@
           <p:cNvPr id="2" name="Titel 1">
             <a:extLst>
               <a:ext uri="{FF2B5EF4-FFF2-40B4-BE49-F238E27FC236}">
-                <a16:creationId xmlns:a16="http://schemas.microsoft.com/office/drawing/2014/main" id="{CCCD46FC-9A01-47D6-BAC8-2D2E932072CF}"/>
+                <a16:creationId xmlns:a16="http://schemas.microsoft.com/office/drawing/2014/main" id="{64782AED-C01C-4FDA-89D6-BB6C01ED6A2E}"/>
               </a:ext>
             </a:extLst>
           </p:cNvPr>
@@ -3550,40 +6270,320 @@
           <a:p>
             <a:r>
               <a:rPr lang="de-DE" dirty="0"/>
-              <a:t>Gantt-Chart</a:t>
+              <a:t>Kostenplan</a:t>
             </a:r>
           </a:p>
         </p:txBody>
       </p:sp>
-      <p:sp>
-        <p:nvSpPr>
-          <p:cNvPr id="3" name="Inhaltsplatzhalter 2">
-            <a:extLst>
-              <a:ext uri="{FF2B5EF4-FFF2-40B4-BE49-F238E27FC236}">
-                <a16:creationId xmlns:a16="http://schemas.microsoft.com/office/drawing/2014/main" id="{0C113CFB-F00A-4CC7-BB2B-C835C0DE3A9E}"/>
-              </a:ext>
-            </a:extLst>
-          </p:cNvPr>
-          <p:cNvSpPr>
-            <a:spLocks noGrp="1"/>
-          </p:cNvSpPr>
+      <p:graphicFrame>
+        <p:nvGraphicFramePr>
+          <p:cNvPr id="4" name="Tabelle 3">
+            <a:extLst>
+              <a:ext uri="{FF2B5EF4-FFF2-40B4-BE49-F238E27FC236}">
+                <a16:creationId xmlns:a16="http://schemas.microsoft.com/office/drawing/2014/main" id="{F5FC5EB3-AED7-4CFB-9AD6-1E9ED7DD8B74}"/>
+              </a:ext>
+            </a:extLst>
+          </p:cNvPr>
+          <p:cNvGraphicFramePr>
+            <a:graphicFrameLocks noGrp="1"/>
+          </p:cNvGraphicFramePr>
           <p:nvPr>
-            <p:ph idx="1"/>
+            <p:extLst>
+              <p:ext uri="{D42A27DB-BD31-4B8C-83A1-F6EECF244321}">
+                <p14:modId xmlns:p14="http://schemas.microsoft.com/office/powerpoint/2010/main" val="3665056737"/>
+              </p:ext>
+            </p:extLst>
           </p:nvPr>
-        </p:nvSpPr>
-        <p:spPr/>
-        <p:txBody>
-          <a:bodyPr/>
-          <a:lstStyle/>
-          <a:p>
-            <a:endParaRPr lang="de-DE" dirty="0"/>
-          </a:p>
-        </p:txBody>
-      </p:sp>
+        </p:nvGraphicFramePr>
+        <p:xfrm>
+          <a:off x="838200" y="1595435"/>
+          <a:ext cx="9658350" cy="4390329"/>
+        </p:xfrm>
+        <a:graphic>
+          <a:graphicData uri="http://schemas.openxmlformats.org/drawingml/2006/table">
+            <a:tbl>
+              <a:tblPr firstRow="1" bandRow="1">
+                <a:tableStyleId>{5C22544A-7EE6-4342-B048-85BDC9FD1C3A}</a:tableStyleId>
+              </a:tblPr>
+              <a:tblGrid>
+                <a:gridCol w="3219450">
+                  <a:extLst>
+                    <a:ext uri="{9D8B030D-6E8A-4147-A177-3AD203B41FA5}">
+                      <a16:colId xmlns:a16="http://schemas.microsoft.com/office/drawing/2014/main" val="2823823705"/>
+                    </a:ext>
+                  </a:extLst>
+                </a:gridCol>
+                <a:gridCol w="3219450">
+                  <a:extLst>
+                    <a:ext uri="{9D8B030D-6E8A-4147-A177-3AD203B41FA5}">
+                      <a16:colId xmlns:a16="http://schemas.microsoft.com/office/drawing/2014/main" val="2983007004"/>
+                    </a:ext>
+                  </a:extLst>
+                </a:gridCol>
+                <a:gridCol w="3219450">
+                  <a:extLst>
+                    <a:ext uri="{9D8B030D-6E8A-4147-A177-3AD203B41FA5}">
+                      <a16:colId xmlns:a16="http://schemas.microsoft.com/office/drawing/2014/main" val="285467693"/>
+                    </a:ext>
+                  </a:extLst>
+                </a:gridCol>
+              </a:tblGrid>
+              <a:tr h="507111">
+                <a:tc>
+                  <a:txBody>
+                    <a:bodyPr/>
+                    <a:lstStyle/>
+                    <a:p>
+                      <a:r>
+                        <a:rPr lang="de-DE" dirty="0"/>
+                        <a:t>Beschreibung</a:t>
+                      </a:r>
+                    </a:p>
+                  </a:txBody>
+                  <a:tcPr/>
+                </a:tc>
+                <a:tc>
+                  <a:txBody>
+                    <a:bodyPr/>
+                    <a:lstStyle/>
+                    <a:p>
+                      <a:r>
+                        <a:rPr lang="de-DE" dirty="0"/>
+                        <a:t>Kosten</a:t>
+                      </a:r>
+                    </a:p>
+                  </a:txBody>
+                  <a:tcPr/>
+                </a:tc>
+                <a:tc>
+                  <a:txBody>
+                    <a:bodyPr/>
+                    <a:lstStyle/>
+                    <a:p>
+                      <a:r>
+                        <a:rPr lang="de-DE" dirty="0"/>
+                        <a:t>Kosten gesamt</a:t>
+                      </a:r>
+                    </a:p>
+                  </a:txBody>
+                  <a:tcPr/>
+                </a:tc>
+                <a:extLst>
+                  <a:ext uri="{0D108BD9-81ED-4DB2-BD59-A6C34878D82A}">
+                    <a16:rowId xmlns:a16="http://schemas.microsoft.com/office/drawing/2014/main" val="2430927546"/>
+                  </a:ext>
+                </a:extLst>
+              </a:tr>
+              <a:tr h="1250410">
+                <a:tc>
+                  <a:txBody>
+                    <a:bodyPr/>
+                    <a:lstStyle/>
+                    <a:p>
+                      <a:r>
+                        <a:rPr lang="de-DE" dirty="0"/>
+                        <a:t>Mitarbeiter</a:t>
+                      </a:r>
+                    </a:p>
+                  </a:txBody>
+                  <a:tcPr/>
+                </a:tc>
+                <a:tc>
+                  <a:txBody>
+                    <a:bodyPr/>
+                    <a:lstStyle/>
+                    <a:p>
+                      <a:r>
+                        <a:rPr lang="de-DE" dirty="0"/>
+                        <a:t>2 Monate * 4 MAs * 10 h/Woche *  5000€/pro Monat = 10 000€</a:t>
+                      </a:r>
+                    </a:p>
+                  </a:txBody>
+                  <a:tcPr/>
+                </a:tc>
+                <a:tc>
+                  <a:txBody>
+                    <a:bodyPr/>
+                    <a:lstStyle/>
+                    <a:p>
+                      <a:r>
+                        <a:rPr lang="de-DE" dirty="0"/>
+                        <a:t>10 000€</a:t>
+                      </a:r>
+                    </a:p>
+                  </a:txBody>
+                  <a:tcPr/>
+                </a:tc>
+                <a:extLst>
+                  <a:ext uri="{0D108BD9-81ED-4DB2-BD59-A6C34878D82A}">
+                    <a16:rowId xmlns:a16="http://schemas.microsoft.com/office/drawing/2014/main" val="334275446"/>
+                  </a:ext>
+                </a:extLst>
+              </a:tr>
+              <a:tr h="875287">
+                <a:tc>
+                  <a:txBody>
+                    <a:bodyPr/>
+                    <a:lstStyle/>
+                    <a:p>
+                      <a:r>
+                        <a:rPr lang="de-DE" dirty="0"/>
+                        <a:t>Hardware (SPS, Gateway, mobile Anzeigegeräte)</a:t>
+                      </a:r>
+                    </a:p>
+                  </a:txBody>
+                  <a:tcPr/>
+                </a:tc>
+                <a:tc>
+                  <a:txBody>
+                    <a:bodyPr/>
+                    <a:lstStyle/>
+                    <a:p>
+                      <a:r>
+                        <a:rPr lang="de-DE" dirty="0"/>
+                        <a:t>150 € + 200€ + 110€ * MA Anzahl + 50€ Sensoren/Aktoren</a:t>
+                      </a:r>
+                    </a:p>
+                  </a:txBody>
+                  <a:tcPr/>
+                </a:tc>
+                <a:tc>
+                  <a:txBody>
+                    <a:bodyPr/>
+                    <a:lstStyle/>
+                    <a:p>
+                      <a:r>
+                        <a:rPr lang="de-DE" dirty="0"/>
+                        <a:t>10 000€ + 1500€ = 11 500€</a:t>
+                      </a:r>
+                    </a:p>
+                  </a:txBody>
+                  <a:tcPr/>
+                </a:tc>
+                <a:extLst>
+                  <a:ext uri="{0D108BD9-81ED-4DB2-BD59-A6C34878D82A}">
+                    <a16:rowId xmlns:a16="http://schemas.microsoft.com/office/drawing/2014/main" val="1184967262"/>
+                  </a:ext>
+                </a:extLst>
+              </a:tr>
+              <a:tr h="1250410">
+                <a:tc>
+                  <a:txBody>
+                    <a:bodyPr/>
+                    <a:lstStyle/>
+                    <a:p>
+                      <a:r>
+                        <a:rPr lang="de-DE" dirty="0"/>
+                        <a:t>Lizenzkosten SAP</a:t>
+                      </a:r>
+                    </a:p>
+                  </a:txBody>
+                  <a:tcPr/>
+                </a:tc>
+                <a:tc>
+                  <a:txBody>
+                    <a:bodyPr/>
+                    <a:lstStyle/>
+                    <a:p>
+                      <a:r>
+                        <a:rPr lang="de-DE" dirty="0"/>
+                        <a:t>Professional User  = 2700€</a:t>
+                      </a:r>
+                    </a:p>
+                    <a:p>
+                      <a:r>
+                        <a:rPr lang="de-DE" dirty="0"/>
+                        <a:t>Limited User = 1400€</a:t>
+                      </a:r>
+                    </a:p>
+                    <a:p>
+                      <a:r>
+                        <a:rPr lang="de-DE" dirty="0"/>
+                        <a:t>Wartung + Support = 22% </a:t>
+                      </a:r>
+                    </a:p>
+                    <a:p>
+                      <a:r>
+                        <a:rPr lang="de-DE" dirty="0"/>
+                        <a:t>10 Limited User =  20 374€</a:t>
+                      </a:r>
+                    </a:p>
+                  </a:txBody>
+                  <a:tcPr/>
+                </a:tc>
+                <a:tc>
+                  <a:txBody>
+                    <a:bodyPr/>
+                    <a:lstStyle/>
+                    <a:p>
+                      <a:r>
+                        <a:rPr lang="de-DE" dirty="0"/>
+                        <a:t>11 500€ + 20 374€ = 31 874€</a:t>
+                      </a:r>
+                    </a:p>
+                  </a:txBody>
+                  <a:tcPr/>
+                </a:tc>
+                <a:extLst>
+                  <a:ext uri="{0D108BD9-81ED-4DB2-BD59-A6C34878D82A}">
+                    <a16:rowId xmlns:a16="http://schemas.microsoft.com/office/drawing/2014/main" val="4181657170"/>
+                  </a:ext>
+                </a:extLst>
+              </a:tr>
+              <a:tr h="507111">
+                <a:tc>
+                  <a:txBody>
+                    <a:bodyPr/>
+                    <a:lstStyle/>
+                    <a:p>
+                      <a:r>
+                        <a:rPr lang="de-DE" dirty="0"/>
+                        <a:t>Gewinnmarge</a:t>
+                      </a:r>
+                    </a:p>
+                  </a:txBody>
+                  <a:tcPr/>
+                </a:tc>
+                <a:tc>
+                  <a:txBody>
+                    <a:bodyPr/>
+                    <a:lstStyle/>
+                    <a:p>
+                      <a:r>
+                        <a:rPr lang="de-DE" dirty="0"/>
+                        <a:t>15 % *  31 874€  =  4781€</a:t>
+                      </a:r>
+                    </a:p>
+                  </a:txBody>
+                  <a:tcPr/>
+                </a:tc>
+                <a:tc>
+                  <a:txBody>
+                    <a:bodyPr/>
+                    <a:lstStyle/>
+                    <a:p>
+                      <a:r>
+                        <a:rPr lang="de-DE" dirty="0"/>
+                        <a:t>31 874€ + 4781€ = 36 655€</a:t>
+                      </a:r>
+                    </a:p>
+                  </a:txBody>
+                  <a:tcPr/>
+                </a:tc>
+                <a:extLst>
+                  <a:ext uri="{0D108BD9-81ED-4DB2-BD59-A6C34878D82A}">
+                    <a16:rowId xmlns:a16="http://schemas.microsoft.com/office/drawing/2014/main" val="949079146"/>
+                  </a:ext>
+                </a:extLst>
+              </a:tr>
+            </a:tbl>
+          </a:graphicData>
+        </a:graphic>
+      </p:graphicFrame>
     </p:spTree>
     <p:extLst>
       <p:ext uri="{BB962C8B-B14F-4D97-AF65-F5344CB8AC3E}">
-        <p14:creationId xmlns:p14="http://schemas.microsoft.com/office/powerpoint/2010/main" val="4020376945"/>
+        <p14:creationId xmlns:p14="http://schemas.microsoft.com/office/powerpoint/2010/main" val="1586088365"/>
       </p:ext>
     </p:extLst>
   </p:cSld>
@@ -3615,7 +6615,7 @@
           <p:cNvPr id="2" name="Titel 1">
             <a:extLst>
               <a:ext uri="{FF2B5EF4-FFF2-40B4-BE49-F238E27FC236}">
-                <a16:creationId xmlns:a16="http://schemas.microsoft.com/office/drawing/2014/main" id="{64782AED-C01C-4FDA-89D6-BB6C01ED6A2E}"/>
+                <a16:creationId xmlns:a16="http://schemas.microsoft.com/office/drawing/2014/main" id="{2721C069-BABD-4827-BD58-66B56371F492}"/>
               </a:ext>
             </a:extLst>
           </p:cNvPr>
@@ -3633,7 +6633,7 @@
           <a:p>
             <a:r>
               <a:rPr lang="de-DE" dirty="0"/>
-              <a:t>Kostenplan</a:t>
+              <a:t>Kosteneinsparungen/Gewinnsteigerung</a:t>
             </a:r>
           </a:p>
         </p:txBody>
@@ -3643,7 +6643,7 @@
           <p:cNvPr id="3" name="Inhaltsplatzhalter 2">
             <a:extLst>
               <a:ext uri="{FF2B5EF4-FFF2-40B4-BE49-F238E27FC236}">
-                <a16:creationId xmlns:a16="http://schemas.microsoft.com/office/drawing/2014/main" id="{122F56C8-E26B-4550-A9DD-280B050A9347}"/>
+                <a16:creationId xmlns:a16="http://schemas.microsoft.com/office/drawing/2014/main" id="{39500A13-64F0-48E2-920D-0DE07D2B3862}"/>
               </a:ext>
             </a:extLst>
           </p:cNvPr>
@@ -3656,34 +6656,70 @@
         </p:nvSpPr>
         <p:spPr/>
         <p:txBody>
-          <a:bodyPr/>
+          <a:bodyPr>
+            <a:normAutofit fontScale="85000" lnSpcReduction="10000"/>
+          </a:bodyPr>
           <a:lstStyle/>
           <a:p>
             <a:r>
               <a:rPr lang="de-DE" dirty="0"/>
-              <a:t>Annahme zum Gehalt und Arbeitsstunden unserer MAs</a:t>
-            </a:r>
-          </a:p>
-          <a:p>
-            <a:r>
+              <a:t>Senkung des Fehlproduktionsrisikos um 60% , daraus resultiert eine Gewinnsteigerung von 11%</a:t>
+            </a:r>
+            <a:br>
               <a:rPr lang="de-DE" dirty="0"/>
-              <a:t>Annahme zur Beschaffungskosten von Hardware (SPS, Gateway, mögl. RFID Sender/Empfänger, mögl. Geräte zum Anzeigen des Dashboards)</a:t>
-            </a:r>
-          </a:p>
-          <a:p>
+            </a:br>
             <a:r>
               <a:rPr lang="de-DE" dirty="0"/>
-              <a:t>Annahme zu Lizenzkosten (1 professional, 10 limited)</a:t>
-            </a:r>
-          </a:p>
-          <a:p>
-            <a:r>
+              <a:t>Beispielrechnung:</a:t>
+            </a:r>
+            <a:br>
               <a:rPr lang="de-DE" dirty="0"/>
-              <a:t>Annahme zu unserer Gewinnmarge (z.B. 18% ohne Lizenz)</a:t>
-            </a:r>
-          </a:p>
-          <a:p>
-            <a:endParaRPr lang="de-DE" dirty="0"/>
+            </a:br>
+            <a:r>
+              <a:rPr lang="de-DE" dirty="0"/>
+              <a:t>(1 – 0.15) * 10 000l * 0.065 €/l = 552.5€ </a:t>
+            </a:r>
+            <a:br>
+              <a:rPr lang="de-DE" dirty="0"/>
+            </a:br>
+            <a:r>
+              <a:rPr lang="de-DE" dirty="0"/>
+              <a:t>(1 – 0.05) * 10 000l * 0.065 €/l = 617.5€  =&gt; 65€ mehr Gewinn</a:t>
+            </a:r>
+          </a:p>
+          <a:p>
+            <a:r>
+              <a:rPr lang="de-DE" dirty="0"/>
+              <a:t>Aufgrund der erhöhten Qualität und dem sehr umkämpften niedrig Preis Sektor im Biermarkt ist ein Wachstum Ihres Marktanteils um 20% annehmbar</a:t>
+            </a:r>
+          </a:p>
+          <a:p>
+            <a:r>
+              <a:rPr lang="de-DE" dirty="0"/>
+              <a:t>Durch eine langfristig gefestigte Marktposition haben Sie bei Verhandlungen mit Zulieferern eine stärkere Position und können besser verhandeln</a:t>
+            </a:r>
+          </a:p>
+          <a:p>
+            <a:r>
+              <a:rPr lang="de-DE" dirty="0"/>
+              <a:t>Das digitale Grundgerüst eines ERP-Systems ermöglicht Ihnen weitere Investitionen in gewinnsteigende Maßnahmen wie Prozessoptimierung, </a:t>
+            </a:r>
+            <a:r>
+              <a:rPr lang="de-DE" dirty="0" err="1"/>
+              <a:t>Conditioning</a:t>
+            </a:r>
+            <a:r>
+              <a:rPr lang="de-DE" dirty="0"/>
+              <a:t> Monitoring, </a:t>
+            </a:r>
+            <a:r>
+              <a:rPr lang="de-DE" dirty="0" err="1"/>
+              <a:t>Predictive</a:t>
+            </a:r>
+            <a:r>
+              <a:rPr lang="de-DE" dirty="0"/>
+              <a:t> Maintenance oder weitere Automatisierungsschritte</a:t>
+            </a:r>
           </a:p>
           <a:p>
             <a:endParaRPr lang="de-DE" dirty="0"/>
@@ -3693,7 +6729,7 @@
     </p:spTree>
     <p:extLst>
       <p:ext uri="{BB962C8B-B14F-4D97-AF65-F5344CB8AC3E}">
-        <p14:creationId xmlns:p14="http://schemas.microsoft.com/office/powerpoint/2010/main" val="1586088365"/>
+        <p14:creationId xmlns:p14="http://schemas.microsoft.com/office/powerpoint/2010/main" val="1886582988"/>
       </p:ext>
     </p:extLst>
   </p:cSld>
@@ -3725,7 +6761,7 @@
           <p:cNvPr id="2" name="Titel 1">
             <a:extLst>
               <a:ext uri="{FF2B5EF4-FFF2-40B4-BE49-F238E27FC236}">
-                <a16:creationId xmlns:a16="http://schemas.microsoft.com/office/drawing/2014/main" id="{2721C069-BABD-4827-BD58-66B56371F492}"/>
+                <a16:creationId xmlns:a16="http://schemas.microsoft.com/office/drawing/2014/main" id="{87F17492-2A50-4136-954C-73B1F33E7351}"/>
               </a:ext>
             </a:extLst>
           </p:cNvPr>
@@ -3743,7 +6779,7 @@
           <a:p>
             <a:r>
               <a:rPr lang="de-DE" dirty="0"/>
-              <a:t>Kosteneinsparungen/Gewinnsteigerung</a:t>
+              <a:t>Quellen zu Annahmen</a:t>
             </a:r>
           </a:p>
         </p:txBody>
@@ -3753,7 +6789,7 @@
           <p:cNvPr id="3" name="Inhaltsplatzhalter 2">
             <a:extLst>
               <a:ext uri="{FF2B5EF4-FFF2-40B4-BE49-F238E27FC236}">
-                <a16:creationId xmlns:a16="http://schemas.microsoft.com/office/drawing/2014/main" id="{39500A13-64F0-48E2-920D-0DE07D2B3862}"/>
+                <a16:creationId xmlns:a16="http://schemas.microsoft.com/office/drawing/2014/main" id="{B5FCEED9-839D-4AA4-9B52-8815D23CDEE4}"/>
               </a:ext>
             </a:extLst>
           </p:cNvPr>
@@ -3766,54 +6802,78 @@
         </p:nvSpPr>
         <p:spPr/>
         <p:txBody>
-          <a:bodyPr/>
+          <a:bodyPr>
+            <a:normAutofit/>
+          </a:bodyPr>
           <a:lstStyle/>
           <a:p>
+            <a:pPr marL="0" indent="0">
+              <a:buNone/>
+            </a:pPr>
             <a:r>
               <a:rPr lang="de-DE" dirty="0"/>
-              <a:t>Annahme zur Fehlproduktion pro Bestellung davor und danach</a:t>
-            </a:r>
-          </a:p>
-          <a:p>
+              <a:t>Gehalt SAP Consulting:</a:t>
+            </a:r>
+            <a:endParaRPr lang="de-DE" dirty="0">
+              <a:hlinkClick r:id="rId2"/>
+            </a:endParaRPr>
+          </a:p>
+          <a:p>
+            <a:r>
+              <a:rPr lang="de-DE" dirty="0">
+                <a:hlinkClick r:id="rId2"/>
+              </a:rPr>
+              <a:t>https://www.absolventa.de/jobs/channel/sap-erp/thema/gehalt</a:t>
+            </a:r>
+            <a:endParaRPr lang="de-DE" dirty="0"/>
+          </a:p>
+          <a:p>
+            <a:r>
+              <a:rPr lang="de-DE" dirty="0">
+                <a:hlinkClick r:id="rId3"/>
+              </a:rPr>
+              <a:t>https://www.alphajump.de/karriereguide/gehalt/gehalt-sap-consultant</a:t>
+            </a:r>
+            <a:endParaRPr lang="de-DE" dirty="0"/>
+          </a:p>
+          <a:p>
+            <a:pPr marL="0" indent="0">
+              <a:buNone/>
+            </a:pPr>
             <a:r>
               <a:rPr lang="de-DE" dirty="0"/>
-              <a:t>Annahme zu Erhöhung des Marktanteils aufgrund höherer Qualität </a:t>
-            </a:r>
-            <a:br>
+              <a:t>Gewinnmarge bei IT-Consulting:</a:t>
+            </a:r>
+          </a:p>
+          <a:p>
+            <a:r>
+              <a:rPr lang="de-DE" dirty="0">
+                <a:hlinkClick r:id="rId4"/>
+              </a:rPr>
+              <a:t>https://www.gevestor.de/details/software-und-it-hohe-ebit-margen-im-branchenvergleich-753237.html</a:t>
+            </a:r>
+            <a:endParaRPr lang="de-DE" dirty="0"/>
+          </a:p>
+          <a:p>
+            <a:pPr marL="0" indent="0">
+              <a:buNone/>
+            </a:pPr>
+            <a:r>
               <a:rPr lang="de-DE" dirty="0"/>
-            </a:br>
-            <a:r>
-              <a:rPr lang="de-DE" dirty="0"/>
-              <a:t>-&gt; sehr umkämpfter Markt </a:t>
-            </a:r>
-          </a:p>
-          <a:p>
-            <a:r>
-              <a:rPr lang="de-DE" dirty="0"/>
-              <a:t>Risiko bei Ausfall des Braumeisters Annahme machen</a:t>
-            </a:r>
-          </a:p>
-          <a:p>
-            <a:r>
-              <a:rPr lang="de-DE" dirty="0"/>
-              <a:t>Investitionen in weitere gewinnsteigende Maßnahmen ermöglicht (Prozessoptimierung, </a:t>
-            </a:r>
-            <a:r>
-              <a:rPr lang="de-DE" dirty="0" err="1"/>
-              <a:t>Conditioning</a:t>
-            </a:r>
-            <a:r>
-              <a:rPr lang="de-DE" dirty="0"/>
-              <a:t> Monitoring, </a:t>
-            </a:r>
-            <a:r>
-              <a:rPr lang="de-DE" dirty="0" err="1"/>
-              <a:t>Predictive</a:t>
-            </a:r>
-            <a:r>
-              <a:rPr lang="de-DE" dirty="0"/>
-              <a:t> Maintenance, weitere Automatisierungsschritte)</a:t>
-            </a:r>
+              <a:t>SAP Lizenzkosten:</a:t>
+            </a:r>
+          </a:p>
+          <a:p>
+            <a:r>
+              <a:rPr lang="de-DE" dirty="0">
+                <a:hlinkClick r:id="rId5"/>
+              </a:rPr>
+              <a:t>https://versino.de/sap-business-one/kosten/</a:t>
+            </a:r>
+            <a:endParaRPr lang="de-DE" dirty="0"/>
+          </a:p>
+          <a:p>
+            <a:endParaRPr lang="de-DE" dirty="0"/>
           </a:p>
           <a:p>
             <a:endParaRPr lang="de-DE" dirty="0"/>
@@ -3823,7 +6883,7 @@
     </p:spTree>
     <p:extLst>
       <p:ext uri="{BB962C8B-B14F-4D97-AF65-F5344CB8AC3E}">
-        <p14:creationId xmlns:p14="http://schemas.microsoft.com/office/powerpoint/2010/main" val="1886582988"/>
+        <p14:creationId xmlns:p14="http://schemas.microsoft.com/office/powerpoint/2010/main" val="1606319757"/>
       </p:ext>
     </p:extLst>
   </p:cSld>
@@ -5987,7 +9047,7 @@
           <p:cNvPr id="2" name="Titel 1">
             <a:extLst>
               <a:ext uri="{FF2B5EF4-FFF2-40B4-BE49-F238E27FC236}">
-                <a16:creationId xmlns:a16="http://schemas.microsoft.com/office/drawing/2014/main" id="{501EBE92-3DFF-4B1E-B806-A7C566334140}"/>
+                <a16:creationId xmlns:a16="http://schemas.microsoft.com/office/drawing/2014/main" id="{ECB575D1-760B-43F1-9715-77F1EA9C08A1}"/>
               </a:ext>
             </a:extLst>
           </p:cNvPr>
@@ -6005,35 +9065,582 @@
           <a:p>
             <a:r>
               <a:rPr lang="de-DE" dirty="0"/>
-              <a:t>Rangfolgediagramm</a:t>
+              <a:t>Zeitplan</a:t>
             </a:r>
           </a:p>
         </p:txBody>
       </p:sp>
+      <p:graphicFrame>
+        <p:nvGraphicFramePr>
+          <p:cNvPr id="4" name="Tabelle 3">
+            <a:extLst>
+              <a:ext uri="{FF2B5EF4-FFF2-40B4-BE49-F238E27FC236}">
+                <a16:creationId xmlns:a16="http://schemas.microsoft.com/office/drawing/2014/main" id="{540C6EDA-E47E-45C9-A28E-41BB2A404F3F}"/>
+              </a:ext>
+            </a:extLst>
+          </p:cNvPr>
+          <p:cNvGraphicFramePr>
+            <a:graphicFrameLocks noGrp="1"/>
+          </p:cNvGraphicFramePr>
+          <p:nvPr>
+            <p:extLst>
+              <p:ext uri="{D42A27DB-BD31-4B8C-83A1-F6EECF244321}">
+                <p14:modId xmlns:p14="http://schemas.microsoft.com/office/powerpoint/2010/main" val="767081674"/>
+              </p:ext>
+            </p:extLst>
+          </p:nvPr>
+        </p:nvGraphicFramePr>
+        <p:xfrm>
+          <a:off x="838200" y="1314450"/>
+          <a:ext cx="10515600" cy="4914901"/>
+        </p:xfrm>
+        <a:graphic>
+          <a:graphicData uri="http://schemas.openxmlformats.org/drawingml/2006/table">
+            <a:tbl>
+              <a:tblPr firstRow="1" bandRow="1">
+                <a:tableStyleId>{5C22544A-7EE6-4342-B048-85BDC9FD1C3A}</a:tableStyleId>
+              </a:tblPr>
+              <a:tblGrid>
+                <a:gridCol w="6466882">
+                  <a:extLst>
+                    <a:ext uri="{9D8B030D-6E8A-4147-A177-3AD203B41FA5}">
+                      <a16:colId xmlns:a16="http://schemas.microsoft.com/office/drawing/2014/main" val="4114169832"/>
+                    </a:ext>
+                  </a:extLst>
+                </a:gridCol>
+                <a:gridCol w="2359415">
+                  <a:extLst>
+                    <a:ext uri="{9D8B030D-6E8A-4147-A177-3AD203B41FA5}">
+                      <a16:colId xmlns:a16="http://schemas.microsoft.com/office/drawing/2014/main" val="505643562"/>
+                    </a:ext>
+                  </a:extLst>
+                </a:gridCol>
+                <a:gridCol w="1689303">
+                  <a:extLst>
+                    <a:ext uri="{9D8B030D-6E8A-4147-A177-3AD203B41FA5}">
+                      <a16:colId xmlns:a16="http://schemas.microsoft.com/office/drawing/2014/main" val="63425046"/>
+                    </a:ext>
+                  </a:extLst>
+                </a:gridCol>
+              </a:tblGrid>
+              <a:tr h="393064">
+                <a:tc>
+                  <a:txBody>
+                    <a:bodyPr/>
+                    <a:lstStyle/>
+                    <a:p>
+                      <a:pPr algn="l"/>
+                      <a:r>
+                        <a:rPr lang="de-DE" dirty="0"/>
+                        <a:t>Beschreibung der Tätigkeit</a:t>
+                      </a:r>
+                    </a:p>
+                  </a:txBody>
+                  <a:tcPr/>
+                </a:tc>
+                <a:tc>
+                  <a:txBody>
+                    <a:bodyPr/>
+                    <a:lstStyle/>
+                    <a:p>
+                      <a:pPr algn="ctr"/>
+                      <a:r>
+                        <a:rPr lang="de-DE" dirty="0"/>
+                        <a:t>Dauer in Wochen</a:t>
+                      </a:r>
+                    </a:p>
+                  </a:txBody>
+                  <a:tcPr/>
+                </a:tc>
+                <a:tc>
+                  <a:txBody>
+                    <a:bodyPr/>
+                    <a:lstStyle/>
+                    <a:p>
+                      <a:pPr algn="ctr"/>
+                      <a:r>
+                        <a:rPr lang="de-DE" dirty="0"/>
+                        <a:t>Referenz</a:t>
+                      </a:r>
+                    </a:p>
+                  </a:txBody>
+                  <a:tcPr/>
+                </a:tc>
+                <a:extLst>
+                  <a:ext uri="{0D108BD9-81ED-4DB2-BD59-A6C34878D82A}">
+                    <a16:rowId xmlns:a16="http://schemas.microsoft.com/office/drawing/2014/main" val="514831670"/>
+                  </a:ext>
+                </a:extLst>
+              </a:tr>
+              <a:tr h="532021">
+                <a:tc>
+                  <a:txBody>
+                    <a:bodyPr/>
+                    <a:lstStyle/>
+                    <a:p>
+                      <a:r>
+                        <a:rPr lang="de-DE" dirty="0"/>
+                        <a:t>Gateway installieren und konfigurieren</a:t>
+                      </a:r>
+                    </a:p>
+                  </a:txBody>
+                  <a:tcPr/>
+                </a:tc>
+                <a:tc>
+                  <a:txBody>
+                    <a:bodyPr/>
+                    <a:lstStyle/>
+                    <a:p>
+                      <a:pPr algn="ctr"/>
+                      <a:r>
+                        <a:rPr lang="de-DE" dirty="0"/>
+                        <a:t>1</a:t>
+                      </a:r>
+                    </a:p>
+                  </a:txBody>
+                  <a:tcPr/>
+                </a:tc>
+                <a:tc>
+                  <a:txBody>
+                    <a:bodyPr/>
+                    <a:lstStyle/>
+                    <a:p>
+                      <a:pPr algn="ctr"/>
+                      <a:r>
+                        <a:rPr lang="de-DE" dirty="0"/>
+                        <a:t>Gate</a:t>
+                      </a:r>
+                    </a:p>
+                  </a:txBody>
+                  <a:tcPr/>
+                </a:tc>
+                <a:extLst>
+                  <a:ext uri="{0D108BD9-81ED-4DB2-BD59-A6C34878D82A}">
+                    <a16:rowId xmlns:a16="http://schemas.microsoft.com/office/drawing/2014/main" val="345566159"/>
+                  </a:ext>
+                </a:extLst>
+              </a:tr>
+              <a:tr h="524130">
+                <a:tc>
+                  <a:txBody>
+                    <a:bodyPr/>
+                    <a:lstStyle/>
+                    <a:p>
+                      <a:r>
+                        <a:rPr lang="de-DE" dirty="0"/>
+                        <a:t>MQTT Client-Server Architektur erstellen und installieren</a:t>
+                      </a:r>
+                    </a:p>
+                  </a:txBody>
+                  <a:tcPr/>
+                </a:tc>
+                <a:tc>
+                  <a:txBody>
+                    <a:bodyPr/>
+                    <a:lstStyle/>
+                    <a:p>
+                      <a:pPr algn="ctr"/>
+                      <a:r>
+                        <a:rPr lang="de-DE" dirty="0"/>
+                        <a:t>2</a:t>
+                      </a:r>
+                    </a:p>
+                  </a:txBody>
+                  <a:tcPr/>
+                </a:tc>
+                <a:tc>
+                  <a:txBody>
+                    <a:bodyPr/>
+                    <a:lstStyle/>
+                    <a:p>
+                      <a:pPr algn="ctr"/>
+                      <a:r>
+                        <a:rPr lang="de-DE" dirty="0"/>
+                        <a:t>MQTT</a:t>
+                      </a:r>
+                    </a:p>
+                  </a:txBody>
+                  <a:tcPr/>
+                </a:tc>
+                <a:extLst>
+                  <a:ext uri="{0D108BD9-81ED-4DB2-BD59-A6C34878D82A}">
+                    <a16:rowId xmlns:a16="http://schemas.microsoft.com/office/drawing/2014/main" val="707689269"/>
+                  </a:ext>
+                </a:extLst>
+              </a:tr>
+              <a:tr h="393064">
+                <a:tc>
+                  <a:txBody>
+                    <a:bodyPr/>
+                    <a:lstStyle/>
+                    <a:p>
+                      <a:r>
+                        <a:rPr lang="de-DE" dirty="0"/>
+                        <a:t>SAP programmieren</a:t>
+                      </a:r>
+                    </a:p>
+                  </a:txBody>
+                  <a:tcPr/>
+                </a:tc>
+                <a:tc>
+                  <a:txBody>
+                    <a:bodyPr/>
+                    <a:lstStyle/>
+                    <a:p>
+                      <a:pPr algn="ctr"/>
+                      <a:r>
+                        <a:rPr lang="de-DE" dirty="0"/>
+                        <a:t>3</a:t>
+                      </a:r>
+                    </a:p>
+                  </a:txBody>
+                  <a:tcPr/>
+                </a:tc>
+                <a:tc>
+                  <a:txBody>
+                    <a:bodyPr/>
+                    <a:lstStyle/>
+                    <a:p>
+                      <a:pPr algn="ctr"/>
+                      <a:r>
+                        <a:rPr lang="de-DE" dirty="0"/>
+                        <a:t>SAP</a:t>
+                      </a:r>
+                    </a:p>
+                  </a:txBody>
+                  <a:tcPr/>
+                </a:tc>
+                <a:extLst>
+                  <a:ext uri="{0D108BD9-81ED-4DB2-BD59-A6C34878D82A}">
+                    <a16:rowId xmlns:a16="http://schemas.microsoft.com/office/drawing/2014/main" val="2832557126"/>
+                  </a:ext>
+                </a:extLst>
+              </a:tr>
+              <a:tr h="532021">
+                <a:tc>
+                  <a:txBody>
+                    <a:bodyPr/>
+                    <a:lstStyle/>
+                    <a:p>
+                      <a:r>
+                        <a:rPr lang="de-DE" dirty="0"/>
+                        <a:t>Dashboard anfertigen und installieren</a:t>
+                      </a:r>
+                    </a:p>
+                  </a:txBody>
+                  <a:tcPr/>
+                </a:tc>
+                <a:tc>
+                  <a:txBody>
+                    <a:bodyPr/>
+                    <a:lstStyle/>
+                    <a:p>
+                      <a:pPr algn="ctr"/>
+                      <a:r>
+                        <a:rPr lang="de-DE" dirty="0"/>
+                        <a:t>2</a:t>
+                      </a:r>
+                    </a:p>
+                  </a:txBody>
+                  <a:tcPr/>
+                </a:tc>
+                <a:tc>
+                  <a:txBody>
+                    <a:bodyPr/>
+                    <a:lstStyle/>
+                    <a:p>
+                      <a:pPr algn="ctr"/>
+                      <a:r>
+                        <a:rPr lang="de-DE" dirty="0"/>
+                        <a:t>Dash</a:t>
+                      </a:r>
+                    </a:p>
+                  </a:txBody>
+                  <a:tcPr/>
+                </a:tc>
+                <a:extLst>
+                  <a:ext uri="{0D108BD9-81ED-4DB2-BD59-A6C34878D82A}">
+                    <a16:rowId xmlns:a16="http://schemas.microsoft.com/office/drawing/2014/main" val="1310350267"/>
+                  </a:ext>
+                </a:extLst>
+              </a:tr>
+              <a:tr h="551474">
+                <a:tc>
+                  <a:txBody>
+                    <a:bodyPr/>
+                    <a:lstStyle/>
+                    <a:p>
+                      <a:r>
+                        <a:rPr lang="de-DE" dirty="0"/>
+                        <a:t>OPC-UA Client-Server Architektur erstellen und installieren</a:t>
+                      </a:r>
+                    </a:p>
+                  </a:txBody>
+                  <a:tcPr/>
+                </a:tc>
+                <a:tc>
+                  <a:txBody>
+                    <a:bodyPr/>
+                    <a:lstStyle/>
+                    <a:p>
+                      <a:pPr algn="ctr"/>
+                      <a:r>
+                        <a:rPr lang="de-DE" dirty="0"/>
+                        <a:t>2</a:t>
+                      </a:r>
+                    </a:p>
+                  </a:txBody>
+                  <a:tcPr/>
+                </a:tc>
+                <a:tc>
+                  <a:txBody>
+                    <a:bodyPr/>
+                    <a:lstStyle/>
+                    <a:p>
+                      <a:pPr algn="ctr"/>
+                      <a:r>
+                        <a:rPr lang="de-DE" dirty="0"/>
+                        <a:t>OPC-UA</a:t>
+                      </a:r>
+                    </a:p>
+                  </a:txBody>
+                  <a:tcPr/>
+                </a:tc>
+                <a:extLst>
+                  <a:ext uri="{0D108BD9-81ED-4DB2-BD59-A6C34878D82A}">
+                    <a16:rowId xmlns:a16="http://schemas.microsoft.com/office/drawing/2014/main" val="3181483072"/>
+                  </a:ext>
+                </a:extLst>
+              </a:tr>
+              <a:tr h="393064">
+                <a:tc>
+                  <a:txBody>
+                    <a:bodyPr/>
+                    <a:lstStyle/>
+                    <a:p>
+                      <a:r>
+                        <a:rPr lang="de-DE" dirty="0"/>
+                        <a:t>SPS programmieren</a:t>
+                      </a:r>
+                    </a:p>
+                  </a:txBody>
+                  <a:tcPr/>
+                </a:tc>
+                <a:tc>
+                  <a:txBody>
+                    <a:bodyPr/>
+                    <a:lstStyle/>
+                    <a:p>
+                      <a:pPr algn="ctr"/>
+                      <a:r>
+                        <a:rPr lang="de-DE" dirty="0"/>
+                        <a:t>1</a:t>
+                      </a:r>
+                    </a:p>
+                  </a:txBody>
+                  <a:tcPr/>
+                </a:tc>
+                <a:tc>
+                  <a:txBody>
+                    <a:bodyPr/>
+                    <a:lstStyle/>
+                    <a:p>
+                      <a:pPr algn="ctr"/>
+                      <a:r>
+                        <a:rPr lang="de-DE" dirty="0"/>
+                        <a:t>SPS</a:t>
+                      </a:r>
+                    </a:p>
+                  </a:txBody>
+                  <a:tcPr/>
+                </a:tc>
+                <a:extLst>
+                  <a:ext uri="{0D108BD9-81ED-4DB2-BD59-A6C34878D82A}">
+                    <a16:rowId xmlns:a16="http://schemas.microsoft.com/office/drawing/2014/main" val="4001189344"/>
+                  </a:ext>
+                </a:extLst>
+              </a:tr>
+              <a:tr h="532021">
+                <a:tc>
+                  <a:txBody>
+                    <a:bodyPr/>
+                    <a:lstStyle/>
+                    <a:p>
+                      <a:r>
+                        <a:rPr lang="de-DE" dirty="0"/>
+                        <a:t>Schnittstellen für die anderen Gruppen schaffen</a:t>
+                      </a:r>
+                    </a:p>
+                  </a:txBody>
+                  <a:tcPr/>
+                </a:tc>
+                <a:tc>
+                  <a:txBody>
+                    <a:bodyPr/>
+                    <a:lstStyle/>
+                    <a:p>
+                      <a:pPr algn="ctr"/>
+                      <a:r>
+                        <a:rPr lang="de-DE" dirty="0"/>
+                        <a:t>2.5</a:t>
+                      </a:r>
+                    </a:p>
+                  </a:txBody>
+                  <a:tcPr/>
+                </a:tc>
+                <a:tc>
+                  <a:txBody>
+                    <a:bodyPr/>
+                    <a:lstStyle/>
+                    <a:p>
+                      <a:pPr algn="ctr"/>
+                      <a:r>
+                        <a:rPr lang="de-DE" dirty="0"/>
+                        <a:t>Schnitt</a:t>
+                      </a:r>
+                    </a:p>
+                  </a:txBody>
+                  <a:tcPr/>
+                </a:tc>
+                <a:extLst>
+                  <a:ext uri="{0D108BD9-81ED-4DB2-BD59-A6C34878D82A}">
+                    <a16:rowId xmlns:a16="http://schemas.microsoft.com/office/drawing/2014/main" val="469134997"/>
+                  </a:ext>
+                </a:extLst>
+              </a:tr>
+              <a:tr h="532021">
+                <a:tc>
+                  <a:txBody>
+                    <a:bodyPr/>
+                    <a:lstStyle/>
+                    <a:p>
+                      <a:r>
+                        <a:rPr lang="de-DE" dirty="0"/>
+                        <a:t>Testen einer Teilkomponente</a:t>
+                      </a:r>
+                    </a:p>
+                  </a:txBody>
+                  <a:tcPr/>
+                </a:tc>
+                <a:tc>
+                  <a:txBody>
+                    <a:bodyPr/>
+                    <a:lstStyle/>
+                    <a:p>
+                      <a:pPr algn="ctr"/>
+                      <a:r>
+                        <a:rPr lang="de-DE" dirty="0"/>
+                        <a:t>2</a:t>
+                      </a:r>
+                    </a:p>
+                  </a:txBody>
+                  <a:tcPr/>
+                </a:tc>
+                <a:tc>
+                  <a:txBody>
+                    <a:bodyPr/>
+                    <a:lstStyle/>
+                    <a:p>
+                      <a:pPr algn="ctr"/>
+                      <a:r>
+                        <a:rPr lang="de-DE" dirty="0" err="1"/>
+                        <a:t>TeilTest</a:t>
+                      </a:r>
+                      <a:endParaRPr lang="de-DE" dirty="0"/>
+                    </a:p>
+                  </a:txBody>
+                  <a:tcPr/>
+                </a:tc>
+                <a:extLst>
+                  <a:ext uri="{0D108BD9-81ED-4DB2-BD59-A6C34878D82A}">
+                    <a16:rowId xmlns:a16="http://schemas.microsoft.com/office/drawing/2014/main" val="1557987470"/>
+                  </a:ext>
+                </a:extLst>
+              </a:tr>
+              <a:tr h="532021">
+                <a:tc>
+                  <a:txBody>
+                    <a:bodyPr/>
+                    <a:lstStyle/>
+                    <a:p>
+                      <a:r>
+                        <a:rPr lang="de-DE" dirty="0"/>
+                        <a:t>Testen des Gesamtsystems/Abnahme</a:t>
+                      </a:r>
+                    </a:p>
+                  </a:txBody>
+                  <a:tcPr/>
+                </a:tc>
+                <a:tc>
+                  <a:txBody>
+                    <a:bodyPr/>
+                    <a:lstStyle/>
+                    <a:p>
+                      <a:pPr algn="ctr"/>
+                      <a:r>
+                        <a:rPr lang="de-DE" dirty="0"/>
+                        <a:t>2</a:t>
+                      </a:r>
+                    </a:p>
+                  </a:txBody>
+                  <a:tcPr/>
+                </a:tc>
+                <a:tc>
+                  <a:txBody>
+                    <a:bodyPr/>
+                    <a:lstStyle/>
+                    <a:p>
+                      <a:pPr algn="ctr"/>
+                      <a:r>
+                        <a:rPr lang="de-DE" dirty="0" err="1"/>
+                        <a:t>SysTest</a:t>
+                      </a:r>
+                      <a:endParaRPr lang="de-DE" dirty="0"/>
+                    </a:p>
+                  </a:txBody>
+                  <a:tcPr/>
+                </a:tc>
+                <a:extLst>
+                  <a:ext uri="{0D108BD9-81ED-4DB2-BD59-A6C34878D82A}">
+                    <a16:rowId xmlns:a16="http://schemas.microsoft.com/office/drawing/2014/main" val="408041960"/>
+                  </a:ext>
+                </a:extLst>
+              </a:tr>
+            </a:tbl>
+          </a:graphicData>
+        </a:graphic>
+      </p:graphicFrame>
       <p:sp>
         <p:nvSpPr>
-          <p:cNvPr id="3" name="Inhaltsplatzhalter 2">
-            <a:extLst>
-              <a:ext uri="{FF2B5EF4-FFF2-40B4-BE49-F238E27FC236}">
-                <a16:creationId xmlns:a16="http://schemas.microsoft.com/office/drawing/2014/main" id="{8B0038F3-B0C2-4D4D-A5BD-ABD1F0B35332}"/>
-              </a:ext>
-            </a:extLst>
-          </p:cNvPr>
-          <p:cNvSpPr>
-            <a:spLocks noGrp="1"/>
-          </p:cNvSpPr>
-          <p:nvPr>
-            <p:ph idx="1"/>
-          </p:nvPr>
+          <p:cNvPr id="7" name="Textfeld 6">
+            <a:extLst>
+              <a:ext uri="{FF2B5EF4-FFF2-40B4-BE49-F238E27FC236}">
+                <a16:creationId xmlns:a16="http://schemas.microsoft.com/office/drawing/2014/main" id="{519CE46F-2B01-492C-A4F0-A12734BCC544}"/>
+              </a:ext>
+            </a:extLst>
+          </p:cNvPr>
+          <p:cNvSpPr txBox="1"/>
+          <p:nvPr/>
         </p:nvSpPr>
-        <p:spPr/>
+        <p:spPr>
+          <a:xfrm>
+            <a:off x="1047750" y="6229350"/>
+            <a:ext cx="7543800" cy="461665"/>
+          </a:xfrm>
+          <a:prstGeom prst="rect">
+            <a:avLst/>
+          </a:prstGeom>
+          <a:noFill/>
+        </p:spPr>
         <p:txBody>
-          <a:bodyPr/>
+          <a:bodyPr wrap="square" rtlCol="0">
+            <a:spAutoFit/>
+          </a:bodyPr>
           <a:lstStyle/>
           <a:p>
             <a:r>
-              <a:rPr lang="de-DE" dirty="0"/>
-              <a:t>Annahme zur Reihenfolge bzw. Reihenfolge festlegen</a:t>
+              <a:rPr lang="de-DE" sz="2400" dirty="0"/>
+              <a:t>Geschätzte Gesamtdauer des Projekts: 2 Monate</a:t>
             </a:r>
           </a:p>
         </p:txBody>
@@ -6041,7 +9648,7 @@
     </p:spTree>
     <p:extLst>
       <p:ext uri="{BB962C8B-B14F-4D97-AF65-F5344CB8AC3E}">
-        <p14:creationId xmlns:p14="http://schemas.microsoft.com/office/powerpoint/2010/main" val="3604795767"/>
+        <p14:creationId xmlns:p14="http://schemas.microsoft.com/office/powerpoint/2010/main" val="758388306"/>
       </p:ext>
     </p:extLst>
   </p:cSld>

</xml_diff>

<commit_message>
adjusted numbers for 100 workers
</commit_message>
<xml_diff>
--- a/Präsentation/Präsentation_Entwurf.pptx
+++ b/Präsentation/Präsentation_Entwurf.pptx
@@ -4,6 +4,9 @@
   <p:sldMasterIdLst>
     <p:sldMasterId id="2147483648" r:id="rId1"/>
   </p:sldMasterIdLst>
+  <p:notesMasterIdLst>
+    <p:notesMasterId r:id="rId15"/>
+  </p:notesMasterIdLst>
   <p:sldIdLst>
     <p:sldId id="257" r:id="rId2"/>
     <p:sldId id="262" r:id="rId3"/>
@@ -124,6 +127,559 @@
 </p:presentation>
 </file>
 
+<file path=ppt/notesMasters/notesMaster1.xml><?xml version="1.0" encoding="utf-8"?>
+<p:notesMaster xmlns:a="http://schemas.openxmlformats.org/drawingml/2006/main" xmlns:r="http://schemas.openxmlformats.org/officeDocument/2006/relationships" xmlns:p="http://schemas.openxmlformats.org/presentationml/2006/main">
+  <p:cSld>
+    <p:bg>
+      <p:bgRef idx="1001">
+        <a:schemeClr val="bg1"/>
+      </p:bgRef>
+    </p:bg>
+    <p:spTree>
+      <p:nvGrpSpPr>
+        <p:cNvPr id="1" name=""/>
+        <p:cNvGrpSpPr/>
+        <p:nvPr/>
+      </p:nvGrpSpPr>
+      <p:grpSpPr>
+        <a:xfrm>
+          <a:off x="0" y="0"/>
+          <a:ext cx="0" cy="0"/>
+          <a:chOff x="0" y="0"/>
+          <a:chExt cx="0" cy="0"/>
+        </a:xfrm>
+      </p:grpSpPr>
+      <p:sp>
+        <p:nvSpPr>
+          <p:cNvPr id="2" name="Kopfzeilenplatzhalter 1"/>
+          <p:cNvSpPr>
+            <a:spLocks noGrp="1"/>
+          </p:cNvSpPr>
+          <p:nvPr>
+            <p:ph type="hdr" sz="quarter"/>
+          </p:nvPr>
+        </p:nvSpPr>
+        <p:spPr>
+          <a:xfrm>
+            <a:off x="0" y="0"/>
+            <a:ext cx="2971800" cy="458788"/>
+          </a:xfrm>
+          <a:prstGeom prst="rect">
+            <a:avLst/>
+          </a:prstGeom>
+        </p:spPr>
+        <p:txBody>
+          <a:bodyPr vert="horz" lIns="91440" tIns="45720" rIns="91440" bIns="45720" rtlCol="0"/>
+          <a:lstStyle>
+            <a:lvl1pPr algn="l">
+              <a:defRPr sz="1200"/>
+            </a:lvl1pPr>
+          </a:lstStyle>
+          <a:p>
+            <a:endParaRPr lang="de-DE"/>
+          </a:p>
+        </p:txBody>
+      </p:sp>
+      <p:sp>
+        <p:nvSpPr>
+          <p:cNvPr id="3" name="Datumsplatzhalter 2"/>
+          <p:cNvSpPr>
+            <a:spLocks noGrp="1"/>
+          </p:cNvSpPr>
+          <p:nvPr>
+            <p:ph type="dt" idx="1"/>
+          </p:nvPr>
+        </p:nvSpPr>
+        <p:spPr>
+          <a:xfrm>
+            <a:off x="3884613" y="0"/>
+            <a:ext cx="2971800" cy="458788"/>
+          </a:xfrm>
+          <a:prstGeom prst="rect">
+            <a:avLst/>
+          </a:prstGeom>
+        </p:spPr>
+        <p:txBody>
+          <a:bodyPr vert="horz" lIns="91440" tIns="45720" rIns="91440" bIns="45720" rtlCol="0"/>
+          <a:lstStyle>
+            <a:lvl1pPr algn="r">
+              <a:defRPr sz="1200"/>
+            </a:lvl1pPr>
+          </a:lstStyle>
+          <a:p>
+            <a:fld id="{5C20507F-F644-498B-8FD8-DF1C414025EC}" type="datetimeFigureOut">
+              <a:rPr lang="de-DE" smtClean="0"/>
+              <a:t>02.11.2019</a:t>
+            </a:fld>
+            <a:endParaRPr lang="de-DE"/>
+          </a:p>
+        </p:txBody>
+      </p:sp>
+      <p:sp>
+        <p:nvSpPr>
+          <p:cNvPr id="4" name="Folienbildplatzhalter 3"/>
+          <p:cNvSpPr>
+            <a:spLocks noGrp="1" noRot="1" noChangeAspect="1"/>
+          </p:cNvSpPr>
+          <p:nvPr>
+            <p:ph type="sldImg" idx="2"/>
+          </p:nvPr>
+        </p:nvSpPr>
+        <p:spPr>
+          <a:xfrm>
+            <a:off x="685800" y="1143000"/>
+            <a:ext cx="5486400" cy="3086100"/>
+          </a:xfrm>
+          <a:prstGeom prst="rect">
+            <a:avLst/>
+          </a:prstGeom>
+          <a:noFill/>
+          <a:ln w="12700">
+            <a:solidFill>
+              <a:prstClr val="black"/>
+            </a:solidFill>
+          </a:ln>
+        </p:spPr>
+        <p:txBody>
+          <a:bodyPr vert="horz" lIns="91440" tIns="45720" rIns="91440" bIns="45720" rtlCol="0" anchor="ctr"/>
+          <a:lstStyle/>
+          <a:p>
+            <a:endParaRPr lang="de-DE"/>
+          </a:p>
+        </p:txBody>
+      </p:sp>
+      <p:sp>
+        <p:nvSpPr>
+          <p:cNvPr id="5" name="Notizenplatzhalter 4"/>
+          <p:cNvSpPr>
+            <a:spLocks noGrp="1"/>
+          </p:cNvSpPr>
+          <p:nvPr>
+            <p:ph type="body" sz="quarter" idx="3"/>
+          </p:nvPr>
+        </p:nvSpPr>
+        <p:spPr>
+          <a:xfrm>
+            <a:off x="685800" y="4400550"/>
+            <a:ext cx="5486400" cy="3600450"/>
+          </a:xfrm>
+          <a:prstGeom prst="rect">
+            <a:avLst/>
+          </a:prstGeom>
+        </p:spPr>
+        <p:txBody>
+          <a:bodyPr vert="horz" lIns="91440" tIns="45720" rIns="91440" bIns="45720" rtlCol="0"/>
+          <a:lstStyle/>
+          <a:p>
+            <a:pPr lvl="0"/>
+            <a:r>
+              <a:rPr lang="de-DE"/>
+              <a:t>Mastertextformat bearbeiten</a:t>
+            </a:r>
+          </a:p>
+          <a:p>
+            <a:pPr lvl="1"/>
+            <a:r>
+              <a:rPr lang="de-DE"/>
+              <a:t>Zweite Ebene</a:t>
+            </a:r>
+          </a:p>
+          <a:p>
+            <a:pPr lvl="2"/>
+            <a:r>
+              <a:rPr lang="de-DE"/>
+              <a:t>Dritte Ebene</a:t>
+            </a:r>
+          </a:p>
+          <a:p>
+            <a:pPr lvl="3"/>
+            <a:r>
+              <a:rPr lang="de-DE"/>
+              <a:t>Vierte Ebene</a:t>
+            </a:r>
+          </a:p>
+          <a:p>
+            <a:pPr lvl="4"/>
+            <a:r>
+              <a:rPr lang="de-DE"/>
+              <a:t>Fünfte Ebene</a:t>
+            </a:r>
+          </a:p>
+        </p:txBody>
+      </p:sp>
+      <p:sp>
+        <p:nvSpPr>
+          <p:cNvPr id="6" name="Fußzeilenplatzhalter 5"/>
+          <p:cNvSpPr>
+            <a:spLocks noGrp="1"/>
+          </p:cNvSpPr>
+          <p:nvPr>
+            <p:ph type="ftr" sz="quarter" idx="4"/>
+          </p:nvPr>
+        </p:nvSpPr>
+        <p:spPr>
+          <a:xfrm>
+            <a:off x="0" y="8685213"/>
+            <a:ext cx="2971800" cy="458787"/>
+          </a:xfrm>
+          <a:prstGeom prst="rect">
+            <a:avLst/>
+          </a:prstGeom>
+        </p:spPr>
+        <p:txBody>
+          <a:bodyPr vert="horz" lIns="91440" tIns="45720" rIns="91440" bIns="45720" rtlCol="0" anchor="b"/>
+          <a:lstStyle>
+            <a:lvl1pPr algn="l">
+              <a:defRPr sz="1200"/>
+            </a:lvl1pPr>
+          </a:lstStyle>
+          <a:p>
+            <a:endParaRPr lang="de-DE"/>
+          </a:p>
+        </p:txBody>
+      </p:sp>
+      <p:sp>
+        <p:nvSpPr>
+          <p:cNvPr id="7" name="Foliennummernplatzhalter 6"/>
+          <p:cNvSpPr>
+            <a:spLocks noGrp="1"/>
+          </p:cNvSpPr>
+          <p:nvPr>
+            <p:ph type="sldNum" sz="quarter" idx="5"/>
+          </p:nvPr>
+        </p:nvSpPr>
+        <p:spPr>
+          <a:xfrm>
+            <a:off x="3884613" y="8685213"/>
+            <a:ext cx="2971800" cy="458787"/>
+          </a:xfrm>
+          <a:prstGeom prst="rect">
+            <a:avLst/>
+          </a:prstGeom>
+        </p:spPr>
+        <p:txBody>
+          <a:bodyPr vert="horz" lIns="91440" tIns="45720" rIns="91440" bIns="45720" rtlCol="0" anchor="b"/>
+          <a:lstStyle>
+            <a:lvl1pPr algn="r">
+              <a:defRPr sz="1200"/>
+            </a:lvl1pPr>
+          </a:lstStyle>
+          <a:p>
+            <a:fld id="{2F526E87-3F77-4BDE-BD80-0F6E2B67AF76}" type="slidenum">
+              <a:rPr lang="de-DE" smtClean="0"/>
+              <a:t>‹Nr.›</a:t>
+            </a:fld>
+            <a:endParaRPr lang="de-DE"/>
+          </a:p>
+        </p:txBody>
+      </p:sp>
+    </p:spTree>
+    <p:extLst>
+      <p:ext uri="{BB962C8B-B14F-4D97-AF65-F5344CB8AC3E}">
+        <p14:creationId xmlns:p14="http://schemas.microsoft.com/office/powerpoint/2010/main" val="3609658473"/>
+      </p:ext>
+    </p:extLst>
+  </p:cSld>
+  <p:clrMap bg1="lt1" tx1="dk1" bg2="lt2" tx2="dk2" accent1="accent1" accent2="accent2" accent3="accent3" accent4="accent4" accent5="accent5" accent6="accent6" hlink="hlink" folHlink="folHlink"/>
+  <p:notesStyle>
+    <a:lvl1pPr marL="0" algn="l" defTabSz="914400" rtl="0" eaLnBrk="1" latinLnBrk="0" hangingPunct="1">
+      <a:defRPr sz="1200" kern="1200">
+        <a:solidFill>
+          <a:schemeClr val="tx1"/>
+        </a:solidFill>
+        <a:latin typeface="+mn-lt"/>
+        <a:ea typeface="+mn-ea"/>
+        <a:cs typeface="+mn-cs"/>
+      </a:defRPr>
+    </a:lvl1pPr>
+    <a:lvl2pPr marL="457200" algn="l" defTabSz="914400" rtl="0" eaLnBrk="1" latinLnBrk="0" hangingPunct="1">
+      <a:defRPr sz="1200" kern="1200">
+        <a:solidFill>
+          <a:schemeClr val="tx1"/>
+        </a:solidFill>
+        <a:latin typeface="+mn-lt"/>
+        <a:ea typeface="+mn-ea"/>
+        <a:cs typeface="+mn-cs"/>
+      </a:defRPr>
+    </a:lvl2pPr>
+    <a:lvl3pPr marL="914400" algn="l" defTabSz="914400" rtl="0" eaLnBrk="1" latinLnBrk="0" hangingPunct="1">
+      <a:defRPr sz="1200" kern="1200">
+        <a:solidFill>
+          <a:schemeClr val="tx1"/>
+        </a:solidFill>
+        <a:latin typeface="+mn-lt"/>
+        <a:ea typeface="+mn-ea"/>
+        <a:cs typeface="+mn-cs"/>
+      </a:defRPr>
+    </a:lvl3pPr>
+    <a:lvl4pPr marL="1371600" algn="l" defTabSz="914400" rtl="0" eaLnBrk="1" latinLnBrk="0" hangingPunct="1">
+      <a:defRPr sz="1200" kern="1200">
+        <a:solidFill>
+          <a:schemeClr val="tx1"/>
+        </a:solidFill>
+        <a:latin typeface="+mn-lt"/>
+        <a:ea typeface="+mn-ea"/>
+        <a:cs typeface="+mn-cs"/>
+      </a:defRPr>
+    </a:lvl4pPr>
+    <a:lvl5pPr marL="1828800" algn="l" defTabSz="914400" rtl="0" eaLnBrk="1" latinLnBrk="0" hangingPunct="1">
+      <a:defRPr sz="1200" kern="1200">
+        <a:solidFill>
+          <a:schemeClr val="tx1"/>
+        </a:solidFill>
+        <a:latin typeface="+mn-lt"/>
+        <a:ea typeface="+mn-ea"/>
+        <a:cs typeface="+mn-cs"/>
+      </a:defRPr>
+    </a:lvl5pPr>
+    <a:lvl6pPr marL="2286000" algn="l" defTabSz="914400" rtl="0" eaLnBrk="1" latinLnBrk="0" hangingPunct="1">
+      <a:defRPr sz="1200" kern="1200">
+        <a:solidFill>
+          <a:schemeClr val="tx1"/>
+        </a:solidFill>
+        <a:latin typeface="+mn-lt"/>
+        <a:ea typeface="+mn-ea"/>
+        <a:cs typeface="+mn-cs"/>
+      </a:defRPr>
+    </a:lvl6pPr>
+    <a:lvl7pPr marL="2743200" algn="l" defTabSz="914400" rtl="0" eaLnBrk="1" latinLnBrk="0" hangingPunct="1">
+      <a:defRPr sz="1200" kern="1200">
+        <a:solidFill>
+          <a:schemeClr val="tx1"/>
+        </a:solidFill>
+        <a:latin typeface="+mn-lt"/>
+        <a:ea typeface="+mn-ea"/>
+        <a:cs typeface="+mn-cs"/>
+      </a:defRPr>
+    </a:lvl7pPr>
+    <a:lvl8pPr marL="3200400" algn="l" defTabSz="914400" rtl="0" eaLnBrk="1" latinLnBrk="0" hangingPunct="1">
+      <a:defRPr sz="1200" kern="1200">
+        <a:solidFill>
+          <a:schemeClr val="tx1"/>
+        </a:solidFill>
+        <a:latin typeface="+mn-lt"/>
+        <a:ea typeface="+mn-ea"/>
+        <a:cs typeface="+mn-cs"/>
+      </a:defRPr>
+    </a:lvl8pPr>
+    <a:lvl9pPr marL="3657600" algn="l" defTabSz="914400" rtl="0" eaLnBrk="1" latinLnBrk="0" hangingPunct="1">
+      <a:defRPr sz="1200" kern="1200">
+        <a:solidFill>
+          <a:schemeClr val="tx1"/>
+        </a:solidFill>
+        <a:latin typeface="+mn-lt"/>
+        <a:ea typeface="+mn-ea"/>
+        <a:cs typeface="+mn-cs"/>
+      </a:defRPr>
+    </a:lvl9pPr>
+  </p:notesStyle>
+</p:notesMaster>
+</file>
+
+<file path=ppt/notesSlides/notesSlide1.xml><?xml version="1.0" encoding="utf-8"?>
+<p:notes xmlns:a="http://schemas.openxmlformats.org/drawingml/2006/main" xmlns:r="http://schemas.openxmlformats.org/officeDocument/2006/relationships" xmlns:p="http://schemas.openxmlformats.org/presentationml/2006/main">
+  <p:cSld>
+    <p:spTree>
+      <p:nvGrpSpPr>
+        <p:cNvPr id="1" name=""/>
+        <p:cNvGrpSpPr/>
+        <p:nvPr/>
+      </p:nvGrpSpPr>
+      <p:grpSpPr>
+        <a:xfrm>
+          <a:off x="0" y="0"/>
+          <a:ext cx="0" cy="0"/>
+          <a:chOff x="0" y="0"/>
+          <a:chExt cx="0" cy="0"/>
+        </a:xfrm>
+      </p:grpSpPr>
+      <p:sp>
+        <p:nvSpPr>
+          <p:cNvPr id="2" name="Folienbildplatzhalter 1"/>
+          <p:cNvSpPr>
+            <a:spLocks noGrp="1" noRot="1" noChangeAspect="1"/>
+          </p:cNvSpPr>
+          <p:nvPr>
+            <p:ph type="sldImg"/>
+          </p:nvPr>
+        </p:nvSpPr>
+        <p:spPr/>
+      </p:sp>
+      <p:sp>
+        <p:nvSpPr>
+          <p:cNvPr id="3" name="Notizenplatzhalter 2"/>
+          <p:cNvSpPr>
+            <a:spLocks noGrp="1"/>
+          </p:cNvSpPr>
+          <p:nvPr>
+            <p:ph type="body" idx="1"/>
+          </p:nvPr>
+        </p:nvSpPr>
+        <p:spPr/>
+        <p:txBody>
+          <a:bodyPr/>
+          <a:lstStyle/>
+          <a:p>
+            <a:r>
+              <a:rPr lang="de-DE" dirty="0"/>
+              <a:t>Annahme, dass 30 Mitarbeiter zeitgleich in der Produktion arbeiten</a:t>
+            </a:r>
+          </a:p>
+        </p:txBody>
+      </p:sp>
+      <p:sp>
+        <p:nvSpPr>
+          <p:cNvPr id="4" name="Foliennummernplatzhalter 3"/>
+          <p:cNvSpPr>
+            <a:spLocks noGrp="1"/>
+          </p:cNvSpPr>
+          <p:nvPr>
+            <p:ph type="sldNum" sz="quarter" idx="5"/>
+          </p:nvPr>
+        </p:nvSpPr>
+        <p:spPr/>
+        <p:txBody>
+          <a:bodyPr/>
+          <a:lstStyle/>
+          <a:p>
+            <a:fld id="{2F526E87-3F77-4BDE-BD80-0F6E2B67AF76}" type="slidenum">
+              <a:rPr lang="de-DE" smtClean="0"/>
+              <a:t>11</a:t>
+            </a:fld>
+            <a:endParaRPr lang="de-DE"/>
+          </a:p>
+        </p:txBody>
+      </p:sp>
+    </p:spTree>
+    <p:extLst>
+      <p:ext uri="{BB962C8B-B14F-4D97-AF65-F5344CB8AC3E}">
+        <p14:creationId xmlns:p14="http://schemas.microsoft.com/office/powerpoint/2010/main" val="2987293007"/>
+      </p:ext>
+    </p:extLst>
+  </p:cSld>
+  <p:clrMapOvr>
+    <a:masterClrMapping/>
+  </p:clrMapOvr>
+</p:notes>
+</file>
+
+<file path=ppt/notesSlides/notesSlide2.xml><?xml version="1.0" encoding="utf-8"?>
+<p:notes xmlns:a="http://schemas.openxmlformats.org/drawingml/2006/main" xmlns:r="http://schemas.openxmlformats.org/officeDocument/2006/relationships" xmlns:p="http://schemas.openxmlformats.org/presentationml/2006/main">
+  <p:cSld>
+    <p:spTree>
+      <p:nvGrpSpPr>
+        <p:cNvPr id="1" name=""/>
+        <p:cNvGrpSpPr/>
+        <p:nvPr/>
+      </p:nvGrpSpPr>
+      <p:grpSpPr>
+        <a:xfrm>
+          <a:off x="0" y="0"/>
+          <a:ext cx="0" cy="0"/>
+          <a:chOff x="0" y="0"/>
+          <a:chExt cx="0" cy="0"/>
+        </a:xfrm>
+      </p:grpSpPr>
+      <p:sp>
+        <p:nvSpPr>
+          <p:cNvPr id="2" name="Folienbildplatzhalter 1"/>
+          <p:cNvSpPr>
+            <a:spLocks noGrp="1" noRot="1" noChangeAspect="1"/>
+          </p:cNvSpPr>
+          <p:nvPr>
+            <p:ph type="sldImg"/>
+          </p:nvPr>
+        </p:nvSpPr>
+        <p:spPr/>
+      </p:sp>
+      <p:sp>
+        <p:nvSpPr>
+          <p:cNvPr id="3" name="Notizenplatzhalter 2"/>
+          <p:cNvSpPr>
+            <a:spLocks noGrp="1"/>
+          </p:cNvSpPr>
+          <p:nvPr>
+            <p:ph type="body" idx="1"/>
+          </p:nvPr>
+        </p:nvSpPr>
+        <p:spPr/>
+        <p:txBody>
+          <a:bodyPr/>
+          <a:lstStyle/>
+          <a:p>
+            <a:r>
+              <a:rPr lang="de-DE" dirty="0"/>
+              <a:t>Annahme </a:t>
+            </a:r>
+          </a:p>
+          <a:p>
+            <a:pPr marL="0" indent="0">
+              <a:buFontTx/>
+              <a:buNone/>
+            </a:pPr>
+            <a:r>
+              <a:rPr lang="de-DE" dirty="0"/>
+              <a:t>-   Getränkemarkt hat Gewinnmarge von 15%</a:t>
+            </a:r>
+          </a:p>
+          <a:p>
+            <a:pPr marL="171450" indent="-171450">
+              <a:buFontTx/>
+              <a:buChar char="-"/>
+            </a:pPr>
+            <a:r>
+              <a:rPr lang="de-DE" dirty="0"/>
+              <a:t>Endprodukt wird für etwa 0.87€/l  verkauft</a:t>
+            </a:r>
+          </a:p>
+          <a:p>
+            <a:pPr marL="171450" indent="-171450">
+              <a:buFontTx/>
+              <a:buChar char="-"/>
+            </a:pPr>
+            <a:r>
+              <a:rPr lang="de-DE" dirty="0"/>
+              <a:t>Produktionskosten von 0.675€/l</a:t>
+            </a:r>
+          </a:p>
+        </p:txBody>
+      </p:sp>
+      <p:sp>
+        <p:nvSpPr>
+          <p:cNvPr id="4" name="Foliennummernplatzhalter 3"/>
+          <p:cNvSpPr>
+            <a:spLocks noGrp="1"/>
+          </p:cNvSpPr>
+          <p:nvPr>
+            <p:ph type="sldNum" sz="quarter" idx="5"/>
+          </p:nvPr>
+        </p:nvSpPr>
+        <p:spPr/>
+        <p:txBody>
+          <a:bodyPr/>
+          <a:lstStyle/>
+          <a:p>
+            <a:fld id="{2F526E87-3F77-4BDE-BD80-0F6E2B67AF76}" type="slidenum">
+              <a:rPr lang="de-DE" smtClean="0"/>
+              <a:t>12</a:t>
+            </a:fld>
+            <a:endParaRPr lang="de-DE"/>
+          </a:p>
+        </p:txBody>
+      </p:sp>
+    </p:spTree>
+    <p:extLst>
+      <p:ext uri="{BB962C8B-B14F-4D97-AF65-F5344CB8AC3E}">
+        <p14:creationId xmlns:p14="http://schemas.microsoft.com/office/powerpoint/2010/main" val="3322788553"/>
+      </p:ext>
+    </p:extLst>
+  </p:cSld>
+  <p:clrMapOvr>
+    <a:masterClrMapping/>
+  </p:clrMapOvr>
+</p:notes>
+</file>
+
 <file path=ppt/slideLayouts/slideLayout1.xml><?xml version="1.0" encoding="utf-8"?>
 <p:sldLayout xmlns:a="http://schemas.openxmlformats.org/drawingml/2006/main" xmlns:r="http://schemas.openxmlformats.org/officeDocument/2006/relationships" xmlns:p="http://schemas.openxmlformats.org/presentationml/2006/main" type="title" preserve="1">
   <p:cSld name="Titelfolie">
@@ -271,7 +827,7 @@
           <a:p>
             <a:fld id="{D5E4B74C-DC10-4D74-8535-8C5AB711050D}" type="datetimeFigureOut">
               <a:rPr lang="de-DE" smtClean="0"/>
-              <a:t>01.11.2019</a:t>
+              <a:t>02.11.2019</a:t>
             </a:fld>
             <a:endParaRPr lang="de-DE"/>
           </a:p>
@@ -469,7 +1025,7 @@
           <a:p>
             <a:fld id="{D5E4B74C-DC10-4D74-8535-8C5AB711050D}" type="datetimeFigureOut">
               <a:rPr lang="de-DE" smtClean="0"/>
-              <a:t>01.11.2019</a:t>
+              <a:t>02.11.2019</a:t>
             </a:fld>
             <a:endParaRPr lang="de-DE"/>
           </a:p>
@@ -677,7 +1233,7 @@
           <a:p>
             <a:fld id="{D5E4B74C-DC10-4D74-8535-8C5AB711050D}" type="datetimeFigureOut">
               <a:rPr lang="de-DE" smtClean="0"/>
-              <a:t>01.11.2019</a:t>
+              <a:t>02.11.2019</a:t>
             </a:fld>
             <a:endParaRPr lang="de-DE"/>
           </a:p>
@@ -875,7 +1431,7 @@
           <a:p>
             <a:fld id="{D5E4B74C-DC10-4D74-8535-8C5AB711050D}" type="datetimeFigureOut">
               <a:rPr lang="de-DE" smtClean="0"/>
-              <a:t>01.11.2019</a:t>
+              <a:t>02.11.2019</a:t>
             </a:fld>
             <a:endParaRPr lang="de-DE"/>
           </a:p>
@@ -1150,7 +1706,7 @@
           <a:p>
             <a:fld id="{D5E4B74C-DC10-4D74-8535-8C5AB711050D}" type="datetimeFigureOut">
               <a:rPr lang="de-DE" smtClean="0"/>
-              <a:t>01.11.2019</a:t>
+              <a:t>02.11.2019</a:t>
             </a:fld>
             <a:endParaRPr lang="de-DE"/>
           </a:p>
@@ -1415,7 +1971,7 @@
           <a:p>
             <a:fld id="{D5E4B74C-DC10-4D74-8535-8C5AB711050D}" type="datetimeFigureOut">
               <a:rPr lang="de-DE" smtClean="0"/>
-              <a:t>01.11.2019</a:t>
+              <a:t>02.11.2019</a:t>
             </a:fld>
             <a:endParaRPr lang="de-DE"/>
           </a:p>
@@ -1827,7 +2383,7 @@
           <a:p>
             <a:fld id="{D5E4B74C-DC10-4D74-8535-8C5AB711050D}" type="datetimeFigureOut">
               <a:rPr lang="de-DE" smtClean="0"/>
-              <a:t>01.11.2019</a:t>
+              <a:t>02.11.2019</a:t>
             </a:fld>
             <a:endParaRPr lang="de-DE"/>
           </a:p>
@@ -1968,7 +2524,7 @@
           <a:p>
             <a:fld id="{D5E4B74C-DC10-4D74-8535-8C5AB711050D}" type="datetimeFigureOut">
               <a:rPr lang="de-DE" smtClean="0"/>
-              <a:t>01.11.2019</a:t>
+              <a:t>02.11.2019</a:t>
             </a:fld>
             <a:endParaRPr lang="de-DE"/>
           </a:p>
@@ -2081,7 +2637,7 @@
           <a:p>
             <a:fld id="{D5E4B74C-DC10-4D74-8535-8C5AB711050D}" type="datetimeFigureOut">
               <a:rPr lang="de-DE" smtClean="0"/>
-              <a:t>01.11.2019</a:t>
+              <a:t>02.11.2019</a:t>
             </a:fld>
             <a:endParaRPr lang="de-DE"/>
           </a:p>
@@ -2392,7 +2948,7 @@
           <a:p>
             <a:fld id="{D5E4B74C-DC10-4D74-8535-8C5AB711050D}" type="datetimeFigureOut">
               <a:rPr lang="de-DE" smtClean="0"/>
-              <a:t>01.11.2019</a:t>
+              <a:t>02.11.2019</a:t>
             </a:fld>
             <a:endParaRPr lang="de-DE"/>
           </a:p>
@@ -2680,7 +3236,7 @@
           <a:p>
             <a:fld id="{D5E4B74C-DC10-4D74-8535-8C5AB711050D}" type="datetimeFigureOut">
               <a:rPr lang="de-DE" smtClean="0"/>
-              <a:t>01.11.2019</a:t>
+              <a:t>02.11.2019</a:t>
             </a:fld>
             <a:endParaRPr lang="de-DE"/>
           </a:p>
@@ -2921,7 +3477,7 @@
           <a:p>
             <a:fld id="{D5E4B74C-DC10-4D74-8535-8C5AB711050D}" type="datetimeFigureOut">
               <a:rPr lang="de-DE" smtClean="0"/>
-              <a:t>01.11.2019</a:t>
+              <a:t>02.11.2019</a:t>
             </a:fld>
             <a:endParaRPr lang="de-DE"/>
           </a:p>
@@ -6290,14 +6846,14 @@
           <p:nvPr>
             <p:extLst>
               <p:ext uri="{D42A27DB-BD31-4B8C-83A1-F6EECF244321}">
-                <p14:modId xmlns:p14="http://schemas.microsoft.com/office/powerpoint/2010/main" val="3665056737"/>
+                <p14:modId xmlns:p14="http://schemas.microsoft.com/office/powerpoint/2010/main" val="3909225733"/>
               </p:ext>
             </p:extLst>
           </p:nvPr>
         </p:nvGraphicFramePr>
         <p:xfrm>
           <a:off x="838200" y="1595435"/>
-          <a:ext cx="9658350" cy="4390329"/>
+          <a:ext cx="10515600" cy="4390329"/>
         </p:xfrm>
         <a:graphic>
           <a:graphicData uri="http://schemas.openxmlformats.org/drawingml/2006/table">
@@ -6306,21 +6862,21 @@
                 <a:tableStyleId>{5C22544A-7EE6-4342-B048-85BDC9FD1C3A}</a:tableStyleId>
               </a:tblPr>
               <a:tblGrid>
-                <a:gridCol w="3219450">
+                <a:gridCol w="3505200">
                   <a:extLst>
                     <a:ext uri="{9D8B030D-6E8A-4147-A177-3AD203B41FA5}">
                       <a16:colId xmlns:a16="http://schemas.microsoft.com/office/drawing/2014/main" val="2823823705"/>
                     </a:ext>
                   </a:extLst>
                 </a:gridCol>
-                <a:gridCol w="3219450">
+                <a:gridCol w="3735495">
                   <a:extLst>
                     <a:ext uri="{9D8B030D-6E8A-4147-A177-3AD203B41FA5}">
                       <a16:colId xmlns:a16="http://schemas.microsoft.com/office/drawing/2014/main" val="2983007004"/>
                     </a:ext>
                   </a:extLst>
                 </a:gridCol>
-                <a:gridCol w="3219450">
+                <a:gridCol w="3274905">
                   <a:extLst>
                     <a:ext uri="{9D8B030D-6E8A-4147-A177-3AD203B41FA5}">
                       <a16:colId xmlns:a16="http://schemas.microsoft.com/office/drawing/2014/main" val="285467693"/>
@@ -6395,7 +6951,7 @@
                     <a:p>
                       <a:r>
                         <a:rPr lang="de-DE" dirty="0"/>
-                        <a:t>2 Monate * 4 MAs * 10 h/Woche *  5000€/pro Monat = 10 000€</a:t>
+                        <a:t>2 Monate * 4 MAs * 20 h/Woche *  5000€/pro Monat</a:t>
                       </a:r>
                     </a:p>
                   </a:txBody>
@@ -6408,7 +6964,7 @@
                     <a:p>
                       <a:r>
                         <a:rPr lang="de-DE" dirty="0"/>
-                        <a:t>10 000€</a:t>
+                        <a:t>20 000€</a:t>
                       </a:r>
                     </a:p>
                   </a:txBody>
@@ -6441,7 +6997,7 @@
                     <a:p>
                       <a:r>
                         <a:rPr lang="de-DE" dirty="0"/>
-                        <a:t>150 € + 200€ + 110€ * MA Anzahl + 50€ Sensoren/Aktoren</a:t>
+                        <a:t>450€ + 200€ + 110€ * MA Anzahl + 150€  Sensoren/Aktoren</a:t>
                       </a:r>
                     </a:p>
                   </a:txBody>
@@ -6454,7 +7010,7 @@
                     <a:p>
                       <a:r>
                         <a:rPr lang="de-DE" dirty="0"/>
-                        <a:t>10 000€ + 1500€ = 11 500€</a:t>
+                        <a:t>20 000€ + 4 100€ = 24 100€</a:t>
                       </a:r>
                     </a:p>
                   </a:txBody>
@@ -6499,13 +7055,13 @@
                     <a:p>
                       <a:r>
                         <a:rPr lang="de-DE" dirty="0"/>
-                        <a:t>Wartung + Support = 22% </a:t>
+                        <a:t>Wartung + Support = 17% + 5% </a:t>
                       </a:r>
                     </a:p>
                     <a:p>
                       <a:r>
                         <a:rPr lang="de-DE" dirty="0"/>
-                        <a:t>10 Limited User =  20 374€</a:t>
+                        <a:t>30 Limited + 1 Professional =  54 534€</a:t>
                       </a:r>
                     </a:p>
                   </a:txBody>
@@ -6518,7 +7074,7 @@
                     <a:p>
                       <a:r>
                         <a:rPr lang="de-DE" dirty="0"/>
-                        <a:t>11 500€ + 20 374€ = 31 874€</a:t>
+                        <a:t>24 100€ + 54 534€ = 78 634€</a:t>
                       </a:r>
                     </a:p>
                   </a:txBody>
@@ -6551,7 +7107,7 @@
                     <a:p>
                       <a:r>
                         <a:rPr lang="de-DE" dirty="0"/>
-                        <a:t>15 % *  31 874€  =  4781€</a:t>
+                        <a:t>15 % *  78 634€  =  11 795€</a:t>
                       </a:r>
                     </a:p>
                   </a:txBody>
@@ -6564,7 +7120,7 @@
                     <a:p>
                       <a:r>
                         <a:rPr lang="de-DE" dirty="0"/>
-                        <a:t>31 874€ + 4781€ = 36 655€</a:t>
+                        <a:t>78 634€ + 11 795€ = 90 429€</a:t>
                       </a:r>
                     </a:p>
                   </a:txBody>
@@ -6663,7 +7219,7 @@
           <a:p>
             <a:r>
               <a:rPr lang="de-DE" dirty="0"/>
-              <a:t>Senkung des Fehlproduktionsrisikos um 60% , daraus resultiert eine Gewinnsteigerung von 11%</a:t>
+              <a:t>Senkung des Fehlproduktionsrisikos um 90% , daraus resultiert eine Gewinnsteigerung von 10%</a:t>
             </a:r>
             <a:br>
               <a:rPr lang="de-DE" dirty="0"/>
@@ -6677,20 +7233,20 @@
             </a:br>
             <a:r>
               <a:rPr lang="de-DE" dirty="0"/>
-              <a:t>(1 – 0.15) * 10 000l * 0.065 €/l = 552.5€ </a:t>
+              <a:t>(1 – 0.10) * 10 000l * 0.0675 €/l = 607.5€ </a:t>
             </a:r>
             <a:br>
               <a:rPr lang="de-DE" dirty="0"/>
             </a:br>
             <a:r>
               <a:rPr lang="de-DE" dirty="0"/>
-              <a:t>(1 – 0.05) * 10 000l * 0.065 €/l = 617.5€  =&gt; 65€ mehr Gewinn</a:t>
+              <a:t>(1 – 0.01) * 10 000l * 0.0675 €/l = 668.25€  =&gt; 60.75€ mehr Gewinn pro 10 000l</a:t>
             </a:r>
           </a:p>
           <a:p>
             <a:r>
               <a:rPr lang="de-DE" dirty="0"/>
-              <a:t>Aufgrund der erhöhten Qualität und dem sehr umkämpften niedrig Preis Sektor im Biermarkt ist ein Wachstum Ihres Marktanteils um 20% annehmbar</a:t>
+              <a:t>Aufgrund der erhöhten Qualität und dem sehr umkämpften niedrig Preis Sektor im Biermarkt ist ein Wachstum Ihres Marktanteils um 30% annehmbar</a:t>
             </a:r>
           </a:p>
           <a:p>
@@ -6803,7 +7359,7 @@
         <p:spPr/>
         <p:txBody>
           <a:bodyPr>
-            <a:normAutofit/>
+            <a:normAutofit fontScale="92500" lnSpcReduction="10000"/>
           </a:bodyPr>
           <a:lstStyle/>
           <a:p>
@@ -6871,6 +7427,21 @@
               <a:t>https://versino.de/sap-business-one/kosten/</a:t>
             </a:r>
             <a:endParaRPr lang="de-DE" dirty="0"/>
+          </a:p>
+          <a:p>
+            <a:pPr marL="0" indent="0">
+              <a:buNone/>
+            </a:pPr>
+            <a:r>
+              <a:rPr lang="de-DE" dirty="0"/>
+              <a:t>Informationen zum Unternehmen:</a:t>
+            </a:r>
+          </a:p>
+          <a:p>
+            <a:r>
+              <a:rPr lang="de-DE" dirty="0"/>
+              <a:t>Ilias Blogg und Ausschreibung</a:t>
+            </a:r>
           </a:p>
           <a:p>
             <a:endParaRPr lang="de-DE" dirty="0"/>
@@ -9951,4 +10522,299 @@
     </a:ext>
   </a:extLst>
 </a:theme>
+</file>
+
+<file path=ppt/theme/theme2.xml><?xml version="1.0" encoding="utf-8"?>
+<a:theme xmlns:a="http://schemas.openxmlformats.org/drawingml/2006/main" name="Office">
+  <a:themeElements>
+    <a:clrScheme name="Office">
+      <a:dk1>
+        <a:sysClr val="windowText" lastClr="000000"/>
+      </a:dk1>
+      <a:lt1>
+        <a:sysClr val="window" lastClr="FFFFFF"/>
+      </a:lt1>
+      <a:dk2>
+        <a:srgbClr val="44546A"/>
+      </a:dk2>
+      <a:lt2>
+        <a:srgbClr val="E7E6E6"/>
+      </a:lt2>
+      <a:accent1>
+        <a:srgbClr val="4472C4"/>
+      </a:accent1>
+      <a:accent2>
+        <a:srgbClr val="ED7D31"/>
+      </a:accent2>
+      <a:accent3>
+        <a:srgbClr val="A5A5A5"/>
+      </a:accent3>
+      <a:accent4>
+        <a:srgbClr val="FFC000"/>
+      </a:accent4>
+      <a:accent5>
+        <a:srgbClr val="5B9BD5"/>
+      </a:accent5>
+      <a:accent6>
+        <a:srgbClr val="70AD47"/>
+      </a:accent6>
+      <a:hlink>
+        <a:srgbClr val="0563C1"/>
+      </a:hlink>
+      <a:folHlink>
+        <a:srgbClr val="954F72"/>
+      </a:folHlink>
+    </a:clrScheme>
+    <a:fontScheme name="Office">
+      <a:majorFont>
+        <a:latin typeface="Calibri Light" panose="020F0302020204030204"/>
+        <a:ea typeface=""/>
+        <a:cs typeface=""/>
+        <a:font script="Jpan" typeface="游ゴシック Light"/>
+        <a:font script="Hang" typeface="맑은 고딕"/>
+        <a:font script="Hans" typeface="等线 Light"/>
+        <a:font script="Hant" typeface="新細明體"/>
+        <a:font script="Arab" typeface="Times New Roman"/>
+        <a:font script="Hebr" typeface="Times New Roman"/>
+        <a:font script="Thai" typeface="Angsana New"/>
+        <a:font script="Ethi" typeface="Nyala"/>
+        <a:font script="Beng" typeface="Vrinda"/>
+        <a:font script="Gujr" typeface="Shruti"/>
+        <a:font script="Khmr" typeface="MoolBoran"/>
+        <a:font script="Knda" typeface="Tunga"/>
+        <a:font script="Guru" typeface="Raavi"/>
+        <a:font script="Cans" typeface="Euphemia"/>
+        <a:font script="Cher" typeface="Plantagenet Cherokee"/>
+        <a:font script="Yiii" typeface="Microsoft Yi Baiti"/>
+        <a:font script="Tibt" typeface="Microsoft Himalaya"/>
+        <a:font script="Thaa" typeface="MV Boli"/>
+        <a:font script="Deva" typeface="Mangal"/>
+        <a:font script="Telu" typeface="Gautami"/>
+        <a:font script="Taml" typeface="Latha"/>
+        <a:font script="Syrc" typeface="Estrangelo Edessa"/>
+        <a:font script="Orya" typeface="Kalinga"/>
+        <a:font script="Mlym" typeface="Kartika"/>
+        <a:font script="Laoo" typeface="DokChampa"/>
+        <a:font script="Sinh" typeface="Iskoola Pota"/>
+        <a:font script="Mong" typeface="Mongolian Baiti"/>
+        <a:font script="Viet" typeface="Times New Roman"/>
+        <a:font script="Uigh" typeface="Microsoft Uighur"/>
+        <a:font script="Geor" typeface="Sylfaen"/>
+        <a:font script="Armn" typeface="Arial"/>
+        <a:font script="Bugi" typeface="Leelawadee UI"/>
+        <a:font script="Bopo" typeface="Microsoft JhengHei"/>
+        <a:font script="Java" typeface="Javanese Text"/>
+        <a:font script="Lisu" typeface="Segoe UI"/>
+        <a:font script="Mymr" typeface="Myanmar Text"/>
+        <a:font script="Nkoo" typeface="Ebrima"/>
+        <a:font script="Olck" typeface="Nirmala UI"/>
+        <a:font script="Osma" typeface="Ebrima"/>
+        <a:font script="Phag" typeface="Phagspa"/>
+        <a:font script="Syrn" typeface="Estrangelo Edessa"/>
+        <a:font script="Syrj" typeface="Estrangelo Edessa"/>
+        <a:font script="Syre" typeface="Estrangelo Edessa"/>
+        <a:font script="Sora" typeface="Nirmala UI"/>
+        <a:font script="Tale" typeface="Microsoft Tai Le"/>
+        <a:font script="Talu" typeface="Microsoft New Tai Lue"/>
+        <a:font script="Tfng" typeface="Ebrima"/>
+      </a:majorFont>
+      <a:minorFont>
+        <a:latin typeface="Calibri" panose="020F0502020204030204"/>
+        <a:ea typeface=""/>
+        <a:cs typeface=""/>
+        <a:font script="Jpan" typeface="游ゴシック"/>
+        <a:font script="Hang" typeface="맑은 고딕"/>
+        <a:font script="Hans" typeface="等线"/>
+        <a:font script="Hant" typeface="新細明體"/>
+        <a:font script="Arab" typeface="Arial"/>
+        <a:font script="Hebr" typeface="Arial"/>
+        <a:font script="Thai" typeface="Cordia New"/>
+        <a:font script="Ethi" typeface="Nyala"/>
+        <a:font script="Beng" typeface="Vrinda"/>
+        <a:font script="Gujr" typeface="Shruti"/>
+        <a:font script="Khmr" typeface="DaunPenh"/>
+        <a:font script="Knda" typeface="Tunga"/>
+        <a:font script="Guru" typeface="Raavi"/>
+        <a:font script="Cans" typeface="Euphemia"/>
+        <a:font script="Cher" typeface="Plantagenet Cherokee"/>
+        <a:font script="Yiii" typeface="Microsoft Yi Baiti"/>
+        <a:font script="Tibt" typeface="Microsoft Himalaya"/>
+        <a:font script="Thaa" typeface="MV Boli"/>
+        <a:font script="Deva" typeface="Mangal"/>
+        <a:font script="Telu" typeface="Gautami"/>
+        <a:font script="Taml" typeface="Latha"/>
+        <a:font script="Syrc" typeface="Estrangelo Edessa"/>
+        <a:font script="Orya" typeface="Kalinga"/>
+        <a:font script="Mlym" typeface="Kartika"/>
+        <a:font script="Laoo" typeface="DokChampa"/>
+        <a:font script="Sinh" typeface="Iskoola Pota"/>
+        <a:font script="Mong" typeface="Mongolian Baiti"/>
+        <a:font script="Viet" typeface="Arial"/>
+        <a:font script="Uigh" typeface="Microsoft Uighur"/>
+        <a:font script="Geor" typeface="Sylfaen"/>
+        <a:font script="Armn" typeface="Arial"/>
+        <a:font script="Bugi" typeface="Leelawadee UI"/>
+        <a:font script="Bopo" typeface="Microsoft JhengHei"/>
+        <a:font script="Java" typeface="Javanese Text"/>
+        <a:font script="Lisu" typeface="Segoe UI"/>
+        <a:font script="Mymr" typeface="Myanmar Text"/>
+        <a:font script="Nkoo" typeface="Ebrima"/>
+        <a:font script="Olck" typeface="Nirmala UI"/>
+        <a:font script="Osma" typeface="Ebrima"/>
+        <a:font script="Phag" typeface="Phagspa"/>
+        <a:font script="Syrn" typeface="Estrangelo Edessa"/>
+        <a:font script="Syrj" typeface="Estrangelo Edessa"/>
+        <a:font script="Syre" typeface="Estrangelo Edessa"/>
+        <a:font script="Sora" typeface="Nirmala UI"/>
+        <a:font script="Tale" typeface="Microsoft Tai Le"/>
+        <a:font script="Talu" typeface="Microsoft New Tai Lue"/>
+        <a:font script="Tfng" typeface="Ebrima"/>
+      </a:minorFont>
+    </a:fontScheme>
+    <a:fmtScheme name="Office">
+      <a:fillStyleLst>
+        <a:solidFill>
+          <a:schemeClr val="phClr"/>
+        </a:solidFill>
+        <a:gradFill rotWithShape="1">
+          <a:gsLst>
+            <a:gs pos="0">
+              <a:schemeClr val="phClr">
+                <a:lumMod val="110000"/>
+                <a:satMod val="105000"/>
+                <a:tint val="67000"/>
+              </a:schemeClr>
+            </a:gs>
+            <a:gs pos="50000">
+              <a:schemeClr val="phClr">
+                <a:lumMod val="105000"/>
+                <a:satMod val="103000"/>
+                <a:tint val="73000"/>
+              </a:schemeClr>
+            </a:gs>
+            <a:gs pos="100000">
+              <a:schemeClr val="phClr">
+                <a:lumMod val="105000"/>
+                <a:satMod val="109000"/>
+                <a:tint val="81000"/>
+              </a:schemeClr>
+            </a:gs>
+          </a:gsLst>
+          <a:lin ang="5400000" scaled="0"/>
+        </a:gradFill>
+        <a:gradFill rotWithShape="1">
+          <a:gsLst>
+            <a:gs pos="0">
+              <a:schemeClr val="phClr">
+                <a:satMod val="103000"/>
+                <a:lumMod val="102000"/>
+                <a:tint val="94000"/>
+              </a:schemeClr>
+            </a:gs>
+            <a:gs pos="50000">
+              <a:schemeClr val="phClr">
+                <a:satMod val="110000"/>
+                <a:lumMod val="100000"/>
+                <a:shade val="100000"/>
+              </a:schemeClr>
+            </a:gs>
+            <a:gs pos="100000">
+              <a:schemeClr val="phClr">
+                <a:lumMod val="99000"/>
+                <a:satMod val="120000"/>
+                <a:shade val="78000"/>
+              </a:schemeClr>
+            </a:gs>
+          </a:gsLst>
+          <a:lin ang="5400000" scaled="0"/>
+        </a:gradFill>
+      </a:fillStyleLst>
+      <a:lnStyleLst>
+        <a:ln w="6350" cap="flat" cmpd="sng" algn="ctr">
+          <a:solidFill>
+            <a:schemeClr val="phClr"/>
+          </a:solidFill>
+          <a:prstDash val="solid"/>
+          <a:miter lim="800000"/>
+        </a:ln>
+        <a:ln w="12700" cap="flat" cmpd="sng" algn="ctr">
+          <a:solidFill>
+            <a:schemeClr val="phClr"/>
+          </a:solidFill>
+          <a:prstDash val="solid"/>
+          <a:miter lim="800000"/>
+        </a:ln>
+        <a:ln w="19050" cap="flat" cmpd="sng" algn="ctr">
+          <a:solidFill>
+            <a:schemeClr val="phClr"/>
+          </a:solidFill>
+          <a:prstDash val="solid"/>
+          <a:miter lim="800000"/>
+        </a:ln>
+      </a:lnStyleLst>
+      <a:effectStyleLst>
+        <a:effectStyle>
+          <a:effectLst/>
+        </a:effectStyle>
+        <a:effectStyle>
+          <a:effectLst/>
+        </a:effectStyle>
+        <a:effectStyle>
+          <a:effectLst>
+            <a:outerShdw blurRad="57150" dist="19050" dir="5400000" algn="ctr" rotWithShape="0">
+              <a:srgbClr val="000000">
+                <a:alpha val="63000"/>
+              </a:srgbClr>
+            </a:outerShdw>
+          </a:effectLst>
+        </a:effectStyle>
+      </a:effectStyleLst>
+      <a:bgFillStyleLst>
+        <a:solidFill>
+          <a:schemeClr val="phClr"/>
+        </a:solidFill>
+        <a:solidFill>
+          <a:schemeClr val="phClr">
+            <a:tint val="95000"/>
+            <a:satMod val="170000"/>
+          </a:schemeClr>
+        </a:solidFill>
+        <a:gradFill rotWithShape="1">
+          <a:gsLst>
+            <a:gs pos="0">
+              <a:schemeClr val="phClr">
+                <a:tint val="93000"/>
+                <a:satMod val="150000"/>
+                <a:shade val="98000"/>
+                <a:lumMod val="102000"/>
+              </a:schemeClr>
+            </a:gs>
+            <a:gs pos="50000">
+              <a:schemeClr val="phClr">
+                <a:tint val="98000"/>
+                <a:satMod val="130000"/>
+                <a:shade val="90000"/>
+                <a:lumMod val="103000"/>
+              </a:schemeClr>
+            </a:gs>
+            <a:gs pos="100000">
+              <a:schemeClr val="phClr">
+                <a:shade val="63000"/>
+                <a:satMod val="120000"/>
+              </a:schemeClr>
+            </a:gs>
+          </a:gsLst>
+          <a:lin ang="5400000" scaled="0"/>
+        </a:gradFill>
+      </a:bgFillStyleLst>
+    </a:fmtScheme>
+  </a:themeElements>
+  <a:objectDefaults/>
+  <a:extraClrSchemeLst/>
+  <a:extLst>
+    <a:ext uri="{05A4C25C-085E-4340-85A3-A5531E510DB2}">
+      <thm15:themeFamily xmlns:thm15="http://schemas.microsoft.com/office/thememl/2012/main" name="Office Theme" id="{62F939B6-93AF-4DB8-9C6B-D6C7DFDC589F}" vid="{4A3C46E8-61CC-4603-A589-7422A47A8E4A}"/>
+    </a:ext>
+  </a:extLst>
+</a:theme>
 </file>
</xml_diff>

<commit_message>
added arrows in BPMN and fixed some spelling
</commit_message>
<xml_diff>
--- a/Präsentation/Präsentation_Entwurf.pptx
+++ b/Präsentation/Präsentation_Entwurf.pptx
@@ -9759,7 +9759,7 @@
           <a:p>
             <a:r>
               <a:rPr lang="de-DE" dirty="0"/>
-              <a:t>Sicherung bzw. sogar Verbesserung der Qualität durch klare Instruktionen</a:t>
+              <a:t>Sicherung bzw. Verbesserung der Qualität durch klare Instruktionen</a:t>
             </a:r>
           </a:p>
           <a:p>
@@ -9862,8 +9862,8 @@
         </p:blipFill>
         <p:spPr>
           <a:xfrm>
-            <a:off x="2290407" y="530086"/>
-            <a:ext cx="8125801" cy="6189833"/>
+            <a:off x="2270233" y="811125"/>
+            <a:ext cx="7756863" cy="5908794"/>
           </a:xfrm>
           <a:prstGeom prst="rect">
             <a:avLst/>
@@ -9884,8 +9884,8 @@
         </p:nvSpPr>
         <p:spPr>
           <a:xfrm>
-            <a:off x="4866208" y="138081"/>
-            <a:ext cx="2499530" cy="369332"/>
+            <a:off x="343591" y="138081"/>
+            <a:ext cx="5752409" cy="769441"/>
           </a:xfrm>
           <a:prstGeom prst="rect">
             <a:avLst/>
@@ -9899,7 +9899,7 @@
           <a:lstStyle/>
           <a:p>
             <a:r>
-              <a:rPr lang="de-DE" b="1" u="sng" dirty="0"/>
+              <a:rPr lang="de-DE" sz="4400" dirty="0"/>
               <a:t>Business Process Canvas</a:t>
             </a:r>
           </a:p>
@@ -10851,6 +10851,242 @@
           </a:fontRef>
         </p:style>
       </p:cxnSp>
+      <p:cxnSp>
+        <p:nvCxnSpPr>
+          <p:cNvPr id="7" name="Gerade Verbindung mit Pfeil 6">
+            <a:extLst>
+              <a:ext uri="{FF2B5EF4-FFF2-40B4-BE49-F238E27FC236}">
+                <a16:creationId xmlns:a16="http://schemas.microsoft.com/office/drawing/2014/main" id="{A96D4E76-2689-46B7-A6AB-8525918E8A66}"/>
+              </a:ext>
+            </a:extLst>
+          </p:cNvPr>
+          <p:cNvCxnSpPr>
+            <a:cxnSpLocks/>
+          </p:cNvCxnSpPr>
+          <p:nvPr/>
+        </p:nvCxnSpPr>
+        <p:spPr>
+          <a:xfrm flipV="1">
+            <a:off x="10595003" y="2601310"/>
+            <a:ext cx="0" cy="451453"/>
+          </a:xfrm>
+          <a:prstGeom prst="straightConnector1">
+            <a:avLst/>
+          </a:prstGeom>
+          <a:ln w="9525" cap="rnd" cmpd="sng" algn="ctr">
+            <a:solidFill>
+              <a:schemeClr val="dk1"/>
+            </a:solidFill>
+            <a:prstDash val="dash"/>
+            <a:round/>
+            <a:headEnd type="none" w="med" len="med"/>
+            <a:tailEnd type="none" w="med" len="med"/>
+          </a:ln>
+        </p:spPr>
+        <p:style>
+          <a:lnRef idx="0">
+            <a:scrgbClr r="0" g="0" b="0"/>
+          </a:lnRef>
+          <a:fillRef idx="0">
+            <a:scrgbClr r="0" g="0" b="0"/>
+          </a:fillRef>
+          <a:effectRef idx="0">
+            <a:scrgbClr r="0" g="0" b="0"/>
+          </a:effectRef>
+          <a:fontRef idx="minor">
+            <a:schemeClr val="tx1"/>
+          </a:fontRef>
+        </p:style>
+      </p:cxnSp>
+      <p:cxnSp>
+        <p:nvCxnSpPr>
+          <p:cNvPr id="8" name="Gerade Verbindung mit Pfeil 7">
+            <a:extLst>
+              <a:ext uri="{FF2B5EF4-FFF2-40B4-BE49-F238E27FC236}">
+                <a16:creationId xmlns:a16="http://schemas.microsoft.com/office/drawing/2014/main" id="{2E4E40B2-3B7F-44BD-9422-51F913CD4804}"/>
+              </a:ext>
+            </a:extLst>
+          </p:cNvPr>
+          <p:cNvCxnSpPr>
+            <a:cxnSpLocks/>
+          </p:cNvCxnSpPr>
+          <p:nvPr/>
+        </p:nvCxnSpPr>
+        <p:spPr>
+          <a:xfrm flipH="1" flipV="1">
+            <a:off x="8812924" y="2601310"/>
+            <a:ext cx="1782082" cy="3"/>
+          </a:xfrm>
+          <a:prstGeom prst="straightConnector1">
+            <a:avLst/>
+          </a:prstGeom>
+          <a:ln w="9525" cap="rnd" cmpd="sng" algn="ctr">
+            <a:solidFill>
+              <a:schemeClr val="dk1"/>
+            </a:solidFill>
+            <a:prstDash val="dash"/>
+            <a:round/>
+            <a:headEnd type="none" w="med" len="med"/>
+            <a:tailEnd type="none" w="med" len="med"/>
+          </a:ln>
+        </p:spPr>
+        <p:style>
+          <a:lnRef idx="0">
+            <a:scrgbClr r="0" g="0" b="0"/>
+          </a:lnRef>
+          <a:fillRef idx="0">
+            <a:scrgbClr r="0" g="0" b="0"/>
+          </a:fillRef>
+          <a:effectRef idx="0">
+            <a:scrgbClr r="0" g="0" b="0"/>
+          </a:effectRef>
+          <a:fontRef idx="minor">
+            <a:schemeClr val="tx1"/>
+          </a:fontRef>
+        </p:style>
+      </p:cxnSp>
+      <p:cxnSp>
+        <p:nvCxnSpPr>
+          <p:cNvPr id="13" name="Gerade Verbindung mit Pfeil 12">
+            <a:extLst>
+              <a:ext uri="{FF2B5EF4-FFF2-40B4-BE49-F238E27FC236}">
+                <a16:creationId xmlns:a16="http://schemas.microsoft.com/office/drawing/2014/main" id="{C494E480-806B-4840-B537-2CABB27E1B44}"/>
+              </a:ext>
+            </a:extLst>
+          </p:cNvPr>
+          <p:cNvCxnSpPr>
+            <a:cxnSpLocks/>
+            <a:endCxn id="3" idx="0"/>
+          </p:cNvCxnSpPr>
+          <p:nvPr/>
+        </p:nvCxnSpPr>
+        <p:spPr>
+          <a:xfrm flipH="1" flipV="1">
+            <a:off x="8503444" y="1895475"/>
+            <a:ext cx="309480" cy="705835"/>
+          </a:xfrm>
+          <a:prstGeom prst="straightConnector1">
+            <a:avLst/>
+          </a:prstGeom>
+          <a:ln w="9525" cap="rnd" cmpd="sng" algn="ctr">
+            <a:solidFill>
+              <a:schemeClr val="dk1"/>
+            </a:solidFill>
+            <a:prstDash val="dash"/>
+            <a:round/>
+            <a:headEnd type="none" w="med" len="med"/>
+            <a:tailEnd type="arrow" w="med" len="med"/>
+          </a:ln>
+        </p:spPr>
+        <p:style>
+          <a:lnRef idx="0">
+            <a:scrgbClr r="0" g="0" b="0"/>
+          </a:lnRef>
+          <a:fillRef idx="0">
+            <a:scrgbClr r="0" g="0" b="0"/>
+          </a:fillRef>
+          <a:effectRef idx="0">
+            <a:scrgbClr r="0" g="0" b="0"/>
+          </a:effectRef>
+          <a:fontRef idx="minor">
+            <a:schemeClr val="tx1"/>
+          </a:fontRef>
+        </p:style>
+      </p:cxnSp>
+      <p:cxnSp>
+        <p:nvCxnSpPr>
+          <p:cNvPr id="16" name="Gerade Verbindung mit Pfeil 15">
+            <a:extLst>
+              <a:ext uri="{FF2B5EF4-FFF2-40B4-BE49-F238E27FC236}">
+                <a16:creationId xmlns:a16="http://schemas.microsoft.com/office/drawing/2014/main" id="{57BFBCD0-F6E6-476D-8093-B613206FFC58}"/>
+              </a:ext>
+            </a:extLst>
+          </p:cNvPr>
+          <p:cNvCxnSpPr>
+            <a:cxnSpLocks/>
+          </p:cNvCxnSpPr>
+          <p:nvPr/>
+        </p:nvCxnSpPr>
+        <p:spPr>
+          <a:xfrm flipH="1" flipV="1">
+            <a:off x="8574554" y="1895475"/>
+            <a:ext cx="2477074" cy="705835"/>
+          </a:xfrm>
+          <a:prstGeom prst="straightConnector1">
+            <a:avLst/>
+          </a:prstGeom>
+          <a:ln w="9525" cap="rnd" cmpd="sng" algn="ctr">
+            <a:solidFill>
+              <a:schemeClr val="dk1"/>
+            </a:solidFill>
+            <a:prstDash val="dash"/>
+            <a:round/>
+            <a:headEnd type="none" w="med" len="med"/>
+            <a:tailEnd type="arrow" w="med" len="med"/>
+          </a:ln>
+        </p:spPr>
+        <p:style>
+          <a:lnRef idx="0">
+            <a:scrgbClr r="0" g="0" b="0"/>
+          </a:lnRef>
+          <a:fillRef idx="0">
+            <a:scrgbClr r="0" g="0" b="0"/>
+          </a:fillRef>
+          <a:effectRef idx="0">
+            <a:scrgbClr r="0" g="0" b="0"/>
+          </a:effectRef>
+          <a:fontRef idx="minor">
+            <a:schemeClr val="tx1"/>
+          </a:fontRef>
+        </p:style>
+      </p:cxnSp>
+      <p:cxnSp>
+        <p:nvCxnSpPr>
+          <p:cNvPr id="18" name="Gerade Verbindung mit Pfeil 17">
+            <a:extLst>
+              <a:ext uri="{FF2B5EF4-FFF2-40B4-BE49-F238E27FC236}">
+                <a16:creationId xmlns:a16="http://schemas.microsoft.com/office/drawing/2014/main" id="{FCB91439-15BC-4EAC-9A11-88851AA99612}"/>
+              </a:ext>
+            </a:extLst>
+          </p:cNvPr>
+          <p:cNvCxnSpPr>
+            <a:cxnSpLocks/>
+          </p:cNvCxnSpPr>
+          <p:nvPr/>
+        </p:nvCxnSpPr>
+        <p:spPr>
+          <a:xfrm flipH="1">
+            <a:off x="11067969" y="2601310"/>
+            <a:ext cx="724696" cy="0"/>
+          </a:xfrm>
+          <a:prstGeom prst="straightConnector1">
+            <a:avLst/>
+          </a:prstGeom>
+          <a:ln w="9525" cap="rnd" cmpd="sng" algn="ctr">
+            <a:solidFill>
+              <a:schemeClr val="dk1"/>
+            </a:solidFill>
+            <a:prstDash val="dash"/>
+            <a:round/>
+            <a:headEnd type="none" w="med" len="med"/>
+            <a:tailEnd type="none" w="med" len="med"/>
+          </a:ln>
+        </p:spPr>
+        <p:style>
+          <a:lnRef idx="0">
+            <a:scrgbClr r="0" g="0" b="0"/>
+          </a:lnRef>
+          <a:fillRef idx="0">
+            <a:scrgbClr r="0" g="0" b="0"/>
+          </a:fillRef>
+          <a:effectRef idx="0">
+            <a:scrgbClr r="0" g="0" b="0"/>
+          </a:effectRef>
+          <a:fontRef idx="minor">
+            <a:schemeClr val="tx1"/>
+          </a:fontRef>
+        </p:style>
+      </p:cxnSp>
     </p:spTree>
     <p:extLst>
       <p:ext uri="{BB962C8B-B14F-4D97-AF65-F5344CB8AC3E}">
@@ -10945,6 +11181,100 @@
           </a:p>
         </p:txBody>
       </p:sp>
+      <p:cxnSp>
+        <p:nvCxnSpPr>
+          <p:cNvPr id="11" name="Gerade Verbindung mit Pfeil 10">
+            <a:extLst>
+              <a:ext uri="{FF2B5EF4-FFF2-40B4-BE49-F238E27FC236}">
+                <a16:creationId xmlns:a16="http://schemas.microsoft.com/office/drawing/2014/main" id="{029E55C0-3341-44A4-B1F0-855160B93B7A}"/>
+              </a:ext>
+            </a:extLst>
+          </p:cNvPr>
+          <p:cNvCxnSpPr>
+            <a:cxnSpLocks/>
+          </p:cNvCxnSpPr>
+          <p:nvPr/>
+        </p:nvCxnSpPr>
+        <p:spPr>
+          <a:xfrm flipV="1">
+            <a:off x="4688189" y="2538248"/>
+            <a:ext cx="0" cy="591207"/>
+          </a:xfrm>
+          <a:prstGeom prst="straightConnector1">
+            <a:avLst/>
+          </a:prstGeom>
+          <a:ln w="9525" cap="rnd" cmpd="sng" algn="ctr">
+            <a:solidFill>
+              <a:schemeClr val="dk1"/>
+            </a:solidFill>
+            <a:prstDash val="dash"/>
+            <a:round/>
+            <a:headEnd type="none" w="med" len="med"/>
+            <a:tailEnd type="none" w="med" len="med"/>
+          </a:ln>
+        </p:spPr>
+        <p:style>
+          <a:lnRef idx="0">
+            <a:scrgbClr r="0" g="0" b="0"/>
+          </a:lnRef>
+          <a:fillRef idx="0">
+            <a:scrgbClr r="0" g="0" b="0"/>
+          </a:fillRef>
+          <a:effectRef idx="0">
+            <a:scrgbClr r="0" g="0" b="0"/>
+          </a:effectRef>
+          <a:fontRef idx="minor">
+            <a:schemeClr val="tx1"/>
+          </a:fontRef>
+        </p:style>
+      </p:cxnSp>
+      <p:cxnSp>
+        <p:nvCxnSpPr>
+          <p:cNvPr id="15" name="Gerade Verbindung mit Pfeil 14">
+            <a:extLst>
+              <a:ext uri="{FF2B5EF4-FFF2-40B4-BE49-F238E27FC236}">
+                <a16:creationId xmlns:a16="http://schemas.microsoft.com/office/drawing/2014/main" id="{51EB9300-C011-45A8-B043-2DC60294433A}"/>
+              </a:ext>
+            </a:extLst>
+          </p:cNvPr>
+          <p:cNvCxnSpPr>
+            <a:cxnSpLocks/>
+          </p:cNvCxnSpPr>
+          <p:nvPr/>
+        </p:nvCxnSpPr>
+        <p:spPr>
+          <a:xfrm flipH="1">
+            <a:off x="367932" y="2538248"/>
+            <a:ext cx="4320257" cy="1"/>
+          </a:xfrm>
+          <a:prstGeom prst="straightConnector1">
+            <a:avLst/>
+          </a:prstGeom>
+          <a:ln w="9525" cap="flat" cmpd="sng" algn="ctr">
+            <a:solidFill>
+              <a:schemeClr val="dk1"/>
+            </a:solidFill>
+            <a:prstDash val="dash"/>
+            <a:round/>
+            <a:headEnd type="none" w="med" len="med"/>
+            <a:tailEnd type="none" w="med" len="med"/>
+          </a:ln>
+        </p:spPr>
+        <p:style>
+          <a:lnRef idx="0">
+            <a:scrgbClr r="0" g="0" b="0"/>
+          </a:lnRef>
+          <a:fillRef idx="0">
+            <a:scrgbClr r="0" g="0" b="0"/>
+          </a:fillRef>
+          <a:effectRef idx="0">
+            <a:scrgbClr r="0" g="0" b="0"/>
+          </a:effectRef>
+          <a:fontRef idx="minor">
+            <a:schemeClr val="tx1"/>
+          </a:fontRef>
+        </p:style>
+      </p:cxnSp>
     </p:spTree>
     <p:extLst>
       <p:ext uri="{BB962C8B-B14F-4D97-AF65-F5344CB8AC3E}">
@@ -11698,6 +12028,20 @@
                 </a:solidFill>
               </a:rPr>
               <a:t>Produktionstest/Abnahme</a:t>
+            </a:r>
+          </a:p>
+          <a:p>
+            <a:pPr marL="285750" indent="-285750">
+              <a:buFont typeface="Arial" panose="020B0604020202020204" pitchFamily="34" charset="0"/>
+              <a:buChar char="•"/>
+            </a:pPr>
+            <a:r>
+              <a:rPr lang="de-DE" sz="1400" dirty="0">
+                <a:solidFill>
+                  <a:schemeClr val="tx1"/>
+                </a:solidFill>
+              </a:rPr>
+              <a:t>Test der Teilkomponenten</a:t>
             </a:r>
           </a:p>
         </p:txBody>
@@ -12388,7 +12732,7 @@
         </p:nvSpPr>
         <p:spPr>
           <a:xfrm>
-            <a:off x="1047750" y="6229350"/>
+            <a:off x="838200" y="6229351"/>
             <a:ext cx="7543800" cy="461665"/>
           </a:xfrm>
           <a:prstGeom prst="rect">

</xml_diff>